<commit_message>
presentation skeletton ... starting with examples
</commit_message>
<xml_diff>
--- a/Dependency Injection - the right way.pptx
+++ b/Dependency Injection - the right way.pptx
@@ -5,7 +5,7 @@
     <p:sldMasterId id="2147483648" r:id="rId1"/>
   </p:sldMasterIdLst>
   <p:notesMasterIdLst>
-    <p:notesMasterId r:id="rId29"/>
+    <p:notesMasterId r:id="rId30"/>
   </p:notesMasterIdLst>
   <p:sldIdLst>
     <p:sldId id="258" r:id="rId2"/>
@@ -17,24 +17,25 @@
     <p:sldId id="261" r:id="rId8"/>
     <p:sldId id="282" r:id="rId9"/>
     <p:sldId id="262" r:id="rId10"/>
-    <p:sldId id="263" r:id="rId11"/>
-    <p:sldId id="264" r:id="rId12"/>
-    <p:sldId id="265" r:id="rId13"/>
-    <p:sldId id="266" r:id="rId14"/>
-    <p:sldId id="267" r:id="rId15"/>
-    <p:sldId id="268" r:id="rId16"/>
-    <p:sldId id="269" r:id="rId17"/>
-    <p:sldId id="270" r:id="rId18"/>
-    <p:sldId id="271" r:id="rId19"/>
-    <p:sldId id="272" r:id="rId20"/>
-    <p:sldId id="273" r:id="rId21"/>
-    <p:sldId id="274" r:id="rId22"/>
-    <p:sldId id="275" r:id="rId23"/>
-    <p:sldId id="276" r:id="rId24"/>
-    <p:sldId id="277" r:id="rId25"/>
-    <p:sldId id="278" r:id="rId26"/>
-    <p:sldId id="279" r:id="rId27"/>
-    <p:sldId id="259" r:id="rId28"/>
+    <p:sldId id="283" r:id="rId11"/>
+    <p:sldId id="263" r:id="rId12"/>
+    <p:sldId id="264" r:id="rId13"/>
+    <p:sldId id="265" r:id="rId14"/>
+    <p:sldId id="266" r:id="rId15"/>
+    <p:sldId id="267" r:id="rId16"/>
+    <p:sldId id="268" r:id="rId17"/>
+    <p:sldId id="269" r:id="rId18"/>
+    <p:sldId id="270" r:id="rId19"/>
+    <p:sldId id="271" r:id="rId20"/>
+    <p:sldId id="272" r:id="rId21"/>
+    <p:sldId id="273" r:id="rId22"/>
+    <p:sldId id="274" r:id="rId23"/>
+    <p:sldId id="275" r:id="rId24"/>
+    <p:sldId id="276" r:id="rId25"/>
+    <p:sldId id="277" r:id="rId26"/>
+    <p:sldId id="278" r:id="rId27"/>
+    <p:sldId id="279" r:id="rId28"/>
+    <p:sldId id="259" r:id="rId29"/>
   </p:sldIdLst>
   <p:sldSz cx="9144000" cy="6858000" type="screen4x3"/>
   <p:notesSz cx="6858000" cy="9144000"/>
@@ -151,6 +152,7 @@
             <p14:sldId id="261"/>
             <p14:sldId id="282"/>
             <p14:sldId id="262"/>
+            <p14:sldId id="283"/>
             <p14:sldId id="263"/>
             <p14:sldId id="264"/>
             <p14:sldId id="265"/>
@@ -827,6 +829,133 @@
 </file>
 
 <file path=ppt/notesSlides/notesSlide4.xml><?xml version="1.0" encoding="utf-8"?>
+<p:notes xmlns:a="http://schemas.openxmlformats.org/drawingml/2006/main" xmlns:r="http://schemas.openxmlformats.org/officeDocument/2006/relationships" xmlns:p="http://schemas.openxmlformats.org/presentationml/2006/main">
+  <p:cSld>
+    <p:spTree>
+      <p:nvGrpSpPr>
+        <p:cNvPr id="1" name=""/>
+        <p:cNvGrpSpPr/>
+        <p:nvPr/>
+      </p:nvGrpSpPr>
+      <p:grpSpPr>
+        <a:xfrm>
+          <a:off x="0" y="0"/>
+          <a:ext cx="0" cy="0"/>
+          <a:chOff x="0" y="0"/>
+          <a:chExt cx="0" cy="0"/>
+        </a:xfrm>
+      </p:grpSpPr>
+      <p:sp>
+        <p:nvSpPr>
+          <p:cNvPr id="2" name="Slide Image Placeholder 1"/>
+          <p:cNvSpPr>
+            <a:spLocks noGrp="1" noRot="1" noChangeAspect="1"/>
+          </p:cNvSpPr>
+          <p:nvPr>
+            <p:ph type="sldImg"/>
+          </p:nvPr>
+        </p:nvSpPr>
+        <p:spPr/>
+      </p:sp>
+      <p:sp>
+        <p:nvSpPr>
+          <p:cNvPr id="3" name="Notes Placeholder 2"/>
+          <p:cNvSpPr>
+            <a:spLocks noGrp="1"/>
+          </p:cNvSpPr>
+          <p:nvPr>
+            <p:ph type="body" idx="1"/>
+          </p:nvPr>
+        </p:nvSpPr>
+        <p:spPr/>
+        <p:txBody>
+          <a:bodyPr/>
+          <a:lstStyle/>
+          <a:p>
+            <a:r>
+              <a:rPr lang="en-US" dirty="0" smtClean="0"/>
+              <a:t>Comment : </a:t>
+            </a:r>
+          </a:p>
+          <a:p>
+            <a:r>
+              <a:rPr lang="en-US" dirty="0" smtClean="0"/>
+              <a:t>First encounter with need for loosely coupled code</a:t>
+            </a:r>
+            <a:r>
+              <a:rPr lang="en-US" baseline="0" dirty="0" smtClean="0"/>
+              <a:t> came from unit tests</a:t>
+            </a:r>
+          </a:p>
+          <a:p>
+            <a:r>
+              <a:rPr lang="en-US" baseline="0" dirty="0" smtClean="0"/>
+              <a:t>Who write unit tests here ? Anybody who writes unit tests first ? </a:t>
+            </a:r>
+            <a:endParaRPr lang="en-US" dirty="0" smtClean="0"/>
+          </a:p>
+          <a:p>
+            <a:r>
+              <a:rPr lang="en-US" dirty="0" smtClean="0"/>
+              <a:t>First encounter where you code MUST</a:t>
+            </a:r>
+            <a:r>
+              <a:rPr lang="en-US" baseline="0" dirty="0" smtClean="0"/>
+              <a:t> BE loosely coupled : unit tests ! Actually consume components out of the scope of the application</a:t>
+            </a:r>
+          </a:p>
+          <a:p>
+            <a:endParaRPr lang="en-US" baseline="0" dirty="0" smtClean="0"/>
+          </a:p>
+          <a:p>
+            <a:r>
+              <a:rPr lang="en-US" baseline="0" dirty="0" smtClean="0"/>
+              <a:t>Tightly coupled code is hard to test or not testable at all … if it’s testable it’s not too tightly coupled</a:t>
+            </a:r>
+            <a:endParaRPr lang="en-US" dirty="0" smtClean="0"/>
+          </a:p>
+          <a:p>
+            <a:endParaRPr lang="en-US" dirty="0"/>
+          </a:p>
+        </p:txBody>
+      </p:sp>
+      <p:sp>
+        <p:nvSpPr>
+          <p:cNvPr id="4" name="Slide Number Placeholder 3"/>
+          <p:cNvSpPr>
+            <a:spLocks noGrp="1"/>
+          </p:cNvSpPr>
+          <p:nvPr>
+            <p:ph type="sldNum" sz="quarter" idx="10"/>
+          </p:nvPr>
+        </p:nvSpPr>
+        <p:spPr/>
+        <p:txBody>
+          <a:bodyPr/>
+          <a:lstStyle/>
+          <a:p>
+            <a:fld id="{33F0961A-48D7-4871-86EB-F9831811C96F}" type="slidenum">
+              <a:rPr lang="en-US" smtClean="0"/>
+              <a:t>8</a:t>
+            </a:fld>
+            <a:endParaRPr lang="en-US"/>
+          </a:p>
+        </p:txBody>
+      </p:sp>
+    </p:spTree>
+    <p:extLst>
+      <p:ext uri="{BB962C8B-B14F-4D97-AF65-F5344CB8AC3E}">
+        <p14:creationId xmlns:p14="http://schemas.microsoft.com/office/powerpoint/2010/main" val="998928377"/>
+      </p:ext>
+    </p:extLst>
+  </p:cSld>
+  <p:clrMapOvr>
+    <a:masterClrMapping/>
+  </p:clrMapOvr>
+</p:notes>
+</file>
+
+<file path=ppt/notesSlides/notesSlide5.xml><?xml version="1.0" encoding="utf-8"?>
 <p:notes xmlns:a="http://schemas.openxmlformats.org/drawingml/2006/main" xmlns:r="http://schemas.openxmlformats.org/officeDocument/2006/relationships" xmlns:p="http://schemas.openxmlformats.org/presentationml/2006/main">
   <p:cSld>
     <p:spTree>
@@ -4158,7 +4287,7 @@
           <a:p>
             <a:r>
               <a:rPr lang="en-US" dirty="0" smtClean="0"/>
-              <a:t>Example</a:t>
+              <a:t>From Tightly to Loosely Coupled</a:t>
             </a:r>
             <a:endParaRPr lang="en-US" dirty="0"/>
           </a:p>
@@ -4166,27 +4295,31 @@
       </p:sp>
       <p:sp>
         <p:nvSpPr>
-          <p:cNvPr id="3" name="Content Placeholder 2"/>
-          <p:cNvSpPr>
-            <a:spLocks noGrp="1"/>
-          </p:cNvSpPr>
-          <p:nvPr>
-            <p:ph idx="1"/>
-          </p:nvPr>
-        </p:nvSpPr>
-        <p:spPr/>
-        <p:txBody>
-          <a:bodyPr/>
-          <a:lstStyle/>
-          <a:p>
-            <a:endParaRPr lang="en-US" dirty="0" smtClean="0"/>
+          <p:cNvPr id="3" name="Text Placeholder 2"/>
+          <p:cNvSpPr>
+            <a:spLocks noGrp="1"/>
+          </p:cNvSpPr>
+          <p:nvPr>
+            <p:ph type="body" idx="1"/>
+          </p:nvPr>
+        </p:nvSpPr>
+        <p:spPr/>
+        <p:txBody>
+          <a:bodyPr/>
+          <a:lstStyle/>
+          <a:p>
+            <a:r>
+              <a:rPr lang="en-US" dirty="0" smtClean="0"/>
+              <a:t>Show me the code !</a:t>
+            </a:r>
+            <a:endParaRPr lang="en-US" dirty="0"/>
           </a:p>
         </p:txBody>
       </p:sp>
     </p:spTree>
     <p:extLst>
       <p:ext uri="{BB962C8B-B14F-4D97-AF65-F5344CB8AC3E}">
-        <p14:creationId xmlns:p14="http://schemas.microsoft.com/office/powerpoint/2010/main" val="3704436838"/>
+        <p14:creationId xmlns:p14="http://schemas.microsoft.com/office/powerpoint/2010/main" val="2941395999"/>
       </p:ext>
     </p:extLst>
   </p:cSld>
@@ -4237,7 +4370,7 @@
           <a:p>
             <a:r>
               <a:rPr lang="en-US" dirty="0" smtClean="0"/>
-              <a:t>Tightly coupled code</a:t>
+              <a:t>Example : Boring Banking System</a:t>
             </a:r>
             <a:endParaRPr lang="en-US" dirty="0"/>
           </a:p>
@@ -4258,14 +4391,22 @@
           <a:bodyPr/>
           <a:lstStyle/>
           <a:p>
-            <a:endParaRPr lang="en-US"/>
+            <a:r>
+              <a:rPr lang="en-US" dirty="0" smtClean="0"/>
+              <a:t>User can list </a:t>
+            </a:r>
+            <a:r>
+              <a:rPr lang="en-US" smtClean="0"/>
+              <a:t>his accounts</a:t>
+            </a:r>
+            <a:endParaRPr lang="en-US" dirty="0" smtClean="0"/>
           </a:p>
         </p:txBody>
       </p:sp>
     </p:spTree>
     <p:extLst>
       <p:ext uri="{BB962C8B-B14F-4D97-AF65-F5344CB8AC3E}">
-        <p14:creationId xmlns:p14="http://schemas.microsoft.com/office/powerpoint/2010/main" val="304151210"/>
+        <p14:creationId xmlns:p14="http://schemas.microsoft.com/office/powerpoint/2010/main" val="3704436838"/>
       </p:ext>
     </p:extLst>
   </p:cSld>
@@ -4316,7 +4457,7 @@
           <a:p>
             <a:r>
               <a:rPr lang="en-US" dirty="0" smtClean="0"/>
-              <a:t>Separation of Concerns (SRP)</a:t>
+              <a:t>Tightly coupled code</a:t>
             </a:r>
             <a:endParaRPr lang="en-US" dirty="0"/>
           </a:p>
@@ -4344,13 +4485,20 @@
     </p:spTree>
     <p:extLst>
       <p:ext uri="{BB962C8B-B14F-4D97-AF65-F5344CB8AC3E}">
-        <p14:creationId xmlns:p14="http://schemas.microsoft.com/office/powerpoint/2010/main" val="774879577"/>
+        <p14:creationId xmlns:p14="http://schemas.microsoft.com/office/powerpoint/2010/main" val="304151210"/>
       </p:ext>
     </p:extLst>
   </p:cSld>
   <p:clrMapOvr>
     <a:masterClrMapping/>
   </p:clrMapOvr>
+  <p:timing>
+    <p:tnLst>
+      <p:par>
+        <p:cTn id="1" dur="indefinite" restart="never" nodeType="tmRoot"/>
+      </p:par>
+    </p:tnLst>
+  </p:timing>
 </p:sld>
 </file>
 
@@ -4388,7 +4536,7 @@
           <a:p>
             <a:r>
               <a:rPr lang="en-US" dirty="0" smtClean="0"/>
-              <a:t>Program to an abstraction</a:t>
+              <a:t>Separation of Concerns (SRP)</a:t>
             </a:r>
             <a:endParaRPr lang="en-US" dirty="0"/>
           </a:p>
@@ -4416,7 +4564,7 @@
     </p:spTree>
     <p:extLst>
       <p:ext uri="{BB962C8B-B14F-4D97-AF65-F5344CB8AC3E}">
-        <p14:creationId xmlns:p14="http://schemas.microsoft.com/office/powerpoint/2010/main" val="2273883719"/>
+        <p14:creationId xmlns:p14="http://schemas.microsoft.com/office/powerpoint/2010/main" val="774879577"/>
       </p:ext>
     </p:extLst>
   </p:cSld>
@@ -4460,7 +4608,7 @@
           <a:p>
             <a:r>
               <a:rPr lang="en-US" dirty="0" smtClean="0"/>
-              <a:t>Making it testable - Properties</a:t>
+              <a:t>Program to an abstraction</a:t>
             </a:r>
             <a:endParaRPr lang="en-US" dirty="0"/>
           </a:p>
@@ -4488,7 +4636,7 @@
     </p:spTree>
     <p:extLst>
       <p:ext uri="{BB962C8B-B14F-4D97-AF65-F5344CB8AC3E}">
-        <p14:creationId xmlns:p14="http://schemas.microsoft.com/office/powerpoint/2010/main" val="2460160534"/>
+        <p14:creationId xmlns:p14="http://schemas.microsoft.com/office/powerpoint/2010/main" val="2273883719"/>
       </p:ext>
     </p:extLst>
   </p:cSld>
@@ -4532,7 +4680,7 @@
           <a:p>
             <a:r>
               <a:rPr lang="en-US" dirty="0" smtClean="0"/>
-              <a:t>Making it testable - Constructor</a:t>
+              <a:t>Making it testable - Properties</a:t>
             </a:r>
             <a:endParaRPr lang="en-US" dirty="0"/>
           </a:p>
@@ -4560,7 +4708,7 @@
     </p:spTree>
     <p:extLst>
       <p:ext uri="{BB962C8B-B14F-4D97-AF65-F5344CB8AC3E}">
-        <p14:creationId xmlns:p14="http://schemas.microsoft.com/office/powerpoint/2010/main" val="1108926905"/>
+        <p14:creationId xmlns:p14="http://schemas.microsoft.com/office/powerpoint/2010/main" val="2460160534"/>
       </p:ext>
     </p:extLst>
   </p:cSld>
@@ -4604,7 +4752,7 @@
           <a:p>
             <a:r>
               <a:rPr lang="en-US" dirty="0" smtClean="0"/>
-              <a:t>Inversion of Control</a:t>
+              <a:t>Making it testable - Constructor</a:t>
             </a:r>
             <a:endParaRPr lang="en-US" dirty="0"/>
           </a:p>
@@ -4632,7 +4780,7 @@
     </p:spTree>
     <p:extLst>
       <p:ext uri="{BB962C8B-B14F-4D97-AF65-F5344CB8AC3E}">
-        <p14:creationId xmlns:p14="http://schemas.microsoft.com/office/powerpoint/2010/main" val="4108550095"/>
+        <p14:creationId xmlns:p14="http://schemas.microsoft.com/office/powerpoint/2010/main" val="1108926905"/>
       </p:ext>
     </p:extLst>
   </p:cSld>
@@ -4676,7 +4824,7 @@
           <a:p>
             <a:r>
               <a:rPr lang="en-US" dirty="0" smtClean="0"/>
-              <a:t>It’s viral !</a:t>
+              <a:t>Inversion of Control</a:t>
             </a:r>
             <a:endParaRPr lang="en-US" dirty="0"/>
           </a:p>
@@ -4697,18 +4845,14 @@
           <a:bodyPr/>
           <a:lstStyle/>
           <a:p>
-            <a:r>
-              <a:rPr lang="en-US" dirty="0" smtClean="0"/>
-              <a:t>Composition Root</a:t>
-            </a:r>
-            <a:endParaRPr lang="en-US" dirty="0"/>
+            <a:endParaRPr lang="en-US"/>
           </a:p>
         </p:txBody>
       </p:sp>
     </p:spTree>
     <p:extLst>
       <p:ext uri="{BB962C8B-B14F-4D97-AF65-F5344CB8AC3E}">
-        <p14:creationId xmlns:p14="http://schemas.microsoft.com/office/powerpoint/2010/main" val="1394666143"/>
+        <p14:creationId xmlns:p14="http://schemas.microsoft.com/office/powerpoint/2010/main" val="4108550095"/>
       </p:ext>
     </p:extLst>
   </p:cSld>
@@ -4752,7 +4896,7 @@
           <a:p>
             <a:r>
               <a:rPr lang="en-US" dirty="0" smtClean="0"/>
-              <a:t>Pure DI aka Poor Man’s DI</a:t>
+              <a:t>It’s viral !</a:t>
             </a:r>
             <a:endParaRPr lang="en-US" dirty="0"/>
           </a:p>
@@ -4773,14 +4917,18 @@
           <a:bodyPr/>
           <a:lstStyle/>
           <a:p>
-            <a:endParaRPr lang="en-US"/>
+            <a:r>
+              <a:rPr lang="en-US" dirty="0" smtClean="0"/>
+              <a:t>Composition Root</a:t>
+            </a:r>
+            <a:endParaRPr lang="en-US" dirty="0"/>
           </a:p>
         </p:txBody>
       </p:sp>
     </p:spTree>
     <p:extLst>
       <p:ext uri="{BB962C8B-B14F-4D97-AF65-F5344CB8AC3E}">
-        <p14:creationId xmlns:p14="http://schemas.microsoft.com/office/powerpoint/2010/main" val="550091921"/>
+        <p14:creationId xmlns:p14="http://schemas.microsoft.com/office/powerpoint/2010/main" val="1394666143"/>
       </p:ext>
     </p:extLst>
   </p:cSld>
@@ -4824,7 +4972,7 @@
           <a:p>
             <a:r>
               <a:rPr lang="en-US" dirty="0" smtClean="0"/>
-              <a:t>Extensibility with DI</a:t>
+              <a:t>Pure DI aka Poor Man’s DI</a:t>
             </a:r>
             <a:endParaRPr lang="en-US" dirty="0"/>
           </a:p>
@@ -4845,54 +4993,14 @@
           <a:bodyPr/>
           <a:lstStyle/>
           <a:p>
-            <a:r>
-              <a:rPr lang="en-US" dirty="0" err="1" smtClean="0"/>
-              <a:t>Composability</a:t>
-            </a:r>
-            <a:r>
-              <a:rPr lang="en-US" dirty="0" smtClean="0"/>
-              <a:t> </a:t>
-            </a:r>
-          </a:p>
-          <a:p>
-            <a:r>
-              <a:rPr lang="en-US" dirty="0" smtClean="0"/>
-              <a:t>Testability</a:t>
-            </a:r>
-          </a:p>
-          <a:p>
-            <a:r>
-              <a:rPr lang="en-US" dirty="0" smtClean="0"/>
-              <a:t>Decorator</a:t>
-            </a:r>
-          </a:p>
-          <a:p>
-            <a:endParaRPr lang="en-US" dirty="0"/>
-          </a:p>
-          <a:p>
-            <a:r>
-              <a:rPr lang="en-US" dirty="0" smtClean="0"/>
-              <a:t>Late binding</a:t>
-            </a:r>
-          </a:p>
-          <a:p>
-            <a:endParaRPr lang="en-US" dirty="0"/>
-          </a:p>
-          <a:p>
-            <a:r>
-              <a:rPr lang="en-US" dirty="0" smtClean="0"/>
-              <a:t>Examples ? </a:t>
-            </a:r>
-          </a:p>
-          <a:p>
-            <a:endParaRPr lang="en-US" dirty="0"/>
+            <a:endParaRPr lang="en-US"/>
           </a:p>
         </p:txBody>
       </p:sp>
     </p:spTree>
     <p:extLst>
       <p:ext uri="{BB962C8B-B14F-4D97-AF65-F5344CB8AC3E}">
-        <p14:creationId xmlns:p14="http://schemas.microsoft.com/office/powerpoint/2010/main" val="3162647260"/>
+        <p14:creationId xmlns:p14="http://schemas.microsoft.com/office/powerpoint/2010/main" val="550091921"/>
       </p:ext>
     </p:extLst>
   </p:cSld>
@@ -4942,18 +5050,25 @@
           <a:lstStyle/>
           <a:p>
             <a:r>
+              <a:rPr lang="en-US" b="1" dirty="0" smtClean="0">
+                <a:latin typeface="Arial" panose="020B0604020202020204" pitchFamily="34" charset="0"/>
+                <a:cs typeface="Arial" panose="020B0604020202020204" pitchFamily="34" charset="0"/>
+              </a:rPr>
+              <a:t>Dependency </a:t>
+            </a:r>
+            <a:r>
+              <a:rPr lang="en-US" b="1" dirty="0" smtClean="0">
+                <a:latin typeface="Arial" panose="020B0604020202020204" pitchFamily="34" charset="0"/>
+                <a:cs typeface="Arial" panose="020B0604020202020204" pitchFamily="34" charset="0"/>
+              </a:rPr>
+              <a:t>Injection</a:t>
+            </a:r>
+            <a:r>
               <a:rPr lang="en-US" dirty="0" smtClean="0">
                 <a:latin typeface="Arial" panose="020B0604020202020204" pitchFamily="34" charset="0"/>
                 <a:cs typeface="Arial" panose="020B0604020202020204" pitchFamily="34" charset="0"/>
               </a:rPr>
-              <a:t>Dependency </a:t>
-            </a:r>
-            <a:r>
-              <a:rPr lang="en-US" dirty="0" smtClean="0">
-                <a:latin typeface="Arial" panose="020B0604020202020204" pitchFamily="34" charset="0"/>
-                <a:cs typeface="Arial" panose="020B0604020202020204" pitchFamily="34" charset="0"/>
-              </a:rPr>
-              <a:t>Injection, </a:t>
+              <a:t>, </a:t>
             </a:r>
             <a:br>
               <a:rPr lang="en-US" dirty="0" smtClean="0">
@@ -5153,7 +5268,7 @@
           <a:p>
             <a:r>
               <a:rPr lang="en-US" dirty="0" smtClean="0"/>
-              <a:t>DI Container</a:t>
+              <a:t>Extensibility with DI</a:t>
             </a:r>
             <a:endParaRPr lang="en-US" dirty="0"/>
           </a:p>
@@ -5175,9 +5290,45 @@
           <a:lstStyle/>
           <a:p>
             <a:r>
+              <a:rPr lang="en-US" dirty="0" err="1" smtClean="0"/>
+              <a:t>Composability</a:t>
+            </a:r>
+            <a:r>
               <a:rPr lang="en-US" dirty="0" smtClean="0"/>
-              <a:t>How it works / what it does</a:t>
-            </a:r>
+              <a:t> </a:t>
+            </a:r>
+          </a:p>
+          <a:p>
+            <a:r>
+              <a:rPr lang="en-US" dirty="0" smtClean="0"/>
+              <a:t>Testability</a:t>
+            </a:r>
+          </a:p>
+          <a:p>
+            <a:r>
+              <a:rPr lang="en-US" dirty="0" smtClean="0"/>
+              <a:t>Decorator</a:t>
+            </a:r>
+          </a:p>
+          <a:p>
+            <a:endParaRPr lang="en-US" dirty="0"/>
+          </a:p>
+          <a:p>
+            <a:r>
+              <a:rPr lang="en-US" dirty="0" smtClean="0"/>
+              <a:t>Late binding</a:t>
+            </a:r>
+          </a:p>
+          <a:p>
+            <a:endParaRPr lang="en-US" dirty="0"/>
+          </a:p>
+          <a:p>
+            <a:r>
+              <a:rPr lang="en-US" dirty="0" smtClean="0"/>
+              <a:t>Examples ? </a:t>
+            </a:r>
+          </a:p>
+          <a:p>
             <a:endParaRPr lang="en-US" dirty="0"/>
           </a:p>
         </p:txBody>
@@ -5185,7 +5336,7 @@
     </p:spTree>
     <p:extLst>
       <p:ext uri="{BB962C8B-B14F-4D97-AF65-F5344CB8AC3E}">
-        <p14:creationId xmlns:p14="http://schemas.microsoft.com/office/powerpoint/2010/main" val="3753203453"/>
+        <p14:creationId xmlns:p14="http://schemas.microsoft.com/office/powerpoint/2010/main" val="3162647260"/>
       </p:ext>
     </p:extLst>
   </p:cSld>
@@ -5224,14 +5375,12 @@
         </p:nvSpPr>
         <p:spPr/>
         <p:txBody>
-          <a:bodyPr>
-            <a:normAutofit fontScale="90000"/>
-          </a:bodyPr>
+          <a:bodyPr/>
           <a:lstStyle/>
           <a:p>
             <a:r>
               <a:rPr lang="en-US" dirty="0" smtClean="0"/>
-              <a:t>Service Locator – DI container misusage</a:t>
+              <a:t>DI Container</a:t>
             </a:r>
             <a:endParaRPr lang="en-US" dirty="0"/>
           </a:p>
@@ -5252,14 +5401,18 @@
           <a:bodyPr/>
           <a:lstStyle/>
           <a:p>
-            <a:endParaRPr lang="en-US"/>
+            <a:r>
+              <a:rPr lang="en-US" dirty="0" smtClean="0"/>
+              <a:t>How it works / what it does</a:t>
+            </a:r>
+            <a:endParaRPr lang="en-US" dirty="0"/>
           </a:p>
         </p:txBody>
       </p:sp>
     </p:spTree>
     <p:extLst>
       <p:ext uri="{BB962C8B-B14F-4D97-AF65-F5344CB8AC3E}">
-        <p14:creationId xmlns:p14="http://schemas.microsoft.com/office/powerpoint/2010/main" val="1148450113"/>
+        <p14:creationId xmlns:p14="http://schemas.microsoft.com/office/powerpoint/2010/main" val="3753203453"/>
       </p:ext>
     </p:extLst>
   </p:cSld>
@@ -5298,12 +5451,14 @@
         </p:nvSpPr>
         <p:spPr/>
         <p:txBody>
-          <a:bodyPr/>
+          <a:bodyPr>
+            <a:normAutofit fontScale="90000"/>
+          </a:bodyPr>
           <a:lstStyle/>
           <a:p>
             <a:r>
               <a:rPr lang="en-US" dirty="0" smtClean="0"/>
-              <a:t>Composition, but not only</a:t>
+              <a:t>Service Locator – DI container misusage</a:t>
             </a:r>
             <a:endParaRPr lang="en-US" dirty="0"/>
           </a:p>
@@ -5324,26 +5479,14 @@
           <a:bodyPr/>
           <a:lstStyle/>
           <a:p>
-            <a:r>
-              <a:rPr lang="en-US" dirty="0" smtClean="0"/>
-              <a:t>Object creation and composition</a:t>
-            </a:r>
-          </a:p>
-          <a:p>
-            <a:r>
-              <a:rPr lang="en-US" dirty="0" smtClean="0"/>
-              <a:t>Other important parts of DI</a:t>
-            </a:r>
-          </a:p>
-          <a:p>
-            <a:endParaRPr lang="en-US" dirty="0"/>
+            <a:endParaRPr lang="en-US"/>
           </a:p>
         </p:txBody>
       </p:sp>
     </p:spTree>
     <p:extLst>
       <p:ext uri="{BB962C8B-B14F-4D97-AF65-F5344CB8AC3E}">
-        <p14:creationId xmlns:p14="http://schemas.microsoft.com/office/powerpoint/2010/main" val="2294633566"/>
+        <p14:creationId xmlns:p14="http://schemas.microsoft.com/office/powerpoint/2010/main" val="1148450113"/>
       </p:ext>
     </p:extLst>
   </p:cSld>
@@ -5386,12 +5529,8 @@
           <a:lstStyle/>
           <a:p>
             <a:r>
-              <a:rPr lang="en-US" dirty="0" err="1" smtClean="0"/>
-              <a:t>LifeTime</a:t>
-            </a:r>
-            <a:r>
               <a:rPr lang="en-US" dirty="0" smtClean="0"/>
-              <a:t> Management</a:t>
+              <a:t>Composition, but not only</a:t>
             </a:r>
             <a:endParaRPr lang="en-US" dirty="0"/>
           </a:p>
@@ -5411,6 +5550,18 @@
         <p:txBody>
           <a:bodyPr/>
           <a:lstStyle/>
+          <a:p>
+            <a:r>
+              <a:rPr lang="en-US" dirty="0" smtClean="0"/>
+              <a:t>Object creation and composition</a:t>
+            </a:r>
+          </a:p>
+          <a:p>
+            <a:r>
+              <a:rPr lang="en-US" dirty="0" smtClean="0"/>
+              <a:t>Other important parts of DI</a:t>
+            </a:r>
+          </a:p>
           <a:p>
             <a:endParaRPr lang="en-US" dirty="0"/>
           </a:p>
@@ -5419,7 +5570,7 @@
     </p:spTree>
     <p:extLst>
       <p:ext uri="{BB962C8B-B14F-4D97-AF65-F5344CB8AC3E}">
-        <p14:creationId xmlns:p14="http://schemas.microsoft.com/office/powerpoint/2010/main" val="3458786066"/>
+        <p14:creationId xmlns:p14="http://schemas.microsoft.com/office/powerpoint/2010/main" val="2294633566"/>
       </p:ext>
     </p:extLst>
   </p:cSld>
@@ -5462,8 +5613,12 @@
           <a:lstStyle/>
           <a:p>
             <a:r>
+              <a:rPr lang="en-US" dirty="0" err="1" smtClean="0"/>
+              <a:t>LifeTime</a:t>
+            </a:r>
+            <a:r>
               <a:rPr lang="en-US" dirty="0" smtClean="0"/>
-              <a:t>Interception</a:t>
+              <a:t> Management</a:t>
             </a:r>
             <a:endParaRPr lang="en-US" dirty="0"/>
           </a:p>
@@ -5491,7 +5646,7 @@
     </p:spTree>
     <p:extLst>
       <p:ext uri="{BB962C8B-B14F-4D97-AF65-F5344CB8AC3E}">
-        <p14:creationId xmlns:p14="http://schemas.microsoft.com/office/powerpoint/2010/main" val="4036849652"/>
+        <p14:creationId xmlns:p14="http://schemas.microsoft.com/office/powerpoint/2010/main" val="3458786066"/>
       </p:ext>
     </p:extLst>
   </p:cSld>
@@ -5530,14 +5685,12 @@
         </p:nvSpPr>
         <p:spPr/>
         <p:txBody>
-          <a:bodyPr>
-            <a:normAutofit/>
-          </a:bodyPr>
+          <a:bodyPr/>
           <a:lstStyle/>
           <a:p>
             <a:r>
               <a:rPr lang="en-US" dirty="0" smtClean="0"/>
-              <a:t>Conclusion</a:t>
+              <a:t>Interception</a:t>
             </a:r>
             <a:endParaRPr lang="en-US" dirty="0"/>
           </a:p>
@@ -5558,14 +5711,14 @@
           <a:bodyPr/>
           <a:lstStyle/>
           <a:p>
-            <a:endParaRPr lang="en-US"/>
+            <a:endParaRPr lang="en-US" dirty="0"/>
           </a:p>
         </p:txBody>
       </p:sp>
     </p:spTree>
     <p:extLst>
       <p:ext uri="{BB962C8B-B14F-4D97-AF65-F5344CB8AC3E}">
-        <p14:creationId xmlns:p14="http://schemas.microsoft.com/office/powerpoint/2010/main" val="308607750"/>
+        <p14:creationId xmlns:p14="http://schemas.microsoft.com/office/powerpoint/2010/main" val="4036849652"/>
       </p:ext>
     </p:extLst>
   </p:cSld>
@@ -5604,6 +5757,80 @@
         </p:nvSpPr>
         <p:spPr/>
         <p:txBody>
+          <a:bodyPr>
+            <a:normAutofit/>
+          </a:bodyPr>
+          <a:lstStyle/>
+          <a:p>
+            <a:r>
+              <a:rPr lang="en-US" dirty="0" smtClean="0"/>
+              <a:t>Conclusion</a:t>
+            </a:r>
+            <a:endParaRPr lang="en-US" dirty="0"/>
+          </a:p>
+        </p:txBody>
+      </p:sp>
+      <p:sp>
+        <p:nvSpPr>
+          <p:cNvPr id="3" name="Content Placeholder 2"/>
+          <p:cNvSpPr>
+            <a:spLocks noGrp="1"/>
+          </p:cNvSpPr>
+          <p:nvPr>
+            <p:ph idx="1"/>
+          </p:nvPr>
+        </p:nvSpPr>
+        <p:spPr/>
+        <p:txBody>
+          <a:bodyPr/>
+          <a:lstStyle/>
+          <a:p>
+            <a:endParaRPr lang="en-US"/>
+          </a:p>
+        </p:txBody>
+      </p:sp>
+    </p:spTree>
+    <p:extLst>
+      <p:ext uri="{BB962C8B-B14F-4D97-AF65-F5344CB8AC3E}">
+        <p14:creationId xmlns:p14="http://schemas.microsoft.com/office/powerpoint/2010/main" val="308607750"/>
+      </p:ext>
+    </p:extLst>
+  </p:cSld>
+  <p:clrMapOvr>
+    <a:masterClrMapping/>
+  </p:clrMapOvr>
+</p:sld>
+</file>
+
+<file path=ppt/slides/slide27.xml><?xml version="1.0" encoding="utf-8"?>
+<p:sld xmlns:a="http://schemas.openxmlformats.org/drawingml/2006/main" xmlns:r="http://schemas.openxmlformats.org/officeDocument/2006/relationships" xmlns:p="http://schemas.openxmlformats.org/presentationml/2006/main">
+  <p:cSld>
+    <p:spTree>
+      <p:nvGrpSpPr>
+        <p:cNvPr id="1" name=""/>
+        <p:cNvGrpSpPr/>
+        <p:nvPr/>
+      </p:nvGrpSpPr>
+      <p:grpSpPr>
+        <a:xfrm>
+          <a:off x="0" y="0"/>
+          <a:ext cx="0" cy="0"/>
+          <a:chOff x="0" y="0"/>
+          <a:chExt cx="0" cy="0"/>
+        </a:xfrm>
+      </p:grpSpPr>
+      <p:sp>
+        <p:nvSpPr>
+          <p:cNvPr id="2" name="Title 1"/>
+          <p:cNvSpPr>
+            <a:spLocks noGrp="1"/>
+          </p:cNvSpPr>
+          <p:nvPr>
+            <p:ph type="title"/>
+          </p:nvPr>
+        </p:nvSpPr>
+        <p:spPr/>
+        <p:txBody>
           <a:bodyPr/>
           <a:lstStyle/>
           <a:p>
@@ -5647,7 +5874,7 @@
 </p:sld>
 </file>
 
-<file path=ppt/slides/slide27.xml><?xml version="1.0" encoding="utf-8"?>
+<file path=ppt/slides/slide28.xml><?xml version="1.0" encoding="utf-8"?>
 <p:sld xmlns:a="http://schemas.openxmlformats.org/drawingml/2006/main" xmlns:r="http://schemas.openxmlformats.org/officeDocument/2006/relationships" xmlns:p="http://schemas.openxmlformats.org/presentationml/2006/main">
   <p:cSld>
     <p:spTree>
@@ -6617,13 +6844,13 @@
             <a:spLocks noGrp="1"/>
           </p:cNvSpPr>
           <p:nvPr>
-            <p:ph idx="1"/>
+            <p:ph sz="half" idx="1"/>
           </p:nvPr>
         </p:nvSpPr>
         <p:spPr>
           <a:xfrm>
-            <a:off x="457200" y="2924944"/>
-            <a:ext cx="8229600" cy="3201219"/>
+            <a:off x="457200" y="2964085"/>
+            <a:ext cx="4038600" cy="3417243"/>
           </a:xfrm>
         </p:spPr>
         <p:txBody>
@@ -6636,19 +6863,56 @@
               <a:buNone/>
             </a:pPr>
             <a:r>
+              <a:rPr lang="fr-FR" dirty="0" smtClean="0"/>
+              <a:t>Small components …</a:t>
+            </a:r>
+          </a:p>
+          <a:p>
+            <a:pPr>
+              <a:buFontTx/>
+              <a:buChar char="-"/>
+            </a:pPr>
+            <a:r>
+              <a:rPr lang="fr-FR" dirty="0" smtClean="0"/>
+              <a:t>Independent</a:t>
+            </a:r>
+          </a:p>
+          <a:p>
+            <a:pPr>
+              <a:buFontTx/>
+              <a:buChar char="-"/>
+            </a:pPr>
+            <a:r>
               <a:rPr lang="fr-FR" dirty="0" err="1" smtClean="0"/>
-              <a:t>It’s</a:t>
-            </a:r>
+              <a:t>Reusable</a:t>
+            </a:r>
+            <a:endParaRPr lang="fr-FR" dirty="0" smtClean="0"/>
+          </a:p>
+          <a:p>
+            <a:pPr>
+              <a:buFontTx/>
+              <a:buChar char="-"/>
+            </a:pPr>
             <a:r>
               <a:rPr lang="fr-FR" dirty="0" smtClean="0"/>
-              <a:t> NOT : </a:t>
-            </a:r>
-          </a:p>
-          <a:p>
-            <a:pPr lvl="1"/>
-            <a:r>
-              <a:rPr lang="fr-FR" dirty="0"/>
-              <a:t>A</a:t>
+              <a:t>Interchangeable</a:t>
+            </a:r>
+          </a:p>
+          <a:p>
+            <a:pPr marL="0" indent="0">
+              <a:buNone/>
+            </a:pPr>
+            <a:r>
+              <a:rPr lang="fr-FR" dirty="0" smtClean="0"/>
+              <a:t>… </a:t>
+            </a:r>
+            <a:r>
+              <a:rPr lang="fr-FR" dirty="0" err="1"/>
+              <a:t>p</a:t>
+            </a:r>
+            <a:r>
+              <a:rPr lang="fr-FR" dirty="0" err="1" smtClean="0"/>
+              <a:t>lugged</a:t>
             </a:r>
             <a:r>
               <a:rPr lang="fr-FR" dirty="0" smtClean="0"/>
@@ -6656,37 +6920,131 @@
             </a:r>
             <a:r>
               <a:rPr lang="fr-FR" dirty="0" err="1" smtClean="0"/>
-              <a:t>library</a:t>
-            </a:r>
+              <a:t>together</a:t>
+            </a:r>
+            <a:r>
+              <a:rPr lang="fr-FR" dirty="0" smtClean="0"/>
+              <a:t> to </a:t>
+            </a:r>
+            <a:r>
+              <a:rPr lang="fr-FR" dirty="0" err="1" smtClean="0"/>
+              <a:t>form</a:t>
+            </a:r>
+            <a:r>
+              <a:rPr lang="fr-FR" dirty="0" smtClean="0"/>
+              <a:t> a </a:t>
+            </a:r>
+            <a:r>
+              <a:rPr lang="fr-FR" dirty="0" err="1" smtClean="0"/>
+              <a:t>bigger</a:t>
+            </a:r>
+            <a:r>
+              <a:rPr lang="fr-FR" dirty="0" smtClean="0"/>
+              <a:t> system</a:t>
+            </a:r>
+          </a:p>
+          <a:p>
+            <a:pPr lvl="1">
+              <a:buFontTx/>
+              <a:buChar char="-"/>
+            </a:pPr>
             <a:endParaRPr lang="fr-FR" dirty="0" smtClean="0"/>
           </a:p>
           <a:p>
-            <a:pPr lvl="1"/>
-            <a:r>
-              <a:rPr lang="fr-FR" dirty="0" smtClean="0"/>
-              <a:t>A </a:t>
-            </a:r>
-            <a:r>
-              <a:rPr lang="fr-FR" dirty="0" err="1" smtClean="0"/>
-              <a:t>framework</a:t>
-            </a:r>
+            <a:pPr>
+              <a:buFontTx/>
+              <a:buChar char="-"/>
+            </a:pPr>
             <a:endParaRPr lang="fr-FR" dirty="0" smtClean="0"/>
           </a:p>
           <a:p>
-            <a:pPr lvl="1"/>
-            <a:r>
-              <a:rPr lang="fr-FR" dirty="0"/>
-              <a:t>A</a:t>
-            </a:r>
-            <a:r>
-              <a:rPr lang="fr-FR" dirty="0" smtClean="0"/>
-              <a:t> </a:t>
-            </a:r>
-            <a:r>
-              <a:rPr lang="fr-FR" dirty="0" err="1" smtClean="0"/>
-              <a:t>tool</a:t>
-            </a:r>
+            <a:pPr>
+              <a:buFontTx/>
+              <a:buChar char="-"/>
+            </a:pPr>
             <a:endParaRPr lang="fr-FR" dirty="0" smtClean="0"/>
+          </a:p>
+        </p:txBody>
+      </p:sp>
+      <p:sp>
+        <p:nvSpPr>
+          <p:cNvPr id="5" name="Content Placeholder 4"/>
+          <p:cNvSpPr>
+            <a:spLocks noGrp="1"/>
+          </p:cNvSpPr>
+          <p:nvPr>
+            <p:ph sz="half" idx="2"/>
+          </p:nvPr>
+        </p:nvSpPr>
+        <p:spPr>
+          <a:xfrm>
+            <a:off x="4648200" y="2964085"/>
+            <a:ext cx="4038600" cy="3417243"/>
+          </a:xfrm>
+        </p:spPr>
+        <p:txBody>
+          <a:bodyPr>
+            <a:normAutofit/>
+          </a:bodyPr>
+          <a:lstStyle/>
+          <a:p>
+            <a:pPr marL="0" indent="0">
+              <a:buNone/>
+            </a:pPr>
+            <a:r>
+              <a:rPr lang="en-US" dirty="0" smtClean="0"/>
+              <a:t>Benefits : </a:t>
+            </a:r>
+          </a:p>
+          <a:p>
+            <a:pPr>
+              <a:buFontTx/>
+              <a:buChar char="-"/>
+            </a:pPr>
+            <a:r>
+              <a:rPr lang="en-US" dirty="0" smtClean="0"/>
+              <a:t>Small classes with single responsibility</a:t>
+            </a:r>
+          </a:p>
+          <a:p>
+            <a:pPr>
+              <a:buFontTx/>
+              <a:buChar char="-"/>
+            </a:pPr>
+            <a:r>
+              <a:rPr lang="en-US" dirty="0" smtClean="0"/>
+              <a:t>Easier maintenance</a:t>
+            </a:r>
+          </a:p>
+          <a:p>
+            <a:pPr>
+              <a:buFontTx/>
+              <a:buChar char="-"/>
+            </a:pPr>
+            <a:r>
+              <a:rPr lang="en-US" dirty="0" smtClean="0"/>
+              <a:t>Extensibility</a:t>
+            </a:r>
+          </a:p>
+          <a:p>
+            <a:pPr>
+              <a:buFontTx/>
+              <a:buChar char="-"/>
+            </a:pPr>
+            <a:r>
+              <a:rPr lang="en-US" dirty="0" smtClean="0"/>
+              <a:t>Testable by definition</a:t>
+            </a:r>
+          </a:p>
+          <a:p>
+            <a:pPr>
+              <a:buFontTx/>
+              <a:buChar char="-"/>
+            </a:pPr>
+            <a:endParaRPr lang="en-US" dirty="0" smtClean="0"/>
+          </a:p>
+          <a:p>
+            <a:endParaRPr lang="en-US" dirty="0" smtClean="0"/>
           </a:p>
         </p:txBody>
       </p:sp>
@@ -6806,7 +7164,7 @@
 </file>
 
 <file path=ppt/slides/slide9.xml><?xml version="1.0" encoding="utf-8"?>
-<p:sld xmlns:a="http://schemas.openxmlformats.org/drawingml/2006/main" xmlns:r="http://schemas.openxmlformats.org/officeDocument/2006/relationships" xmlns:p="http://schemas.openxmlformats.org/presentationml/2006/main">
+<p:sld xmlns:a="http://schemas.openxmlformats.org/drawingml/2006/main" xmlns:r="http://schemas.openxmlformats.org/officeDocument/2006/relationships" xmlns:p="http://schemas.openxmlformats.org/presentationml/2006/main" show="0">
   <p:cSld>
     <p:spTree>
       <p:nvGrpSpPr>
@@ -6858,9 +7216,12 @@
         <p:spPr/>
         <p:txBody>
           <a:bodyPr>
-            <a:normAutofit fontScale="92500" lnSpcReduction="20000"/>
+            <a:normAutofit fontScale="85000" lnSpcReduction="20000"/>
           </a:bodyPr>
           <a:lstStyle/>
+          <a:p>
+            <a:endParaRPr lang="en-US" dirty="0" smtClean="0"/>
+          </a:p>
           <a:p>
             <a:r>
               <a:rPr lang="en-US" dirty="0" smtClean="0"/>
@@ -6924,6 +7285,14 @@
   <p:clrMapOvr>
     <a:masterClrMapping/>
   </p:clrMapOvr>
+  <mc:AlternateContent xmlns:mc="http://schemas.openxmlformats.org/markup-compatibility/2006">
+    <mc:Choice xmlns:p14="http://schemas.microsoft.com/office/powerpoint/2010/main" Requires="p14">
+      <p:transition spd="slow" p14:dur="2000"/>
+    </mc:Choice>
+    <mc:Fallback>
+      <p:transition spd="slow"/>
+    </mc:Fallback>
+  </mc:AlternateContent>
   <p:timing>
     <p:tnLst>
       <p:par>

</xml_diff>

<commit_message>
updated slides with Constructor Injection
</commit_message>
<xml_diff>
--- a/Dependency Injection - the right way.pptx
+++ b/Dependency Injection - the right way.pptx
@@ -5,7 +5,7 @@
     <p:sldMasterId id="2147483648" r:id="rId1"/>
   </p:sldMasterIdLst>
   <p:notesMasterIdLst>
-    <p:notesMasterId r:id="rId37"/>
+    <p:notesMasterId r:id="rId39"/>
   </p:notesMasterIdLst>
   <p:sldIdLst>
     <p:sldId id="258" r:id="rId2"/>
@@ -32,17 +32,19 @@
     <p:sldId id="268" r:id="rId23"/>
     <p:sldId id="291" r:id="rId24"/>
     <p:sldId id="269" r:id="rId25"/>
-    <p:sldId id="270" r:id="rId26"/>
-    <p:sldId id="271" r:id="rId27"/>
-    <p:sldId id="272" r:id="rId28"/>
-    <p:sldId id="273" r:id="rId29"/>
-    <p:sldId id="274" r:id="rId30"/>
-    <p:sldId id="275" r:id="rId31"/>
-    <p:sldId id="276" r:id="rId32"/>
-    <p:sldId id="277" r:id="rId33"/>
-    <p:sldId id="278" r:id="rId34"/>
-    <p:sldId id="279" r:id="rId35"/>
-    <p:sldId id="259" r:id="rId36"/>
+    <p:sldId id="292" r:id="rId26"/>
+    <p:sldId id="293" r:id="rId27"/>
+    <p:sldId id="270" r:id="rId28"/>
+    <p:sldId id="271" r:id="rId29"/>
+    <p:sldId id="272" r:id="rId30"/>
+    <p:sldId id="273" r:id="rId31"/>
+    <p:sldId id="274" r:id="rId32"/>
+    <p:sldId id="275" r:id="rId33"/>
+    <p:sldId id="276" r:id="rId34"/>
+    <p:sldId id="277" r:id="rId35"/>
+    <p:sldId id="278" r:id="rId36"/>
+    <p:sldId id="279" r:id="rId37"/>
+    <p:sldId id="259" r:id="rId38"/>
   </p:sldIdLst>
   <p:sldSz cx="9144000" cy="6858000" type="screen4x3"/>
   <p:notesSz cx="6858000" cy="9144000"/>
@@ -174,6 +176,8 @@
             <p14:sldId id="268"/>
             <p14:sldId id="291"/>
             <p14:sldId id="269"/>
+            <p14:sldId id="292"/>
+            <p14:sldId id="293"/>
             <p14:sldId id="270"/>
             <p14:sldId id="271"/>
             <p14:sldId id="272"/>
@@ -678,6 +682,77 @@
             <a:r>
               <a:rPr lang="en-US" dirty="0" smtClean="0"/>
               <a:t>Interface of abstract class ….</a:t>
+            </a:r>
+          </a:p>
+          <a:p>
+            <a:endParaRPr lang="fr-FR" dirty="0" smtClean="0"/>
+          </a:p>
+          <a:p>
+            <a:r>
+              <a:rPr lang="fr-FR" dirty="0" smtClean="0"/>
+              <a:t>I </a:t>
+            </a:r>
+            <a:r>
+              <a:rPr lang="fr-FR" dirty="0" err="1" smtClean="0"/>
+              <a:t>can’t</a:t>
+            </a:r>
+            <a:r>
+              <a:rPr lang="fr-FR" dirty="0" smtClean="0"/>
+              <a:t> do new I….. </a:t>
+            </a:r>
+          </a:p>
+          <a:p>
+            <a:r>
+              <a:rPr lang="fr-FR" dirty="0" smtClean="0"/>
+              <a:t>The </a:t>
+            </a:r>
+            <a:r>
+              <a:rPr lang="fr-FR" dirty="0" err="1" smtClean="0"/>
+              <a:t>closest</a:t>
+            </a:r>
+            <a:r>
+              <a:rPr lang="fr-FR" dirty="0" smtClean="0"/>
+              <a:t> </a:t>
+            </a:r>
+            <a:r>
+              <a:rPr lang="fr-FR" dirty="0" err="1" smtClean="0"/>
+              <a:t>we</a:t>
+            </a:r>
+            <a:r>
+              <a:rPr lang="fr-FR" dirty="0" smtClean="0"/>
+              <a:t> </a:t>
+            </a:r>
+            <a:r>
+              <a:rPr lang="fr-FR" dirty="0" err="1" smtClean="0"/>
+              <a:t>can</a:t>
+            </a:r>
+            <a:r>
+              <a:rPr lang="fr-FR" dirty="0" smtClean="0"/>
+              <a:t> </a:t>
+            </a:r>
+            <a:r>
+              <a:rPr lang="fr-FR" dirty="0" err="1" smtClean="0"/>
+              <a:t>get</a:t>
+            </a:r>
+            <a:r>
+              <a:rPr lang="fr-FR" dirty="0" smtClean="0"/>
+              <a:t> </a:t>
+            </a:r>
+            <a:r>
+              <a:rPr lang="fr-FR" dirty="0" err="1" smtClean="0"/>
+              <a:t>is</a:t>
+            </a:r>
+            <a:r>
+              <a:rPr lang="fr-FR" dirty="0" smtClean="0"/>
+              <a:t> </a:t>
+            </a:r>
+            <a:r>
+              <a:rPr lang="fr-FR" dirty="0" err="1" smtClean="0"/>
+              <a:t>this</a:t>
+            </a:r>
+            <a:r>
+              <a:rPr lang="fr-FR" dirty="0" smtClean="0"/>
+              <a:t> ….</a:t>
             </a:r>
             <a:endParaRPr lang="en-US" dirty="0"/>
           </a:p>
@@ -26186,6 +26261,1936 @@
           </a:p>
         </p:txBody>
       </p:sp>
+      <p:sp>
+        <p:nvSpPr>
+          <p:cNvPr id="7" name="TextBox 6"/>
+          <p:cNvSpPr txBox="1"/>
+          <p:nvPr/>
+        </p:nvSpPr>
+        <p:spPr>
+          <a:xfrm>
+            <a:off x="-468560" y="1268760"/>
+            <a:ext cx="12241360" cy="2973891"/>
+          </a:xfrm>
+          <a:prstGeom prst="rect">
+            <a:avLst/>
+          </a:prstGeom>
+          <a:solidFill>
+            <a:schemeClr val="bg1"/>
+          </a:solidFill>
+          <a:ln>
+            <a:solidFill>
+              <a:schemeClr val="accent1"/>
+            </a:solidFill>
+          </a:ln>
+        </p:spPr>
+        <p:txBody>
+          <a:bodyPr wrap="square" rtlCol="0">
+            <a:spAutoFit/>
+          </a:bodyPr>
+          <a:lstStyle/>
+          <a:p>
+            <a:pPr>
+              <a:lnSpc>
+                <a:spcPct val="115000"/>
+              </a:lnSpc>
+              <a:spcAft>
+                <a:spcPts val="0"/>
+              </a:spcAft>
+            </a:pPr>
+            <a:r>
+              <a:rPr lang="en-US" sz="1600" dirty="0">
+                <a:solidFill>
+                  <a:srgbClr val="0000FF"/>
+                </a:solidFill>
+                <a:highlight>
+                  <a:srgbClr val="FFFFFF"/>
+                </a:highlight>
+                <a:latin typeface="Consolas"/>
+                <a:ea typeface="Calibri"/>
+                <a:cs typeface="Times New Roman"/>
+              </a:rPr>
+              <a:t>public</a:t>
+            </a:r>
+            <a:r>
+              <a:rPr lang="en-US" sz="1600" dirty="0">
+                <a:solidFill>
+                  <a:srgbClr val="000000"/>
+                </a:solidFill>
+                <a:highlight>
+                  <a:srgbClr val="FFFFFF"/>
+                </a:highlight>
+                <a:latin typeface="Consolas"/>
+                <a:ea typeface="Calibri"/>
+                <a:cs typeface="Times New Roman"/>
+              </a:rPr>
+              <a:t> </a:t>
+            </a:r>
+            <a:r>
+              <a:rPr lang="en-US" sz="1600" dirty="0">
+                <a:solidFill>
+                  <a:srgbClr val="0000FF"/>
+                </a:solidFill>
+                <a:highlight>
+                  <a:srgbClr val="FFFFFF"/>
+                </a:highlight>
+                <a:latin typeface="Consolas"/>
+                <a:ea typeface="Calibri"/>
+                <a:cs typeface="Times New Roman"/>
+              </a:rPr>
+              <a:t>class</a:t>
+            </a:r>
+            <a:r>
+              <a:rPr lang="en-US" sz="1600" dirty="0">
+                <a:solidFill>
+                  <a:srgbClr val="000000"/>
+                </a:solidFill>
+                <a:highlight>
+                  <a:srgbClr val="FFFFFF"/>
+                </a:highlight>
+                <a:latin typeface="Consolas"/>
+                <a:ea typeface="Calibri"/>
+                <a:cs typeface="Times New Roman"/>
+              </a:rPr>
+              <a:t> </a:t>
+            </a:r>
+            <a:r>
+              <a:rPr lang="en-US" sz="1600" dirty="0" err="1">
+                <a:solidFill>
+                  <a:srgbClr val="2B91AF"/>
+                </a:solidFill>
+                <a:highlight>
+                  <a:srgbClr val="FFFFFF"/>
+                </a:highlight>
+                <a:latin typeface="Consolas"/>
+                <a:ea typeface="Calibri"/>
+                <a:cs typeface="Times New Roman"/>
+              </a:rPr>
+              <a:t>AccountController</a:t>
+            </a:r>
+            <a:r>
+              <a:rPr lang="en-US" sz="1600" dirty="0">
+                <a:solidFill>
+                  <a:srgbClr val="000000"/>
+                </a:solidFill>
+                <a:highlight>
+                  <a:srgbClr val="FFFFFF"/>
+                </a:highlight>
+                <a:latin typeface="Consolas"/>
+                <a:ea typeface="Calibri"/>
+                <a:cs typeface="Times New Roman"/>
+              </a:rPr>
+              <a:t> : </a:t>
+            </a:r>
+            <a:r>
+              <a:rPr lang="en-US" sz="1600" dirty="0" err="1">
+                <a:solidFill>
+                  <a:srgbClr val="2B91AF"/>
+                </a:solidFill>
+                <a:highlight>
+                  <a:srgbClr val="FFFFFF"/>
+                </a:highlight>
+                <a:latin typeface="Consolas"/>
+                <a:ea typeface="Calibri"/>
+                <a:cs typeface="Times New Roman"/>
+              </a:rPr>
+              <a:t>BaseController</a:t>
+            </a:r>
+            <a:endParaRPr lang="en-US" sz="2000" dirty="0">
+              <a:ea typeface="Calibri"/>
+              <a:cs typeface="Times New Roman"/>
+            </a:endParaRPr>
+          </a:p>
+          <a:p>
+            <a:pPr>
+              <a:lnSpc>
+                <a:spcPct val="115000"/>
+              </a:lnSpc>
+              <a:spcAft>
+                <a:spcPts val="0"/>
+              </a:spcAft>
+            </a:pPr>
+            <a:r>
+              <a:rPr lang="en-US" sz="1600" dirty="0">
+                <a:solidFill>
+                  <a:srgbClr val="000000"/>
+                </a:solidFill>
+                <a:highlight>
+                  <a:srgbClr val="FFFFFF"/>
+                </a:highlight>
+                <a:latin typeface="Consolas"/>
+                <a:ea typeface="Calibri"/>
+                <a:cs typeface="Times New Roman"/>
+              </a:rPr>
+              <a:t>    {</a:t>
+            </a:r>
+            <a:endParaRPr lang="en-US" sz="2000" dirty="0">
+              <a:ea typeface="Calibri"/>
+              <a:cs typeface="Times New Roman"/>
+            </a:endParaRPr>
+          </a:p>
+          <a:p>
+            <a:pPr>
+              <a:lnSpc>
+                <a:spcPct val="115000"/>
+              </a:lnSpc>
+              <a:spcAft>
+                <a:spcPts val="0"/>
+              </a:spcAft>
+            </a:pPr>
+            <a:r>
+              <a:rPr lang="en-US" sz="1600" dirty="0">
+                <a:solidFill>
+                  <a:srgbClr val="000000"/>
+                </a:solidFill>
+                <a:highlight>
+                  <a:srgbClr val="FFFFFF"/>
+                </a:highlight>
+                <a:latin typeface="Consolas"/>
+                <a:ea typeface="Calibri"/>
+                <a:cs typeface="Times New Roman"/>
+              </a:rPr>
+              <a:t>        </a:t>
+            </a:r>
+            <a:r>
+              <a:rPr lang="en-US" sz="1600" dirty="0">
+                <a:solidFill>
+                  <a:srgbClr val="0000FF"/>
+                </a:solidFill>
+                <a:highlight>
+                  <a:srgbClr val="FFFFFF"/>
+                </a:highlight>
+                <a:latin typeface="Consolas"/>
+                <a:ea typeface="Calibri"/>
+                <a:cs typeface="Times New Roman"/>
+              </a:rPr>
+              <a:t>private</a:t>
+            </a:r>
+            <a:r>
+              <a:rPr lang="en-US" sz="1600" dirty="0">
+                <a:solidFill>
+                  <a:srgbClr val="000000"/>
+                </a:solidFill>
+                <a:highlight>
+                  <a:srgbClr val="FFFFFF"/>
+                </a:highlight>
+                <a:latin typeface="Consolas"/>
+                <a:ea typeface="Calibri"/>
+                <a:cs typeface="Times New Roman"/>
+              </a:rPr>
+              <a:t> </a:t>
+            </a:r>
+            <a:r>
+              <a:rPr lang="en-US" sz="1600" dirty="0" err="1">
+                <a:solidFill>
+                  <a:srgbClr val="0000FF"/>
+                </a:solidFill>
+                <a:highlight>
+                  <a:srgbClr val="FFFFFF"/>
+                </a:highlight>
+                <a:latin typeface="Consolas"/>
+                <a:ea typeface="Calibri"/>
+                <a:cs typeface="Times New Roman"/>
+              </a:rPr>
+              <a:t>readonly</a:t>
+            </a:r>
+            <a:r>
+              <a:rPr lang="en-US" sz="1600" dirty="0">
+                <a:solidFill>
+                  <a:srgbClr val="000000"/>
+                </a:solidFill>
+                <a:highlight>
+                  <a:srgbClr val="FFFFFF"/>
+                </a:highlight>
+                <a:latin typeface="Consolas"/>
+                <a:ea typeface="Calibri"/>
+                <a:cs typeface="Times New Roman"/>
+              </a:rPr>
+              <a:t> </a:t>
+            </a:r>
+            <a:r>
+              <a:rPr lang="en-US" sz="1600" dirty="0" err="1">
+                <a:solidFill>
+                  <a:srgbClr val="2B91AF"/>
+                </a:solidFill>
+                <a:highlight>
+                  <a:srgbClr val="FFFFFF"/>
+                </a:highlight>
+                <a:latin typeface="Consolas"/>
+                <a:ea typeface="Calibri"/>
+                <a:cs typeface="Times New Roman"/>
+              </a:rPr>
+              <a:t>IUserAccountService</a:t>
+            </a:r>
+            <a:r>
+              <a:rPr lang="en-US" sz="1600" dirty="0">
+                <a:solidFill>
+                  <a:srgbClr val="000000"/>
+                </a:solidFill>
+                <a:highlight>
+                  <a:srgbClr val="FFFFFF"/>
+                </a:highlight>
+                <a:latin typeface="Consolas"/>
+                <a:ea typeface="Calibri"/>
+                <a:cs typeface="Times New Roman"/>
+              </a:rPr>
+              <a:t> _</a:t>
+            </a:r>
+            <a:r>
+              <a:rPr lang="en-US" sz="1600" dirty="0" err="1">
+                <a:solidFill>
+                  <a:srgbClr val="000000"/>
+                </a:solidFill>
+                <a:highlight>
+                  <a:srgbClr val="FFFFFF"/>
+                </a:highlight>
+                <a:latin typeface="Consolas"/>
+                <a:ea typeface="Calibri"/>
+                <a:cs typeface="Times New Roman"/>
+              </a:rPr>
+              <a:t>userAccountService</a:t>
+            </a:r>
+            <a:r>
+              <a:rPr lang="en-US" sz="1600" dirty="0">
+                <a:solidFill>
+                  <a:srgbClr val="000000"/>
+                </a:solidFill>
+                <a:highlight>
+                  <a:srgbClr val="FFFFFF"/>
+                </a:highlight>
+                <a:latin typeface="Consolas"/>
+                <a:ea typeface="Calibri"/>
+                <a:cs typeface="Times New Roman"/>
+              </a:rPr>
+              <a:t>;</a:t>
+            </a:r>
+            <a:endParaRPr lang="en-US" sz="2000" dirty="0">
+              <a:ea typeface="Calibri"/>
+              <a:cs typeface="Times New Roman"/>
+            </a:endParaRPr>
+          </a:p>
+          <a:p>
+            <a:pPr>
+              <a:lnSpc>
+                <a:spcPct val="115000"/>
+              </a:lnSpc>
+              <a:spcAft>
+                <a:spcPts val="0"/>
+              </a:spcAft>
+            </a:pPr>
+            <a:r>
+              <a:rPr lang="en-US" sz="1600" dirty="0">
+                <a:solidFill>
+                  <a:srgbClr val="000000"/>
+                </a:solidFill>
+                <a:highlight>
+                  <a:srgbClr val="FFFFFF"/>
+                </a:highlight>
+                <a:latin typeface="Consolas"/>
+                <a:ea typeface="Calibri"/>
+                <a:cs typeface="Times New Roman"/>
+              </a:rPr>
+              <a:t> </a:t>
+            </a:r>
+            <a:endParaRPr lang="en-US" sz="2000" dirty="0">
+              <a:ea typeface="Calibri"/>
+              <a:cs typeface="Times New Roman"/>
+            </a:endParaRPr>
+          </a:p>
+          <a:p>
+            <a:pPr>
+              <a:lnSpc>
+                <a:spcPct val="115000"/>
+              </a:lnSpc>
+              <a:spcAft>
+                <a:spcPts val="0"/>
+              </a:spcAft>
+            </a:pPr>
+            <a:r>
+              <a:rPr lang="en-US" sz="1600" dirty="0">
+                <a:solidFill>
+                  <a:srgbClr val="000000"/>
+                </a:solidFill>
+                <a:highlight>
+                  <a:srgbClr val="FFFFFF"/>
+                </a:highlight>
+                <a:latin typeface="Consolas"/>
+                <a:ea typeface="Calibri"/>
+                <a:cs typeface="Times New Roman"/>
+              </a:rPr>
+              <a:t>        </a:t>
+            </a:r>
+            <a:r>
+              <a:rPr lang="en-US" sz="1600" dirty="0">
+                <a:solidFill>
+                  <a:srgbClr val="0000FF"/>
+                </a:solidFill>
+                <a:highlight>
+                  <a:srgbClr val="FFFFFF"/>
+                </a:highlight>
+                <a:latin typeface="Consolas"/>
+                <a:ea typeface="Calibri"/>
+                <a:cs typeface="Times New Roman"/>
+              </a:rPr>
+              <a:t>public</a:t>
+            </a:r>
+            <a:r>
+              <a:rPr lang="en-US" sz="1600" dirty="0">
+                <a:solidFill>
+                  <a:srgbClr val="000000"/>
+                </a:solidFill>
+                <a:highlight>
+                  <a:srgbClr val="FFFFFF"/>
+                </a:highlight>
+                <a:latin typeface="Consolas"/>
+                <a:ea typeface="Calibri"/>
+                <a:cs typeface="Times New Roman"/>
+              </a:rPr>
+              <a:t> </a:t>
+            </a:r>
+            <a:r>
+              <a:rPr lang="en-US" sz="1600" dirty="0" err="1">
+                <a:solidFill>
+                  <a:srgbClr val="000000"/>
+                </a:solidFill>
+                <a:highlight>
+                  <a:srgbClr val="FFFFFF"/>
+                </a:highlight>
+                <a:latin typeface="Consolas"/>
+                <a:ea typeface="Calibri"/>
+                <a:cs typeface="Times New Roman"/>
+              </a:rPr>
+              <a:t>AccountController</a:t>
+            </a:r>
+            <a:r>
+              <a:rPr lang="en-US" sz="1600" dirty="0">
+                <a:solidFill>
+                  <a:srgbClr val="000000"/>
+                </a:solidFill>
+                <a:highlight>
+                  <a:srgbClr val="FFFFFF"/>
+                </a:highlight>
+                <a:latin typeface="Consolas"/>
+                <a:ea typeface="Calibri"/>
+                <a:cs typeface="Times New Roman"/>
+              </a:rPr>
+              <a:t>(</a:t>
+            </a:r>
+            <a:r>
+              <a:rPr lang="en-US" sz="1600" dirty="0" err="1">
+                <a:solidFill>
+                  <a:srgbClr val="2B91AF"/>
+                </a:solidFill>
+                <a:highlight>
+                  <a:srgbClr val="FFFFFF"/>
+                </a:highlight>
+                <a:latin typeface="Consolas"/>
+                <a:ea typeface="Calibri"/>
+                <a:cs typeface="Times New Roman"/>
+              </a:rPr>
+              <a:t>IUserAccountService</a:t>
+            </a:r>
+            <a:r>
+              <a:rPr lang="en-US" sz="1600" dirty="0">
+                <a:solidFill>
+                  <a:srgbClr val="000000"/>
+                </a:solidFill>
+                <a:highlight>
+                  <a:srgbClr val="FFFFFF"/>
+                </a:highlight>
+                <a:latin typeface="Consolas"/>
+                <a:ea typeface="Calibri"/>
+                <a:cs typeface="Times New Roman"/>
+              </a:rPr>
+              <a:t> </a:t>
+            </a:r>
+            <a:r>
+              <a:rPr lang="en-US" sz="1600" dirty="0" err="1">
+                <a:solidFill>
+                  <a:srgbClr val="000000"/>
+                </a:solidFill>
+                <a:highlight>
+                  <a:srgbClr val="FFFFFF"/>
+                </a:highlight>
+                <a:latin typeface="Consolas"/>
+                <a:ea typeface="Calibri"/>
+                <a:cs typeface="Times New Roman"/>
+              </a:rPr>
+              <a:t>userAccountService</a:t>
+            </a:r>
+            <a:r>
+              <a:rPr lang="en-US" sz="1600" dirty="0">
+                <a:solidFill>
+                  <a:srgbClr val="000000"/>
+                </a:solidFill>
+                <a:highlight>
+                  <a:srgbClr val="FFFFFF"/>
+                </a:highlight>
+                <a:latin typeface="Consolas"/>
+                <a:ea typeface="Calibri"/>
+                <a:cs typeface="Times New Roman"/>
+              </a:rPr>
+              <a:t>)</a:t>
+            </a:r>
+            <a:endParaRPr lang="en-US" sz="2000" dirty="0">
+              <a:ea typeface="Calibri"/>
+              <a:cs typeface="Times New Roman"/>
+            </a:endParaRPr>
+          </a:p>
+          <a:p>
+            <a:pPr>
+              <a:lnSpc>
+                <a:spcPct val="115000"/>
+              </a:lnSpc>
+              <a:spcAft>
+                <a:spcPts val="0"/>
+              </a:spcAft>
+            </a:pPr>
+            <a:r>
+              <a:rPr lang="en-US" sz="1600" dirty="0">
+                <a:solidFill>
+                  <a:srgbClr val="000000"/>
+                </a:solidFill>
+                <a:highlight>
+                  <a:srgbClr val="FFFFFF"/>
+                </a:highlight>
+                <a:latin typeface="Consolas"/>
+                <a:ea typeface="Calibri"/>
+                <a:cs typeface="Times New Roman"/>
+              </a:rPr>
+              <a:t>        {</a:t>
+            </a:r>
+            <a:endParaRPr lang="en-US" sz="2000" dirty="0">
+              <a:ea typeface="Calibri"/>
+              <a:cs typeface="Times New Roman"/>
+            </a:endParaRPr>
+          </a:p>
+          <a:p>
+            <a:pPr>
+              <a:lnSpc>
+                <a:spcPct val="115000"/>
+              </a:lnSpc>
+              <a:spcAft>
+                <a:spcPts val="0"/>
+              </a:spcAft>
+            </a:pPr>
+            <a:r>
+              <a:rPr lang="en-US" sz="1600" dirty="0">
+                <a:solidFill>
+                  <a:srgbClr val="000000"/>
+                </a:solidFill>
+                <a:highlight>
+                  <a:srgbClr val="FFFFFF"/>
+                </a:highlight>
+                <a:latin typeface="Consolas"/>
+                <a:ea typeface="Calibri"/>
+                <a:cs typeface="Times New Roman"/>
+              </a:rPr>
+              <a:t>            </a:t>
+            </a:r>
+            <a:r>
+              <a:rPr lang="en-US" sz="1600" dirty="0">
+                <a:solidFill>
+                  <a:srgbClr val="0000FF"/>
+                </a:solidFill>
+                <a:highlight>
+                  <a:srgbClr val="FFFFFF"/>
+                </a:highlight>
+                <a:latin typeface="Consolas"/>
+                <a:ea typeface="Calibri"/>
+                <a:cs typeface="Times New Roman"/>
+              </a:rPr>
+              <a:t>if</a:t>
+            </a:r>
+            <a:r>
+              <a:rPr lang="en-US" sz="1600" dirty="0">
+                <a:solidFill>
+                  <a:srgbClr val="000000"/>
+                </a:solidFill>
+                <a:highlight>
+                  <a:srgbClr val="FFFFFF"/>
+                </a:highlight>
+                <a:latin typeface="Consolas"/>
+                <a:ea typeface="Calibri"/>
+                <a:cs typeface="Times New Roman"/>
+              </a:rPr>
+              <a:t> (</a:t>
+            </a:r>
+            <a:r>
+              <a:rPr lang="en-US" sz="1600" dirty="0" err="1">
+                <a:solidFill>
+                  <a:srgbClr val="000000"/>
+                </a:solidFill>
+                <a:highlight>
+                  <a:srgbClr val="FFFFFF"/>
+                </a:highlight>
+                <a:latin typeface="Consolas"/>
+                <a:ea typeface="Calibri"/>
+                <a:cs typeface="Times New Roman"/>
+              </a:rPr>
+              <a:t>userAccountService</a:t>
+            </a:r>
+            <a:r>
+              <a:rPr lang="en-US" sz="1600" dirty="0">
+                <a:solidFill>
+                  <a:srgbClr val="000000"/>
+                </a:solidFill>
+                <a:highlight>
+                  <a:srgbClr val="FFFFFF"/>
+                </a:highlight>
+                <a:latin typeface="Consolas"/>
+                <a:ea typeface="Calibri"/>
+                <a:cs typeface="Times New Roman"/>
+              </a:rPr>
+              <a:t> == </a:t>
+            </a:r>
+            <a:r>
+              <a:rPr lang="en-US" sz="1600" dirty="0">
+                <a:solidFill>
+                  <a:srgbClr val="0000FF"/>
+                </a:solidFill>
+                <a:highlight>
+                  <a:srgbClr val="FFFFFF"/>
+                </a:highlight>
+                <a:latin typeface="Consolas"/>
+                <a:ea typeface="Calibri"/>
+                <a:cs typeface="Times New Roman"/>
+              </a:rPr>
+              <a:t>null</a:t>
+            </a:r>
+            <a:r>
+              <a:rPr lang="en-US" sz="1600" dirty="0">
+                <a:solidFill>
+                  <a:srgbClr val="000000"/>
+                </a:solidFill>
+                <a:highlight>
+                  <a:srgbClr val="FFFFFF"/>
+                </a:highlight>
+                <a:latin typeface="Consolas"/>
+                <a:ea typeface="Calibri"/>
+                <a:cs typeface="Times New Roman"/>
+              </a:rPr>
+              <a:t>) </a:t>
+            </a:r>
+            <a:r>
+              <a:rPr lang="en-US" sz="1600" dirty="0">
+                <a:solidFill>
+                  <a:srgbClr val="0000FF"/>
+                </a:solidFill>
+                <a:highlight>
+                  <a:srgbClr val="FFFFFF"/>
+                </a:highlight>
+                <a:latin typeface="Consolas"/>
+                <a:ea typeface="Calibri"/>
+                <a:cs typeface="Times New Roman"/>
+              </a:rPr>
+              <a:t>throw</a:t>
+            </a:r>
+            <a:r>
+              <a:rPr lang="en-US" sz="1600" dirty="0">
+                <a:solidFill>
+                  <a:srgbClr val="000000"/>
+                </a:solidFill>
+                <a:highlight>
+                  <a:srgbClr val="FFFFFF"/>
+                </a:highlight>
+                <a:latin typeface="Consolas"/>
+                <a:ea typeface="Calibri"/>
+                <a:cs typeface="Times New Roman"/>
+              </a:rPr>
+              <a:t> </a:t>
+            </a:r>
+            <a:r>
+              <a:rPr lang="en-US" sz="1600" dirty="0">
+                <a:solidFill>
+                  <a:srgbClr val="0000FF"/>
+                </a:solidFill>
+                <a:highlight>
+                  <a:srgbClr val="FFFFFF"/>
+                </a:highlight>
+                <a:latin typeface="Consolas"/>
+                <a:ea typeface="Calibri"/>
+                <a:cs typeface="Times New Roman"/>
+              </a:rPr>
+              <a:t>new</a:t>
+            </a:r>
+            <a:r>
+              <a:rPr lang="en-US" sz="1600" dirty="0">
+                <a:solidFill>
+                  <a:srgbClr val="000000"/>
+                </a:solidFill>
+                <a:highlight>
+                  <a:srgbClr val="FFFFFF"/>
+                </a:highlight>
+                <a:latin typeface="Consolas"/>
+                <a:ea typeface="Calibri"/>
+                <a:cs typeface="Times New Roman"/>
+              </a:rPr>
+              <a:t> </a:t>
+            </a:r>
+            <a:r>
+              <a:rPr lang="en-US" sz="1600" dirty="0" err="1">
+                <a:solidFill>
+                  <a:srgbClr val="2B91AF"/>
+                </a:solidFill>
+                <a:highlight>
+                  <a:srgbClr val="FFFFFF"/>
+                </a:highlight>
+                <a:latin typeface="Consolas"/>
+                <a:ea typeface="Calibri"/>
+                <a:cs typeface="Times New Roman"/>
+              </a:rPr>
+              <a:t>ArgumentNullException</a:t>
+            </a:r>
+            <a:r>
+              <a:rPr lang="en-US" sz="1600" dirty="0">
+                <a:solidFill>
+                  <a:srgbClr val="000000"/>
+                </a:solidFill>
+                <a:highlight>
+                  <a:srgbClr val="FFFFFF"/>
+                </a:highlight>
+                <a:latin typeface="Consolas"/>
+                <a:ea typeface="Calibri"/>
+                <a:cs typeface="Times New Roman"/>
+              </a:rPr>
+              <a:t>(</a:t>
+            </a:r>
+            <a:r>
+              <a:rPr lang="en-US" sz="1600" dirty="0">
+                <a:solidFill>
+                  <a:srgbClr val="A31515"/>
+                </a:solidFill>
+                <a:highlight>
+                  <a:srgbClr val="FFFFFF"/>
+                </a:highlight>
+                <a:latin typeface="Consolas"/>
+                <a:ea typeface="Calibri"/>
+                <a:cs typeface="Times New Roman"/>
+              </a:rPr>
+              <a:t>"</a:t>
+            </a:r>
+            <a:r>
+              <a:rPr lang="en-US" sz="1600" dirty="0" err="1">
+                <a:solidFill>
+                  <a:srgbClr val="A31515"/>
+                </a:solidFill>
+                <a:highlight>
+                  <a:srgbClr val="FFFFFF"/>
+                </a:highlight>
+                <a:latin typeface="Consolas"/>
+                <a:ea typeface="Calibri"/>
+                <a:cs typeface="Times New Roman"/>
+              </a:rPr>
+              <a:t>userAccountService</a:t>
+            </a:r>
+            <a:r>
+              <a:rPr lang="en-US" sz="1600" dirty="0">
+                <a:solidFill>
+                  <a:srgbClr val="A31515"/>
+                </a:solidFill>
+                <a:highlight>
+                  <a:srgbClr val="FFFFFF"/>
+                </a:highlight>
+                <a:latin typeface="Consolas"/>
+                <a:ea typeface="Calibri"/>
+                <a:cs typeface="Times New Roman"/>
+              </a:rPr>
+              <a:t>"</a:t>
+            </a:r>
+            <a:r>
+              <a:rPr lang="en-US" sz="1600" dirty="0">
+                <a:solidFill>
+                  <a:srgbClr val="000000"/>
+                </a:solidFill>
+                <a:highlight>
+                  <a:srgbClr val="FFFFFF"/>
+                </a:highlight>
+                <a:latin typeface="Consolas"/>
+                <a:ea typeface="Calibri"/>
+                <a:cs typeface="Times New Roman"/>
+              </a:rPr>
+              <a:t>);</a:t>
+            </a:r>
+            <a:endParaRPr lang="en-US" sz="2000" dirty="0">
+              <a:ea typeface="Calibri"/>
+              <a:cs typeface="Times New Roman"/>
+            </a:endParaRPr>
+          </a:p>
+          <a:p>
+            <a:pPr>
+              <a:lnSpc>
+                <a:spcPct val="115000"/>
+              </a:lnSpc>
+              <a:spcAft>
+                <a:spcPts val="0"/>
+              </a:spcAft>
+            </a:pPr>
+            <a:r>
+              <a:rPr lang="en-US" sz="1600" dirty="0">
+                <a:solidFill>
+                  <a:srgbClr val="000000"/>
+                </a:solidFill>
+                <a:highlight>
+                  <a:srgbClr val="FFFFFF"/>
+                </a:highlight>
+                <a:latin typeface="Consolas"/>
+                <a:ea typeface="Calibri"/>
+                <a:cs typeface="Times New Roman"/>
+              </a:rPr>
+              <a:t>            _</a:t>
+            </a:r>
+            <a:r>
+              <a:rPr lang="en-US" sz="1600" dirty="0" err="1">
+                <a:solidFill>
+                  <a:srgbClr val="000000"/>
+                </a:solidFill>
+                <a:highlight>
+                  <a:srgbClr val="FFFFFF"/>
+                </a:highlight>
+                <a:latin typeface="Consolas"/>
+                <a:ea typeface="Calibri"/>
+                <a:cs typeface="Times New Roman"/>
+              </a:rPr>
+              <a:t>userAccountService</a:t>
+            </a:r>
+            <a:r>
+              <a:rPr lang="en-US" sz="1600" dirty="0">
+                <a:solidFill>
+                  <a:srgbClr val="000000"/>
+                </a:solidFill>
+                <a:highlight>
+                  <a:srgbClr val="FFFFFF"/>
+                </a:highlight>
+                <a:latin typeface="Consolas"/>
+                <a:ea typeface="Calibri"/>
+                <a:cs typeface="Times New Roman"/>
+              </a:rPr>
+              <a:t> = </a:t>
+            </a:r>
+            <a:r>
+              <a:rPr lang="en-US" sz="1600" dirty="0" err="1">
+                <a:solidFill>
+                  <a:srgbClr val="000000"/>
+                </a:solidFill>
+                <a:highlight>
+                  <a:srgbClr val="FFFFFF"/>
+                </a:highlight>
+                <a:latin typeface="Consolas"/>
+                <a:ea typeface="Calibri"/>
+                <a:cs typeface="Times New Roman"/>
+              </a:rPr>
+              <a:t>userAccountService</a:t>
+            </a:r>
+            <a:r>
+              <a:rPr lang="en-US" sz="1600" dirty="0">
+                <a:solidFill>
+                  <a:srgbClr val="000000"/>
+                </a:solidFill>
+                <a:highlight>
+                  <a:srgbClr val="FFFFFF"/>
+                </a:highlight>
+                <a:latin typeface="Consolas"/>
+                <a:ea typeface="Calibri"/>
+                <a:cs typeface="Times New Roman"/>
+              </a:rPr>
+              <a:t>;</a:t>
+            </a:r>
+            <a:endParaRPr lang="en-US" sz="2000" dirty="0">
+              <a:ea typeface="Calibri"/>
+              <a:cs typeface="Times New Roman"/>
+            </a:endParaRPr>
+          </a:p>
+          <a:p>
+            <a:pPr>
+              <a:lnSpc>
+                <a:spcPct val="115000"/>
+              </a:lnSpc>
+              <a:spcAft>
+                <a:spcPts val="0"/>
+              </a:spcAft>
+            </a:pPr>
+            <a:r>
+              <a:rPr lang="en-US" sz="1600" dirty="0">
+                <a:solidFill>
+                  <a:srgbClr val="000000"/>
+                </a:solidFill>
+                <a:highlight>
+                  <a:srgbClr val="FFFFFF"/>
+                </a:highlight>
+                <a:latin typeface="Consolas"/>
+                <a:ea typeface="Calibri"/>
+                <a:cs typeface="Times New Roman"/>
+              </a:rPr>
+              <a:t>        }</a:t>
+            </a:r>
+            <a:endParaRPr lang="en-US" sz="2000" dirty="0">
+              <a:ea typeface="Calibri"/>
+              <a:cs typeface="Times New Roman"/>
+            </a:endParaRPr>
+          </a:p>
+          <a:p>
+            <a:pPr>
+              <a:lnSpc>
+                <a:spcPct val="115000"/>
+              </a:lnSpc>
+              <a:spcAft>
+                <a:spcPts val="1000"/>
+              </a:spcAft>
+            </a:pPr>
+            <a:r>
+              <a:rPr lang="fr-FR" sz="1400" i="1" dirty="0" err="1" smtClean="0">
+                <a:solidFill>
+                  <a:srgbClr val="000000"/>
+                </a:solidFill>
+                <a:highlight>
+                  <a:srgbClr val="FFFFFF"/>
+                </a:highlight>
+                <a:latin typeface="Consolas"/>
+                <a:ea typeface="Calibri"/>
+                <a:cs typeface="Times New Roman"/>
+              </a:rPr>
+              <a:t>AccountController</a:t>
+            </a:r>
+            <a:r>
+              <a:rPr lang="fr-FR" sz="1400" i="1" dirty="0" smtClean="0">
+                <a:solidFill>
+                  <a:srgbClr val="000000"/>
+                </a:solidFill>
+                <a:highlight>
+                  <a:srgbClr val="FFFFFF"/>
+                </a:highlight>
+                <a:latin typeface="Consolas"/>
+                <a:ea typeface="Calibri"/>
+                <a:cs typeface="Times New Roman"/>
+              </a:rPr>
+              <a:t> (</a:t>
+            </a:r>
+            <a:r>
+              <a:rPr lang="fr-FR" sz="1400" i="1" dirty="0" err="1" smtClean="0">
+                <a:solidFill>
+                  <a:srgbClr val="000000"/>
+                </a:solidFill>
+                <a:highlight>
+                  <a:srgbClr val="FFFFFF"/>
+                </a:highlight>
+                <a:latin typeface="Consolas"/>
+                <a:ea typeface="Calibri"/>
+                <a:cs typeface="Times New Roman"/>
+              </a:rPr>
+              <a:t>WebPortal</a:t>
+            </a:r>
+            <a:r>
+              <a:rPr lang="fr-FR" sz="1400" i="1" dirty="0" smtClean="0">
+                <a:solidFill>
+                  <a:srgbClr val="000000"/>
+                </a:solidFill>
+                <a:highlight>
+                  <a:srgbClr val="FFFFFF"/>
+                </a:highlight>
+                <a:latin typeface="Consolas"/>
+                <a:ea typeface="Calibri"/>
+                <a:cs typeface="Times New Roman"/>
+              </a:rPr>
+              <a:t>)</a:t>
+            </a:r>
+            <a:endParaRPr lang="en-US" i="1" dirty="0">
+              <a:ea typeface="Calibri"/>
+              <a:cs typeface="Times New Roman"/>
+            </a:endParaRPr>
+          </a:p>
+        </p:txBody>
+      </p:sp>
+      <p:sp>
+        <p:nvSpPr>
+          <p:cNvPr id="8" name="TextBox 7"/>
+          <p:cNvSpPr txBox="1"/>
+          <p:nvPr/>
+        </p:nvSpPr>
+        <p:spPr>
+          <a:xfrm>
+            <a:off x="107504" y="2880491"/>
+            <a:ext cx="12241360" cy="3068789"/>
+          </a:xfrm>
+          <a:prstGeom prst="rect">
+            <a:avLst/>
+          </a:prstGeom>
+          <a:solidFill>
+            <a:schemeClr val="bg1"/>
+          </a:solidFill>
+          <a:ln>
+            <a:solidFill>
+              <a:schemeClr val="accent1"/>
+            </a:solidFill>
+          </a:ln>
+        </p:spPr>
+        <p:txBody>
+          <a:bodyPr wrap="square" rtlCol="0">
+            <a:spAutoFit/>
+          </a:bodyPr>
+          <a:lstStyle/>
+          <a:p>
+            <a:pPr>
+              <a:lnSpc>
+                <a:spcPct val="115000"/>
+              </a:lnSpc>
+              <a:spcAft>
+                <a:spcPts val="0"/>
+              </a:spcAft>
+            </a:pPr>
+            <a:r>
+              <a:rPr lang="en-US" sz="1600" dirty="0">
+                <a:solidFill>
+                  <a:srgbClr val="000000"/>
+                </a:solidFill>
+                <a:highlight>
+                  <a:srgbClr val="FFFFFF"/>
+                </a:highlight>
+                <a:latin typeface="Consolas"/>
+                <a:ea typeface="Calibri"/>
+                <a:cs typeface="Times New Roman"/>
+              </a:rPr>
+              <a:t> </a:t>
+            </a:r>
+            <a:r>
+              <a:rPr lang="en-US" sz="1600" dirty="0">
+                <a:solidFill>
+                  <a:srgbClr val="0000FF"/>
+                </a:solidFill>
+                <a:highlight>
+                  <a:srgbClr val="FFFFFF"/>
+                </a:highlight>
+                <a:latin typeface="Consolas"/>
+                <a:ea typeface="Calibri"/>
+                <a:cs typeface="Times New Roman"/>
+              </a:rPr>
+              <a:t>public</a:t>
+            </a:r>
+            <a:r>
+              <a:rPr lang="en-US" sz="1600" dirty="0">
+                <a:solidFill>
+                  <a:srgbClr val="000000"/>
+                </a:solidFill>
+                <a:highlight>
+                  <a:srgbClr val="FFFFFF"/>
+                </a:highlight>
+                <a:latin typeface="Consolas"/>
+                <a:ea typeface="Calibri"/>
+                <a:cs typeface="Times New Roman"/>
+              </a:rPr>
+              <a:t> </a:t>
+            </a:r>
+            <a:r>
+              <a:rPr lang="en-US" sz="1600" dirty="0">
+                <a:solidFill>
+                  <a:srgbClr val="0000FF"/>
+                </a:solidFill>
+                <a:highlight>
+                  <a:srgbClr val="FFFFFF"/>
+                </a:highlight>
+                <a:latin typeface="Consolas"/>
+                <a:ea typeface="Calibri"/>
+                <a:cs typeface="Times New Roman"/>
+              </a:rPr>
+              <a:t>class</a:t>
+            </a:r>
+            <a:r>
+              <a:rPr lang="en-US" sz="1600" dirty="0">
+                <a:solidFill>
+                  <a:srgbClr val="000000"/>
+                </a:solidFill>
+                <a:highlight>
+                  <a:srgbClr val="FFFFFF"/>
+                </a:highlight>
+                <a:latin typeface="Consolas"/>
+                <a:ea typeface="Calibri"/>
+                <a:cs typeface="Times New Roman"/>
+              </a:rPr>
+              <a:t> </a:t>
+            </a:r>
+            <a:r>
+              <a:rPr lang="en-US" sz="1600" dirty="0" err="1">
+                <a:solidFill>
+                  <a:srgbClr val="2B91AF"/>
+                </a:solidFill>
+                <a:highlight>
+                  <a:srgbClr val="FFFFFF"/>
+                </a:highlight>
+                <a:latin typeface="Consolas"/>
+                <a:ea typeface="Calibri"/>
+                <a:cs typeface="Times New Roman"/>
+              </a:rPr>
+              <a:t>UserAccountService</a:t>
+            </a:r>
+            <a:r>
+              <a:rPr lang="en-US" sz="1600" dirty="0">
+                <a:solidFill>
+                  <a:srgbClr val="000000"/>
+                </a:solidFill>
+                <a:highlight>
+                  <a:srgbClr val="FFFFFF"/>
+                </a:highlight>
+                <a:latin typeface="Consolas"/>
+                <a:ea typeface="Calibri"/>
+                <a:cs typeface="Times New Roman"/>
+              </a:rPr>
+              <a:t> : </a:t>
+            </a:r>
+            <a:r>
+              <a:rPr lang="en-US" sz="1600" dirty="0" err="1">
+                <a:solidFill>
+                  <a:srgbClr val="2B91AF"/>
+                </a:solidFill>
+                <a:highlight>
+                  <a:srgbClr val="FFFFFF"/>
+                </a:highlight>
+                <a:latin typeface="Consolas"/>
+                <a:ea typeface="Calibri"/>
+                <a:cs typeface="Times New Roman"/>
+              </a:rPr>
+              <a:t>IUserAccountService</a:t>
+            </a:r>
+            <a:endParaRPr lang="en-US" sz="2000" dirty="0">
+              <a:ea typeface="Calibri"/>
+              <a:cs typeface="Times New Roman"/>
+            </a:endParaRPr>
+          </a:p>
+          <a:p>
+            <a:pPr>
+              <a:lnSpc>
+                <a:spcPct val="115000"/>
+              </a:lnSpc>
+              <a:spcAft>
+                <a:spcPts val="0"/>
+              </a:spcAft>
+            </a:pPr>
+            <a:r>
+              <a:rPr lang="en-US" sz="1600" dirty="0">
+                <a:solidFill>
+                  <a:srgbClr val="000000"/>
+                </a:solidFill>
+                <a:highlight>
+                  <a:srgbClr val="FFFFFF"/>
+                </a:highlight>
+                <a:latin typeface="Consolas"/>
+                <a:ea typeface="Calibri"/>
+                <a:cs typeface="Times New Roman"/>
+              </a:rPr>
+              <a:t>    {</a:t>
+            </a:r>
+            <a:endParaRPr lang="en-US" sz="2000" dirty="0">
+              <a:ea typeface="Calibri"/>
+              <a:cs typeface="Times New Roman"/>
+            </a:endParaRPr>
+          </a:p>
+          <a:p>
+            <a:pPr>
+              <a:lnSpc>
+                <a:spcPct val="115000"/>
+              </a:lnSpc>
+              <a:spcAft>
+                <a:spcPts val="0"/>
+              </a:spcAft>
+            </a:pPr>
+            <a:r>
+              <a:rPr lang="en-US" sz="1600" dirty="0">
+                <a:solidFill>
+                  <a:srgbClr val="000000"/>
+                </a:solidFill>
+                <a:highlight>
+                  <a:srgbClr val="FFFFFF"/>
+                </a:highlight>
+                <a:latin typeface="Consolas"/>
+                <a:ea typeface="Calibri"/>
+                <a:cs typeface="Times New Roman"/>
+              </a:rPr>
+              <a:t>        </a:t>
+            </a:r>
+            <a:r>
+              <a:rPr lang="en-US" sz="1600" dirty="0">
+                <a:solidFill>
+                  <a:srgbClr val="0000FF"/>
+                </a:solidFill>
+                <a:highlight>
+                  <a:srgbClr val="FFFFFF"/>
+                </a:highlight>
+                <a:latin typeface="Consolas"/>
+                <a:ea typeface="Calibri"/>
+                <a:cs typeface="Times New Roman"/>
+              </a:rPr>
+              <a:t>private</a:t>
+            </a:r>
+            <a:r>
+              <a:rPr lang="en-US" sz="1600" dirty="0">
+                <a:solidFill>
+                  <a:srgbClr val="000000"/>
+                </a:solidFill>
+                <a:highlight>
+                  <a:srgbClr val="FFFFFF"/>
+                </a:highlight>
+                <a:latin typeface="Consolas"/>
+                <a:ea typeface="Calibri"/>
+                <a:cs typeface="Times New Roman"/>
+              </a:rPr>
+              <a:t> </a:t>
+            </a:r>
+            <a:r>
+              <a:rPr lang="en-US" sz="1600" dirty="0" err="1">
+                <a:solidFill>
+                  <a:srgbClr val="0000FF"/>
+                </a:solidFill>
+                <a:highlight>
+                  <a:srgbClr val="FFFFFF"/>
+                </a:highlight>
+                <a:latin typeface="Consolas"/>
+                <a:ea typeface="Calibri"/>
+                <a:cs typeface="Times New Roman"/>
+              </a:rPr>
+              <a:t>readonly</a:t>
+            </a:r>
+            <a:r>
+              <a:rPr lang="en-US" sz="1600" dirty="0">
+                <a:solidFill>
+                  <a:srgbClr val="000000"/>
+                </a:solidFill>
+                <a:highlight>
+                  <a:srgbClr val="FFFFFF"/>
+                </a:highlight>
+                <a:latin typeface="Consolas"/>
+                <a:ea typeface="Calibri"/>
+                <a:cs typeface="Times New Roman"/>
+              </a:rPr>
+              <a:t> </a:t>
+            </a:r>
+            <a:r>
+              <a:rPr lang="en-US" sz="1600" dirty="0" err="1">
+                <a:solidFill>
+                  <a:srgbClr val="2B91AF"/>
+                </a:solidFill>
+                <a:highlight>
+                  <a:srgbClr val="FFFFFF"/>
+                </a:highlight>
+                <a:latin typeface="Consolas"/>
+                <a:ea typeface="Calibri"/>
+                <a:cs typeface="Times New Roman"/>
+              </a:rPr>
+              <a:t>IAccountRepository</a:t>
+            </a:r>
+            <a:r>
+              <a:rPr lang="en-US" sz="1600" dirty="0">
+                <a:solidFill>
+                  <a:srgbClr val="000000"/>
+                </a:solidFill>
+                <a:highlight>
+                  <a:srgbClr val="FFFFFF"/>
+                </a:highlight>
+                <a:latin typeface="Consolas"/>
+                <a:ea typeface="Calibri"/>
+                <a:cs typeface="Times New Roman"/>
+              </a:rPr>
+              <a:t> _</a:t>
+            </a:r>
+            <a:r>
+              <a:rPr lang="en-US" sz="1600" dirty="0" err="1">
+                <a:solidFill>
+                  <a:srgbClr val="000000"/>
+                </a:solidFill>
+                <a:highlight>
+                  <a:srgbClr val="FFFFFF"/>
+                </a:highlight>
+                <a:latin typeface="Consolas"/>
+                <a:ea typeface="Calibri"/>
+                <a:cs typeface="Times New Roman"/>
+              </a:rPr>
+              <a:t>accountRepository</a:t>
+            </a:r>
+            <a:r>
+              <a:rPr lang="en-US" sz="1600" dirty="0">
+                <a:solidFill>
+                  <a:srgbClr val="000000"/>
+                </a:solidFill>
+                <a:highlight>
+                  <a:srgbClr val="FFFFFF"/>
+                </a:highlight>
+                <a:latin typeface="Consolas"/>
+                <a:ea typeface="Calibri"/>
+                <a:cs typeface="Times New Roman"/>
+              </a:rPr>
+              <a:t>;</a:t>
+            </a:r>
+            <a:endParaRPr lang="en-US" sz="2000" dirty="0">
+              <a:ea typeface="Calibri"/>
+              <a:cs typeface="Times New Roman"/>
+            </a:endParaRPr>
+          </a:p>
+          <a:p>
+            <a:pPr>
+              <a:lnSpc>
+                <a:spcPct val="115000"/>
+              </a:lnSpc>
+              <a:spcAft>
+                <a:spcPts val="0"/>
+              </a:spcAft>
+            </a:pPr>
+            <a:r>
+              <a:rPr lang="en-US" sz="1600" dirty="0">
+                <a:solidFill>
+                  <a:srgbClr val="000000"/>
+                </a:solidFill>
+                <a:highlight>
+                  <a:srgbClr val="FFFFFF"/>
+                </a:highlight>
+                <a:latin typeface="Consolas"/>
+                <a:ea typeface="Calibri"/>
+                <a:cs typeface="Times New Roman"/>
+              </a:rPr>
+              <a:t> </a:t>
+            </a:r>
+            <a:endParaRPr lang="en-US" sz="2000" dirty="0">
+              <a:ea typeface="Calibri"/>
+              <a:cs typeface="Times New Roman"/>
+            </a:endParaRPr>
+          </a:p>
+          <a:p>
+            <a:pPr>
+              <a:lnSpc>
+                <a:spcPct val="115000"/>
+              </a:lnSpc>
+              <a:spcAft>
+                <a:spcPts val="0"/>
+              </a:spcAft>
+            </a:pPr>
+            <a:r>
+              <a:rPr lang="en-US" sz="1600" dirty="0">
+                <a:solidFill>
+                  <a:srgbClr val="000000"/>
+                </a:solidFill>
+                <a:highlight>
+                  <a:srgbClr val="FFFFFF"/>
+                </a:highlight>
+                <a:latin typeface="Consolas"/>
+                <a:ea typeface="Calibri"/>
+                <a:cs typeface="Times New Roman"/>
+              </a:rPr>
+              <a:t>        </a:t>
+            </a:r>
+            <a:r>
+              <a:rPr lang="en-US" sz="1600" dirty="0">
+                <a:solidFill>
+                  <a:srgbClr val="0000FF"/>
+                </a:solidFill>
+                <a:highlight>
+                  <a:srgbClr val="FFFFFF"/>
+                </a:highlight>
+                <a:latin typeface="Consolas"/>
+                <a:ea typeface="Calibri"/>
+                <a:cs typeface="Times New Roman"/>
+              </a:rPr>
+              <a:t>public</a:t>
+            </a:r>
+            <a:r>
+              <a:rPr lang="en-US" sz="1600" dirty="0">
+                <a:solidFill>
+                  <a:srgbClr val="000000"/>
+                </a:solidFill>
+                <a:highlight>
+                  <a:srgbClr val="FFFFFF"/>
+                </a:highlight>
+                <a:latin typeface="Consolas"/>
+                <a:ea typeface="Calibri"/>
+                <a:cs typeface="Times New Roman"/>
+              </a:rPr>
+              <a:t> </a:t>
+            </a:r>
+            <a:r>
+              <a:rPr lang="en-US" sz="1600" dirty="0" err="1">
+                <a:solidFill>
+                  <a:srgbClr val="000000"/>
+                </a:solidFill>
+                <a:highlight>
+                  <a:srgbClr val="FFFFFF"/>
+                </a:highlight>
+                <a:latin typeface="Consolas"/>
+                <a:ea typeface="Calibri"/>
+                <a:cs typeface="Times New Roman"/>
+              </a:rPr>
+              <a:t>UserAccountService</a:t>
+            </a:r>
+            <a:r>
+              <a:rPr lang="en-US" sz="1600" dirty="0">
+                <a:solidFill>
+                  <a:srgbClr val="000000"/>
+                </a:solidFill>
+                <a:highlight>
+                  <a:srgbClr val="FFFFFF"/>
+                </a:highlight>
+                <a:latin typeface="Consolas"/>
+                <a:ea typeface="Calibri"/>
+                <a:cs typeface="Times New Roman"/>
+              </a:rPr>
+              <a:t>(</a:t>
+            </a:r>
+            <a:r>
+              <a:rPr lang="en-US" sz="1600" dirty="0" err="1">
+                <a:solidFill>
+                  <a:srgbClr val="2B91AF"/>
+                </a:solidFill>
+                <a:highlight>
+                  <a:srgbClr val="FFFFFF"/>
+                </a:highlight>
+                <a:latin typeface="Consolas"/>
+                <a:ea typeface="Calibri"/>
+                <a:cs typeface="Times New Roman"/>
+              </a:rPr>
+              <a:t>IAccountRepository</a:t>
+            </a:r>
+            <a:r>
+              <a:rPr lang="en-US" sz="1600" dirty="0">
+                <a:solidFill>
+                  <a:srgbClr val="000000"/>
+                </a:solidFill>
+                <a:highlight>
+                  <a:srgbClr val="FFFFFF"/>
+                </a:highlight>
+                <a:latin typeface="Consolas"/>
+                <a:ea typeface="Calibri"/>
+                <a:cs typeface="Times New Roman"/>
+              </a:rPr>
+              <a:t> </a:t>
+            </a:r>
+            <a:r>
+              <a:rPr lang="en-US" sz="1600" dirty="0" err="1">
+                <a:solidFill>
+                  <a:srgbClr val="000000"/>
+                </a:solidFill>
+                <a:highlight>
+                  <a:srgbClr val="FFFFFF"/>
+                </a:highlight>
+                <a:latin typeface="Consolas"/>
+                <a:ea typeface="Calibri"/>
+                <a:cs typeface="Times New Roman"/>
+              </a:rPr>
+              <a:t>accountRepository</a:t>
+            </a:r>
+            <a:r>
+              <a:rPr lang="en-US" sz="1600" dirty="0">
+                <a:solidFill>
+                  <a:srgbClr val="000000"/>
+                </a:solidFill>
+                <a:highlight>
+                  <a:srgbClr val="FFFFFF"/>
+                </a:highlight>
+                <a:latin typeface="Consolas"/>
+                <a:ea typeface="Calibri"/>
+                <a:cs typeface="Times New Roman"/>
+              </a:rPr>
+              <a:t>)</a:t>
+            </a:r>
+            <a:endParaRPr lang="en-US" sz="2000" dirty="0">
+              <a:ea typeface="Calibri"/>
+              <a:cs typeface="Times New Roman"/>
+            </a:endParaRPr>
+          </a:p>
+          <a:p>
+            <a:pPr>
+              <a:lnSpc>
+                <a:spcPct val="115000"/>
+              </a:lnSpc>
+              <a:spcAft>
+                <a:spcPts val="0"/>
+              </a:spcAft>
+            </a:pPr>
+            <a:r>
+              <a:rPr lang="en-US" sz="1600" dirty="0">
+                <a:solidFill>
+                  <a:srgbClr val="000000"/>
+                </a:solidFill>
+                <a:highlight>
+                  <a:srgbClr val="FFFFFF"/>
+                </a:highlight>
+                <a:latin typeface="Consolas"/>
+                <a:ea typeface="Calibri"/>
+                <a:cs typeface="Times New Roman"/>
+              </a:rPr>
+              <a:t>        {</a:t>
+            </a:r>
+            <a:endParaRPr lang="en-US" sz="2000" dirty="0">
+              <a:ea typeface="Calibri"/>
+              <a:cs typeface="Times New Roman"/>
+            </a:endParaRPr>
+          </a:p>
+          <a:p>
+            <a:pPr>
+              <a:lnSpc>
+                <a:spcPct val="115000"/>
+              </a:lnSpc>
+              <a:spcAft>
+                <a:spcPts val="0"/>
+              </a:spcAft>
+            </a:pPr>
+            <a:r>
+              <a:rPr lang="en-US" sz="1600" dirty="0">
+                <a:solidFill>
+                  <a:srgbClr val="000000"/>
+                </a:solidFill>
+                <a:highlight>
+                  <a:srgbClr val="FFFFFF"/>
+                </a:highlight>
+                <a:latin typeface="Consolas"/>
+                <a:ea typeface="Calibri"/>
+                <a:cs typeface="Times New Roman"/>
+              </a:rPr>
+              <a:t>            </a:t>
+            </a:r>
+            <a:r>
+              <a:rPr lang="en-US" sz="1600" dirty="0">
+                <a:solidFill>
+                  <a:srgbClr val="0000FF"/>
+                </a:solidFill>
+                <a:highlight>
+                  <a:srgbClr val="FFFFFF"/>
+                </a:highlight>
+                <a:latin typeface="Consolas"/>
+                <a:ea typeface="Calibri"/>
+                <a:cs typeface="Times New Roman"/>
+              </a:rPr>
+              <a:t>if</a:t>
+            </a:r>
+            <a:r>
+              <a:rPr lang="en-US" sz="1600" dirty="0">
+                <a:solidFill>
+                  <a:srgbClr val="000000"/>
+                </a:solidFill>
+                <a:highlight>
+                  <a:srgbClr val="FFFFFF"/>
+                </a:highlight>
+                <a:latin typeface="Consolas"/>
+                <a:ea typeface="Calibri"/>
+                <a:cs typeface="Times New Roman"/>
+              </a:rPr>
+              <a:t> (</a:t>
+            </a:r>
+            <a:r>
+              <a:rPr lang="en-US" sz="1600" dirty="0" err="1">
+                <a:solidFill>
+                  <a:srgbClr val="000000"/>
+                </a:solidFill>
+                <a:highlight>
+                  <a:srgbClr val="FFFFFF"/>
+                </a:highlight>
+                <a:latin typeface="Consolas"/>
+                <a:ea typeface="Calibri"/>
+                <a:cs typeface="Times New Roman"/>
+              </a:rPr>
+              <a:t>accountRepository</a:t>
+            </a:r>
+            <a:r>
+              <a:rPr lang="en-US" sz="1600" dirty="0">
+                <a:solidFill>
+                  <a:srgbClr val="000000"/>
+                </a:solidFill>
+                <a:highlight>
+                  <a:srgbClr val="FFFFFF"/>
+                </a:highlight>
+                <a:latin typeface="Consolas"/>
+                <a:ea typeface="Calibri"/>
+                <a:cs typeface="Times New Roman"/>
+              </a:rPr>
+              <a:t> == </a:t>
+            </a:r>
+            <a:r>
+              <a:rPr lang="en-US" sz="1600" dirty="0">
+                <a:solidFill>
+                  <a:srgbClr val="0000FF"/>
+                </a:solidFill>
+                <a:highlight>
+                  <a:srgbClr val="FFFFFF"/>
+                </a:highlight>
+                <a:latin typeface="Consolas"/>
+                <a:ea typeface="Calibri"/>
+                <a:cs typeface="Times New Roman"/>
+              </a:rPr>
+              <a:t>null</a:t>
+            </a:r>
+            <a:r>
+              <a:rPr lang="en-US" sz="1600" dirty="0">
+                <a:solidFill>
+                  <a:srgbClr val="000000"/>
+                </a:solidFill>
+                <a:highlight>
+                  <a:srgbClr val="FFFFFF"/>
+                </a:highlight>
+                <a:latin typeface="Consolas"/>
+                <a:ea typeface="Calibri"/>
+                <a:cs typeface="Times New Roman"/>
+              </a:rPr>
+              <a:t>) </a:t>
+            </a:r>
+            <a:r>
+              <a:rPr lang="en-US" sz="1600" dirty="0">
+                <a:solidFill>
+                  <a:srgbClr val="0000FF"/>
+                </a:solidFill>
+                <a:highlight>
+                  <a:srgbClr val="FFFFFF"/>
+                </a:highlight>
+                <a:latin typeface="Consolas"/>
+                <a:ea typeface="Calibri"/>
+                <a:cs typeface="Times New Roman"/>
+              </a:rPr>
+              <a:t>throw</a:t>
+            </a:r>
+            <a:r>
+              <a:rPr lang="en-US" sz="1600" dirty="0">
+                <a:solidFill>
+                  <a:srgbClr val="000000"/>
+                </a:solidFill>
+                <a:highlight>
+                  <a:srgbClr val="FFFFFF"/>
+                </a:highlight>
+                <a:latin typeface="Consolas"/>
+                <a:ea typeface="Calibri"/>
+                <a:cs typeface="Times New Roman"/>
+              </a:rPr>
+              <a:t> </a:t>
+            </a:r>
+            <a:r>
+              <a:rPr lang="en-US" sz="1600" dirty="0">
+                <a:solidFill>
+                  <a:srgbClr val="0000FF"/>
+                </a:solidFill>
+                <a:highlight>
+                  <a:srgbClr val="FFFFFF"/>
+                </a:highlight>
+                <a:latin typeface="Consolas"/>
+                <a:ea typeface="Calibri"/>
+                <a:cs typeface="Times New Roman"/>
+              </a:rPr>
+              <a:t>new</a:t>
+            </a:r>
+            <a:r>
+              <a:rPr lang="en-US" sz="1600" dirty="0">
+                <a:solidFill>
+                  <a:srgbClr val="000000"/>
+                </a:solidFill>
+                <a:highlight>
+                  <a:srgbClr val="FFFFFF"/>
+                </a:highlight>
+                <a:latin typeface="Consolas"/>
+                <a:ea typeface="Calibri"/>
+                <a:cs typeface="Times New Roman"/>
+              </a:rPr>
+              <a:t> </a:t>
+            </a:r>
+            <a:r>
+              <a:rPr lang="en-US" sz="1600" dirty="0" err="1">
+                <a:solidFill>
+                  <a:srgbClr val="2B91AF"/>
+                </a:solidFill>
+                <a:highlight>
+                  <a:srgbClr val="FFFFFF"/>
+                </a:highlight>
+                <a:latin typeface="Consolas"/>
+                <a:ea typeface="Calibri"/>
+                <a:cs typeface="Times New Roman"/>
+              </a:rPr>
+              <a:t>ArgumentNullException</a:t>
+            </a:r>
+            <a:r>
+              <a:rPr lang="en-US" sz="1600" dirty="0">
+                <a:solidFill>
+                  <a:srgbClr val="000000"/>
+                </a:solidFill>
+                <a:highlight>
+                  <a:srgbClr val="FFFFFF"/>
+                </a:highlight>
+                <a:latin typeface="Consolas"/>
+                <a:ea typeface="Calibri"/>
+                <a:cs typeface="Times New Roman"/>
+              </a:rPr>
+              <a:t>(</a:t>
+            </a:r>
+            <a:r>
+              <a:rPr lang="en-US" sz="1600" dirty="0">
+                <a:solidFill>
+                  <a:srgbClr val="A31515"/>
+                </a:solidFill>
+                <a:highlight>
+                  <a:srgbClr val="FFFFFF"/>
+                </a:highlight>
+                <a:latin typeface="Consolas"/>
+                <a:ea typeface="Calibri"/>
+                <a:cs typeface="Times New Roman"/>
+              </a:rPr>
+              <a:t>"</a:t>
+            </a:r>
+            <a:r>
+              <a:rPr lang="en-US" sz="1600" dirty="0" err="1">
+                <a:solidFill>
+                  <a:srgbClr val="A31515"/>
+                </a:solidFill>
+                <a:highlight>
+                  <a:srgbClr val="FFFFFF"/>
+                </a:highlight>
+                <a:latin typeface="Consolas"/>
+                <a:ea typeface="Calibri"/>
+                <a:cs typeface="Times New Roman"/>
+              </a:rPr>
+              <a:t>accountRepository</a:t>
+            </a:r>
+            <a:r>
+              <a:rPr lang="en-US" sz="1600" dirty="0">
+                <a:solidFill>
+                  <a:srgbClr val="A31515"/>
+                </a:solidFill>
+                <a:highlight>
+                  <a:srgbClr val="FFFFFF"/>
+                </a:highlight>
+                <a:latin typeface="Consolas"/>
+                <a:ea typeface="Calibri"/>
+                <a:cs typeface="Times New Roman"/>
+              </a:rPr>
+              <a:t>"</a:t>
+            </a:r>
+            <a:r>
+              <a:rPr lang="en-US" sz="1600" dirty="0">
+                <a:solidFill>
+                  <a:srgbClr val="000000"/>
+                </a:solidFill>
+                <a:highlight>
+                  <a:srgbClr val="FFFFFF"/>
+                </a:highlight>
+                <a:latin typeface="Consolas"/>
+                <a:ea typeface="Calibri"/>
+                <a:cs typeface="Times New Roman"/>
+              </a:rPr>
+              <a:t>);</a:t>
+            </a:r>
+            <a:endParaRPr lang="en-US" sz="2000" dirty="0">
+              <a:ea typeface="Calibri"/>
+              <a:cs typeface="Times New Roman"/>
+            </a:endParaRPr>
+          </a:p>
+          <a:p>
+            <a:pPr>
+              <a:lnSpc>
+                <a:spcPct val="115000"/>
+              </a:lnSpc>
+              <a:spcAft>
+                <a:spcPts val="0"/>
+              </a:spcAft>
+            </a:pPr>
+            <a:r>
+              <a:rPr lang="en-US" sz="1600" dirty="0">
+                <a:solidFill>
+                  <a:srgbClr val="000000"/>
+                </a:solidFill>
+                <a:highlight>
+                  <a:srgbClr val="FFFFFF"/>
+                </a:highlight>
+                <a:latin typeface="Consolas"/>
+                <a:ea typeface="Calibri"/>
+                <a:cs typeface="Times New Roman"/>
+              </a:rPr>
+              <a:t>            _</a:t>
+            </a:r>
+            <a:r>
+              <a:rPr lang="en-US" sz="1600" dirty="0" err="1">
+                <a:solidFill>
+                  <a:srgbClr val="000000"/>
+                </a:solidFill>
+                <a:highlight>
+                  <a:srgbClr val="FFFFFF"/>
+                </a:highlight>
+                <a:latin typeface="Consolas"/>
+                <a:ea typeface="Calibri"/>
+                <a:cs typeface="Times New Roman"/>
+              </a:rPr>
+              <a:t>accountRepository</a:t>
+            </a:r>
+            <a:r>
+              <a:rPr lang="en-US" sz="1600" dirty="0">
+                <a:solidFill>
+                  <a:srgbClr val="000000"/>
+                </a:solidFill>
+                <a:highlight>
+                  <a:srgbClr val="FFFFFF"/>
+                </a:highlight>
+                <a:latin typeface="Consolas"/>
+                <a:ea typeface="Calibri"/>
+                <a:cs typeface="Times New Roman"/>
+              </a:rPr>
+              <a:t> = </a:t>
+            </a:r>
+            <a:r>
+              <a:rPr lang="en-US" sz="1600" dirty="0" err="1">
+                <a:solidFill>
+                  <a:srgbClr val="000000"/>
+                </a:solidFill>
+                <a:highlight>
+                  <a:srgbClr val="FFFFFF"/>
+                </a:highlight>
+                <a:latin typeface="Consolas"/>
+                <a:ea typeface="Calibri"/>
+                <a:cs typeface="Times New Roman"/>
+              </a:rPr>
+              <a:t>accountRepository</a:t>
+            </a:r>
+            <a:r>
+              <a:rPr lang="en-US" sz="1600" dirty="0">
+                <a:solidFill>
+                  <a:srgbClr val="000000"/>
+                </a:solidFill>
+                <a:highlight>
+                  <a:srgbClr val="FFFFFF"/>
+                </a:highlight>
+                <a:latin typeface="Consolas"/>
+                <a:ea typeface="Calibri"/>
+                <a:cs typeface="Times New Roman"/>
+              </a:rPr>
+              <a:t>;</a:t>
+            </a:r>
+            <a:endParaRPr lang="en-US" sz="2000" dirty="0">
+              <a:ea typeface="Calibri"/>
+              <a:cs typeface="Times New Roman"/>
+            </a:endParaRPr>
+          </a:p>
+          <a:p>
+            <a:pPr>
+              <a:lnSpc>
+                <a:spcPct val="115000"/>
+              </a:lnSpc>
+              <a:spcAft>
+                <a:spcPts val="1000"/>
+              </a:spcAft>
+            </a:pPr>
+            <a:r>
+              <a:rPr lang="en-US" sz="1600" dirty="0">
+                <a:solidFill>
+                  <a:srgbClr val="000000"/>
+                </a:solidFill>
+                <a:highlight>
+                  <a:srgbClr val="FFFFFF"/>
+                </a:highlight>
+                <a:latin typeface="Consolas"/>
+                <a:ea typeface="Calibri"/>
+                <a:cs typeface="Times New Roman"/>
+              </a:rPr>
+              <a:t>        </a:t>
+            </a:r>
+            <a:r>
+              <a:rPr lang="en-US" sz="1600" dirty="0" smtClean="0">
+                <a:solidFill>
+                  <a:srgbClr val="000000"/>
+                </a:solidFill>
+                <a:highlight>
+                  <a:srgbClr val="FFFFFF"/>
+                </a:highlight>
+                <a:latin typeface="Consolas"/>
+                <a:ea typeface="Calibri"/>
+                <a:cs typeface="Times New Roman"/>
+              </a:rPr>
+              <a:t>}</a:t>
+            </a:r>
+          </a:p>
+          <a:p>
+            <a:pPr>
+              <a:lnSpc>
+                <a:spcPct val="115000"/>
+              </a:lnSpc>
+              <a:spcAft>
+                <a:spcPts val="1000"/>
+              </a:spcAft>
+            </a:pPr>
+            <a:r>
+              <a:rPr lang="fr-FR" sz="1600" i="1" dirty="0" err="1" smtClean="0">
+                <a:solidFill>
+                  <a:srgbClr val="000000"/>
+                </a:solidFill>
+                <a:highlight>
+                  <a:srgbClr val="FFFFFF"/>
+                </a:highlight>
+                <a:latin typeface="Consolas"/>
+                <a:ea typeface="Calibri"/>
+                <a:cs typeface="Times New Roman"/>
+              </a:rPr>
+              <a:t>UserAccountService.cs</a:t>
+            </a:r>
+            <a:r>
+              <a:rPr lang="fr-FR" sz="1600" i="1" dirty="0" smtClean="0">
+                <a:solidFill>
+                  <a:srgbClr val="000000"/>
+                </a:solidFill>
+                <a:highlight>
+                  <a:srgbClr val="FFFFFF"/>
+                </a:highlight>
+                <a:latin typeface="Consolas"/>
+                <a:ea typeface="Calibri"/>
+                <a:cs typeface="Times New Roman"/>
+              </a:rPr>
+              <a:t> (Business)</a:t>
+            </a:r>
+            <a:endParaRPr lang="en-US" i="1" dirty="0">
+              <a:ea typeface="Calibri"/>
+              <a:cs typeface="Times New Roman"/>
+            </a:endParaRPr>
+          </a:p>
+        </p:txBody>
+      </p:sp>
+      <p:pic>
+        <p:nvPicPr>
+          <p:cNvPr id="6146" name="Picture 2"/>
+          <p:cNvPicPr>
+            <a:picLocks noChangeAspect="1" noChangeArrowheads="1"/>
+          </p:cNvPicPr>
+          <p:nvPr/>
+        </p:nvPicPr>
+        <p:blipFill>
+          <a:blip r:embed="rId3">
+            <a:extLst>
+              <a:ext uri="{28A0092B-C50C-407E-A947-70E740481C1C}">
+                <a14:useLocalDpi xmlns:a14="http://schemas.microsoft.com/office/drawing/2010/main" val="0"/>
+              </a:ext>
+            </a:extLst>
+          </a:blip>
+          <a:srcRect/>
+          <a:stretch>
+            <a:fillRect/>
+          </a:stretch>
+        </p:blipFill>
+        <p:spPr bwMode="auto">
+          <a:xfrm>
+            <a:off x="0" y="1966913"/>
+            <a:ext cx="9553575" cy="2924175"/>
+          </a:xfrm>
+          <a:prstGeom prst="rect">
+            <a:avLst/>
+          </a:prstGeom>
+          <a:noFill/>
+          <a:ln>
+            <a:noFill/>
+          </a:ln>
+          <a:extLst>
+            <a:ext uri="{909E8E84-426E-40DD-AFC4-6F175D3DCCD1}">
+              <a14:hiddenFill xmlns:a14="http://schemas.microsoft.com/office/drawing/2010/main">
+                <a:solidFill>
+                  <a:schemeClr val="accent1"/>
+                </a:solidFill>
+              </a14:hiddenFill>
+            </a:ext>
+            <a:ext uri="{91240B29-F687-4F45-9708-019B960494DF}">
+              <a14:hiddenLine xmlns:a14="http://schemas.microsoft.com/office/drawing/2010/main" w="9525">
+                <a:solidFill>
+                  <a:schemeClr val="tx1"/>
+                </a:solidFill>
+                <a:miter lim="800000"/>
+                <a:headEnd/>
+                <a:tailEnd/>
+              </a14:hiddenLine>
+            </a:ext>
+          </a:extLst>
+        </p:spPr>
+      </p:pic>
     </p:spTree>
     <p:extLst>
       <p:ext uri="{BB962C8B-B14F-4D97-AF65-F5344CB8AC3E}">
@@ -26199,9 +28204,126 @@
   <p:timing>
     <p:tnLst>
       <p:par>
-        <p:cTn id="1" dur="indefinite" restart="never" nodeType="tmRoot"/>
+        <p:cTn id="1" dur="indefinite" restart="never" nodeType="tmRoot">
+          <p:childTnLst>
+            <p:seq concurrent="1" nextAc="seek">
+              <p:cTn id="2" dur="indefinite" nodeType="mainSeq">
+                <p:childTnLst>
+                  <p:par>
+                    <p:cTn id="3" fill="hold">
+                      <p:stCondLst>
+                        <p:cond delay="indefinite"/>
+                      </p:stCondLst>
+                      <p:childTnLst>
+                        <p:par>
+                          <p:cTn id="4" fill="hold">
+                            <p:stCondLst>
+                              <p:cond delay="0"/>
+                            </p:stCondLst>
+                            <p:childTnLst>
+                              <p:par>
+                                <p:cTn id="5" presetID="1" presetClass="entr" presetSubtype="0" fill="hold" grpId="0" nodeType="clickEffect">
+                                  <p:stCondLst>
+                                    <p:cond delay="0"/>
+                                  </p:stCondLst>
+                                  <p:childTnLst>
+                                    <p:set>
+                                      <p:cBhvr>
+                                        <p:cTn id="6" dur="1" fill="hold">
+                                          <p:stCondLst>
+                                            <p:cond delay="0"/>
+                                          </p:stCondLst>
+                                        </p:cTn>
+                                        <p:tgtEl>
+                                          <p:spTgt spid="7"/>
+                                        </p:tgtEl>
+                                        <p:attrNameLst>
+                                          <p:attrName>style.visibility</p:attrName>
+                                        </p:attrNameLst>
+                                      </p:cBhvr>
+                                      <p:to>
+                                        <p:strVal val="visible"/>
+                                      </p:to>
+                                    </p:set>
+                                  </p:childTnLst>
+                                </p:cTn>
+                              </p:par>
+                            </p:childTnLst>
+                          </p:cTn>
+                        </p:par>
+                      </p:childTnLst>
+                    </p:cTn>
+                  </p:par>
+                  <p:par>
+                    <p:cTn id="7" fill="hold">
+                      <p:stCondLst>
+                        <p:cond delay="indefinite"/>
+                      </p:stCondLst>
+                      <p:childTnLst>
+                        <p:par>
+                          <p:cTn id="8" fill="hold">
+                            <p:stCondLst>
+                              <p:cond delay="0"/>
+                            </p:stCondLst>
+                            <p:childTnLst>
+                              <p:par>
+                                <p:cTn id="9" presetID="1" presetClass="entr" presetSubtype="0" fill="hold" grpId="0" nodeType="clickEffect">
+                                  <p:stCondLst>
+                                    <p:cond delay="0"/>
+                                  </p:stCondLst>
+                                  <p:childTnLst>
+                                    <p:set>
+                                      <p:cBhvr>
+                                        <p:cTn id="10" dur="1" fill="hold">
+                                          <p:stCondLst>
+                                            <p:cond delay="0"/>
+                                          </p:stCondLst>
+                                        </p:cTn>
+                                        <p:tgtEl>
+                                          <p:spTgt spid="8"/>
+                                        </p:tgtEl>
+                                        <p:attrNameLst>
+                                          <p:attrName>style.visibility</p:attrName>
+                                        </p:attrNameLst>
+                                      </p:cBhvr>
+                                      <p:to>
+                                        <p:strVal val="visible"/>
+                                      </p:to>
+                                    </p:set>
+                                  </p:childTnLst>
+                                </p:cTn>
+                              </p:par>
+                            </p:childTnLst>
+                          </p:cTn>
+                        </p:par>
+                      </p:childTnLst>
+                    </p:cTn>
+                  </p:par>
+                </p:childTnLst>
+              </p:cTn>
+              <p:prevCondLst>
+                <p:cond evt="onPrev" delay="0">
+                  <p:tgtEl>
+                    <p:sldTgt/>
+                  </p:tgtEl>
+                </p:cond>
+              </p:prevCondLst>
+              <p:nextCondLst>
+                <p:cond evt="onNext" delay="0">
+                  <p:tgtEl>
+                    <p:sldTgt/>
+                  </p:tgtEl>
+                </p:cond>
+              </p:nextCondLst>
+            </p:seq>
+          </p:childTnLst>
+        </p:cTn>
       </p:par>
     </p:tnLst>
+    <p:bldLst>
+      <p:bldP spid="7" grpId="0" animBg="1"/>
+      <p:bldP spid="8" grpId="0" animBg="1"/>
+    </p:bldLst>
   </p:timing>
 </p:sld>
 </file>
@@ -26239,8 +28361,20 @@
           <a:lstStyle/>
           <a:p>
             <a:r>
-              <a:rPr lang="en-US" dirty="0" smtClean="0"/>
-              <a:t>It’s viral !</a:t>
+              <a:rPr lang="fr-FR" dirty="0" smtClean="0"/>
+              <a:t>pattern : </a:t>
+            </a:r>
+            <a:r>
+              <a:rPr lang="fr-FR" b="1" dirty="0" err="1" smtClean="0"/>
+              <a:t>Constructor</a:t>
+            </a:r>
+            <a:r>
+              <a:rPr lang="fr-FR" b="1" dirty="0" smtClean="0"/>
+              <a:t> Injection</a:t>
+            </a:r>
+            <a:r>
+              <a:rPr lang="fr-FR" dirty="0" smtClean="0"/>
+              <a:t> </a:t>
             </a:r>
             <a:endParaRPr lang="en-US" dirty="0"/>
           </a:p>
@@ -26261,9 +28395,145 @@
           <a:bodyPr/>
           <a:lstStyle/>
           <a:p>
-            <a:r>
-              <a:rPr lang="en-US" dirty="0" smtClean="0"/>
-              <a:t>Composition Root</a:t>
+            <a:pPr marL="0" indent="0">
+              <a:buNone/>
+            </a:pPr>
+            <a:r>
+              <a:rPr lang="fr-FR" b="1" i="1" dirty="0" err="1" smtClean="0"/>
+              <a:t>Declare</a:t>
+            </a:r>
+            <a:r>
+              <a:rPr lang="fr-FR" b="1" i="1" dirty="0" smtClean="0"/>
+              <a:t> </a:t>
+            </a:r>
+            <a:r>
+              <a:rPr lang="fr-FR" b="1" i="1" dirty="0" err="1" smtClean="0"/>
+              <a:t>required</a:t>
+            </a:r>
+            <a:r>
+              <a:rPr lang="fr-FR" b="1" i="1" dirty="0" smtClean="0"/>
+              <a:t> </a:t>
+            </a:r>
+            <a:r>
+              <a:rPr lang="fr-FR" b="1" i="1" dirty="0" err="1" smtClean="0"/>
+              <a:t>dependencies</a:t>
+            </a:r>
+            <a:r>
+              <a:rPr lang="fr-FR" b="1" i="1" dirty="0" smtClean="0"/>
+              <a:t> as </a:t>
+            </a:r>
+            <a:r>
+              <a:rPr lang="fr-FR" b="1" i="1" dirty="0" err="1" smtClean="0"/>
+              <a:t>constructor</a:t>
+            </a:r>
+            <a:r>
+              <a:rPr lang="fr-FR" b="1" i="1" dirty="0" smtClean="0"/>
+              <a:t> </a:t>
+            </a:r>
+            <a:r>
+              <a:rPr lang="fr-FR" b="1" i="1" dirty="0" err="1" smtClean="0"/>
+              <a:t>parameters</a:t>
+            </a:r>
+            <a:endParaRPr lang="fr-FR" b="1" i="1" dirty="0" smtClean="0"/>
+          </a:p>
+          <a:p>
+            <a:r>
+              <a:rPr lang="fr-FR" dirty="0" err="1" smtClean="0"/>
+              <a:t>Declarative</a:t>
+            </a:r>
+            <a:r>
+              <a:rPr lang="fr-FR" dirty="0" smtClean="0"/>
+              <a:t> and </a:t>
+            </a:r>
+            <a:r>
+              <a:rPr lang="fr-FR" dirty="0" err="1" smtClean="0"/>
+              <a:t>discoverable</a:t>
+            </a:r>
+            <a:endParaRPr lang="fr-FR" dirty="0" smtClean="0"/>
+          </a:p>
+          <a:p>
+            <a:r>
+              <a:rPr lang="fr-FR" dirty="0" smtClean="0"/>
+              <a:t>Type-</a:t>
+            </a:r>
+            <a:r>
+              <a:rPr lang="fr-FR" dirty="0" err="1" smtClean="0"/>
+              <a:t>safe</a:t>
+            </a:r>
+            <a:endParaRPr lang="fr-FR" dirty="0" smtClean="0"/>
+          </a:p>
+          <a:p>
+            <a:r>
+              <a:rPr lang="fr-FR" dirty="0" err="1" smtClean="0"/>
+              <a:t>Recommended</a:t>
+            </a:r>
+            <a:r>
+              <a:rPr lang="fr-FR" dirty="0" smtClean="0"/>
+              <a:t> </a:t>
+            </a:r>
+            <a:r>
+              <a:rPr lang="fr-FR" dirty="0" err="1" smtClean="0"/>
+              <a:t>approach</a:t>
+            </a:r>
+            <a:r>
+              <a:rPr lang="fr-FR" dirty="0" smtClean="0"/>
+              <a:t> in 99.9% of cases</a:t>
+            </a:r>
+          </a:p>
+          <a:p>
+            <a:endParaRPr lang="fr-FR" dirty="0"/>
+          </a:p>
+          <a:p>
+            <a:pPr marL="0" indent="0">
+              <a:buNone/>
+            </a:pPr>
+            <a:r>
+              <a:rPr lang="fr-FR" sz="2400" dirty="0" err="1" smtClean="0"/>
+              <a:t>Need</a:t>
+            </a:r>
+            <a:r>
+              <a:rPr lang="fr-FR" sz="2400" dirty="0" smtClean="0"/>
+              <a:t> </a:t>
+            </a:r>
+            <a:r>
+              <a:rPr lang="fr-FR" sz="2400" dirty="0" err="1" smtClean="0"/>
+              <a:t>Guard</a:t>
+            </a:r>
+            <a:r>
+              <a:rPr lang="fr-FR" sz="2400" dirty="0" smtClean="0"/>
+              <a:t> clause </a:t>
+            </a:r>
+            <a:r>
+              <a:rPr lang="fr-FR" sz="2400" dirty="0" err="1" smtClean="0"/>
+              <a:t>because</a:t>
+            </a:r>
+            <a:r>
+              <a:rPr lang="fr-FR" sz="2400" dirty="0" smtClean="0"/>
+              <a:t> C# </a:t>
+            </a:r>
+            <a:r>
+              <a:rPr lang="fr-FR" sz="2400" dirty="0" err="1" smtClean="0"/>
+              <a:t>does</a:t>
+            </a:r>
+            <a:r>
+              <a:rPr lang="fr-FR" sz="2400" dirty="0" smtClean="0"/>
+              <a:t> not support non-</a:t>
+            </a:r>
+            <a:r>
+              <a:rPr lang="fr-FR" sz="2400" dirty="0" err="1" smtClean="0"/>
+              <a:t>nullable</a:t>
+            </a:r>
+            <a:r>
+              <a:rPr lang="fr-FR" sz="2400" dirty="0" smtClean="0"/>
+              <a:t> </a:t>
+            </a:r>
+            <a:r>
+              <a:rPr lang="fr-FR" sz="2400" dirty="0" err="1" smtClean="0"/>
+              <a:t>reference</a:t>
+            </a:r>
+            <a:r>
+              <a:rPr lang="fr-FR" sz="2400" dirty="0" smtClean="0"/>
+              <a:t> types …</a:t>
             </a:r>
             <a:endParaRPr lang="en-US" dirty="0"/>
           </a:p>
@@ -26272,7 +28542,7 @@
     </p:spTree>
     <p:extLst>
       <p:ext uri="{BB962C8B-B14F-4D97-AF65-F5344CB8AC3E}">
-        <p14:creationId xmlns:p14="http://schemas.microsoft.com/office/powerpoint/2010/main" val="1394666143"/>
+        <p14:creationId xmlns:p14="http://schemas.microsoft.com/office/powerpoint/2010/main" val="1596228137"/>
       </p:ext>
     </p:extLst>
   </p:cSld>
@@ -26318,12 +28588,46 @@
         </p:nvSpPr>
         <p:spPr/>
         <p:txBody>
-          <a:bodyPr/>
+          <a:bodyPr>
+            <a:normAutofit fontScale="90000"/>
+          </a:bodyPr>
           <a:lstStyle/>
           <a:p>
             <a:r>
-              <a:rPr lang="en-US" dirty="0" smtClean="0"/>
-              <a:t>Pure DI aka Poor Man’s DI</a:t>
+              <a:rPr lang="fr-FR" dirty="0" smtClean="0"/>
+              <a:t>This </a:t>
+            </a:r>
+            <a:r>
+              <a:rPr lang="fr-FR" dirty="0" err="1" smtClean="0"/>
+              <a:t>is</a:t>
+            </a:r>
+            <a:r>
+              <a:rPr lang="fr-FR" dirty="0" smtClean="0"/>
+              <a:t> </a:t>
+            </a:r>
+            <a:r>
+              <a:rPr lang="fr-FR" dirty="0" err="1" smtClean="0"/>
+              <a:t>great</a:t>
+            </a:r>
+            <a:r>
+              <a:rPr lang="fr-FR" dirty="0" smtClean="0"/>
+              <a:t> and </a:t>
+            </a:r>
+            <a:r>
+              <a:rPr lang="fr-FR" dirty="0" err="1" smtClean="0"/>
+              <a:t>everything</a:t>
+            </a:r>
+            <a:r>
+              <a:rPr lang="fr-FR" dirty="0" smtClean="0"/>
+              <a:t> </a:t>
+            </a:r>
+            <a:r>
+              <a:rPr lang="fr-FR" dirty="0" err="1" smtClean="0"/>
+              <a:t>except</a:t>
+            </a:r>
+            <a:r>
+              <a:rPr lang="fr-FR" dirty="0" smtClean="0"/>
+              <a:t> …</a:t>
             </a:r>
             <a:endParaRPr lang="en-US" dirty="0"/>
           </a:p>
@@ -26351,7 +28655,7 @@
     </p:spTree>
     <p:extLst>
       <p:ext uri="{BB962C8B-B14F-4D97-AF65-F5344CB8AC3E}">
-        <p14:creationId xmlns:p14="http://schemas.microsoft.com/office/powerpoint/2010/main" val="550091921"/>
+        <p14:creationId xmlns:p14="http://schemas.microsoft.com/office/powerpoint/2010/main" val="2030705628"/>
       </p:ext>
     </p:extLst>
   </p:cSld>
@@ -26402,7 +28706,7 @@
           <a:p>
             <a:r>
               <a:rPr lang="en-US" dirty="0" smtClean="0"/>
-              <a:t>Extensibility with DI</a:t>
+              <a:t>It’s viral !</a:t>
             </a:r>
             <a:endParaRPr lang="en-US" dirty="0"/>
           </a:p>
@@ -26424,45 +28728,9 @@
           <a:lstStyle/>
           <a:p>
             <a:r>
-              <a:rPr lang="en-US" dirty="0" err="1" smtClean="0"/>
-              <a:t>Composability</a:t>
-            </a:r>
-            <a:r>
               <a:rPr lang="en-US" dirty="0" smtClean="0"/>
-              <a:t> </a:t>
-            </a:r>
-          </a:p>
-          <a:p>
-            <a:r>
-              <a:rPr lang="en-US" dirty="0" smtClean="0"/>
-              <a:t>Testability</a:t>
-            </a:r>
-          </a:p>
-          <a:p>
-            <a:r>
-              <a:rPr lang="en-US" dirty="0" smtClean="0"/>
-              <a:t>Decorator</a:t>
-            </a:r>
-          </a:p>
-          <a:p>
-            <a:endParaRPr lang="en-US" dirty="0"/>
-          </a:p>
-          <a:p>
-            <a:r>
-              <a:rPr lang="en-US" dirty="0" smtClean="0"/>
-              <a:t>Late binding</a:t>
-            </a:r>
-          </a:p>
-          <a:p>
-            <a:endParaRPr lang="en-US" dirty="0"/>
-          </a:p>
-          <a:p>
-            <a:r>
-              <a:rPr lang="en-US" dirty="0" smtClean="0"/>
-              <a:t>Examples ? </a:t>
-            </a:r>
-          </a:p>
-          <a:p>
+              <a:t>Composition Root</a:t>
+            </a:r>
             <a:endParaRPr lang="en-US" dirty="0"/>
           </a:p>
         </p:txBody>
@@ -26470,7 +28738,7 @@
     </p:spTree>
     <p:extLst>
       <p:ext uri="{BB962C8B-B14F-4D97-AF65-F5344CB8AC3E}">
-        <p14:creationId xmlns:p14="http://schemas.microsoft.com/office/powerpoint/2010/main" val="3162647260"/>
+        <p14:creationId xmlns:p14="http://schemas.microsoft.com/office/powerpoint/2010/main" val="1394666143"/>
       </p:ext>
     </p:extLst>
   </p:cSld>
@@ -26521,7 +28789,7 @@
           <a:p>
             <a:r>
               <a:rPr lang="en-US" dirty="0" smtClean="0"/>
-              <a:t>DI Container</a:t>
+              <a:t>Pure DI aka Poor Man’s DI</a:t>
             </a:r>
             <a:endParaRPr lang="en-US" dirty="0"/>
           </a:p>
@@ -26542,18 +28810,14 @@
           <a:bodyPr/>
           <a:lstStyle/>
           <a:p>
-            <a:r>
-              <a:rPr lang="en-US" dirty="0" smtClean="0"/>
-              <a:t>How it works / what it does</a:t>
-            </a:r>
-            <a:endParaRPr lang="en-US" dirty="0"/>
+            <a:endParaRPr lang="en-US"/>
           </a:p>
         </p:txBody>
       </p:sp>
     </p:spTree>
     <p:extLst>
       <p:ext uri="{BB962C8B-B14F-4D97-AF65-F5344CB8AC3E}">
-        <p14:creationId xmlns:p14="http://schemas.microsoft.com/office/powerpoint/2010/main" val="3753203453"/>
+        <p14:creationId xmlns:p14="http://schemas.microsoft.com/office/powerpoint/2010/main" val="550091921"/>
       </p:ext>
     </p:extLst>
   </p:cSld>
@@ -26599,14 +28863,12 @@
         </p:nvSpPr>
         <p:spPr/>
         <p:txBody>
-          <a:bodyPr>
-            <a:normAutofit fontScale="90000"/>
-          </a:bodyPr>
+          <a:bodyPr/>
           <a:lstStyle/>
           <a:p>
             <a:r>
               <a:rPr lang="en-US" dirty="0" smtClean="0"/>
-              <a:t>Service Locator – DI container misusage</a:t>
+              <a:t>Extensibility with DI</a:t>
             </a:r>
             <a:endParaRPr lang="en-US" dirty="0"/>
           </a:p>
@@ -26627,14 +28889,54 @@
           <a:bodyPr/>
           <a:lstStyle/>
           <a:p>
-            <a:endParaRPr lang="en-US"/>
+            <a:r>
+              <a:rPr lang="en-US" dirty="0" err="1" smtClean="0"/>
+              <a:t>Composability</a:t>
+            </a:r>
+            <a:r>
+              <a:rPr lang="en-US" dirty="0" smtClean="0"/>
+              <a:t> </a:t>
+            </a:r>
+          </a:p>
+          <a:p>
+            <a:r>
+              <a:rPr lang="en-US" dirty="0" smtClean="0"/>
+              <a:t>Testability</a:t>
+            </a:r>
+          </a:p>
+          <a:p>
+            <a:r>
+              <a:rPr lang="en-US" dirty="0" smtClean="0"/>
+              <a:t>Decorator</a:t>
+            </a:r>
+          </a:p>
+          <a:p>
+            <a:endParaRPr lang="en-US" dirty="0"/>
+          </a:p>
+          <a:p>
+            <a:r>
+              <a:rPr lang="en-US" dirty="0" smtClean="0"/>
+              <a:t>Late binding</a:t>
+            </a:r>
+          </a:p>
+          <a:p>
+            <a:endParaRPr lang="en-US" dirty="0"/>
+          </a:p>
+          <a:p>
+            <a:r>
+              <a:rPr lang="en-US" dirty="0" smtClean="0"/>
+              <a:t>Examples ? </a:t>
+            </a:r>
+          </a:p>
+          <a:p>
+            <a:endParaRPr lang="en-US" dirty="0"/>
           </a:p>
         </p:txBody>
       </p:sp>
     </p:spTree>
     <p:extLst>
       <p:ext uri="{BB962C8B-B14F-4D97-AF65-F5344CB8AC3E}">
-        <p14:creationId xmlns:p14="http://schemas.microsoft.com/office/powerpoint/2010/main" val="1148450113"/>
+        <p14:creationId xmlns:p14="http://schemas.microsoft.com/office/powerpoint/2010/main" val="3162647260"/>
       </p:ext>
     </p:extLst>
   </p:cSld>
@@ -26846,7 +29148,7 @@
           <a:p>
             <a:r>
               <a:rPr lang="en-US" dirty="0" smtClean="0"/>
-              <a:t>Composition, but not only</a:t>
+              <a:t>DI Container</a:t>
             </a:r>
             <a:endParaRPr lang="en-US" dirty="0"/>
           </a:p>
@@ -26869,16 +29171,8 @@
           <a:p>
             <a:r>
               <a:rPr lang="en-US" dirty="0" smtClean="0"/>
-              <a:t>Object creation and composition</a:t>
-            </a:r>
-          </a:p>
-          <a:p>
-            <a:r>
-              <a:rPr lang="en-US" dirty="0" smtClean="0"/>
-              <a:t>Other important parts of DI</a:t>
-            </a:r>
-          </a:p>
-          <a:p>
+              <a:t>How it works / what it does</a:t>
+            </a:r>
             <a:endParaRPr lang="en-US" dirty="0"/>
           </a:p>
         </p:txBody>
@@ -26886,7 +29180,7 @@
     </p:spTree>
     <p:extLst>
       <p:ext uri="{BB962C8B-B14F-4D97-AF65-F5344CB8AC3E}">
-        <p14:creationId xmlns:p14="http://schemas.microsoft.com/office/powerpoint/2010/main" val="2294633566"/>
+        <p14:creationId xmlns:p14="http://schemas.microsoft.com/office/powerpoint/2010/main" val="3753203453"/>
       </p:ext>
     </p:extLst>
   </p:cSld>
@@ -26932,16 +29226,14 @@
         </p:nvSpPr>
         <p:spPr/>
         <p:txBody>
-          <a:bodyPr/>
+          <a:bodyPr>
+            <a:normAutofit fontScale="90000"/>
+          </a:bodyPr>
           <a:lstStyle/>
           <a:p>
             <a:r>
-              <a:rPr lang="en-US" dirty="0" err="1" smtClean="0"/>
-              <a:t>LifeTime</a:t>
-            </a:r>
-            <a:r>
               <a:rPr lang="en-US" dirty="0" smtClean="0"/>
-              <a:t> Management</a:t>
+              <a:t>Service Locator – DI container misusage</a:t>
             </a:r>
             <a:endParaRPr lang="en-US" dirty="0"/>
           </a:p>
@@ -26962,14 +29254,14 @@
           <a:bodyPr/>
           <a:lstStyle/>
           <a:p>
-            <a:endParaRPr lang="en-US" dirty="0"/>
+            <a:endParaRPr lang="en-US"/>
           </a:p>
         </p:txBody>
       </p:sp>
     </p:spTree>
     <p:extLst>
       <p:ext uri="{BB962C8B-B14F-4D97-AF65-F5344CB8AC3E}">
-        <p14:creationId xmlns:p14="http://schemas.microsoft.com/office/powerpoint/2010/main" val="3458786066"/>
+        <p14:creationId xmlns:p14="http://schemas.microsoft.com/office/powerpoint/2010/main" val="1148450113"/>
       </p:ext>
     </p:extLst>
   </p:cSld>
@@ -27020,7 +29312,7 @@
           <a:p>
             <a:r>
               <a:rPr lang="en-US" dirty="0" smtClean="0"/>
-              <a:t>Interception</a:t>
+              <a:t>Composition, but not only</a:t>
             </a:r>
             <a:endParaRPr lang="en-US" dirty="0"/>
           </a:p>
@@ -27041,6 +29333,18 @@
           <a:bodyPr/>
           <a:lstStyle/>
           <a:p>
+            <a:r>
+              <a:rPr lang="en-US" dirty="0" smtClean="0"/>
+              <a:t>Object creation and composition</a:t>
+            </a:r>
+          </a:p>
+          <a:p>
+            <a:r>
+              <a:rPr lang="en-US" dirty="0" smtClean="0"/>
+              <a:t>Other important parts of DI</a:t>
+            </a:r>
+          </a:p>
+          <a:p>
             <a:endParaRPr lang="en-US" dirty="0"/>
           </a:p>
         </p:txBody>
@@ -27048,7 +29352,7 @@
     </p:spTree>
     <p:extLst>
       <p:ext uri="{BB962C8B-B14F-4D97-AF65-F5344CB8AC3E}">
-        <p14:creationId xmlns:p14="http://schemas.microsoft.com/office/powerpoint/2010/main" val="4036849652"/>
+        <p14:creationId xmlns:p14="http://schemas.microsoft.com/office/powerpoint/2010/main" val="2294633566"/>
       </p:ext>
     </p:extLst>
   </p:cSld>
@@ -27094,14 +29398,16 @@
         </p:nvSpPr>
         <p:spPr/>
         <p:txBody>
-          <a:bodyPr>
-            <a:normAutofit/>
-          </a:bodyPr>
+          <a:bodyPr/>
           <a:lstStyle/>
           <a:p>
             <a:r>
+              <a:rPr lang="en-US" dirty="0" err="1" smtClean="0"/>
+              <a:t>LifeTime</a:t>
+            </a:r>
+            <a:r>
               <a:rPr lang="en-US" dirty="0" smtClean="0"/>
-              <a:t>Conclusion</a:t>
+              <a:t> Management</a:t>
             </a:r>
             <a:endParaRPr lang="en-US" dirty="0"/>
           </a:p>
@@ -27122,14 +29428,14 @@
           <a:bodyPr/>
           <a:lstStyle/>
           <a:p>
-            <a:endParaRPr lang="en-US"/>
+            <a:endParaRPr lang="en-US" dirty="0"/>
           </a:p>
         </p:txBody>
       </p:sp>
     </p:spTree>
     <p:extLst>
       <p:ext uri="{BB962C8B-B14F-4D97-AF65-F5344CB8AC3E}">
-        <p14:creationId xmlns:p14="http://schemas.microsoft.com/office/powerpoint/2010/main" val="308607750"/>
+        <p14:creationId xmlns:p14="http://schemas.microsoft.com/office/powerpoint/2010/main" val="3458786066"/>
       </p:ext>
     </p:extLst>
   </p:cSld>
@@ -27180,6 +29486,166 @@
           <a:p>
             <a:r>
               <a:rPr lang="en-US" dirty="0" smtClean="0"/>
+              <a:t>Interception</a:t>
+            </a:r>
+            <a:endParaRPr lang="en-US" dirty="0"/>
+          </a:p>
+        </p:txBody>
+      </p:sp>
+      <p:sp>
+        <p:nvSpPr>
+          <p:cNvPr id="3" name="Content Placeholder 2"/>
+          <p:cNvSpPr>
+            <a:spLocks noGrp="1"/>
+          </p:cNvSpPr>
+          <p:nvPr>
+            <p:ph idx="1"/>
+          </p:nvPr>
+        </p:nvSpPr>
+        <p:spPr/>
+        <p:txBody>
+          <a:bodyPr/>
+          <a:lstStyle/>
+          <a:p>
+            <a:endParaRPr lang="en-US" dirty="0"/>
+          </a:p>
+        </p:txBody>
+      </p:sp>
+    </p:spTree>
+    <p:extLst>
+      <p:ext uri="{BB962C8B-B14F-4D97-AF65-F5344CB8AC3E}">
+        <p14:creationId xmlns:p14="http://schemas.microsoft.com/office/powerpoint/2010/main" val="4036849652"/>
+      </p:ext>
+    </p:extLst>
+  </p:cSld>
+  <p:clrMapOvr>
+    <a:masterClrMapping/>
+  </p:clrMapOvr>
+  <p:timing>
+    <p:tnLst>
+      <p:par>
+        <p:cTn id="1" dur="indefinite" restart="never" nodeType="tmRoot"/>
+      </p:par>
+    </p:tnLst>
+  </p:timing>
+</p:sld>
+</file>
+
+<file path=ppt/slides/slide35.xml><?xml version="1.0" encoding="utf-8"?>
+<p:sld xmlns:a="http://schemas.openxmlformats.org/drawingml/2006/main" xmlns:r="http://schemas.openxmlformats.org/officeDocument/2006/relationships" xmlns:p="http://schemas.openxmlformats.org/presentationml/2006/main">
+  <p:cSld>
+    <p:spTree>
+      <p:nvGrpSpPr>
+        <p:cNvPr id="1" name=""/>
+        <p:cNvGrpSpPr/>
+        <p:nvPr/>
+      </p:nvGrpSpPr>
+      <p:grpSpPr>
+        <a:xfrm>
+          <a:off x="0" y="0"/>
+          <a:ext cx="0" cy="0"/>
+          <a:chOff x="0" y="0"/>
+          <a:chExt cx="0" cy="0"/>
+        </a:xfrm>
+      </p:grpSpPr>
+      <p:sp>
+        <p:nvSpPr>
+          <p:cNvPr id="2" name="Title 1"/>
+          <p:cNvSpPr>
+            <a:spLocks noGrp="1"/>
+          </p:cNvSpPr>
+          <p:nvPr>
+            <p:ph type="title"/>
+          </p:nvPr>
+        </p:nvSpPr>
+        <p:spPr/>
+        <p:txBody>
+          <a:bodyPr>
+            <a:normAutofit/>
+          </a:bodyPr>
+          <a:lstStyle/>
+          <a:p>
+            <a:r>
+              <a:rPr lang="en-US" dirty="0" smtClean="0"/>
+              <a:t>Conclusion</a:t>
+            </a:r>
+            <a:endParaRPr lang="en-US" dirty="0"/>
+          </a:p>
+        </p:txBody>
+      </p:sp>
+      <p:sp>
+        <p:nvSpPr>
+          <p:cNvPr id="3" name="Content Placeholder 2"/>
+          <p:cNvSpPr>
+            <a:spLocks noGrp="1"/>
+          </p:cNvSpPr>
+          <p:nvPr>
+            <p:ph idx="1"/>
+          </p:nvPr>
+        </p:nvSpPr>
+        <p:spPr/>
+        <p:txBody>
+          <a:bodyPr/>
+          <a:lstStyle/>
+          <a:p>
+            <a:endParaRPr lang="en-US"/>
+          </a:p>
+        </p:txBody>
+      </p:sp>
+    </p:spTree>
+    <p:extLst>
+      <p:ext uri="{BB962C8B-B14F-4D97-AF65-F5344CB8AC3E}">
+        <p14:creationId xmlns:p14="http://schemas.microsoft.com/office/powerpoint/2010/main" val="308607750"/>
+      </p:ext>
+    </p:extLst>
+  </p:cSld>
+  <p:clrMapOvr>
+    <a:masterClrMapping/>
+  </p:clrMapOvr>
+  <p:timing>
+    <p:tnLst>
+      <p:par>
+        <p:cTn id="1" dur="indefinite" restart="never" nodeType="tmRoot"/>
+      </p:par>
+    </p:tnLst>
+  </p:timing>
+</p:sld>
+</file>
+
+<file path=ppt/slides/slide36.xml><?xml version="1.0" encoding="utf-8"?>
+<p:sld xmlns:a="http://schemas.openxmlformats.org/drawingml/2006/main" xmlns:r="http://schemas.openxmlformats.org/officeDocument/2006/relationships" xmlns:p="http://schemas.openxmlformats.org/presentationml/2006/main">
+  <p:cSld>
+    <p:spTree>
+      <p:nvGrpSpPr>
+        <p:cNvPr id="1" name=""/>
+        <p:cNvGrpSpPr/>
+        <p:nvPr/>
+      </p:nvGrpSpPr>
+      <p:grpSpPr>
+        <a:xfrm>
+          <a:off x="0" y="0"/>
+          <a:ext cx="0" cy="0"/>
+          <a:chOff x="0" y="0"/>
+          <a:chExt cx="0" cy="0"/>
+        </a:xfrm>
+      </p:grpSpPr>
+      <p:sp>
+        <p:nvSpPr>
+          <p:cNvPr id="2" name="Title 1"/>
+          <p:cNvSpPr>
+            <a:spLocks noGrp="1"/>
+          </p:cNvSpPr>
+          <p:nvPr>
+            <p:ph type="title"/>
+          </p:nvPr>
+        </p:nvSpPr>
+        <p:spPr/>
+        <p:txBody>
+          <a:bodyPr/>
+          <a:lstStyle/>
+          <a:p>
+            <a:r>
+              <a:rPr lang="en-US" dirty="0" smtClean="0"/>
               <a:t>Remember</a:t>
             </a:r>
             <a:endParaRPr lang="en-US" dirty="0"/>
@@ -27225,7 +29691,7 @@
 </p:sld>
 </file>
 
-<file path=ppt/slides/slide35.xml><?xml version="1.0" encoding="utf-8"?>
+<file path=ppt/slides/slide37.xml><?xml version="1.0" encoding="utf-8"?>
 <p:sld xmlns:a="http://schemas.openxmlformats.org/drawingml/2006/main" xmlns:r="http://schemas.openxmlformats.org/officeDocument/2006/relationships" xmlns:p="http://schemas.openxmlformats.org/presentationml/2006/main">
   <p:cSld>
     <p:spTree>

</xml_diff>

<commit_message>
Composition Root in the slides
</commit_message>
<xml_diff>
--- a/Dependency Injection - the right way.pptx
+++ b/Dependency Injection - the right way.pptx
@@ -5,7 +5,7 @@
     <p:sldMasterId id="2147483648" r:id="rId1"/>
   </p:sldMasterIdLst>
   <p:notesMasterIdLst>
-    <p:notesMasterId r:id="rId39"/>
+    <p:notesMasterId r:id="rId41"/>
   </p:notesMasterIdLst>
   <p:sldIdLst>
     <p:sldId id="258" r:id="rId2"/>
@@ -34,17 +34,19 @@
     <p:sldId id="269" r:id="rId25"/>
     <p:sldId id="292" r:id="rId26"/>
     <p:sldId id="293" r:id="rId27"/>
-    <p:sldId id="270" r:id="rId28"/>
-    <p:sldId id="271" r:id="rId29"/>
-    <p:sldId id="272" r:id="rId30"/>
-    <p:sldId id="273" r:id="rId31"/>
-    <p:sldId id="274" r:id="rId32"/>
-    <p:sldId id="275" r:id="rId33"/>
-    <p:sldId id="276" r:id="rId34"/>
-    <p:sldId id="277" r:id="rId35"/>
-    <p:sldId id="278" r:id="rId36"/>
-    <p:sldId id="279" r:id="rId37"/>
-    <p:sldId id="259" r:id="rId38"/>
+    <p:sldId id="294" r:id="rId28"/>
+    <p:sldId id="295" r:id="rId29"/>
+    <p:sldId id="296" r:id="rId30"/>
+    <p:sldId id="271" r:id="rId31"/>
+    <p:sldId id="272" r:id="rId32"/>
+    <p:sldId id="273" r:id="rId33"/>
+    <p:sldId id="274" r:id="rId34"/>
+    <p:sldId id="275" r:id="rId35"/>
+    <p:sldId id="276" r:id="rId36"/>
+    <p:sldId id="277" r:id="rId37"/>
+    <p:sldId id="278" r:id="rId38"/>
+    <p:sldId id="279" r:id="rId39"/>
+    <p:sldId id="259" r:id="rId40"/>
   </p:sldIdLst>
   <p:sldSz cx="9144000" cy="6858000" type="screen4x3"/>
   <p:notesSz cx="6858000" cy="9144000"/>
@@ -178,7 +180,9 @@
             <p14:sldId id="269"/>
             <p14:sldId id="292"/>
             <p14:sldId id="293"/>
-            <p14:sldId id="270"/>
+            <p14:sldId id="294"/>
+            <p14:sldId id="295"/>
+            <p14:sldId id="296"/>
             <p14:sldId id="271"/>
             <p14:sldId id="272"/>
             <p14:sldId id="273"/>
@@ -905,6 +909,134 @@
     <p:extLst>
       <p:ext uri="{BB962C8B-B14F-4D97-AF65-F5344CB8AC3E}">
         <p14:creationId xmlns:p14="http://schemas.microsoft.com/office/powerpoint/2010/main" val="1926364492"/>
+      </p:ext>
+    </p:extLst>
+  </p:cSld>
+  <p:clrMapOvr>
+    <a:masterClrMapping/>
+  </p:clrMapOvr>
+</p:notes>
+</file>
+
+<file path=ppt/notesSlides/notesSlide12.xml><?xml version="1.0" encoding="utf-8"?>
+<p:notes xmlns:a="http://schemas.openxmlformats.org/drawingml/2006/main" xmlns:r="http://schemas.openxmlformats.org/officeDocument/2006/relationships" xmlns:p="http://schemas.openxmlformats.org/presentationml/2006/main">
+  <p:cSld>
+    <p:spTree>
+      <p:nvGrpSpPr>
+        <p:cNvPr id="1" name=""/>
+        <p:cNvGrpSpPr/>
+        <p:nvPr/>
+      </p:nvGrpSpPr>
+      <p:grpSpPr>
+        <a:xfrm>
+          <a:off x="0" y="0"/>
+          <a:ext cx="0" cy="0"/>
+          <a:chOff x="0" y="0"/>
+          <a:chExt cx="0" cy="0"/>
+        </a:xfrm>
+      </p:grpSpPr>
+      <p:sp>
+        <p:nvSpPr>
+          <p:cNvPr id="2" name="Slide Image Placeholder 1"/>
+          <p:cNvSpPr>
+            <a:spLocks noGrp="1" noRot="1" noChangeAspect="1"/>
+          </p:cNvSpPr>
+          <p:nvPr>
+            <p:ph type="sldImg"/>
+          </p:nvPr>
+        </p:nvSpPr>
+        <p:spPr/>
+      </p:sp>
+      <p:sp>
+        <p:nvSpPr>
+          <p:cNvPr id="3" name="Notes Placeholder 2"/>
+          <p:cNvSpPr>
+            <a:spLocks noGrp="1"/>
+          </p:cNvSpPr>
+          <p:nvPr>
+            <p:ph type="body" idx="1"/>
+          </p:nvPr>
+        </p:nvSpPr>
+        <p:spPr/>
+        <p:txBody>
+          <a:bodyPr/>
+          <a:lstStyle/>
+          <a:p>
+            <a:r>
+              <a:rPr lang="fr-FR" dirty="0" smtClean="0"/>
+              <a:t>If </a:t>
+            </a:r>
+            <a:r>
+              <a:rPr lang="fr-FR" dirty="0" err="1" smtClean="0"/>
+              <a:t>you</a:t>
+            </a:r>
+            <a:r>
+              <a:rPr lang="fr-FR" dirty="0" smtClean="0"/>
+              <a:t> </a:t>
+            </a:r>
+            <a:r>
+              <a:rPr lang="fr-FR" dirty="0" err="1" smtClean="0"/>
+              <a:t>remember</a:t>
+            </a:r>
+            <a:r>
+              <a:rPr lang="fr-FR" dirty="0" smtClean="0"/>
+              <a:t> one </a:t>
+            </a:r>
+            <a:r>
+              <a:rPr lang="fr-FR" dirty="0" err="1" smtClean="0"/>
+              <a:t>thing</a:t>
+            </a:r>
+            <a:r>
+              <a:rPr lang="fr-FR" dirty="0" smtClean="0"/>
+              <a:t>, </a:t>
+            </a:r>
+            <a:r>
+              <a:rPr lang="fr-FR" dirty="0" err="1" smtClean="0"/>
+              <a:t>it’s</a:t>
+            </a:r>
+            <a:r>
+              <a:rPr lang="fr-FR" dirty="0" smtClean="0"/>
+              <a:t> </a:t>
+            </a:r>
+            <a:r>
+              <a:rPr lang="fr-FR" dirty="0" err="1" smtClean="0"/>
+              <a:t>that</a:t>
+            </a:r>
+            <a:r>
+              <a:rPr lang="fr-FR" dirty="0" smtClean="0"/>
+              <a:t> !</a:t>
+            </a:r>
+            <a:endParaRPr lang="en-US" dirty="0"/>
+          </a:p>
+        </p:txBody>
+      </p:sp>
+      <p:sp>
+        <p:nvSpPr>
+          <p:cNvPr id="4" name="Slide Number Placeholder 3"/>
+          <p:cNvSpPr>
+            <a:spLocks noGrp="1"/>
+          </p:cNvSpPr>
+          <p:nvPr>
+            <p:ph type="sldNum" sz="quarter" idx="10"/>
+          </p:nvPr>
+        </p:nvSpPr>
+        <p:spPr/>
+        <p:txBody>
+          <a:bodyPr/>
+          <a:lstStyle/>
+          <a:p>
+            <a:fld id="{33F0961A-48D7-4871-86EB-F9831811C96F}" type="slidenum">
+              <a:rPr lang="en-US" smtClean="0"/>
+              <a:t>25</a:t>
+            </a:fld>
+            <a:endParaRPr lang="en-US"/>
+          </a:p>
+        </p:txBody>
+      </p:sp>
+    </p:spTree>
+    <p:extLst>
+      <p:ext uri="{BB962C8B-B14F-4D97-AF65-F5344CB8AC3E}">
+        <p14:creationId xmlns:p14="http://schemas.microsoft.com/office/powerpoint/2010/main" val="2061991369"/>
       </p:ext>
     </p:extLst>
   </p:cSld>
@@ -21598,9 +21730,47 @@
         <p:spPr/>
         <p:txBody>
           <a:bodyPr>
-            <a:normAutofit fontScale="92500" lnSpcReduction="20000"/>
+            <a:normAutofit fontScale="85000" lnSpcReduction="10000"/>
           </a:bodyPr>
           <a:lstStyle/>
+          <a:p>
+            <a:pPr marL="0" indent="0" algn="ctr">
+              <a:buNone/>
+            </a:pPr>
+            <a:r>
+              <a:rPr lang="fr-FR" sz="3300" i="1" dirty="0" smtClean="0"/>
+              <a:t>Expose </a:t>
+            </a:r>
+            <a:r>
+              <a:rPr lang="fr-FR" sz="3300" i="1" dirty="0" err="1" smtClean="0"/>
+              <a:t>settable</a:t>
+            </a:r>
+            <a:r>
+              <a:rPr lang="fr-FR" sz="3300" i="1" dirty="0" smtClean="0"/>
+              <a:t> </a:t>
+            </a:r>
+            <a:r>
+              <a:rPr lang="fr-FR" sz="3300" i="1" dirty="0" err="1" smtClean="0"/>
+              <a:t>properties</a:t>
+            </a:r>
+            <a:r>
+              <a:rPr lang="fr-FR" sz="3300" i="1" dirty="0" smtClean="0"/>
+              <a:t> to </a:t>
+            </a:r>
+            <a:r>
+              <a:rPr lang="fr-FR" sz="3300" i="1" dirty="0" err="1" smtClean="0"/>
+              <a:t>modify</a:t>
+            </a:r>
+            <a:r>
+              <a:rPr lang="fr-FR" sz="3300" i="1" dirty="0" smtClean="0"/>
+              <a:t> </a:t>
+            </a:r>
+            <a:r>
+              <a:rPr lang="fr-FR" sz="3300" i="1" dirty="0" err="1" smtClean="0"/>
+              <a:t>dependencies</a:t>
+            </a:r>
+            <a:endParaRPr lang="en-US" i="1" dirty="0" smtClean="0"/>
+          </a:p>
           <a:p>
             <a:pPr marL="0" indent="0">
               <a:buNone/>
@@ -28392,64 +28562,84 @@
         </p:nvSpPr>
         <p:spPr/>
         <p:txBody>
-          <a:bodyPr/>
+          <a:bodyPr>
+            <a:normAutofit lnSpcReduction="10000"/>
+          </a:bodyPr>
           <a:lstStyle/>
           <a:p>
-            <a:pPr marL="0" indent="0">
+            <a:pPr marL="0" indent="0" algn="ctr">
               <a:buNone/>
             </a:pPr>
             <a:r>
-              <a:rPr lang="fr-FR" b="1" i="1" dirty="0" err="1" smtClean="0"/>
+              <a:rPr lang="fr-FR" i="1" dirty="0" err="1" smtClean="0"/>
               <a:t>Declare</a:t>
             </a:r>
             <a:r>
-              <a:rPr lang="fr-FR" b="1" i="1" dirty="0" smtClean="0"/>
+              <a:rPr lang="fr-FR" i="1" dirty="0" smtClean="0"/>
               <a:t> </a:t>
             </a:r>
             <a:r>
-              <a:rPr lang="fr-FR" b="1" i="1" dirty="0" err="1" smtClean="0"/>
+              <a:rPr lang="fr-FR" i="1" dirty="0" err="1" smtClean="0"/>
               <a:t>required</a:t>
             </a:r>
             <a:r>
-              <a:rPr lang="fr-FR" b="1" i="1" dirty="0" smtClean="0"/>
+              <a:rPr lang="fr-FR" i="1" dirty="0" smtClean="0"/>
               <a:t> </a:t>
             </a:r>
             <a:r>
-              <a:rPr lang="fr-FR" b="1" i="1" dirty="0" err="1" smtClean="0"/>
+              <a:rPr lang="fr-FR" i="1" dirty="0" err="1" smtClean="0"/>
               <a:t>dependencies</a:t>
             </a:r>
             <a:r>
-              <a:rPr lang="fr-FR" b="1" i="1" dirty="0" smtClean="0"/>
+              <a:rPr lang="fr-FR" i="1" dirty="0" smtClean="0"/>
               <a:t> as </a:t>
             </a:r>
             <a:r>
-              <a:rPr lang="fr-FR" b="1" i="1" dirty="0" err="1" smtClean="0"/>
+              <a:rPr lang="fr-FR" i="1" dirty="0" err="1" smtClean="0"/>
               <a:t>constructor</a:t>
             </a:r>
             <a:r>
-              <a:rPr lang="fr-FR" b="1" i="1" dirty="0" smtClean="0"/>
+              <a:rPr lang="fr-FR" i="1" dirty="0" smtClean="0"/>
               <a:t> </a:t>
             </a:r>
             <a:r>
-              <a:rPr lang="fr-FR" b="1" i="1" dirty="0" err="1" smtClean="0"/>
+              <a:rPr lang="fr-FR" i="1" dirty="0" err="1" smtClean="0"/>
               <a:t>parameters</a:t>
             </a:r>
-            <a:endParaRPr lang="fr-FR" b="1" i="1" dirty="0" smtClean="0"/>
+            <a:endParaRPr lang="fr-FR" i="1" dirty="0" smtClean="0"/>
           </a:p>
           <a:p>
             <a:r>
               <a:rPr lang="fr-FR" dirty="0" err="1" smtClean="0"/>
               <a:t>Declarative</a:t>
             </a:r>
+            <a:endParaRPr lang="fr-FR" dirty="0"/>
+          </a:p>
+          <a:p>
+            <a:r>
+              <a:rPr lang="fr-FR" dirty="0" err="1" smtClean="0"/>
+              <a:t>Discoverable</a:t>
+            </a:r>
             <a:r>
               <a:rPr lang="fr-FR" dirty="0" smtClean="0"/>
-              <a:t> and </a:t>
+              <a:t> (</a:t>
             </a:r>
             <a:r>
               <a:rPr lang="fr-FR" dirty="0" err="1" smtClean="0"/>
-              <a:t>discoverable</a:t>
-            </a:r>
-            <a:endParaRPr lang="fr-FR" dirty="0" smtClean="0"/>
+              <a:t>intellisense</a:t>
+            </a:r>
+            <a:r>
+              <a:rPr lang="fr-FR" dirty="0" smtClean="0"/>
+              <a:t>, </a:t>
+            </a:r>
+            <a:r>
+              <a:rPr lang="fr-FR" dirty="0" err="1" smtClean="0"/>
+              <a:t>Reflection</a:t>
+            </a:r>
+            <a:r>
+              <a:rPr lang="fr-FR" dirty="0" smtClean="0"/>
+              <a:t> …)</a:t>
+            </a:r>
           </a:p>
           <a:p>
             <a:r>
@@ -28652,6 +28842,643 @@
           </a:p>
         </p:txBody>
       </p:sp>
+      <p:pic>
+        <p:nvPicPr>
+          <p:cNvPr id="7170" name="Picture 2"/>
+          <p:cNvPicPr>
+            <a:picLocks noChangeAspect="1" noChangeArrowheads="1"/>
+          </p:cNvPicPr>
+          <p:nvPr/>
+        </p:nvPicPr>
+        <p:blipFill>
+          <a:blip r:embed="rId2">
+            <a:extLst>
+              <a:ext uri="{28A0092B-C50C-407E-A947-70E740481C1C}">
+                <a14:useLocalDpi xmlns:a14="http://schemas.microsoft.com/office/drawing/2010/main" val="0"/>
+              </a:ext>
+            </a:extLst>
+          </a:blip>
+          <a:srcRect/>
+          <a:stretch>
+            <a:fillRect/>
+          </a:stretch>
+        </p:blipFill>
+        <p:spPr bwMode="auto">
+          <a:xfrm>
+            <a:off x="35496" y="44624"/>
+            <a:ext cx="10964863" cy="7078663"/>
+          </a:xfrm>
+          <a:prstGeom prst="rect">
+            <a:avLst/>
+          </a:prstGeom>
+          <a:noFill/>
+          <a:ln>
+            <a:noFill/>
+          </a:ln>
+          <a:effectLst/>
+          <a:extLst>
+            <a:ext uri="{909E8E84-426E-40DD-AFC4-6F175D3DCCD1}">
+              <a14:hiddenFill xmlns:a14="http://schemas.microsoft.com/office/drawing/2010/main">
+                <a:solidFill>
+                  <a:schemeClr val="accent1"/>
+                </a:solidFill>
+              </a14:hiddenFill>
+            </a:ext>
+            <a:ext uri="{91240B29-F687-4F45-9708-019B960494DF}">
+              <a14:hiddenLine xmlns:a14="http://schemas.microsoft.com/office/drawing/2010/main" w="9525">
+                <a:solidFill>
+                  <a:schemeClr val="tx1"/>
+                </a:solidFill>
+                <a:miter lim="800000"/>
+                <a:headEnd/>
+                <a:tailEnd/>
+              </a14:hiddenLine>
+            </a:ext>
+            <a:ext uri="{AF507438-7753-43E0-B8FC-AC1667EBCBE1}">
+              <a14:hiddenEffects xmlns:a14="http://schemas.microsoft.com/office/drawing/2010/main">
+                <a:effectLst>
+                  <a:outerShdw dist="35921" dir="2700000" algn="ctr" rotWithShape="0">
+                    <a:schemeClr val="bg2"/>
+                  </a:outerShdw>
+                </a:effectLst>
+              </a14:hiddenEffects>
+            </a:ext>
+          </a:extLst>
+        </p:spPr>
+      </p:pic>
+      <p:sp>
+        <p:nvSpPr>
+          <p:cNvPr id="4" name="TextBox 3"/>
+          <p:cNvSpPr txBox="1"/>
+          <p:nvPr/>
+        </p:nvSpPr>
+        <p:spPr>
+          <a:xfrm>
+            <a:off x="35496" y="4365104"/>
+            <a:ext cx="14185576" cy="1273169"/>
+          </a:xfrm>
+          <a:prstGeom prst="rect">
+            <a:avLst/>
+          </a:prstGeom>
+          <a:solidFill>
+            <a:srgbClr val="FFFF66"/>
+          </a:solidFill>
+          <a:ln>
+            <a:solidFill>
+              <a:schemeClr val="accent1">
+                <a:shade val="50000"/>
+              </a:schemeClr>
+            </a:solidFill>
+          </a:ln>
+        </p:spPr>
+        <p:txBody>
+          <a:bodyPr wrap="square" rtlCol="0">
+            <a:spAutoFit/>
+          </a:bodyPr>
+          <a:lstStyle/>
+          <a:p>
+            <a:pPr>
+              <a:lnSpc>
+                <a:spcPts val="1400"/>
+              </a:lnSpc>
+              <a:spcAft>
+                <a:spcPts val="0"/>
+              </a:spcAft>
+              <a:tabLst>
+                <a:tab pos="581660" algn="l"/>
+                <a:tab pos="1163320" algn="l"/>
+                <a:tab pos="1744980" algn="l"/>
+                <a:tab pos="2326640" algn="l"/>
+                <a:tab pos="2908300" algn="l"/>
+                <a:tab pos="3489960" algn="l"/>
+                <a:tab pos="4071620" algn="l"/>
+                <a:tab pos="4653280" algn="l"/>
+                <a:tab pos="5234940" algn="l"/>
+                <a:tab pos="5816600" algn="l"/>
+                <a:tab pos="6398260" algn="l"/>
+                <a:tab pos="6979920" algn="l"/>
+                <a:tab pos="7561580" algn="l"/>
+                <a:tab pos="8143240" algn="l"/>
+                <a:tab pos="8724900" algn="l"/>
+                <a:tab pos="9306560" algn="l"/>
+              </a:tabLst>
+            </a:pPr>
+            <a:r>
+              <a:rPr lang="en-US" sz="1600" dirty="0">
+                <a:solidFill>
+                  <a:srgbClr val="000000"/>
+                </a:solidFill>
+                <a:latin typeface="Consolas"/>
+                <a:ea typeface="Times New Roman"/>
+                <a:cs typeface="Times New Roman"/>
+              </a:rPr>
+              <a:t>[</a:t>
+            </a:r>
+            <a:r>
+              <a:rPr lang="en-US" sz="1600" dirty="0" err="1">
+                <a:solidFill>
+                  <a:srgbClr val="000000"/>
+                </a:solidFill>
+                <a:latin typeface="Consolas"/>
+                <a:ea typeface="Times New Roman"/>
+                <a:cs typeface="Times New Roman"/>
+              </a:rPr>
+              <a:t>InvalidOperationException</a:t>
+            </a:r>
+            <a:r>
+              <a:rPr lang="en-US" sz="1600" dirty="0">
+                <a:solidFill>
+                  <a:srgbClr val="000000"/>
+                </a:solidFill>
+                <a:latin typeface="Consolas"/>
+                <a:ea typeface="Times New Roman"/>
+                <a:cs typeface="Times New Roman"/>
+              </a:rPr>
+              <a:t>: </a:t>
+            </a:r>
+            <a:r>
+              <a:rPr lang="en-US" sz="1600" b="1" dirty="0">
+                <a:solidFill>
+                  <a:srgbClr val="000000"/>
+                </a:solidFill>
+                <a:latin typeface="Consolas"/>
+                <a:ea typeface="Times New Roman"/>
+                <a:cs typeface="Times New Roman"/>
+              </a:rPr>
+              <a:t>An error occurred when trying to create a controller of type '</a:t>
+            </a:r>
+            <a:r>
+              <a:rPr lang="en-US" sz="1600" b="1" dirty="0" err="1">
+                <a:solidFill>
+                  <a:srgbClr val="000000"/>
+                </a:solidFill>
+                <a:latin typeface="Consolas"/>
+                <a:ea typeface="Times New Roman"/>
+                <a:cs typeface="Times New Roman"/>
+              </a:rPr>
+              <a:t>BoringBank.WebPortal.Controllers.AccountController</a:t>
+            </a:r>
+            <a:r>
+              <a:rPr lang="en-US" sz="1600" b="1" dirty="0">
+                <a:solidFill>
+                  <a:srgbClr val="000000"/>
+                </a:solidFill>
+                <a:latin typeface="Consolas"/>
+                <a:ea typeface="Times New Roman"/>
+                <a:cs typeface="Times New Roman"/>
+              </a:rPr>
+              <a:t>'</a:t>
+            </a:r>
+            <a:r>
+              <a:rPr lang="en-US" sz="1600" dirty="0">
+                <a:solidFill>
+                  <a:srgbClr val="000000"/>
+                </a:solidFill>
+                <a:latin typeface="Consolas"/>
+                <a:ea typeface="Times New Roman"/>
+                <a:cs typeface="Times New Roman"/>
+              </a:rPr>
+              <a:t>. Make sure that the controller has a </a:t>
+            </a:r>
+            <a:r>
+              <a:rPr lang="en-US" sz="1600" dirty="0" err="1">
+                <a:solidFill>
+                  <a:srgbClr val="000000"/>
+                </a:solidFill>
+                <a:latin typeface="Consolas"/>
+                <a:ea typeface="Times New Roman"/>
+                <a:cs typeface="Times New Roman"/>
+              </a:rPr>
+              <a:t>parameterless</a:t>
+            </a:r>
+            <a:r>
+              <a:rPr lang="en-US" sz="1600" dirty="0">
+                <a:solidFill>
+                  <a:srgbClr val="000000"/>
+                </a:solidFill>
+                <a:latin typeface="Consolas"/>
+                <a:ea typeface="Times New Roman"/>
+                <a:cs typeface="Times New Roman"/>
+              </a:rPr>
+              <a:t> public constructor.]</a:t>
+            </a:r>
+            <a:endParaRPr lang="en-US" sz="1600" dirty="0">
+              <a:ea typeface="Calibri"/>
+              <a:cs typeface="Times New Roman"/>
+            </a:endParaRPr>
+          </a:p>
+          <a:p>
+            <a:pPr>
+              <a:lnSpc>
+                <a:spcPts val="1400"/>
+              </a:lnSpc>
+              <a:spcAft>
+                <a:spcPts val="0"/>
+              </a:spcAft>
+              <a:tabLst>
+                <a:tab pos="581660" algn="l"/>
+                <a:tab pos="1163320" algn="l"/>
+                <a:tab pos="1744980" algn="l"/>
+                <a:tab pos="2326640" algn="l"/>
+                <a:tab pos="2908300" algn="l"/>
+                <a:tab pos="3489960" algn="l"/>
+                <a:tab pos="4071620" algn="l"/>
+                <a:tab pos="4653280" algn="l"/>
+                <a:tab pos="5234940" algn="l"/>
+                <a:tab pos="5816600" algn="l"/>
+                <a:tab pos="6398260" algn="l"/>
+                <a:tab pos="6979920" algn="l"/>
+                <a:tab pos="7561580" algn="l"/>
+                <a:tab pos="8143240" algn="l"/>
+                <a:tab pos="8724900" algn="l"/>
+                <a:tab pos="9306560" algn="l"/>
+              </a:tabLst>
+            </a:pPr>
+            <a:r>
+              <a:rPr lang="en-US" sz="1600" dirty="0">
+                <a:solidFill>
+                  <a:srgbClr val="000000"/>
+                </a:solidFill>
+                <a:latin typeface="Consolas"/>
+                <a:ea typeface="Times New Roman"/>
+                <a:cs typeface="Times New Roman"/>
+              </a:rPr>
+              <a:t>   </a:t>
+            </a:r>
+            <a:r>
+              <a:rPr lang="en-US" sz="1600" dirty="0" err="1">
+                <a:solidFill>
+                  <a:srgbClr val="000000"/>
+                </a:solidFill>
+                <a:latin typeface="Consolas"/>
+                <a:ea typeface="Times New Roman"/>
+                <a:cs typeface="Times New Roman"/>
+              </a:rPr>
+              <a:t>System.Web.Mvc.DefaultControllerActivator.Create</a:t>
+            </a:r>
+            <a:r>
+              <a:rPr lang="en-US" sz="1600" dirty="0">
+                <a:solidFill>
+                  <a:srgbClr val="000000"/>
+                </a:solidFill>
+                <a:latin typeface="Consolas"/>
+                <a:ea typeface="Times New Roman"/>
+                <a:cs typeface="Times New Roman"/>
+              </a:rPr>
+              <a:t>(</a:t>
+            </a:r>
+            <a:r>
+              <a:rPr lang="en-US" sz="1600" dirty="0" err="1">
+                <a:solidFill>
+                  <a:srgbClr val="000000"/>
+                </a:solidFill>
+                <a:latin typeface="Consolas"/>
+                <a:ea typeface="Times New Roman"/>
+                <a:cs typeface="Times New Roman"/>
+              </a:rPr>
+              <a:t>RequestContext</a:t>
+            </a:r>
+            <a:r>
+              <a:rPr lang="en-US" sz="1600" dirty="0">
+                <a:solidFill>
+                  <a:srgbClr val="000000"/>
+                </a:solidFill>
+                <a:latin typeface="Consolas"/>
+                <a:ea typeface="Times New Roman"/>
+                <a:cs typeface="Times New Roman"/>
+              </a:rPr>
+              <a:t> </a:t>
+            </a:r>
+            <a:r>
+              <a:rPr lang="en-US" sz="1600" dirty="0" err="1">
+                <a:solidFill>
+                  <a:srgbClr val="000000"/>
+                </a:solidFill>
+                <a:latin typeface="Consolas"/>
+                <a:ea typeface="Times New Roman"/>
+                <a:cs typeface="Times New Roman"/>
+              </a:rPr>
+              <a:t>requestContext</a:t>
+            </a:r>
+            <a:r>
+              <a:rPr lang="en-US" sz="1600" dirty="0">
+                <a:solidFill>
+                  <a:srgbClr val="000000"/>
+                </a:solidFill>
+                <a:latin typeface="Consolas"/>
+                <a:ea typeface="Times New Roman"/>
+                <a:cs typeface="Times New Roman"/>
+              </a:rPr>
+              <a:t>, Type </a:t>
+            </a:r>
+            <a:r>
+              <a:rPr lang="en-US" sz="1600" dirty="0" err="1">
+                <a:solidFill>
+                  <a:srgbClr val="000000"/>
+                </a:solidFill>
+                <a:latin typeface="Consolas"/>
+                <a:ea typeface="Times New Roman"/>
+                <a:cs typeface="Times New Roman"/>
+              </a:rPr>
+              <a:t>controllerType</a:t>
+            </a:r>
+            <a:r>
+              <a:rPr lang="en-US" sz="1600" dirty="0">
+                <a:solidFill>
+                  <a:srgbClr val="000000"/>
+                </a:solidFill>
+                <a:latin typeface="Consolas"/>
+                <a:ea typeface="Times New Roman"/>
+                <a:cs typeface="Times New Roman"/>
+              </a:rPr>
+              <a:t>) +178</a:t>
+            </a:r>
+            <a:endParaRPr lang="en-US" sz="1600" dirty="0">
+              <a:ea typeface="Calibri"/>
+              <a:cs typeface="Times New Roman"/>
+            </a:endParaRPr>
+          </a:p>
+          <a:p>
+            <a:pPr>
+              <a:lnSpc>
+                <a:spcPts val="1400"/>
+              </a:lnSpc>
+              <a:spcAft>
+                <a:spcPts val="0"/>
+              </a:spcAft>
+              <a:tabLst>
+                <a:tab pos="581660" algn="l"/>
+                <a:tab pos="1163320" algn="l"/>
+                <a:tab pos="1744980" algn="l"/>
+                <a:tab pos="2326640" algn="l"/>
+                <a:tab pos="2908300" algn="l"/>
+                <a:tab pos="3489960" algn="l"/>
+                <a:tab pos="4071620" algn="l"/>
+                <a:tab pos="4653280" algn="l"/>
+                <a:tab pos="5234940" algn="l"/>
+                <a:tab pos="5816600" algn="l"/>
+                <a:tab pos="6398260" algn="l"/>
+                <a:tab pos="6979920" algn="l"/>
+                <a:tab pos="7561580" algn="l"/>
+                <a:tab pos="8143240" algn="l"/>
+                <a:tab pos="8724900" algn="l"/>
+                <a:tab pos="9306560" algn="l"/>
+              </a:tabLst>
+            </a:pPr>
+            <a:r>
+              <a:rPr lang="en-US" sz="1600" dirty="0">
+                <a:solidFill>
+                  <a:srgbClr val="000000"/>
+                </a:solidFill>
+                <a:latin typeface="Consolas"/>
+                <a:ea typeface="Times New Roman"/>
+                <a:cs typeface="Times New Roman"/>
+              </a:rPr>
+              <a:t>   </a:t>
+            </a:r>
+            <a:r>
+              <a:rPr lang="en-US" sz="1600" dirty="0" err="1">
+                <a:solidFill>
+                  <a:srgbClr val="000000"/>
+                </a:solidFill>
+                <a:latin typeface="Consolas"/>
+                <a:ea typeface="Times New Roman"/>
+                <a:cs typeface="Times New Roman"/>
+              </a:rPr>
+              <a:t>System.Web.Mvc.DefaultControllerFactory.GetControllerInstance</a:t>
+            </a:r>
+            <a:r>
+              <a:rPr lang="en-US" sz="1600" dirty="0">
+                <a:solidFill>
+                  <a:srgbClr val="000000"/>
+                </a:solidFill>
+                <a:latin typeface="Consolas"/>
+                <a:ea typeface="Times New Roman"/>
+                <a:cs typeface="Times New Roman"/>
+              </a:rPr>
+              <a:t>(</a:t>
+            </a:r>
+            <a:r>
+              <a:rPr lang="en-US" sz="1600" dirty="0" err="1">
+                <a:solidFill>
+                  <a:srgbClr val="000000"/>
+                </a:solidFill>
+                <a:latin typeface="Consolas"/>
+                <a:ea typeface="Times New Roman"/>
+                <a:cs typeface="Times New Roman"/>
+              </a:rPr>
+              <a:t>RequestContext</a:t>
+            </a:r>
+            <a:r>
+              <a:rPr lang="en-US" sz="1600" dirty="0">
+                <a:solidFill>
+                  <a:srgbClr val="000000"/>
+                </a:solidFill>
+                <a:latin typeface="Consolas"/>
+                <a:ea typeface="Times New Roman"/>
+                <a:cs typeface="Times New Roman"/>
+              </a:rPr>
+              <a:t> </a:t>
+            </a:r>
+            <a:r>
+              <a:rPr lang="en-US" sz="1600" dirty="0" err="1">
+                <a:solidFill>
+                  <a:srgbClr val="000000"/>
+                </a:solidFill>
+                <a:latin typeface="Consolas"/>
+                <a:ea typeface="Times New Roman"/>
+                <a:cs typeface="Times New Roman"/>
+              </a:rPr>
+              <a:t>requestContext</a:t>
+            </a:r>
+            <a:r>
+              <a:rPr lang="en-US" sz="1600" dirty="0">
+                <a:solidFill>
+                  <a:srgbClr val="000000"/>
+                </a:solidFill>
+                <a:latin typeface="Consolas"/>
+                <a:ea typeface="Times New Roman"/>
+                <a:cs typeface="Times New Roman"/>
+              </a:rPr>
+              <a:t>, Type </a:t>
+            </a:r>
+            <a:r>
+              <a:rPr lang="en-US" sz="1600" dirty="0" err="1">
+                <a:solidFill>
+                  <a:srgbClr val="000000"/>
+                </a:solidFill>
+                <a:latin typeface="Consolas"/>
+                <a:ea typeface="Times New Roman"/>
+                <a:cs typeface="Times New Roman"/>
+              </a:rPr>
+              <a:t>controllerType</a:t>
+            </a:r>
+            <a:r>
+              <a:rPr lang="en-US" sz="1600" dirty="0">
+                <a:solidFill>
+                  <a:srgbClr val="000000"/>
+                </a:solidFill>
+                <a:latin typeface="Consolas"/>
+                <a:ea typeface="Times New Roman"/>
+                <a:cs typeface="Times New Roman"/>
+              </a:rPr>
+              <a:t>) +77</a:t>
+            </a:r>
+            <a:endParaRPr lang="en-US" sz="1600" dirty="0">
+              <a:ea typeface="Calibri"/>
+              <a:cs typeface="Times New Roman"/>
+            </a:endParaRPr>
+          </a:p>
+          <a:p>
+            <a:pPr>
+              <a:lnSpc>
+                <a:spcPts val="1400"/>
+              </a:lnSpc>
+              <a:spcAft>
+                <a:spcPts val="0"/>
+              </a:spcAft>
+              <a:tabLst>
+                <a:tab pos="581660" algn="l"/>
+                <a:tab pos="1163320" algn="l"/>
+                <a:tab pos="1744980" algn="l"/>
+                <a:tab pos="2326640" algn="l"/>
+                <a:tab pos="2908300" algn="l"/>
+                <a:tab pos="3489960" algn="l"/>
+                <a:tab pos="4071620" algn="l"/>
+                <a:tab pos="4653280" algn="l"/>
+                <a:tab pos="5234940" algn="l"/>
+                <a:tab pos="5816600" algn="l"/>
+                <a:tab pos="6398260" algn="l"/>
+                <a:tab pos="6979920" algn="l"/>
+                <a:tab pos="7561580" algn="l"/>
+                <a:tab pos="8143240" algn="l"/>
+                <a:tab pos="8724900" algn="l"/>
+                <a:tab pos="9306560" algn="l"/>
+              </a:tabLst>
+            </a:pPr>
+            <a:r>
+              <a:rPr lang="en-US" sz="1600" dirty="0">
+                <a:solidFill>
+                  <a:srgbClr val="000000"/>
+                </a:solidFill>
+                <a:latin typeface="Consolas"/>
+                <a:ea typeface="Times New Roman"/>
+                <a:cs typeface="Times New Roman"/>
+              </a:rPr>
+              <a:t>   </a:t>
+            </a:r>
+            <a:r>
+              <a:rPr lang="en-US" sz="1600" dirty="0" err="1">
+                <a:solidFill>
+                  <a:srgbClr val="000000"/>
+                </a:solidFill>
+                <a:latin typeface="Consolas"/>
+                <a:ea typeface="Times New Roman"/>
+                <a:cs typeface="Times New Roman"/>
+              </a:rPr>
+              <a:t>System.Web.Mvc.DefaultControllerFactory.CreateController</a:t>
+            </a:r>
+            <a:r>
+              <a:rPr lang="en-US" sz="1600" dirty="0">
+                <a:solidFill>
+                  <a:srgbClr val="000000"/>
+                </a:solidFill>
+                <a:latin typeface="Consolas"/>
+                <a:ea typeface="Times New Roman"/>
+                <a:cs typeface="Times New Roman"/>
+              </a:rPr>
+              <a:t>(</a:t>
+            </a:r>
+            <a:r>
+              <a:rPr lang="en-US" sz="1600" dirty="0" err="1">
+                <a:solidFill>
+                  <a:srgbClr val="000000"/>
+                </a:solidFill>
+                <a:latin typeface="Consolas"/>
+                <a:ea typeface="Times New Roman"/>
+                <a:cs typeface="Times New Roman"/>
+              </a:rPr>
+              <a:t>RequestContext</a:t>
+            </a:r>
+            <a:r>
+              <a:rPr lang="en-US" sz="1600" dirty="0">
+                <a:solidFill>
+                  <a:srgbClr val="000000"/>
+                </a:solidFill>
+                <a:latin typeface="Consolas"/>
+                <a:ea typeface="Times New Roman"/>
+                <a:cs typeface="Times New Roman"/>
+              </a:rPr>
+              <a:t> </a:t>
+            </a:r>
+            <a:r>
+              <a:rPr lang="en-US" sz="1600" dirty="0" err="1">
+                <a:solidFill>
+                  <a:srgbClr val="000000"/>
+                </a:solidFill>
+                <a:latin typeface="Consolas"/>
+                <a:ea typeface="Times New Roman"/>
+                <a:cs typeface="Times New Roman"/>
+              </a:rPr>
+              <a:t>requestContext</a:t>
+            </a:r>
+            <a:r>
+              <a:rPr lang="en-US" sz="1600" dirty="0">
+                <a:solidFill>
+                  <a:srgbClr val="000000"/>
+                </a:solidFill>
+                <a:latin typeface="Consolas"/>
+                <a:ea typeface="Times New Roman"/>
+                <a:cs typeface="Times New Roman"/>
+              </a:rPr>
+              <a:t>, String </a:t>
+            </a:r>
+            <a:r>
+              <a:rPr lang="en-US" sz="1600" dirty="0" err="1">
+                <a:solidFill>
+                  <a:srgbClr val="000000"/>
+                </a:solidFill>
+                <a:latin typeface="Consolas"/>
+                <a:ea typeface="Times New Roman"/>
+                <a:cs typeface="Times New Roman"/>
+              </a:rPr>
+              <a:t>controllerName</a:t>
+            </a:r>
+            <a:r>
+              <a:rPr lang="en-US" sz="1600" dirty="0">
+                <a:solidFill>
+                  <a:srgbClr val="000000"/>
+                </a:solidFill>
+                <a:latin typeface="Consolas"/>
+                <a:ea typeface="Times New Roman"/>
+                <a:cs typeface="Times New Roman"/>
+              </a:rPr>
+              <a:t>) +88</a:t>
+            </a:r>
+            <a:endParaRPr lang="en-US" sz="1600" dirty="0">
+              <a:ea typeface="Calibri"/>
+              <a:cs typeface="Times New Roman"/>
+            </a:endParaRPr>
+          </a:p>
+          <a:p>
+            <a:pPr>
+              <a:lnSpc>
+                <a:spcPct val="115000"/>
+              </a:lnSpc>
+              <a:spcAft>
+                <a:spcPts val="1000"/>
+              </a:spcAft>
+            </a:pPr>
+            <a:r>
+              <a:rPr lang="en-US" sz="1600" dirty="0">
+                <a:ea typeface="Calibri"/>
+                <a:cs typeface="Times New Roman"/>
+              </a:rPr>
+              <a:t> </a:t>
+            </a:r>
+          </a:p>
+        </p:txBody>
+      </p:sp>
     </p:spTree>
     <p:extLst>
       <p:ext uri="{BB962C8B-B14F-4D97-AF65-F5344CB8AC3E}">
@@ -28665,9 +29492,125 @@
   <p:timing>
     <p:tnLst>
       <p:par>
-        <p:cTn id="1" dur="indefinite" restart="never" nodeType="tmRoot"/>
+        <p:cTn id="1" dur="indefinite" restart="never" nodeType="tmRoot">
+          <p:childTnLst>
+            <p:seq concurrent="1" nextAc="seek">
+              <p:cTn id="2" dur="indefinite" nodeType="mainSeq">
+                <p:childTnLst>
+                  <p:par>
+                    <p:cTn id="3" fill="hold">
+                      <p:stCondLst>
+                        <p:cond delay="indefinite"/>
+                      </p:stCondLst>
+                      <p:childTnLst>
+                        <p:par>
+                          <p:cTn id="4" fill="hold">
+                            <p:stCondLst>
+                              <p:cond delay="0"/>
+                            </p:stCondLst>
+                            <p:childTnLst>
+                              <p:par>
+                                <p:cTn id="5" presetID="1" presetClass="entr" presetSubtype="0" fill="hold" nodeType="clickEffect">
+                                  <p:stCondLst>
+                                    <p:cond delay="0"/>
+                                  </p:stCondLst>
+                                  <p:childTnLst>
+                                    <p:set>
+                                      <p:cBhvr>
+                                        <p:cTn id="6" dur="1" fill="hold">
+                                          <p:stCondLst>
+                                            <p:cond delay="0"/>
+                                          </p:stCondLst>
+                                        </p:cTn>
+                                        <p:tgtEl>
+                                          <p:spTgt spid="7170"/>
+                                        </p:tgtEl>
+                                        <p:attrNameLst>
+                                          <p:attrName>style.visibility</p:attrName>
+                                        </p:attrNameLst>
+                                      </p:cBhvr>
+                                      <p:to>
+                                        <p:strVal val="visible"/>
+                                      </p:to>
+                                    </p:set>
+                                  </p:childTnLst>
+                                </p:cTn>
+                              </p:par>
+                            </p:childTnLst>
+                          </p:cTn>
+                        </p:par>
+                      </p:childTnLst>
+                    </p:cTn>
+                  </p:par>
+                  <p:par>
+                    <p:cTn id="7" fill="hold">
+                      <p:stCondLst>
+                        <p:cond delay="indefinite"/>
+                      </p:stCondLst>
+                      <p:childTnLst>
+                        <p:par>
+                          <p:cTn id="8" fill="hold">
+                            <p:stCondLst>
+                              <p:cond delay="0"/>
+                            </p:stCondLst>
+                            <p:childTnLst>
+                              <p:par>
+                                <p:cTn id="9" presetID="1" presetClass="entr" presetSubtype="0" fill="hold" grpId="0" nodeType="clickEffect">
+                                  <p:stCondLst>
+                                    <p:cond delay="0"/>
+                                  </p:stCondLst>
+                                  <p:childTnLst>
+                                    <p:set>
+                                      <p:cBhvr>
+                                        <p:cTn id="10" dur="1" fill="hold">
+                                          <p:stCondLst>
+                                            <p:cond delay="0"/>
+                                          </p:stCondLst>
+                                        </p:cTn>
+                                        <p:tgtEl>
+                                          <p:spTgt spid="4"/>
+                                        </p:tgtEl>
+                                        <p:attrNameLst>
+                                          <p:attrName>style.visibility</p:attrName>
+                                        </p:attrNameLst>
+                                      </p:cBhvr>
+                                      <p:to>
+                                        <p:strVal val="visible"/>
+                                      </p:to>
+                                    </p:set>
+                                  </p:childTnLst>
+                                </p:cTn>
+                              </p:par>
+                            </p:childTnLst>
+                          </p:cTn>
+                        </p:par>
+                      </p:childTnLst>
+                    </p:cTn>
+                  </p:par>
+                </p:childTnLst>
+              </p:cTn>
+              <p:prevCondLst>
+                <p:cond evt="onPrev" delay="0">
+                  <p:tgtEl>
+                    <p:sldTgt/>
+                  </p:tgtEl>
+                </p:cond>
+              </p:prevCondLst>
+              <p:nextCondLst>
+                <p:cond evt="onNext" delay="0">
+                  <p:tgtEl>
+                    <p:sldTgt/>
+                  </p:tgtEl>
+                </p:cond>
+              </p:nextCondLst>
+            </p:seq>
+          </p:childTnLst>
+        </p:cTn>
       </p:par>
     </p:tnLst>
+    <p:bldLst>
+      <p:bldP spid="4" grpId="0" animBg="1"/>
+    </p:bldLst>
   </p:timing>
 </p:sld>
 </file>
@@ -28705,8 +29648,20 @@
           <a:lstStyle/>
           <a:p>
             <a:r>
-              <a:rPr lang="en-US" dirty="0" smtClean="0"/>
-              <a:t>It’s viral !</a:t>
+              <a:rPr lang="fr-FR" dirty="0" smtClean="0"/>
+              <a:t>The </a:t>
+            </a:r>
+            <a:r>
+              <a:rPr lang="fr-FR" dirty="0" err="1" smtClean="0"/>
+              <a:t>chicken</a:t>
+            </a:r>
+            <a:r>
+              <a:rPr lang="fr-FR" dirty="0" smtClean="0"/>
+              <a:t> and the </a:t>
+            </a:r>
+            <a:r>
+              <a:rPr lang="fr-FR" dirty="0" err="1" smtClean="0"/>
+              <a:t>egg</a:t>
             </a:r>
             <a:endParaRPr lang="en-US" dirty="0"/>
           </a:p>
@@ -28728,9 +29683,124 @@
           <a:lstStyle/>
           <a:p>
             <a:r>
-              <a:rPr lang="en-US" dirty="0" smtClean="0"/>
-              <a:t>Composition Root</a:t>
-            </a:r>
+              <a:rPr lang="fr-FR" dirty="0" smtClean="0"/>
+              <a:t>Applications do not </a:t>
+            </a:r>
+            <a:r>
+              <a:rPr lang="fr-FR" dirty="0" err="1" smtClean="0"/>
+              <a:t>work</a:t>
+            </a:r>
+            <a:r>
+              <a:rPr lang="fr-FR" dirty="0" smtClean="0"/>
+              <a:t> </a:t>
+            </a:r>
+            <a:r>
+              <a:rPr lang="fr-FR" dirty="0" err="1" smtClean="0"/>
+              <a:t>with</a:t>
+            </a:r>
+            <a:r>
+              <a:rPr lang="fr-FR" dirty="0" smtClean="0"/>
+              <a:t> </a:t>
+            </a:r>
+            <a:r>
+              <a:rPr lang="fr-FR" dirty="0" err="1" smtClean="0"/>
+              <a:t>only</a:t>
+            </a:r>
+            <a:r>
+              <a:rPr lang="fr-FR" dirty="0" smtClean="0"/>
+              <a:t> interfaces</a:t>
+            </a:r>
+          </a:p>
+          <a:p>
+            <a:r>
+              <a:rPr lang="fr-FR" dirty="0" smtClean="0"/>
+              <a:t>Class instances have to </a:t>
+            </a:r>
+            <a:r>
+              <a:rPr lang="fr-FR" dirty="0" err="1" smtClean="0"/>
+              <a:t>be</a:t>
+            </a:r>
+            <a:r>
+              <a:rPr lang="fr-FR" dirty="0" smtClean="0"/>
+              <a:t> </a:t>
+            </a:r>
+            <a:r>
+              <a:rPr lang="fr-FR" dirty="0" err="1" smtClean="0"/>
+              <a:t>created</a:t>
+            </a:r>
+            <a:r>
+              <a:rPr lang="fr-FR" dirty="0" smtClean="0"/>
+              <a:t> and </a:t>
+            </a:r>
+            <a:r>
+              <a:rPr lang="fr-FR" dirty="0" err="1" smtClean="0"/>
+              <a:t>assembled</a:t>
+            </a:r>
+            <a:r>
+              <a:rPr lang="fr-FR" dirty="0" smtClean="0"/>
+              <a:t> (=</a:t>
+            </a:r>
+            <a:r>
+              <a:rPr lang="fr-FR" dirty="0" err="1" smtClean="0"/>
+              <a:t>composed</a:t>
+            </a:r>
+            <a:r>
+              <a:rPr lang="fr-FR" dirty="0" smtClean="0"/>
+              <a:t>) at </a:t>
+            </a:r>
+            <a:r>
+              <a:rPr lang="fr-FR" dirty="0" err="1" smtClean="0"/>
+              <a:t>some</a:t>
+            </a:r>
+            <a:r>
+              <a:rPr lang="fr-FR" dirty="0" smtClean="0"/>
+              <a:t> point</a:t>
+            </a:r>
+          </a:p>
+          <a:p>
+            <a:r>
+              <a:rPr lang="fr-FR" dirty="0" smtClean="0"/>
+              <a:t>This </a:t>
+            </a:r>
+            <a:r>
+              <a:rPr lang="fr-FR" dirty="0" err="1" smtClean="0"/>
+              <a:t>happens</a:t>
+            </a:r>
+            <a:r>
+              <a:rPr lang="fr-FR" dirty="0" smtClean="0"/>
+              <a:t> </a:t>
+            </a:r>
+            <a:r>
+              <a:rPr lang="fr-FR" dirty="0" err="1" smtClean="0"/>
+              <a:t>only</a:t>
+            </a:r>
+            <a:r>
+              <a:rPr lang="fr-FR" dirty="0" smtClean="0"/>
+              <a:t> in one place in an </a:t>
+            </a:r>
+            <a:r>
+              <a:rPr lang="fr-FR" dirty="0" err="1" smtClean="0"/>
+              <a:t>app</a:t>
+            </a:r>
+            <a:r>
+              <a:rPr lang="fr-FR" dirty="0" smtClean="0"/>
+              <a:t> / web </a:t>
+            </a:r>
+            <a:r>
+              <a:rPr lang="fr-FR" dirty="0" err="1" smtClean="0"/>
+              <a:t>app</a:t>
+            </a:r>
+            <a:r>
+              <a:rPr lang="fr-FR" dirty="0" smtClean="0"/>
+              <a:t> / service / console </a:t>
+            </a:r>
+            <a:r>
+              <a:rPr lang="fr-FR" dirty="0" err="1" smtClean="0"/>
+              <a:t>app</a:t>
+            </a:r>
+            <a:endParaRPr lang="fr-FR" dirty="0" smtClean="0"/>
+          </a:p>
+          <a:p>
             <a:endParaRPr lang="en-US" dirty="0"/>
           </a:p>
         </p:txBody>
@@ -28738,7 +29808,7 @@
     </p:spTree>
     <p:extLst>
       <p:ext uri="{BB962C8B-B14F-4D97-AF65-F5344CB8AC3E}">
-        <p14:creationId xmlns:p14="http://schemas.microsoft.com/office/powerpoint/2010/main" val="1394666143"/>
+        <p14:creationId xmlns:p14="http://schemas.microsoft.com/office/powerpoint/2010/main" val="4027064824"/>
       </p:ext>
     </p:extLst>
   </p:cSld>
@@ -28788,10 +29858,22 @@
           <a:lstStyle/>
           <a:p>
             <a:r>
-              <a:rPr lang="en-US" dirty="0" smtClean="0"/>
-              <a:t>Pure DI aka Poor Man’s DI</a:t>
-            </a:r>
-            <a:endParaRPr lang="en-US" dirty="0"/>
+              <a:rPr lang="fr-FR" dirty="0"/>
+              <a:t>p</a:t>
+            </a:r>
+            <a:r>
+              <a:rPr lang="fr-FR" dirty="0" smtClean="0"/>
+              <a:t>attern : </a:t>
+            </a:r>
+            <a:r>
+              <a:rPr lang="fr-FR" b="1" dirty="0" smtClean="0"/>
+              <a:t>Composition </a:t>
+            </a:r>
+            <a:r>
+              <a:rPr lang="fr-FR" b="1" dirty="0" err="1" smtClean="0"/>
+              <a:t>Root</a:t>
+            </a:r>
+            <a:endParaRPr lang="en-US" b="1" dirty="0"/>
           </a:p>
         </p:txBody>
       </p:sp>
@@ -28807,17 +29889,238 @@
         </p:nvSpPr>
         <p:spPr/>
         <p:txBody>
-          <a:bodyPr/>
+          <a:bodyPr>
+            <a:normAutofit fontScale="92500" lnSpcReduction="20000"/>
+          </a:bodyPr>
           <a:lstStyle/>
           <a:p>
-            <a:endParaRPr lang="en-US"/>
+            <a:pPr marL="0" indent="0" algn="ctr">
+              <a:buNone/>
+            </a:pPr>
+            <a:r>
+              <a:rPr lang="fr-FR" i="1" dirty="0" smtClean="0"/>
+              <a:t>Composition of classes </a:t>
+            </a:r>
+            <a:r>
+              <a:rPr lang="fr-FR" i="1" dirty="0" err="1" smtClean="0"/>
+              <a:t>into</a:t>
+            </a:r>
+            <a:r>
+              <a:rPr lang="fr-FR" i="1" dirty="0" smtClean="0"/>
+              <a:t> a </a:t>
+            </a:r>
+            <a:r>
+              <a:rPr lang="fr-FR" i="1" dirty="0" err="1" smtClean="0"/>
+              <a:t>larger</a:t>
+            </a:r>
+            <a:r>
+              <a:rPr lang="fr-FR" i="1" dirty="0" smtClean="0"/>
+              <a:t> system </a:t>
+            </a:r>
+            <a:r>
+              <a:rPr lang="fr-FR" i="1" dirty="0" err="1" smtClean="0"/>
+              <a:t>should</a:t>
+            </a:r>
+            <a:r>
+              <a:rPr lang="fr-FR" i="1" dirty="0" smtClean="0"/>
+              <a:t> </a:t>
+            </a:r>
+            <a:r>
+              <a:rPr lang="fr-FR" i="1" dirty="0" err="1" smtClean="0"/>
+              <a:t>happen</a:t>
+            </a:r>
+            <a:r>
+              <a:rPr lang="fr-FR" i="1" dirty="0" smtClean="0"/>
+              <a:t> </a:t>
+            </a:r>
+            <a:r>
+              <a:rPr lang="fr-FR" i="1" dirty="0" err="1" smtClean="0"/>
+              <a:t>only</a:t>
+            </a:r>
+            <a:r>
+              <a:rPr lang="fr-FR" i="1" dirty="0" smtClean="0"/>
+              <a:t> in one place</a:t>
+            </a:r>
+          </a:p>
+          <a:p>
+            <a:endParaRPr lang="fr-FR" dirty="0" smtClean="0"/>
+          </a:p>
+          <a:p>
+            <a:r>
+              <a:rPr lang="fr-FR" dirty="0" err="1" smtClean="0"/>
+              <a:t>Create</a:t>
+            </a:r>
+            <a:r>
+              <a:rPr lang="fr-FR" dirty="0" smtClean="0"/>
+              <a:t> one</a:t>
+            </a:r>
+            <a:r>
+              <a:rPr lang="fr-FR" sz="2400" dirty="0" smtClean="0"/>
+              <a:t>*</a:t>
+            </a:r>
+            <a:r>
+              <a:rPr lang="fr-FR" dirty="0" smtClean="0"/>
+              <a:t> </a:t>
+            </a:r>
+            <a:r>
+              <a:rPr lang="fr-FR" dirty="0" err="1" smtClean="0"/>
+              <a:t>object</a:t>
+            </a:r>
+            <a:r>
+              <a:rPr lang="fr-FR" dirty="0" smtClean="0"/>
+              <a:t>-graph</a:t>
+            </a:r>
+          </a:p>
+          <a:p>
+            <a:r>
+              <a:rPr lang="fr-FR" dirty="0" smtClean="0"/>
+              <a:t>There </a:t>
+            </a:r>
+            <a:r>
+              <a:rPr lang="fr-FR" dirty="0" err="1" smtClean="0"/>
+              <a:t>is</a:t>
+            </a:r>
+            <a:r>
+              <a:rPr lang="fr-FR" dirty="0" smtClean="0"/>
+              <a:t> no composition </a:t>
+            </a:r>
+            <a:r>
+              <a:rPr lang="fr-FR" dirty="0" err="1" smtClean="0"/>
+              <a:t>root</a:t>
+            </a:r>
+            <a:r>
+              <a:rPr lang="fr-FR" dirty="0" smtClean="0"/>
+              <a:t> in a </a:t>
+            </a:r>
+            <a:r>
+              <a:rPr lang="fr-FR" dirty="0" err="1" smtClean="0"/>
+              <a:t>library</a:t>
+            </a:r>
+            <a:endParaRPr lang="fr-FR" dirty="0" smtClean="0"/>
+          </a:p>
+          <a:p>
+            <a:r>
+              <a:rPr lang="fr-FR" dirty="0" err="1" smtClean="0"/>
+              <a:t>Only</a:t>
+            </a:r>
+            <a:r>
+              <a:rPr lang="fr-FR" dirty="0" smtClean="0"/>
+              <a:t> « applications » have a Composition </a:t>
+            </a:r>
+            <a:r>
+              <a:rPr lang="fr-FR" dirty="0" err="1" smtClean="0"/>
+              <a:t>Root</a:t>
+            </a:r>
+            <a:endParaRPr lang="fr-FR" dirty="0" smtClean="0"/>
+          </a:p>
+          <a:p>
+            <a:r>
+              <a:rPr lang="fr-FR" dirty="0" err="1" smtClean="0"/>
+              <a:t>Where</a:t>
+            </a:r>
+            <a:r>
+              <a:rPr lang="fr-FR" dirty="0" smtClean="0"/>
+              <a:t> the Composition </a:t>
+            </a:r>
+            <a:r>
+              <a:rPr lang="fr-FR" dirty="0" err="1" smtClean="0"/>
+              <a:t>Root</a:t>
+            </a:r>
+            <a:r>
+              <a:rPr lang="fr-FR" dirty="0" smtClean="0"/>
+              <a:t> </a:t>
+            </a:r>
+            <a:r>
+              <a:rPr lang="fr-FR" dirty="0" err="1" smtClean="0"/>
+              <a:t>can</a:t>
+            </a:r>
+            <a:r>
+              <a:rPr lang="fr-FR" dirty="0" smtClean="0"/>
+              <a:t> </a:t>
+            </a:r>
+            <a:r>
+              <a:rPr lang="fr-FR" dirty="0" err="1" smtClean="0"/>
+              <a:t>be</a:t>
+            </a:r>
+            <a:r>
+              <a:rPr lang="fr-FR" dirty="0" smtClean="0"/>
+              <a:t> </a:t>
+            </a:r>
+            <a:r>
+              <a:rPr lang="fr-FR" dirty="0" err="1" smtClean="0"/>
+              <a:t>plugged</a:t>
+            </a:r>
+            <a:r>
+              <a:rPr lang="fr-FR" dirty="0" smtClean="0"/>
+              <a:t> </a:t>
+            </a:r>
+            <a:r>
+              <a:rPr lang="fr-FR" dirty="0" err="1" smtClean="0"/>
+              <a:t>depends</a:t>
+            </a:r>
+            <a:r>
+              <a:rPr lang="fr-FR" dirty="0" smtClean="0"/>
+              <a:t> on the </a:t>
+            </a:r>
+            <a:r>
+              <a:rPr lang="fr-FR" dirty="0" err="1" smtClean="0"/>
+              <a:t>kind</a:t>
+            </a:r>
+            <a:r>
+              <a:rPr lang="fr-FR" dirty="0" smtClean="0"/>
+              <a:t> of </a:t>
+            </a:r>
+            <a:r>
+              <a:rPr lang="fr-FR" dirty="0" err="1" smtClean="0"/>
+              <a:t>app</a:t>
+            </a:r>
+            <a:endParaRPr lang="fr-FR" dirty="0" smtClean="0"/>
+          </a:p>
+          <a:p>
+            <a:r>
+              <a:rPr lang="fr-FR" dirty="0" smtClean="0"/>
+              <a:t>The Composition </a:t>
+            </a:r>
+            <a:r>
+              <a:rPr lang="fr-FR" dirty="0" err="1" smtClean="0"/>
+              <a:t>Root</a:t>
+            </a:r>
+            <a:r>
+              <a:rPr lang="fr-FR" dirty="0" smtClean="0"/>
+              <a:t> </a:t>
+            </a:r>
+            <a:r>
+              <a:rPr lang="fr-FR" dirty="0" err="1" smtClean="0"/>
+              <a:t>needs</a:t>
+            </a:r>
+            <a:r>
+              <a:rPr lang="fr-FR" dirty="0" smtClean="0"/>
+              <a:t> </a:t>
+            </a:r>
+            <a:r>
+              <a:rPr lang="fr-FR" dirty="0" err="1" smtClean="0"/>
+              <a:t>access</a:t>
+            </a:r>
+            <a:r>
+              <a:rPr lang="fr-FR" dirty="0" smtClean="0"/>
+              <a:t> to all </a:t>
+            </a:r>
+            <a:r>
+              <a:rPr lang="fr-FR" dirty="0" err="1" smtClean="0"/>
+              <a:t>concrete</a:t>
+            </a:r>
+            <a:r>
+              <a:rPr lang="fr-FR" dirty="0" smtClean="0"/>
+              <a:t> types</a:t>
+            </a:r>
+            <a:endParaRPr lang="en-US" dirty="0"/>
           </a:p>
         </p:txBody>
       </p:sp>
     </p:spTree>
     <p:extLst>
       <p:ext uri="{BB962C8B-B14F-4D97-AF65-F5344CB8AC3E}">
-        <p14:creationId xmlns:p14="http://schemas.microsoft.com/office/powerpoint/2010/main" val="550091921"/>
+        <p14:creationId xmlns:p14="http://schemas.microsoft.com/office/powerpoint/2010/main" val="993896906"/>
       </p:ext>
     </p:extLst>
   </p:cSld>
@@ -28867,8 +30170,12 @@
           <a:lstStyle/>
           <a:p>
             <a:r>
-              <a:rPr lang="en-US" dirty="0" smtClean="0"/>
-              <a:t>Extensibility with DI</a:t>
+              <a:rPr lang="fr-FR" dirty="0" smtClean="0"/>
+              <a:t>ASP.NET MVC Composition </a:t>
+            </a:r>
+            <a:r>
+              <a:rPr lang="fr-FR" dirty="0" err="1" smtClean="0"/>
+              <a:t>Root</a:t>
             </a:r>
             <a:endParaRPr lang="en-US" dirty="0"/>
           </a:p>
@@ -28890,53 +30197,2510 @@
           <a:lstStyle/>
           <a:p>
             <a:r>
-              <a:rPr lang="en-US" dirty="0" err="1" smtClean="0"/>
-              <a:t>Composability</a:t>
-            </a:r>
-            <a:r>
-              <a:rPr lang="en-US" dirty="0" smtClean="0"/>
+              <a:rPr lang="fr-FR" sz="2800" dirty="0" err="1" smtClean="0">
+                <a:latin typeface="Consolas" panose="020B0609020204030204" pitchFamily="49" charset="0"/>
+                <a:cs typeface="Consolas" panose="020B0609020204030204" pitchFamily="49" charset="0"/>
+              </a:rPr>
+              <a:t>IControllerFactory</a:t>
+            </a:r>
+            <a:endParaRPr lang="fr-FR" dirty="0" smtClean="0">
+              <a:latin typeface="Consolas" panose="020B0609020204030204" pitchFamily="49" charset="0"/>
+              <a:cs typeface="Consolas" panose="020B0609020204030204" pitchFamily="49" charset="0"/>
+            </a:endParaRPr>
+          </a:p>
+          <a:p>
+            <a:r>
+              <a:rPr lang="fr-FR" dirty="0" err="1" smtClean="0"/>
+              <a:t>Called</a:t>
+            </a:r>
+            <a:r>
+              <a:rPr lang="fr-FR" dirty="0" smtClean="0"/>
+              <a:t> on </a:t>
+            </a:r>
+            <a:r>
+              <a:rPr lang="fr-FR" dirty="0" err="1" smtClean="0"/>
+              <a:t>each</a:t>
+            </a:r>
+            <a:r>
+              <a:rPr lang="fr-FR" dirty="0" smtClean="0"/>
               <a:t> </a:t>
             </a:r>
-          </a:p>
-          <a:p>
-            <a:r>
-              <a:rPr lang="en-US" dirty="0" smtClean="0"/>
-              <a:t>Testability</a:t>
-            </a:r>
-          </a:p>
-          <a:p>
-            <a:r>
-              <a:rPr lang="en-US" dirty="0" smtClean="0"/>
-              <a:t>Decorator</a:t>
-            </a:r>
-          </a:p>
-          <a:p>
+            <a:r>
+              <a:rPr lang="fr-FR" dirty="0" err="1" smtClean="0"/>
+              <a:t>request</a:t>
+            </a:r>
+            <a:r>
+              <a:rPr lang="fr-FR" dirty="0" smtClean="0"/>
+              <a:t> to </a:t>
+            </a:r>
+            <a:r>
+              <a:rPr lang="fr-FR" dirty="0" err="1" smtClean="0"/>
+              <a:t>create</a:t>
+            </a:r>
+            <a:r>
+              <a:rPr lang="fr-FR" dirty="0" smtClean="0"/>
+              <a:t> an instance of a </a:t>
+            </a:r>
+            <a:r>
+              <a:rPr lang="fr-FR" dirty="0" err="1" smtClean="0"/>
+              <a:t>controller</a:t>
+            </a:r>
+            <a:r>
+              <a:rPr lang="fr-FR" dirty="0" smtClean="0"/>
+              <a:t> </a:t>
+            </a:r>
+            <a:r>
+              <a:rPr lang="fr-FR" dirty="0" err="1" smtClean="0"/>
+              <a:t>matching</a:t>
+            </a:r>
+            <a:r>
+              <a:rPr lang="fr-FR" dirty="0" smtClean="0"/>
+              <a:t> URL</a:t>
+            </a:r>
+          </a:p>
+          <a:p>
+            <a:r>
+              <a:rPr lang="fr-FR" dirty="0" err="1" smtClean="0"/>
+              <a:t>DefaultControllerFactory</a:t>
+            </a:r>
+            <a:r>
+              <a:rPr lang="fr-FR" dirty="0" smtClean="0"/>
+              <a:t> </a:t>
+            </a:r>
+            <a:r>
+              <a:rPr lang="fr-FR" dirty="0" err="1" smtClean="0"/>
+              <a:t>expects</a:t>
+            </a:r>
+            <a:r>
+              <a:rPr lang="fr-FR" dirty="0" smtClean="0"/>
+              <a:t> default </a:t>
+            </a:r>
+            <a:r>
+              <a:rPr lang="fr-FR" dirty="0" err="1" smtClean="0"/>
+              <a:t>constructor</a:t>
+            </a:r>
+            <a:r>
+              <a:rPr lang="fr-FR" dirty="0" smtClean="0"/>
+              <a:t> on Controller</a:t>
+            </a:r>
+          </a:p>
+          <a:p>
+            <a:r>
+              <a:rPr lang="fr-FR" dirty="0" smtClean="0"/>
+              <a:t>But </a:t>
+            </a:r>
+            <a:r>
+              <a:rPr lang="fr-FR" dirty="0" err="1" smtClean="0"/>
+              <a:t>it</a:t>
+            </a:r>
+            <a:r>
+              <a:rPr lang="fr-FR" dirty="0" smtClean="0"/>
+              <a:t> </a:t>
+            </a:r>
+            <a:r>
+              <a:rPr lang="fr-FR" dirty="0" err="1" smtClean="0"/>
+              <a:t>can</a:t>
+            </a:r>
+            <a:r>
+              <a:rPr lang="fr-FR" dirty="0" smtClean="0"/>
+              <a:t> </a:t>
+            </a:r>
+            <a:r>
+              <a:rPr lang="fr-FR" dirty="0" err="1" smtClean="0"/>
+              <a:t>be</a:t>
+            </a:r>
+            <a:r>
+              <a:rPr lang="fr-FR" dirty="0" smtClean="0"/>
+              <a:t> </a:t>
+            </a:r>
+            <a:r>
+              <a:rPr lang="fr-FR" dirty="0" err="1" smtClean="0"/>
+              <a:t>changed</a:t>
+            </a:r>
+            <a:r>
+              <a:rPr lang="fr-FR" dirty="0" smtClean="0"/>
+              <a:t> !</a:t>
+            </a:r>
             <a:endParaRPr lang="en-US" dirty="0"/>
           </a:p>
-          <a:p>
-            <a:r>
-              <a:rPr lang="en-US" dirty="0" smtClean="0"/>
-              <a:t>Late binding</a:t>
-            </a:r>
-          </a:p>
-          <a:p>
-            <a:endParaRPr lang="en-US" dirty="0"/>
-          </a:p>
-          <a:p>
-            <a:r>
-              <a:rPr lang="en-US" dirty="0" smtClean="0"/>
-              <a:t>Examples ? </a:t>
-            </a:r>
-          </a:p>
-          <a:p>
-            <a:endParaRPr lang="en-US" dirty="0"/>
+        </p:txBody>
+      </p:sp>
+      <p:sp>
+        <p:nvSpPr>
+          <p:cNvPr id="4" name="TextBox 3"/>
+          <p:cNvSpPr txBox="1"/>
+          <p:nvPr/>
+        </p:nvSpPr>
+        <p:spPr>
+          <a:xfrm>
+            <a:off x="-396552" y="536269"/>
+            <a:ext cx="10297144" cy="5755422"/>
+          </a:xfrm>
+          <a:prstGeom prst="rect">
+            <a:avLst/>
+          </a:prstGeom>
+          <a:solidFill>
+            <a:schemeClr val="bg1"/>
+          </a:solidFill>
+          <a:ln>
+            <a:solidFill>
+              <a:schemeClr val="accent1"/>
+            </a:solidFill>
+          </a:ln>
+        </p:spPr>
+        <p:txBody>
+          <a:bodyPr wrap="square" rtlCol="0">
+            <a:spAutoFit/>
+          </a:bodyPr>
+          <a:lstStyle/>
+          <a:p>
+            <a:pPr>
+              <a:lnSpc>
+                <a:spcPct val="115000"/>
+              </a:lnSpc>
+              <a:spcAft>
+                <a:spcPts val="0"/>
+              </a:spcAft>
+            </a:pPr>
+            <a:r>
+              <a:rPr lang="en-US" sz="1600" dirty="0">
+                <a:solidFill>
+                  <a:srgbClr val="0000FF"/>
+                </a:solidFill>
+                <a:highlight>
+                  <a:srgbClr val="FFFFFF"/>
+                </a:highlight>
+                <a:latin typeface="Consolas"/>
+                <a:ea typeface="Calibri"/>
+                <a:cs typeface="Times New Roman"/>
+              </a:rPr>
+              <a:t>public</a:t>
+            </a:r>
+            <a:r>
+              <a:rPr lang="en-US" sz="1600" dirty="0">
+                <a:solidFill>
+                  <a:srgbClr val="000000"/>
+                </a:solidFill>
+                <a:highlight>
+                  <a:srgbClr val="FFFFFF"/>
+                </a:highlight>
+                <a:latin typeface="Consolas"/>
+                <a:ea typeface="Calibri"/>
+                <a:cs typeface="Times New Roman"/>
+              </a:rPr>
+              <a:t> </a:t>
+            </a:r>
+            <a:r>
+              <a:rPr lang="en-US" sz="1600" dirty="0">
+                <a:solidFill>
+                  <a:srgbClr val="0000FF"/>
+                </a:solidFill>
+                <a:highlight>
+                  <a:srgbClr val="FFFFFF"/>
+                </a:highlight>
+                <a:latin typeface="Consolas"/>
+                <a:ea typeface="Calibri"/>
+                <a:cs typeface="Times New Roman"/>
+              </a:rPr>
+              <a:t>class</a:t>
+            </a:r>
+            <a:r>
+              <a:rPr lang="en-US" sz="1600" dirty="0">
+                <a:solidFill>
+                  <a:srgbClr val="000000"/>
+                </a:solidFill>
+                <a:highlight>
+                  <a:srgbClr val="FFFFFF"/>
+                </a:highlight>
+                <a:latin typeface="Consolas"/>
+                <a:ea typeface="Calibri"/>
+                <a:cs typeface="Times New Roman"/>
+              </a:rPr>
+              <a:t> </a:t>
+            </a:r>
+            <a:r>
+              <a:rPr lang="en-US" sz="1600" dirty="0" err="1">
+                <a:solidFill>
+                  <a:srgbClr val="2B91AF"/>
+                </a:solidFill>
+                <a:highlight>
+                  <a:srgbClr val="FFFFFF"/>
+                </a:highlight>
+                <a:latin typeface="Consolas"/>
+                <a:ea typeface="Calibri"/>
+                <a:cs typeface="Times New Roman"/>
+              </a:rPr>
+              <a:t>AppCompositionRoot</a:t>
+            </a:r>
+            <a:r>
+              <a:rPr lang="en-US" sz="1600" dirty="0">
+                <a:solidFill>
+                  <a:srgbClr val="000000"/>
+                </a:solidFill>
+                <a:highlight>
+                  <a:srgbClr val="FFFFFF"/>
+                </a:highlight>
+                <a:latin typeface="Consolas"/>
+                <a:ea typeface="Calibri"/>
+                <a:cs typeface="Times New Roman"/>
+              </a:rPr>
+              <a:t> : </a:t>
+            </a:r>
+            <a:r>
+              <a:rPr lang="en-US" sz="1600" dirty="0" err="1">
+                <a:solidFill>
+                  <a:srgbClr val="2B91AF"/>
+                </a:solidFill>
+                <a:highlight>
+                  <a:srgbClr val="FFFFFF"/>
+                </a:highlight>
+                <a:latin typeface="Consolas"/>
+                <a:ea typeface="Calibri"/>
+                <a:cs typeface="Times New Roman"/>
+              </a:rPr>
+              <a:t>DefaultControllerFactory</a:t>
+            </a:r>
+            <a:endParaRPr lang="en-US" sz="2000" dirty="0">
+              <a:ea typeface="Calibri"/>
+              <a:cs typeface="Times New Roman"/>
+            </a:endParaRPr>
+          </a:p>
+          <a:p>
+            <a:pPr>
+              <a:lnSpc>
+                <a:spcPct val="115000"/>
+              </a:lnSpc>
+              <a:spcAft>
+                <a:spcPts val="0"/>
+              </a:spcAft>
+            </a:pPr>
+            <a:r>
+              <a:rPr lang="en-US" sz="1600" dirty="0">
+                <a:solidFill>
+                  <a:srgbClr val="000000"/>
+                </a:solidFill>
+                <a:highlight>
+                  <a:srgbClr val="FFFFFF"/>
+                </a:highlight>
+                <a:latin typeface="Consolas"/>
+                <a:ea typeface="Calibri"/>
+                <a:cs typeface="Times New Roman"/>
+              </a:rPr>
+              <a:t>    {</a:t>
+            </a:r>
+            <a:endParaRPr lang="en-US" sz="2000" dirty="0">
+              <a:ea typeface="Calibri"/>
+              <a:cs typeface="Times New Roman"/>
+            </a:endParaRPr>
+          </a:p>
+          <a:p>
+            <a:pPr>
+              <a:lnSpc>
+                <a:spcPct val="115000"/>
+              </a:lnSpc>
+              <a:spcAft>
+                <a:spcPts val="0"/>
+              </a:spcAft>
+            </a:pPr>
+            <a:r>
+              <a:rPr lang="en-US" sz="1600" dirty="0">
+                <a:solidFill>
+                  <a:srgbClr val="000000"/>
+                </a:solidFill>
+                <a:highlight>
+                  <a:srgbClr val="FFFFFF"/>
+                </a:highlight>
+                <a:latin typeface="Consolas"/>
+                <a:ea typeface="Calibri"/>
+                <a:cs typeface="Times New Roman"/>
+              </a:rPr>
+              <a:t>        </a:t>
+            </a:r>
+            <a:r>
+              <a:rPr lang="en-US" sz="1600" dirty="0">
+                <a:solidFill>
+                  <a:srgbClr val="0000FF"/>
+                </a:solidFill>
+                <a:highlight>
+                  <a:srgbClr val="FFFFFF"/>
+                </a:highlight>
+                <a:latin typeface="Consolas"/>
+                <a:ea typeface="Calibri"/>
+                <a:cs typeface="Times New Roman"/>
+              </a:rPr>
+              <a:t>protected</a:t>
+            </a:r>
+            <a:r>
+              <a:rPr lang="en-US" sz="1600" dirty="0">
+                <a:solidFill>
+                  <a:srgbClr val="000000"/>
+                </a:solidFill>
+                <a:highlight>
+                  <a:srgbClr val="FFFFFF"/>
+                </a:highlight>
+                <a:latin typeface="Consolas"/>
+                <a:ea typeface="Calibri"/>
+                <a:cs typeface="Times New Roman"/>
+              </a:rPr>
+              <a:t> </a:t>
+            </a:r>
+            <a:r>
+              <a:rPr lang="en-US" sz="1600" dirty="0">
+                <a:solidFill>
+                  <a:srgbClr val="0000FF"/>
+                </a:solidFill>
+                <a:highlight>
+                  <a:srgbClr val="FFFFFF"/>
+                </a:highlight>
+                <a:latin typeface="Consolas"/>
+                <a:ea typeface="Calibri"/>
+                <a:cs typeface="Times New Roman"/>
+              </a:rPr>
+              <a:t>override</a:t>
+            </a:r>
+            <a:r>
+              <a:rPr lang="en-US" sz="1600" dirty="0">
+                <a:solidFill>
+                  <a:srgbClr val="000000"/>
+                </a:solidFill>
+                <a:highlight>
+                  <a:srgbClr val="FFFFFF"/>
+                </a:highlight>
+                <a:latin typeface="Consolas"/>
+                <a:ea typeface="Calibri"/>
+                <a:cs typeface="Times New Roman"/>
+              </a:rPr>
+              <a:t> </a:t>
+            </a:r>
+            <a:r>
+              <a:rPr lang="en-US" sz="1600" dirty="0" err="1">
+                <a:solidFill>
+                  <a:srgbClr val="2B91AF"/>
+                </a:solidFill>
+                <a:highlight>
+                  <a:srgbClr val="FFFFFF"/>
+                </a:highlight>
+                <a:latin typeface="Consolas"/>
+                <a:ea typeface="Calibri"/>
+                <a:cs typeface="Times New Roman"/>
+              </a:rPr>
+              <a:t>IController</a:t>
+            </a:r>
+            <a:r>
+              <a:rPr lang="en-US" sz="1600" dirty="0">
+                <a:solidFill>
+                  <a:srgbClr val="000000"/>
+                </a:solidFill>
+                <a:highlight>
+                  <a:srgbClr val="FFFFFF"/>
+                </a:highlight>
+                <a:latin typeface="Consolas"/>
+                <a:ea typeface="Calibri"/>
+                <a:cs typeface="Times New Roman"/>
+              </a:rPr>
+              <a:t> </a:t>
+            </a:r>
+            <a:r>
+              <a:rPr lang="en-US" sz="1600" dirty="0" err="1">
+                <a:solidFill>
+                  <a:srgbClr val="000000"/>
+                </a:solidFill>
+                <a:highlight>
+                  <a:srgbClr val="FFFFFF"/>
+                </a:highlight>
+                <a:latin typeface="Consolas"/>
+                <a:ea typeface="Calibri"/>
+                <a:cs typeface="Times New Roman"/>
+              </a:rPr>
+              <a:t>GetControllerInstance</a:t>
+            </a:r>
+            <a:r>
+              <a:rPr lang="en-US" sz="1600" dirty="0">
+                <a:solidFill>
+                  <a:srgbClr val="000000"/>
+                </a:solidFill>
+                <a:highlight>
+                  <a:srgbClr val="FFFFFF"/>
+                </a:highlight>
+                <a:latin typeface="Consolas"/>
+                <a:ea typeface="Calibri"/>
+                <a:cs typeface="Times New Roman"/>
+              </a:rPr>
+              <a:t>(</a:t>
+            </a:r>
+            <a:r>
+              <a:rPr lang="en-US" sz="1600" dirty="0" err="1">
+                <a:solidFill>
+                  <a:srgbClr val="2B91AF"/>
+                </a:solidFill>
+                <a:highlight>
+                  <a:srgbClr val="FFFFFF"/>
+                </a:highlight>
+                <a:latin typeface="Consolas"/>
+                <a:ea typeface="Calibri"/>
+                <a:cs typeface="Times New Roman"/>
+              </a:rPr>
+              <a:t>RequestContext</a:t>
+            </a:r>
+            <a:r>
+              <a:rPr lang="en-US" sz="1600" dirty="0">
+                <a:solidFill>
+                  <a:srgbClr val="000000"/>
+                </a:solidFill>
+                <a:highlight>
+                  <a:srgbClr val="FFFFFF"/>
+                </a:highlight>
+                <a:latin typeface="Consolas"/>
+                <a:ea typeface="Calibri"/>
+                <a:cs typeface="Times New Roman"/>
+              </a:rPr>
+              <a:t> </a:t>
+            </a:r>
+            <a:r>
+              <a:rPr lang="en-US" sz="1600" dirty="0" err="1">
+                <a:solidFill>
+                  <a:srgbClr val="000000"/>
+                </a:solidFill>
+                <a:highlight>
+                  <a:srgbClr val="FFFFFF"/>
+                </a:highlight>
+                <a:latin typeface="Consolas"/>
+                <a:ea typeface="Calibri"/>
+                <a:cs typeface="Times New Roman"/>
+              </a:rPr>
+              <a:t>requestContext</a:t>
+            </a:r>
+            <a:r>
+              <a:rPr lang="en-US" sz="1600" dirty="0">
+                <a:solidFill>
+                  <a:srgbClr val="000000"/>
+                </a:solidFill>
+                <a:highlight>
+                  <a:srgbClr val="FFFFFF"/>
+                </a:highlight>
+                <a:latin typeface="Consolas"/>
+                <a:ea typeface="Calibri"/>
+                <a:cs typeface="Times New Roman"/>
+              </a:rPr>
+              <a:t>, </a:t>
+            </a:r>
+            <a:endParaRPr lang="en-US" sz="1600" dirty="0" smtClean="0">
+              <a:solidFill>
+                <a:srgbClr val="000000"/>
+              </a:solidFill>
+              <a:highlight>
+                <a:srgbClr val="FFFFFF"/>
+              </a:highlight>
+              <a:latin typeface="Consolas"/>
+              <a:ea typeface="Calibri"/>
+              <a:cs typeface="Times New Roman"/>
+            </a:endParaRPr>
+          </a:p>
+          <a:p>
+            <a:pPr>
+              <a:lnSpc>
+                <a:spcPct val="115000"/>
+              </a:lnSpc>
+              <a:spcAft>
+                <a:spcPts val="0"/>
+              </a:spcAft>
+            </a:pPr>
+            <a:r>
+              <a:rPr lang="en-US" sz="1600" dirty="0">
+                <a:solidFill>
+                  <a:srgbClr val="000000"/>
+                </a:solidFill>
+                <a:highlight>
+                  <a:srgbClr val="FFFFFF"/>
+                </a:highlight>
+                <a:latin typeface="Consolas"/>
+                <a:ea typeface="Calibri"/>
+                <a:cs typeface="Times New Roman"/>
+              </a:rPr>
+              <a:t>	</a:t>
+            </a:r>
+            <a:r>
+              <a:rPr lang="en-US" sz="1600" dirty="0" smtClean="0">
+                <a:solidFill>
+                  <a:srgbClr val="000000"/>
+                </a:solidFill>
+                <a:highlight>
+                  <a:srgbClr val="FFFFFF"/>
+                </a:highlight>
+                <a:latin typeface="Consolas"/>
+                <a:ea typeface="Calibri"/>
+                <a:cs typeface="Times New Roman"/>
+              </a:rPr>
+              <a:t>						   </a:t>
+            </a:r>
+            <a:r>
+              <a:rPr lang="en-US" sz="1600" dirty="0" smtClean="0">
+                <a:solidFill>
+                  <a:srgbClr val="2B91AF"/>
+                </a:solidFill>
+                <a:highlight>
+                  <a:srgbClr val="FFFFFF"/>
+                </a:highlight>
+                <a:latin typeface="Consolas"/>
+                <a:ea typeface="Calibri"/>
+                <a:cs typeface="Times New Roman"/>
+              </a:rPr>
+              <a:t>Type</a:t>
+            </a:r>
+            <a:r>
+              <a:rPr lang="en-US" sz="1600" dirty="0" smtClean="0">
+                <a:solidFill>
+                  <a:srgbClr val="000000"/>
+                </a:solidFill>
+                <a:highlight>
+                  <a:srgbClr val="FFFFFF"/>
+                </a:highlight>
+                <a:latin typeface="Consolas"/>
+                <a:ea typeface="Calibri"/>
+                <a:cs typeface="Times New Roman"/>
+              </a:rPr>
+              <a:t> </a:t>
+            </a:r>
+            <a:r>
+              <a:rPr lang="en-US" sz="1600" dirty="0" err="1">
+                <a:solidFill>
+                  <a:srgbClr val="000000"/>
+                </a:solidFill>
+                <a:highlight>
+                  <a:srgbClr val="FFFFFF"/>
+                </a:highlight>
+                <a:latin typeface="Consolas"/>
+                <a:ea typeface="Calibri"/>
+                <a:cs typeface="Times New Roman"/>
+              </a:rPr>
+              <a:t>controllerType</a:t>
+            </a:r>
+            <a:r>
+              <a:rPr lang="en-US" sz="1600" dirty="0">
+                <a:solidFill>
+                  <a:srgbClr val="000000"/>
+                </a:solidFill>
+                <a:highlight>
+                  <a:srgbClr val="FFFFFF"/>
+                </a:highlight>
+                <a:latin typeface="Consolas"/>
+                <a:ea typeface="Calibri"/>
+                <a:cs typeface="Times New Roman"/>
+              </a:rPr>
+              <a:t>)</a:t>
+            </a:r>
+            <a:endParaRPr lang="en-US" sz="2000" dirty="0">
+              <a:ea typeface="Calibri"/>
+              <a:cs typeface="Times New Roman"/>
+            </a:endParaRPr>
+          </a:p>
+          <a:p>
+            <a:pPr>
+              <a:lnSpc>
+                <a:spcPct val="115000"/>
+              </a:lnSpc>
+              <a:spcAft>
+                <a:spcPts val="0"/>
+              </a:spcAft>
+            </a:pPr>
+            <a:r>
+              <a:rPr lang="en-US" sz="1600" dirty="0">
+                <a:solidFill>
+                  <a:srgbClr val="000000"/>
+                </a:solidFill>
+                <a:highlight>
+                  <a:srgbClr val="FFFFFF"/>
+                </a:highlight>
+                <a:latin typeface="Consolas"/>
+                <a:ea typeface="Calibri"/>
+                <a:cs typeface="Times New Roman"/>
+              </a:rPr>
+              <a:t>        {</a:t>
+            </a:r>
+            <a:endParaRPr lang="en-US" sz="2000" dirty="0">
+              <a:ea typeface="Calibri"/>
+              <a:cs typeface="Times New Roman"/>
+            </a:endParaRPr>
+          </a:p>
+          <a:p>
+            <a:pPr>
+              <a:lnSpc>
+                <a:spcPct val="115000"/>
+              </a:lnSpc>
+              <a:spcAft>
+                <a:spcPts val="0"/>
+              </a:spcAft>
+            </a:pPr>
+            <a:r>
+              <a:rPr lang="en-US" sz="1600" dirty="0">
+                <a:solidFill>
+                  <a:srgbClr val="000000"/>
+                </a:solidFill>
+                <a:highlight>
+                  <a:srgbClr val="FFFFFF"/>
+                </a:highlight>
+                <a:latin typeface="Consolas"/>
+                <a:ea typeface="Calibri"/>
+                <a:cs typeface="Times New Roman"/>
+              </a:rPr>
+              <a:t>            </a:t>
+            </a:r>
+            <a:r>
+              <a:rPr lang="en-US" sz="1600" dirty="0">
+                <a:solidFill>
+                  <a:srgbClr val="008000"/>
+                </a:solidFill>
+                <a:highlight>
+                  <a:srgbClr val="FFFFFF"/>
+                </a:highlight>
+                <a:latin typeface="Consolas"/>
+                <a:ea typeface="Calibri"/>
+                <a:cs typeface="Times New Roman"/>
+              </a:rPr>
+              <a:t>// how to compose an </a:t>
+            </a:r>
+            <a:r>
+              <a:rPr lang="en-US" sz="1600" dirty="0" err="1">
+                <a:solidFill>
+                  <a:srgbClr val="008000"/>
+                </a:solidFill>
+                <a:highlight>
+                  <a:srgbClr val="FFFFFF"/>
+                </a:highlight>
+                <a:latin typeface="Consolas"/>
+                <a:ea typeface="Calibri"/>
+                <a:cs typeface="Times New Roman"/>
+              </a:rPr>
+              <a:t>AccountController</a:t>
+            </a:r>
+            <a:r>
+              <a:rPr lang="en-US" sz="1600" dirty="0">
+                <a:solidFill>
+                  <a:srgbClr val="008000"/>
+                </a:solidFill>
+                <a:highlight>
+                  <a:srgbClr val="FFFFFF"/>
+                </a:highlight>
+                <a:latin typeface="Consolas"/>
+                <a:ea typeface="Calibri"/>
+                <a:cs typeface="Times New Roman"/>
+              </a:rPr>
+              <a:t> ?</a:t>
+            </a:r>
+            <a:endParaRPr lang="en-US" sz="2000" dirty="0">
+              <a:ea typeface="Calibri"/>
+              <a:cs typeface="Times New Roman"/>
+            </a:endParaRPr>
+          </a:p>
+          <a:p>
+            <a:pPr>
+              <a:lnSpc>
+                <a:spcPct val="115000"/>
+              </a:lnSpc>
+              <a:spcAft>
+                <a:spcPts val="0"/>
+              </a:spcAft>
+            </a:pPr>
+            <a:r>
+              <a:rPr lang="en-US" sz="1600" dirty="0">
+                <a:solidFill>
+                  <a:srgbClr val="000000"/>
+                </a:solidFill>
+                <a:highlight>
+                  <a:srgbClr val="FFFFFF"/>
+                </a:highlight>
+                <a:latin typeface="Consolas"/>
+                <a:ea typeface="Calibri"/>
+                <a:cs typeface="Times New Roman"/>
+              </a:rPr>
+              <a:t>            </a:t>
+            </a:r>
+            <a:r>
+              <a:rPr lang="en-US" sz="1600" dirty="0">
+                <a:solidFill>
+                  <a:srgbClr val="0000FF"/>
+                </a:solidFill>
+                <a:highlight>
+                  <a:srgbClr val="FFFFFF"/>
+                </a:highlight>
+                <a:latin typeface="Consolas"/>
+                <a:ea typeface="Calibri"/>
+                <a:cs typeface="Times New Roman"/>
+              </a:rPr>
+              <a:t>if</a:t>
+            </a:r>
+            <a:r>
+              <a:rPr lang="en-US" sz="1600" dirty="0">
+                <a:solidFill>
+                  <a:srgbClr val="000000"/>
+                </a:solidFill>
+                <a:highlight>
+                  <a:srgbClr val="FFFFFF"/>
+                </a:highlight>
+                <a:latin typeface="Consolas"/>
+                <a:ea typeface="Calibri"/>
+                <a:cs typeface="Times New Roman"/>
+              </a:rPr>
+              <a:t> (</a:t>
+            </a:r>
+            <a:r>
+              <a:rPr lang="en-US" sz="1600" dirty="0" err="1">
+                <a:solidFill>
+                  <a:srgbClr val="000000"/>
+                </a:solidFill>
+                <a:highlight>
+                  <a:srgbClr val="FFFFFF"/>
+                </a:highlight>
+                <a:latin typeface="Consolas"/>
+                <a:ea typeface="Calibri"/>
+                <a:cs typeface="Times New Roman"/>
+              </a:rPr>
+              <a:t>controllerType</a:t>
+            </a:r>
+            <a:r>
+              <a:rPr lang="en-US" sz="1600" dirty="0">
+                <a:solidFill>
+                  <a:srgbClr val="000000"/>
+                </a:solidFill>
+                <a:highlight>
+                  <a:srgbClr val="FFFFFF"/>
+                </a:highlight>
+                <a:latin typeface="Consolas"/>
+                <a:ea typeface="Calibri"/>
+                <a:cs typeface="Times New Roman"/>
+              </a:rPr>
+              <a:t> == </a:t>
+            </a:r>
+            <a:r>
+              <a:rPr lang="en-US" sz="1600" dirty="0" err="1">
+                <a:solidFill>
+                  <a:srgbClr val="0000FF"/>
+                </a:solidFill>
+                <a:highlight>
+                  <a:srgbClr val="FFFFFF"/>
+                </a:highlight>
+                <a:latin typeface="Consolas"/>
+                <a:ea typeface="Calibri"/>
+                <a:cs typeface="Times New Roman"/>
+              </a:rPr>
+              <a:t>typeof</a:t>
+            </a:r>
+            <a:r>
+              <a:rPr lang="en-US" sz="1600" dirty="0">
+                <a:solidFill>
+                  <a:srgbClr val="000000"/>
+                </a:solidFill>
+                <a:highlight>
+                  <a:srgbClr val="FFFFFF"/>
+                </a:highlight>
+                <a:latin typeface="Consolas"/>
+                <a:ea typeface="Calibri"/>
+                <a:cs typeface="Times New Roman"/>
+              </a:rPr>
+              <a:t>(</a:t>
+            </a:r>
+            <a:r>
+              <a:rPr lang="en-US" sz="1600" dirty="0" err="1">
+                <a:solidFill>
+                  <a:srgbClr val="2B91AF"/>
+                </a:solidFill>
+                <a:highlight>
+                  <a:srgbClr val="FFFFFF"/>
+                </a:highlight>
+                <a:latin typeface="Consolas"/>
+                <a:ea typeface="Calibri"/>
+                <a:cs typeface="Times New Roman"/>
+              </a:rPr>
+              <a:t>AccountController</a:t>
+            </a:r>
+            <a:r>
+              <a:rPr lang="en-US" sz="1600" dirty="0">
+                <a:solidFill>
+                  <a:srgbClr val="000000"/>
+                </a:solidFill>
+                <a:highlight>
+                  <a:srgbClr val="FFFFFF"/>
+                </a:highlight>
+                <a:latin typeface="Consolas"/>
+                <a:ea typeface="Calibri"/>
+                <a:cs typeface="Times New Roman"/>
+              </a:rPr>
+              <a:t>))</a:t>
+            </a:r>
+            <a:endParaRPr lang="en-US" sz="2000" dirty="0">
+              <a:ea typeface="Calibri"/>
+              <a:cs typeface="Times New Roman"/>
+            </a:endParaRPr>
+          </a:p>
+          <a:p>
+            <a:pPr>
+              <a:lnSpc>
+                <a:spcPct val="115000"/>
+              </a:lnSpc>
+              <a:spcAft>
+                <a:spcPts val="0"/>
+              </a:spcAft>
+            </a:pPr>
+            <a:r>
+              <a:rPr lang="en-US" sz="1600" dirty="0">
+                <a:solidFill>
+                  <a:srgbClr val="000000"/>
+                </a:solidFill>
+                <a:highlight>
+                  <a:srgbClr val="FFFFFF"/>
+                </a:highlight>
+                <a:latin typeface="Consolas"/>
+                <a:ea typeface="Calibri"/>
+                <a:cs typeface="Times New Roman"/>
+              </a:rPr>
+              <a:t>            {</a:t>
+            </a:r>
+            <a:endParaRPr lang="en-US" sz="2000" dirty="0">
+              <a:ea typeface="Calibri"/>
+              <a:cs typeface="Times New Roman"/>
+            </a:endParaRPr>
+          </a:p>
+          <a:p>
+            <a:pPr>
+              <a:lnSpc>
+                <a:spcPct val="115000"/>
+              </a:lnSpc>
+              <a:spcAft>
+                <a:spcPts val="0"/>
+              </a:spcAft>
+            </a:pPr>
+            <a:r>
+              <a:rPr lang="en-US" sz="1600" dirty="0">
+                <a:solidFill>
+                  <a:srgbClr val="000000"/>
+                </a:solidFill>
+                <a:highlight>
+                  <a:srgbClr val="FFFFFF"/>
+                </a:highlight>
+                <a:latin typeface="Consolas"/>
+                <a:ea typeface="Calibri"/>
+                <a:cs typeface="Times New Roman"/>
+              </a:rPr>
+              <a:t>                </a:t>
+            </a:r>
+            <a:r>
+              <a:rPr lang="en-US" sz="1600" dirty="0" err="1">
+                <a:solidFill>
+                  <a:srgbClr val="0000FF"/>
+                </a:solidFill>
+                <a:highlight>
+                  <a:srgbClr val="FFFFFF"/>
+                </a:highlight>
+                <a:latin typeface="Consolas"/>
+                <a:ea typeface="Calibri"/>
+                <a:cs typeface="Times New Roman"/>
+              </a:rPr>
+              <a:t>var</a:t>
+            </a:r>
+            <a:r>
+              <a:rPr lang="en-US" sz="1600" dirty="0">
+                <a:solidFill>
+                  <a:srgbClr val="000000"/>
+                </a:solidFill>
+                <a:highlight>
+                  <a:srgbClr val="FFFFFF"/>
+                </a:highlight>
+                <a:latin typeface="Consolas"/>
+                <a:ea typeface="Calibri"/>
+                <a:cs typeface="Times New Roman"/>
+              </a:rPr>
+              <a:t> </a:t>
+            </a:r>
+            <a:r>
+              <a:rPr lang="en-US" sz="1600" dirty="0" err="1">
+                <a:solidFill>
+                  <a:srgbClr val="000000"/>
+                </a:solidFill>
+                <a:highlight>
+                  <a:srgbClr val="FFFFFF"/>
+                </a:highlight>
+                <a:latin typeface="Consolas"/>
+                <a:ea typeface="Calibri"/>
+                <a:cs typeface="Times New Roman"/>
+              </a:rPr>
+              <a:t>connectionString</a:t>
+            </a:r>
+            <a:r>
+              <a:rPr lang="en-US" sz="1600" dirty="0">
+                <a:solidFill>
+                  <a:srgbClr val="000000"/>
+                </a:solidFill>
+                <a:highlight>
+                  <a:srgbClr val="FFFFFF"/>
+                </a:highlight>
+                <a:latin typeface="Consolas"/>
+                <a:ea typeface="Calibri"/>
+                <a:cs typeface="Times New Roman"/>
+              </a:rPr>
+              <a:t> = </a:t>
+            </a:r>
+            <a:r>
+              <a:rPr lang="en-US" sz="1600" dirty="0" err="1" smtClean="0">
+                <a:solidFill>
+                  <a:srgbClr val="2B91AF"/>
+                </a:solidFill>
+                <a:highlight>
+                  <a:srgbClr val="FFFFFF"/>
+                </a:highlight>
+                <a:latin typeface="Consolas"/>
+                <a:ea typeface="Calibri"/>
+                <a:cs typeface="Times New Roman"/>
+              </a:rPr>
+              <a:t>ConfigurationManager</a:t>
+            </a:r>
+            <a:endParaRPr lang="en-US" sz="1600" dirty="0" smtClean="0">
+              <a:solidFill>
+                <a:srgbClr val="2B91AF"/>
+              </a:solidFill>
+              <a:highlight>
+                <a:srgbClr val="FFFFFF"/>
+              </a:highlight>
+              <a:latin typeface="Consolas"/>
+              <a:ea typeface="Calibri"/>
+              <a:cs typeface="Times New Roman"/>
+            </a:endParaRPr>
+          </a:p>
+          <a:p>
+            <a:pPr>
+              <a:lnSpc>
+                <a:spcPct val="115000"/>
+              </a:lnSpc>
+              <a:spcAft>
+                <a:spcPts val="0"/>
+              </a:spcAft>
+            </a:pPr>
+            <a:r>
+              <a:rPr lang="en-US" sz="1600" dirty="0">
+                <a:solidFill>
+                  <a:srgbClr val="2B91AF"/>
+                </a:solidFill>
+                <a:highlight>
+                  <a:srgbClr val="FFFFFF"/>
+                </a:highlight>
+                <a:latin typeface="Consolas"/>
+                <a:ea typeface="Calibri"/>
+                <a:cs typeface="Times New Roman"/>
+              </a:rPr>
+              <a:t>		</a:t>
+            </a:r>
+            <a:r>
+              <a:rPr lang="en-US" sz="1600" dirty="0" smtClean="0">
+                <a:solidFill>
+                  <a:srgbClr val="2B91AF"/>
+                </a:solidFill>
+                <a:highlight>
+                  <a:srgbClr val="FFFFFF"/>
+                </a:highlight>
+                <a:latin typeface="Consolas"/>
+                <a:ea typeface="Calibri"/>
+                <a:cs typeface="Times New Roman"/>
+              </a:rPr>
+              <a:t>    </a:t>
+            </a:r>
+            <a:r>
+              <a:rPr lang="en-US" sz="1600" dirty="0" smtClean="0">
+                <a:solidFill>
+                  <a:srgbClr val="000000"/>
+                </a:solidFill>
+                <a:highlight>
+                  <a:srgbClr val="FFFFFF"/>
+                </a:highlight>
+                <a:latin typeface="Consolas"/>
+                <a:ea typeface="Calibri"/>
+                <a:cs typeface="Times New Roman"/>
+              </a:rPr>
+              <a:t>.</a:t>
+            </a:r>
+            <a:r>
+              <a:rPr lang="en-US" sz="1600" dirty="0" err="1">
+                <a:solidFill>
+                  <a:srgbClr val="000000"/>
+                </a:solidFill>
+                <a:highlight>
+                  <a:srgbClr val="FFFFFF"/>
+                </a:highlight>
+                <a:latin typeface="Consolas"/>
+                <a:ea typeface="Calibri"/>
+                <a:cs typeface="Times New Roman"/>
+              </a:rPr>
+              <a:t>ConnectionStrings</a:t>
+            </a:r>
+            <a:r>
+              <a:rPr lang="en-US" sz="1600" dirty="0">
+                <a:solidFill>
+                  <a:srgbClr val="000000"/>
+                </a:solidFill>
+                <a:highlight>
+                  <a:srgbClr val="FFFFFF"/>
+                </a:highlight>
+                <a:latin typeface="Consolas"/>
+                <a:ea typeface="Calibri"/>
+                <a:cs typeface="Times New Roman"/>
+              </a:rPr>
+              <a:t>[</a:t>
+            </a:r>
+            <a:r>
+              <a:rPr lang="en-US" sz="1600" dirty="0">
+                <a:solidFill>
+                  <a:srgbClr val="A31515"/>
+                </a:solidFill>
+                <a:highlight>
+                  <a:srgbClr val="FFFFFF"/>
+                </a:highlight>
+                <a:latin typeface="Consolas"/>
+                <a:ea typeface="Calibri"/>
+                <a:cs typeface="Times New Roman"/>
+              </a:rPr>
+              <a:t>"</a:t>
+            </a:r>
+            <a:r>
+              <a:rPr lang="en-US" sz="1600" dirty="0" err="1">
+                <a:solidFill>
+                  <a:srgbClr val="A31515"/>
+                </a:solidFill>
+                <a:highlight>
+                  <a:srgbClr val="FFFFFF"/>
+                </a:highlight>
+                <a:latin typeface="Consolas"/>
+                <a:ea typeface="Calibri"/>
+                <a:cs typeface="Times New Roman"/>
+              </a:rPr>
+              <a:t>BankingDbContext</a:t>
+            </a:r>
+            <a:r>
+              <a:rPr lang="en-US" sz="1600" dirty="0" smtClean="0">
+                <a:solidFill>
+                  <a:srgbClr val="A31515"/>
+                </a:solidFill>
+                <a:highlight>
+                  <a:srgbClr val="FFFFFF"/>
+                </a:highlight>
+                <a:latin typeface="Consolas"/>
+                <a:ea typeface="Calibri"/>
+                <a:cs typeface="Times New Roman"/>
+              </a:rPr>
+              <a:t>"</a:t>
+            </a:r>
+            <a:r>
+              <a:rPr lang="en-US" sz="1600" dirty="0" smtClean="0">
+                <a:solidFill>
+                  <a:srgbClr val="000000"/>
+                </a:solidFill>
+                <a:highlight>
+                  <a:srgbClr val="FFFFFF"/>
+                </a:highlight>
+                <a:latin typeface="Consolas"/>
+                <a:ea typeface="Calibri"/>
+                <a:cs typeface="Times New Roman"/>
+              </a:rPr>
+              <a:t>].</a:t>
+            </a:r>
+            <a:r>
+              <a:rPr lang="en-US" sz="1600" dirty="0" err="1">
+                <a:solidFill>
+                  <a:srgbClr val="000000"/>
+                </a:solidFill>
+                <a:highlight>
+                  <a:srgbClr val="FFFFFF"/>
+                </a:highlight>
+                <a:latin typeface="Consolas"/>
+                <a:ea typeface="Calibri"/>
+                <a:cs typeface="Times New Roman"/>
+              </a:rPr>
+              <a:t>ConnectionString</a:t>
+            </a:r>
+            <a:r>
+              <a:rPr lang="en-US" sz="1600" dirty="0" smtClean="0">
+                <a:solidFill>
+                  <a:srgbClr val="000000"/>
+                </a:solidFill>
+                <a:highlight>
+                  <a:srgbClr val="FFFFFF"/>
+                </a:highlight>
+                <a:latin typeface="Consolas"/>
+                <a:ea typeface="Calibri"/>
+                <a:cs typeface="Times New Roman"/>
+              </a:rPr>
+              <a:t>;</a:t>
+            </a:r>
+            <a:endParaRPr lang="en-US" sz="2000" dirty="0">
+              <a:ea typeface="Calibri"/>
+              <a:cs typeface="Times New Roman"/>
+            </a:endParaRPr>
+          </a:p>
+          <a:p>
+            <a:pPr>
+              <a:lnSpc>
+                <a:spcPct val="115000"/>
+              </a:lnSpc>
+              <a:spcAft>
+                <a:spcPts val="0"/>
+              </a:spcAft>
+            </a:pPr>
+            <a:r>
+              <a:rPr lang="en-US" sz="1600" dirty="0">
+                <a:solidFill>
+                  <a:srgbClr val="000000"/>
+                </a:solidFill>
+                <a:highlight>
+                  <a:srgbClr val="FFFFFF"/>
+                </a:highlight>
+                <a:latin typeface="Consolas"/>
+                <a:ea typeface="Calibri"/>
+                <a:cs typeface="Times New Roman"/>
+              </a:rPr>
+              <a:t>                </a:t>
+            </a:r>
+            <a:r>
+              <a:rPr lang="en-US" sz="1600" dirty="0" err="1">
+                <a:solidFill>
+                  <a:srgbClr val="0000FF"/>
+                </a:solidFill>
+                <a:highlight>
+                  <a:srgbClr val="FFFFFF"/>
+                </a:highlight>
+                <a:latin typeface="Consolas"/>
+                <a:ea typeface="Calibri"/>
+                <a:cs typeface="Times New Roman"/>
+              </a:rPr>
+              <a:t>var</a:t>
+            </a:r>
+            <a:r>
+              <a:rPr lang="en-US" sz="1600" dirty="0">
+                <a:solidFill>
+                  <a:srgbClr val="000000"/>
+                </a:solidFill>
+                <a:highlight>
+                  <a:srgbClr val="FFFFFF"/>
+                </a:highlight>
+                <a:latin typeface="Consolas"/>
+                <a:ea typeface="Calibri"/>
+                <a:cs typeface="Times New Roman"/>
+              </a:rPr>
+              <a:t> repo = </a:t>
+            </a:r>
+            <a:r>
+              <a:rPr lang="en-US" sz="1600" dirty="0">
+                <a:solidFill>
+                  <a:srgbClr val="0000FF"/>
+                </a:solidFill>
+                <a:highlight>
+                  <a:srgbClr val="FFFFFF"/>
+                </a:highlight>
+                <a:latin typeface="Consolas"/>
+                <a:ea typeface="Calibri"/>
+                <a:cs typeface="Times New Roman"/>
+              </a:rPr>
+              <a:t>new</a:t>
+            </a:r>
+            <a:r>
+              <a:rPr lang="en-US" sz="1600" dirty="0">
+                <a:solidFill>
+                  <a:srgbClr val="000000"/>
+                </a:solidFill>
+                <a:highlight>
+                  <a:srgbClr val="FFFFFF"/>
+                </a:highlight>
+                <a:latin typeface="Consolas"/>
+                <a:ea typeface="Calibri"/>
+                <a:cs typeface="Times New Roman"/>
+              </a:rPr>
+              <a:t> </a:t>
+            </a:r>
+            <a:r>
+              <a:rPr lang="en-US" sz="1600" dirty="0" err="1">
+                <a:solidFill>
+                  <a:srgbClr val="2B91AF"/>
+                </a:solidFill>
+                <a:highlight>
+                  <a:srgbClr val="FFFFFF"/>
+                </a:highlight>
+                <a:latin typeface="Consolas"/>
+                <a:ea typeface="Calibri"/>
+                <a:cs typeface="Times New Roman"/>
+              </a:rPr>
+              <a:t>AccountRepository</a:t>
+            </a:r>
+            <a:r>
+              <a:rPr lang="en-US" sz="1600" dirty="0">
+                <a:solidFill>
+                  <a:srgbClr val="000000"/>
+                </a:solidFill>
+                <a:highlight>
+                  <a:srgbClr val="FFFFFF"/>
+                </a:highlight>
+                <a:latin typeface="Consolas"/>
+                <a:ea typeface="Calibri"/>
+                <a:cs typeface="Times New Roman"/>
+              </a:rPr>
+              <a:t>(</a:t>
+            </a:r>
+            <a:r>
+              <a:rPr lang="en-US" sz="1600" dirty="0" err="1">
+                <a:solidFill>
+                  <a:srgbClr val="000000"/>
+                </a:solidFill>
+                <a:highlight>
+                  <a:srgbClr val="FFFFFF"/>
+                </a:highlight>
+                <a:latin typeface="Consolas"/>
+                <a:ea typeface="Calibri"/>
+                <a:cs typeface="Times New Roman"/>
+              </a:rPr>
+              <a:t>connectionString</a:t>
+            </a:r>
+            <a:r>
+              <a:rPr lang="en-US" sz="1600" dirty="0" smtClean="0">
+                <a:solidFill>
+                  <a:srgbClr val="000000"/>
+                </a:solidFill>
+                <a:highlight>
+                  <a:srgbClr val="FFFFFF"/>
+                </a:highlight>
+                <a:latin typeface="Consolas"/>
+                <a:ea typeface="Calibri"/>
+                <a:cs typeface="Times New Roman"/>
+              </a:rPr>
+              <a:t>);</a:t>
+            </a:r>
+            <a:endParaRPr lang="en-US" sz="2000" dirty="0">
+              <a:ea typeface="Calibri"/>
+              <a:cs typeface="Times New Roman"/>
+            </a:endParaRPr>
+          </a:p>
+          <a:p>
+            <a:pPr>
+              <a:lnSpc>
+                <a:spcPct val="115000"/>
+              </a:lnSpc>
+              <a:spcAft>
+                <a:spcPts val="0"/>
+              </a:spcAft>
+            </a:pPr>
+            <a:r>
+              <a:rPr lang="en-US" sz="1600" dirty="0">
+                <a:solidFill>
+                  <a:srgbClr val="000000"/>
+                </a:solidFill>
+                <a:highlight>
+                  <a:srgbClr val="FFFFFF"/>
+                </a:highlight>
+                <a:latin typeface="Consolas"/>
+                <a:ea typeface="Calibri"/>
+                <a:cs typeface="Times New Roman"/>
+              </a:rPr>
+              <a:t>                </a:t>
+            </a:r>
+            <a:r>
+              <a:rPr lang="en-US" sz="1600" dirty="0" err="1">
+                <a:solidFill>
+                  <a:srgbClr val="0000FF"/>
+                </a:solidFill>
+                <a:highlight>
+                  <a:srgbClr val="FFFFFF"/>
+                </a:highlight>
+                <a:latin typeface="Consolas"/>
+                <a:ea typeface="Calibri"/>
+                <a:cs typeface="Times New Roman"/>
+              </a:rPr>
+              <a:t>var</a:t>
+            </a:r>
+            <a:r>
+              <a:rPr lang="en-US" sz="1600" dirty="0">
+                <a:solidFill>
+                  <a:srgbClr val="000000"/>
+                </a:solidFill>
+                <a:highlight>
+                  <a:srgbClr val="FFFFFF"/>
+                </a:highlight>
+                <a:latin typeface="Consolas"/>
+                <a:ea typeface="Calibri"/>
+                <a:cs typeface="Times New Roman"/>
+              </a:rPr>
+              <a:t> service = </a:t>
+            </a:r>
+            <a:r>
+              <a:rPr lang="en-US" sz="1600" dirty="0">
+                <a:solidFill>
+                  <a:srgbClr val="0000FF"/>
+                </a:solidFill>
+                <a:highlight>
+                  <a:srgbClr val="FFFFFF"/>
+                </a:highlight>
+                <a:latin typeface="Consolas"/>
+                <a:ea typeface="Calibri"/>
+                <a:cs typeface="Times New Roman"/>
+              </a:rPr>
+              <a:t>new</a:t>
+            </a:r>
+            <a:r>
+              <a:rPr lang="en-US" sz="1600" dirty="0">
+                <a:solidFill>
+                  <a:srgbClr val="000000"/>
+                </a:solidFill>
+                <a:highlight>
+                  <a:srgbClr val="FFFFFF"/>
+                </a:highlight>
+                <a:latin typeface="Consolas"/>
+                <a:ea typeface="Calibri"/>
+                <a:cs typeface="Times New Roman"/>
+              </a:rPr>
+              <a:t> </a:t>
+            </a:r>
+            <a:r>
+              <a:rPr lang="en-US" sz="1600" dirty="0" err="1">
+                <a:solidFill>
+                  <a:srgbClr val="2B91AF"/>
+                </a:solidFill>
+                <a:highlight>
+                  <a:srgbClr val="FFFFFF"/>
+                </a:highlight>
+                <a:latin typeface="Consolas"/>
+                <a:ea typeface="Calibri"/>
+                <a:cs typeface="Times New Roman"/>
+              </a:rPr>
+              <a:t>UserAccountService</a:t>
+            </a:r>
+            <a:r>
+              <a:rPr lang="en-US" sz="1600" dirty="0">
+                <a:solidFill>
+                  <a:srgbClr val="000000"/>
+                </a:solidFill>
+                <a:highlight>
+                  <a:srgbClr val="FFFFFF"/>
+                </a:highlight>
+                <a:latin typeface="Consolas"/>
+                <a:ea typeface="Calibri"/>
+                <a:cs typeface="Times New Roman"/>
+              </a:rPr>
+              <a:t>(repo);</a:t>
+            </a:r>
+            <a:endParaRPr lang="en-US" sz="2000" dirty="0">
+              <a:ea typeface="Calibri"/>
+              <a:cs typeface="Times New Roman"/>
+            </a:endParaRPr>
+          </a:p>
+          <a:p>
+            <a:pPr>
+              <a:lnSpc>
+                <a:spcPct val="115000"/>
+              </a:lnSpc>
+              <a:spcAft>
+                <a:spcPts val="0"/>
+              </a:spcAft>
+            </a:pPr>
+            <a:r>
+              <a:rPr lang="en-US" sz="1600" dirty="0">
+                <a:solidFill>
+                  <a:srgbClr val="000000"/>
+                </a:solidFill>
+                <a:highlight>
+                  <a:srgbClr val="FFFFFF"/>
+                </a:highlight>
+                <a:latin typeface="Consolas"/>
+                <a:ea typeface="Calibri"/>
+                <a:cs typeface="Times New Roman"/>
+              </a:rPr>
+              <a:t> </a:t>
+            </a:r>
+            <a:endParaRPr lang="en-US" sz="2000" dirty="0">
+              <a:ea typeface="Calibri"/>
+              <a:cs typeface="Times New Roman"/>
+            </a:endParaRPr>
+          </a:p>
+          <a:p>
+            <a:pPr>
+              <a:lnSpc>
+                <a:spcPct val="115000"/>
+              </a:lnSpc>
+              <a:spcAft>
+                <a:spcPts val="0"/>
+              </a:spcAft>
+            </a:pPr>
+            <a:r>
+              <a:rPr lang="en-US" sz="1600" dirty="0">
+                <a:solidFill>
+                  <a:srgbClr val="000000"/>
+                </a:solidFill>
+                <a:highlight>
+                  <a:srgbClr val="FFFFFF"/>
+                </a:highlight>
+                <a:latin typeface="Consolas"/>
+                <a:ea typeface="Calibri"/>
+                <a:cs typeface="Times New Roman"/>
+              </a:rPr>
+              <a:t>                </a:t>
+            </a:r>
+            <a:r>
+              <a:rPr lang="en-US" sz="1600" dirty="0">
+                <a:solidFill>
+                  <a:srgbClr val="0000FF"/>
+                </a:solidFill>
+                <a:highlight>
+                  <a:srgbClr val="FFFFFF"/>
+                </a:highlight>
+                <a:latin typeface="Consolas"/>
+                <a:ea typeface="Calibri"/>
+                <a:cs typeface="Times New Roman"/>
+              </a:rPr>
+              <a:t>return</a:t>
+            </a:r>
+            <a:r>
+              <a:rPr lang="en-US" sz="1600" dirty="0">
+                <a:solidFill>
+                  <a:srgbClr val="000000"/>
+                </a:solidFill>
+                <a:highlight>
+                  <a:srgbClr val="FFFFFF"/>
+                </a:highlight>
+                <a:latin typeface="Consolas"/>
+                <a:ea typeface="Calibri"/>
+                <a:cs typeface="Times New Roman"/>
+              </a:rPr>
+              <a:t> </a:t>
+            </a:r>
+            <a:r>
+              <a:rPr lang="en-US" sz="1600" dirty="0">
+                <a:solidFill>
+                  <a:srgbClr val="0000FF"/>
+                </a:solidFill>
+                <a:highlight>
+                  <a:srgbClr val="FFFFFF"/>
+                </a:highlight>
+                <a:latin typeface="Consolas"/>
+                <a:ea typeface="Calibri"/>
+                <a:cs typeface="Times New Roman"/>
+              </a:rPr>
+              <a:t>new</a:t>
+            </a:r>
+            <a:r>
+              <a:rPr lang="en-US" sz="1600" dirty="0">
+                <a:solidFill>
+                  <a:srgbClr val="000000"/>
+                </a:solidFill>
+                <a:highlight>
+                  <a:srgbClr val="FFFFFF"/>
+                </a:highlight>
+                <a:latin typeface="Consolas"/>
+                <a:ea typeface="Calibri"/>
+                <a:cs typeface="Times New Roman"/>
+              </a:rPr>
+              <a:t> </a:t>
+            </a:r>
+            <a:r>
+              <a:rPr lang="en-US" sz="1600" dirty="0" err="1">
+                <a:solidFill>
+                  <a:srgbClr val="2B91AF"/>
+                </a:solidFill>
+                <a:highlight>
+                  <a:srgbClr val="FFFFFF"/>
+                </a:highlight>
+                <a:latin typeface="Consolas"/>
+                <a:ea typeface="Calibri"/>
+                <a:cs typeface="Times New Roman"/>
+              </a:rPr>
+              <a:t>AccountController</a:t>
+            </a:r>
+            <a:r>
+              <a:rPr lang="en-US" sz="1600" dirty="0">
+                <a:solidFill>
+                  <a:srgbClr val="000000"/>
+                </a:solidFill>
+                <a:highlight>
+                  <a:srgbClr val="FFFFFF"/>
+                </a:highlight>
+                <a:latin typeface="Consolas"/>
+                <a:ea typeface="Calibri"/>
+                <a:cs typeface="Times New Roman"/>
+              </a:rPr>
+              <a:t>(service);</a:t>
+            </a:r>
+            <a:endParaRPr lang="en-US" sz="2000" dirty="0">
+              <a:ea typeface="Calibri"/>
+              <a:cs typeface="Times New Roman"/>
+            </a:endParaRPr>
+          </a:p>
+          <a:p>
+            <a:pPr>
+              <a:lnSpc>
+                <a:spcPct val="115000"/>
+              </a:lnSpc>
+              <a:spcAft>
+                <a:spcPts val="0"/>
+              </a:spcAft>
+            </a:pPr>
+            <a:r>
+              <a:rPr lang="en-US" sz="1600" dirty="0">
+                <a:solidFill>
+                  <a:srgbClr val="000000"/>
+                </a:solidFill>
+                <a:highlight>
+                  <a:srgbClr val="FFFFFF"/>
+                </a:highlight>
+                <a:latin typeface="Consolas"/>
+                <a:ea typeface="Calibri"/>
+                <a:cs typeface="Times New Roman"/>
+              </a:rPr>
+              <a:t>            }</a:t>
+            </a:r>
+            <a:endParaRPr lang="en-US" sz="2000" dirty="0">
+              <a:ea typeface="Calibri"/>
+              <a:cs typeface="Times New Roman"/>
+            </a:endParaRPr>
+          </a:p>
+          <a:p>
+            <a:pPr>
+              <a:lnSpc>
+                <a:spcPct val="115000"/>
+              </a:lnSpc>
+              <a:spcAft>
+                <a:spcPts val="0"/>
+              </a:spcAft>
+            </a:pPr>
+            <a:r>
+              <a:rPr lang="en-US" sz="1600" dirty="0">
+                <a:solidFill>
+                  <a:srgbClr val="000000"/>
+                </a:solidFill>
+                <a:highlight>
+                  <a:srgbClr val="FFFFFF"/>
+                </a:highlight>
+                <a:latin typeface="Consolas"/>
+                <a:ea typeface="Calibri"/>
+                <a:cs typeface="Times New Roman"/>
+              </a:rPr>
+              <a:t> </a:t>
+            </a:r>
+            <a:endParaRPr lang="en-US" sz="2000" dirty="0">
+              <a:ea typeface="Calibri"/>
+              <a:cs typeface="Times New Roman"/>
+            </a:endParaRPr>
+          </a:p>
+          <a:p>
+            <a:pPr>
+              <a:lnSpc>
+                <a:spcPct val="115000"/>
+              </a:lnSpc>
+              <a:spcAft>
+                <a:spcPts val="0"/>
+              </a:spcAft>
+            </a:pPr>
+            <a:r>
+              <a:rPr lang="en-US" sz="1600" dirty="0">
+                <a:solidFill>
+                  <a:srgbClr val="000000"/>
+                </a:solidFill>
+                <a:highlight>
+                  <a:srgbClr val="FFFFFF"/>
+                </a:highlight>
+                <a:latin typeface="Consolas"/>
+                <a:ea typeface="Calibri"/>
+                <a:cs typeface="Times New Roman"/>
+              </a:rPr>
+              <a:t>            </a:t>
+            </a:r>
+            <a:r>
+              <a:rPr lang="en-US" sz="1600" dirty="0">
+                <a:solidFill>
+                  <a:srgbClr val="008000"/>
+                </a:solidFill>
+                <a:highlight>
+                  <a:srgbClr val="FFFFFF"/>
+                </a:highlight>
+                <a:latin typeface="Consolas"/>
+                <a:ea typeface="Calibri"/>
+                <a:cs typeface="Times New Roman"/>
+              </a:rPr>
+              <a:t>// standard way in MVC to use default strategy</a:t>
+            </a:r>
+            <a:endParaRPr lang="en-US" sz="2000" dirty="0">
+              <a:ea typeface="Calibri"/>
+              <a:cs typeface="Times New Roman"/>
+            </a:endParaRPr>
+          </a:p>
+          <a:p>
+            <a:pPr>
+              <a:lnSpc>
+                <a:spcPct val="115000"/>
+              </a:lnSpc>
+              <a:spcAft>
+                <a:spcPts val="0"/>
+              </a:spcAft>
+            </a:pPr>
+            <a:r>
+              <a:rPr lang="en-US" sz="1600" dirty="0">
+                <a:solidFill>
+                  <a:srgbClr val="000000"/>
+                </a:solidFill>
+                <a:highlight>
+                  <a:srgbClr val="FFFFFF"/>
+                </a:highlight>
+                <a:latin typeface="Consolas"/>
+                <a:ea typeface="Calibri"/>
+                <a:cs typeface="Times New Roman"/>
+              </a:rPr>
+              <a:t>            </a:t>
+            </a:r>
+            <a:r>
+              <a:rPr lang="en-US" sz="1600" dirty="0">
+                <a:solidFill>
+                  <a:srgbClr val="0000FF"/>
+                </a:solidFill>
+                <a:highlight>
+                  <a:srgbClr val="FFFFFF"/>
+                </a:highlight>
+                <a:latin typeface="Consolas"/>
+                <a:ea typeface="Calibri"/>
+                <a:cs typeface="Times New Roman"/>
+              </a:rPr>
+              <a:t>return</a:t>
+            </a:r>
+            <a:r>
+              <a:rPr lang="en-US" sz="1600" dirty="0">
+                <a:solidFill>
+                  <a:srgbClr val="000000"/>
+                </a:solidFill>
+                <a:highlight>
+                  <a:srgbClr val="FFFFFF"/>
+                </a:highlight>
+                <a:latin typeface="Consolas"/>
+                <a:ea typeface="Calibri"/>
+                <a:cs typeface="Times New Roman"/>
+              </a:rPr>
+              <a:t> </a:t>
+            </a:r>
+            <a:r>
+              <a:rPr lang="en-US" sz="1600" dirty="0">
+                <a:solidFill>
+                  <a:srgbClr val="0000FF"/>
+                </a:solidFill>
+                <a:highlight>
+                  <a:srgbClr val="FFFFFF"/>
+                </a:highlight>
+                <a:latin typeface="Consolas"/>
+                <a:ea typeface="Calibri"/>
+                <a:cs typeface="Times New Roman"/>
+              </a:rPr>
+              <a:t>null</a:t>
+            </a:r>
+            <a:r>
+              <a:rPr lang="en-US" sz="1600" dirty="0">
+                <a:solidFill>
+                  <a:srgbClr val="000000"/>
+                </a:solidFill>
+                <a:highlight>
+                  <a:srgbClr val="FFFFFF"/>
+                </a:highlight>
+                <a:latin typeface="Consolas"/>
+                <a:ea typeface="Calibri"/>
+                <a:cs typeface="Times New Roman"/>
+              </a:rPr>
+              <a:t>;</a:t>
+            </a:r>
+            <a:endParaRPr lang="en-US" sz="2000" dirty="0">
+              <a:ea typeface="Calibri"/>
+              <a:cs typeface="Times New Roman"/>
+            </a:endParaRPr>
+          </a:p>
+          <a:p>
+            <a:pPr>
+              <a:lnSpc>
+                <a:spcPct val="115000"/>
+              </a:lnSpc>
+              <a:spcAft>
+                <a:spcPts val="0"/>
+              </a:spcAft>
+            </a:pPr>
+            <a:r>
+              <a:rPr lang="en-US" sz="1600" dirty="0">
+                <a:solidFill>
+                  <a:srgbClr val="000000"/>
+                </a:solidFill>
+                <a:highlight>
+                  <a:srgbClr val="FFFFFF"/>
+                </a:highlight>
+                <a:latin typeface="Consolas"/>
+                <a:ea typeface="Calibri"/>
+                <a:cs typeface="Times New Roman"/>
+              </a:rPr>
+              <a:t>        }</a:t>
+            </a:r>
+            <a:endParaRPr lang="en-US" sz="2000" dirty="0">
+              <a:ea typeface="Calibri"/>
+              <a:cs typeface="Times New Roman"/>
+            </a:endParaRPr>
+          </a:p>
+          <a:p>
+            <a:pPr>
+              <a:lnSpc>
+                <a:spcPct val="115000"/>
+              </a:lnSpc>
+              <a:spcAft>
+                <a:spcPts val="1000"/>
+              </a:spcAft>
+            </a:pPr>
+            <a:r>
+              <a:rPr lang="en-US" sz="1600" dirty="0">
+                <a:solidFill>
+                  <a:srgbClr val="000000"/>
+                </a:solidFill>
+                <a:highlight>
+                  <a:srgbClr val="FFFFFF"/>
+                </a:highlight>
+                <a:latin typeface="Consolas"/>
+                <a:ea typeface="Calibri"/>
+                <a:cs typeface="Times New Roman"/>
+              </a:rPr>
+              <a:t>    }</a:t>
+            </a:r>
+            <a:endParaRPr lang="en-US" sz="2000" dirty="0">
+              <a:ea typeface="Calibri"/>
+              <a:cs typeface="Times New Roman"/>
+            </a:endParaRPr>
+          </a:p>
+        </p:txBody>
+      </p:sp>
+      <p:grpSp>
+        <p:nvGrpSpPr>
+          <p:cNvPr id="7" name="Group 6"/>
+          <p:cNvGrpSpPr/>
+          <p:nvPr/>
+        </p:nvGrpSpPr>
+        <p:grpSpPr>
+          <a:xfrm>
+            <a:off x="35496" y="2868460"/>
+            <a:ext cx="1379944" cy="1712668"/>
+            <a:chOff x="35496" y="2868460"/>
+            <a:chExt cx="1379944" cy="1712668"/>
+          </a:xfrm>
+        </p:grpSpPr>
+        <p:sp>
+          <p:nvSpPr>
+            <p:cNvPr id="5" name="Left Brace 4"/>
+            <p:cNvSpPr/>
+            <p:nvPr/>
+          </p:nvSpPr>
+          <p:spPr>
+            <a:xfrm>
+              <a:off x="971599" y="2868460"/>
+              <a:ext cx="443841" cy="1712668"/>
+            </a:xfrm>
+            <a:prstGeom prst="leftBrace">
+              <a:avLst/>
+            </a:prstGeom>
+            <a:noFill/>
+            <a:ln w="25400">
+              <a:solidFill>
+                <a:srgbClr val="FF0000"/>
+              </a:solidFill>
+            </a:ln>
+          </p:spPr>
+          <p:style>
+            <a:lnRef idx="1">
+              <a:schemeClr val="accent1"/>
+            </a:lnRef>
+            <a:fillRef idx="0">
+              <a:schemeClr val="accent1"/>
+            </a:fillRef>
+            <a:effectRef idx="0">
+              <a:schemeClr val="accent1"/>
+            </a:effectRef>
+            <a:fontRef idx="minor">
+              <a:schemeClr val="tx1"/>
+            </a:fontRef>
+          </p:style>
+          <p:txBody>
+            <a:bodyPr rtlCol="0" anchor="ctr"/>
+            <a:lstStyle/>
+            <a:p>
+              <a:pPr algn="ctr"/>
+              <a:endParaRPr lang="en-US"/>
+            </a:p>
+          </p:txBody>
+        </p:sp>
+        <p:sp>
+          <p:nvSpPr>
+            <p:cNvPr id="6" name="TextBox 5"/>
+            <p:cNvSpPr txBox="1"/>
+            <p:nvPr/>
+          </p:nvSpPr>
+          <p:spPr>
+            <a:xfrm>
+              <a:off x="35496" y="3430741"/>
+              <a:ext cx="1368131" cy="646331"/>
+            </a:xfrm>
+            <a:prstGeom prst="rect">
+              <a:avLst/>
+            </a:prstGeom>
+            <a:noFill/>
+          </p:spPr>
+          <p:txBody>
+            <a:bodyPr wrap="none" rtlCol="0">
+              <a:spAutoFit/>
+            </a:bodyPr>
+            <a:lstStyle/>
+            <a:p>
+              <a:r>
+                <a:rPr lang="fr-FR" b="1" dirty="0" smtClean="0">
+                  <a:solidFill>
+                    <a:srgbClr val="FF0000"/>
+                  </a:solidFill>
+                </a:rPr>
+                <a:t>Controller</a:t>
+              </a:r>
+            </a:p>
+            <a:p>
+              <a:r>
+                <a:rPr lang="fr-FR" b="1" dirty="0" smtClean="0">
+                  <a:solidFill>
+                    <a:srgbClr val="FF0000"/>
+                  </a:solidFill>
+                </a:rPr>
+                <a:t>composition</a:t>
+              </a:r>
+              <a:endParaRPr lang="en-US" b="1" dirty="0">
+                <a:solidFill>
+                  <a:srgbClr val="FF0000"/>
+                </a:solidFill>
+              </a:endParaRPr>
+            </a:p>
+          </p:txBody>
+        </p:sp>
+      </p:grpSp>
+      <p:sp>
+        <p:nvSpPr>
+          <p:cNvPr id="8" name="TextBox 7"/>
+          <p:cNvSpPr txBox="1"/>
+          <p:nvPr/>
+        </p:nvSpPr>
+        <p:spPr>
+          <a:xfrm>
+            <a:off x="179512" y="2110674"/>
+            <a:ext cx="8640960" cy="2606611"/>
+          </a:xfrm>
+          <a:prstGeom prst="rect">
+            <a:avLst/>
+          </a:prstGeom>
+          <a:solidFill>
+            <a:schemeClr val="bg1"/>
+          </a:solidFill>
+          <a:ln>
+            <a:solidFill>
+              <a:schemeClr val="accent1"/>
+            </a:solidFill>
+          </a:ln>
+        </p:spPr>
+        <p:txBody>
+          <a:bodyPr wrap="square" rtlCol="0">
+            <a:spAutoFit/>
+          </a:bodyPr>
+          <a:lstStyle/>
+          <a:p>
+            <a:pPr>
+              <a:lnSpc>
+                <a:spcPct val="115000"/>
+              </a:lnSpc>
+              <a:spcAft>
+                <a:spcPts val="0"/>
+              </a:spcAft>
+            </a:pPr>
+            <a:r>
+              <a:rPr lang="en-US" sz="1600" dirty="0">
+                <a:solidFill>
+                  <a:srgbClr val="0000FF"/>
+                </a:solidFill>
+                <a:highlight>
+                  <a:srgbClr val="FFFFFF"/>
+                </a:highlight>
+                <a:latin typeface="Consolas"/>
+                <a:ea typeface="Calibri"/>
+                <a:cs typeface="Times New Roman"/>
+              </a:rPr>
+              <a:t>public</a:t>
+            </a:r>
+            <a:r>
+              <a:rPr lang="en-US" sz="1600" dirty="0">
+                <a:solidFill>
+                  <a:srgbClr val="000000"/>
+                </a:solidFill>
+                <a:highlight>
+                  <a:srgbClr val="FFFFFF"/>
+                </a:highlight>
+                <a:latin typeface="Consolas"/>
+                <a:ea typeface="Calibri"/>
+                <a:cs typeface="Times New Roman"/>
+              </a:rPr>
+              <a:t> </a:t>
+            </a:r>
+            <a:r>
+              <a:rPr lang="en-US" sz="1600" dirty="0">
+                <a:solidFill>
+                  <a:srgbClr val="0000FF"/>
+                </a:solidFill>
+                <a:highlight>
+                  <a:srgbClr val="FFFFFF"/>
+                </a:highlight>
+                <a:latin typeface="Consolas"/>
+                <a:ea typeface="Calibri"/>
+                <a:cs typeface="Times New Roman"/>
+              </a:rPr>
+              <a:t>class</a:t>
+            </a:r>
+            <a:r>
+              <a:rPr lang="en-US" sz="1600" dirty="0">
+                <a:solidFill>
+                  <a:srgbClr val="000000"/>
+                </a:solidFill>
+                <a:highlight>
+                  <a:srgbClr val="FFFFFF"/>
+                </a:highlight>
+                <a:latin typeface="Consolas"/>
+                <a:ea typeface="Calibri"/>
+                <a:cs typeface="Times New Roman"/>
+              </a:rPr>
+              <a:t> </a:t>
+            </a:r>
+            <a:r>
+              <a:rPr lang="en-US" sz="1600" dirty="0" err="1">
+                <a:solidFill>
+                  <a:srgbClr val="2B91AF"/>
+                </a:solidFill>
+                <a:highlight>
+                  <a:srgbClr val="FFFFFF"/>
+                </a:highlight>
+                <a:latin typeface="Consolas"/>
+                <a:ea typeface="Calibri"/>
+                <a:cs typeface="Times New Roman"/>
+              </a:rPr>
+              <a:t>MvcApplication</a:t>
+            </a:r>
+            <a:r>
+              <a:rPr lang="en-US" sz="1600" dirty="0">
+                <a:solidFill>
+                  <a:srgbClr val="000000"/>
+                </a:solidFill>
+                <a:highlight>
+                  <a:srgbClr val="FFFFFF"/>
+                </a:highlight>
+                <a:latin typeface="Consolas"/>
+                <a:ea typeface="Calibri"/>
+                <a:cs typeface="Times New Roman"/>
+              </a:rPr>
+              <a:t> : </a:t>
+            </a:r>
+            <a:r>
+              <a:rPr lang="en-US" sz="1600" dirty="0" err="1">
+                <a:solidFill>
+                  <a:srgbClr val="000000"/>
+                </a:solidFill>
+                <a:highlight>
+                  <a:srgbClr val="FFFFFF"/>
+                </a:highlight>
+                <a:latin typeface="Consolas"/>
+                <a:ea typeface="Calibri"/>
+                <a:cs typeface="Times New Roman"/>
+              </a:rPr>
+              <a:t>System.Web.</a:t>
+            </a:r>
+            <a:r>
+              <a:rPr lang="en-US" sz="1600" dirty="0" err="1">
+                <a:solidFill>
+                  <a:srgbClr val="2B91AF"/>
+                </a:solidFill>
+                <a:highlight>
+                  <a:srgbClr val="FFFFFF"/>
+                </a:highlight>
+                <a:latin typeface="Consolas"/>
+                <a:ea typeface="Calibri"/>
+                <a:cs typeface="Times New Roman"/>
+              </a:rPr>
+              <a:t>HttpApplication</a:t>
+            </a:r>
+            <a:endParaRPr lang="en-US" sz="2000" dirty="0">
+              <a:ea typeface="Calibri"/>
+              <a:cs typeface="Times New Roman"/>
+            </a:endParaRPr>
+          </a:p>
+          <a:p>
+            <a:pPr>
+              <a:lnSpc>
+                <a:spcPct val="115000"/>
+              </a:lnSpc>
+              <a:spcAft>
+                <a:spcPts val="0"/>
+              </a:spcAft>
+            </a:pPr>
+            <a:r>
+              <a:rPr lang="en-US" sz="1600" dirty="0">
+                <a:solidFill>
+                  <a:srgbClr val="000000"/>
+                </a:solidFill>
+                <a:highlight>
+                  <a:srgbClr val="FFFFFF"/>
+                </a:highlight>
+                <a:latin typeface="Consolas"/>
+                <a:ea typeface="Calibri"/>
+                <a:cs typeface="Times New Roman"/>
+              </a:rPr>
+              <a:t>    {</a:t>
+            </a:r>
+            <a:endParaRPr lang="en-US" sz="2000" dirty="0">
+              <a:ea typeface="Calibri"/>
+              <a:cs typeface="Times New Roman"/>
+            </a:endParaRPr>
+          </a:p>
+          <a:p>
+            <a:pPr>
+              <a:lnSpc>
+                <a:spcPct val="115000"/>
+              </a:lnSpc>
+              <a:spcAft>
+                <a:spcPts val="0"/>
+              </a:spcAft>
+            </a:pPr>
+            <a:r>
+              <a:rPr lang="en-US" sz="1600" dirty="0">
+                <a:solidFill>
+                  <a:srgbClr val="000000"/>
+                </a:solidFill>
+                <a:highlight>
+                  <a:srgbClr val="FFFFFF"/>
+                </a:highlight>
+                <a:latin typeface="Consolas"/>
+                <a:ea typeface="Calibri"/>
+                <a:cs typeface="Times New Roman"/>
+              </a:rPr>
+              <a:t>        </a:t>
+            </a:r>
+            <a:r>
+              <a:rPr lang="en-US" sz="1600" dirty="0">
+                <a:solidFill>
+                  <a:srgbClr val="0000FF"/>
+                </a:solidFill>
+                <a:highlight>
+                  <a:srgbClr val="FFFFFF"/>
+                </a:highlight>
+                <a:latin typeface="Consolas"/>
+                <a:ea typeface="Calibri"/>
+                <a:cs typeface="Times New Roman"/>
+              </a:rPr>
+              <a:t>protected</a:t>
+            </a:r>
+            <a:r>
+              <a:rPr lang="en-US" sz="1600" dirty="0">
+                <a:solidFill>
+                  <a:srgbClr val="000000"/>
+                </a:solidFill>
+                <a:highlight>
+                  <a:srgbClr val="FFFFFF"/>
+                </a:highlight>
+                <a:latin typeface="Consolas"/>
+                <a:ea typeface="Calibri"/>
+                <a:cs typeface="Times New Roman"/>
+              </a:rPr>
+              <a:t> </a:t>
+            </a:r>
+            <a:r>
+              <a:rPr lang="en-US" sz="1600" dirty="0">
+                <a:solidFill>
+                  <a:srgbClr val="0000FF"/>
+                </a:solidFill>
+                <a:highlight>
+                  <a:srgbClr val="FFFFFF"/>
+                </a:highlight>
+                <a:latin typeface="Consolas"/>
+                <a:ea typeface="Calibri"/>
+                <a:cs typeface="Times New Roman"/>
+              </a:rPr>
+              <a:t>void</a:t>
+            </a:r>
+            <a:r>
+              <a:rPr lang="en-US" sz="1600" dirty="0">
+                <a:solidFill>
+                  <a:srgbClr val="000000"/>
+                </a:solidFill>
+                <a:highlight>
+                  <a:srgbClr val="FFFFFF"/>
+                </a:highlight>
+                <a:latin typeface="Consolas"/>
+                <a:ea typeface="Calibri"/>
+                <a:cs typeface="Times New Roman"/>
+              </a:rPr>
+              <a:t> </a:t>
+            </a:r>
+            <a:r>
+              <a:rPr lang="en-US" sz="1600" dirty="0" err="1">
+                <a:solidFill>
+                  <a:srgbClr val="000000"/>
+                </a:solidFill>
+                <a:highlight>
+                  <a:srgbClr val="FFFFFF"/>
+                </a:highlight>
+                <a:latin typeface="Consolas"/>
+                <a:ea typeface="Calibri"/>
+                <a:cs typeface="Times New Roman"/>
+              </a:rPr>
+              <a:t>Application_Start</a:t>
+            </a:r>
+            <a:r>
+              <a:rPr lang="en-US" sz="1600" dirty="0">
+                <a:solidFill>
+                  <a:srgbClr val="000000"/>
+                </a:solidFill>
+                <a:highlight>
+                  <a:srgbClr val="FFFFFF"/>
+                </a:highlight>
+                <a:latin typeface="Consolas"/>
+                <a:ea typeface="Calibri"/>
+                <a:cs typeface="Times New Roman"/>
+              </a:rPr>
+              <a:t>()</a:t>
+            </a:r>
+            <a:endParaRPr lang="en-US" sz="2000" dirty="0">
+              <a:ea typeface="Calibri"/>
+              <a:cs typeface="Times New Roman"/>
+            </a:endParaRPr>
+          </a:p>
+          <a:p>
+            <a:pPr>
+              <a:lnSpc>
+                <a:spcPct val="115000"/>
+              </a:lnSpc>
+              <a:spcAft>
+                <a:spcPts val="0"/>
+              </a:spcAft>
+            </a:pPr>
+            <a:r>
+              <a:rPr lang="en-US" sz="1600" dirty="0">
+                <a:solidFill>
+                  <a:srgbClr val="000000"/>
+                </a:solidFill>
+                <a:highlight>
+                  <a:srgbClr val="FFFFFF"/>
+                </a:highlight>
+                <a:latin typeface="Consolas"/>
+                <a:ea typeface="Calibri"/>
+                <a:cs typeface="Times New Roman"/>
+              </a:rPr>
+              <a:t>        {</a:t>
+            </a:r>
+            <a:endParaRPr lang="en-US" sz="2000" dirty="0">
+              <a:ea typeface="Calibri"/>
+              <a:cs typeface="Times New Roman"/>
+            </a:endParaRPr>
+          </a:p>
+          <a:p>
+            <a:pPr>
+              <a:lnSpc>
+                <a:spcPct val="115000"/>
+              </a:lnSpc>
+              <a:spcAft>
+                <a:spcPts val="0"/>
+              </a:spcAft>
+            </a:pPr>
+            <a:r>
+              <a:rPr lang="en-US" sz="1600" dirty="0">
+                <a:solidFill>
+                  <a:srgbClr val="000000"/>
+                </a:solidFill>
+                <a:highlight>
+                  <a:srgbClr val="FFFFFF"/>
+                </a:highlight>
+                <a:latin typeface="Consolas"/>
+                <a:ea typeface="Calibri"/>
+                <a:cs typeface="Times New Roman"/>
+              </a:rPr>
+              <a:t>            </a:t>
+            </a:r>
+            <a:r>
+              <a:rPr lang="en-US" sz="1600" dirty="0" err="1">
+                <a:solidFill>
+                  <a:srgbClr val="0000FF"/>
+                </a:solidFill>
+                <a:highlight>
+                  <a:srgbClr val="FFFFFF"/>
+                </a:highlight>
+                <a:latin typeface="Consolas"/>
+                <a:ea typeface="Calibri"/>
+                <a:cs typeface="Times New Roman"/>
+              </a:rPr>
+              <a:t>var</a:t>
+            </a:r>
+            <a:r>
+              <a:rPr lang="en-US" sz="1600" dirty="0">
+                <a:solidFill>
+                  <a:srgbClr val="000000"/>
+                </a:solidFill>
+                <a:highlight>
+                  <a:srgbClr val="FFFFFF"/>
+                </a:highlight>
+                <a:latin typeface="Consolas"/>
+                <a:ea typeface="Calibri"/>
+                <a:cs typeface="Times New Roman"/>
+              </a:rPr>
+              <a:t> factory = </a:t>
+            </a:r>
+            <a:r>
+              <a:rPr lang="en-US" sz="1600" dirty="0">
+                <a:solidFill>
+                  <a:srgbClr val="0000FF"/>
+                </a:solidFill>
+                <a:highlight>
+                  <a:srgbClr val="FFFFFF"/>
+                </a:highlight>
+                <a:latin typeface="Consolas"/>
+                <a:ea typeface="Calibri"/>
+                <a:cs typeface="Times New Roman"/>
+              </a:rPr>
+              <a:t>new</a:t>
+            </a:r>
+            <a:r>
+              <a:rPr lang="en-US" sz="1600" dirty="0">
+                <a:solidFill>
+                  <a:srgbClr val="000000"/>
+                </a:solidFill>
+                <a:highlight>
+                  <a:srgbClr val="FFFFFF"/>
+                </a:highlight>
+                <a:latin typeface="Consolas"/>
+                <a:ea typeface="Calibri"/>
+                <a:cs typeface="Times New Roman"/>
+              </a:rPr>
+              <a:t> </a:t>
+            </a:r>
+            <a:r>
+              <a:rPr lang="en-US" sz="1600" dirty="0" err="1">
+                <a:solidFill>
+                  <a:srgbClr val="2B91AF"/>
+                </a:solidFill>
+                <a:highlight>
+                  <a:srgbClr val="FFFFFF"/>
+                </a:highlight>
+                <a:latin typeface="Consolas"/>
+                <a:ea typeface="Calibri"/>
+                <a:cs typeface="Times New Roman"/>
+              </a:rPr>
+              <a:t>AppCompositionRoot</a:t>
+            </a:r>
+            <a:r>
+              <a:rPr lang="en-US" sz="1600" dirty="0">
+                <a:solidFill>
+                  <a:srgbClr val="000000"/>
+                </a:solidFill>
+                <a:highlight>
+                  <a:srgbClr val="FFFFFF"/>
+                </a:highlight>
+                <a:latin typeface="Consolas"/>
+                <a:ea typeface="Calibri"/>
+                <a:cs typeface="Times New Roman"/>
+              </a:rPr>
+              <a:t>();</a:t>
+            </a:r>
+            <a:endParaRPr lang="en-US" sz="2000" dirty="0">
+              <a:ea typeface="Calibri"/>
+              <a:cs typeface="Times New Roman"/>
+            </a:endParaRPr>
+          </a:p>
+          <a:p>
+            <a:pPr>
+              <a:lnSpc>
+                <a:spcPct val="115000"/>
+              </a:lnSpc>
+              <a:spcAft>
+                <a:spcPts val="0"/>
+              </a:spcAft>
+            </a:pPr>
+            <a:r>
+              <a:rPr lang="en-US" sz="1600" dirty="0">
+                <a:solidFill>
+                  <a:srgbClr val="000000"/>
+                </a:solidFill>
+                <a:highlight>
+                  <a:srgbClr val="FFFFFF"/>
+                </a:highlight>
+                <a:latin typeface="Consolas"/>
+                <a:ea typeface="Calibri"/>
+                <a:cs typeface="Times New Roman"/>
+              </a:rPr>
+              <a:t>            </a:t>
+            </a:r>
+            <a:r>
+              <a:rPr lang="en-US" sz="1600" dirty="0" err="1">
+                <a:solidFill>
+                  <a:srgbClr val="2B91AF"/>
+                </a:solidFill>
+                <a:highlight>
+                  <a:srgbClr val="FFFFFF"/>
+                </a:highlight>
+                <a:latin typeface="Consolas"/>
+                <a:ea typeface="Calibri"/>
+                <a:cs typeface="Times New Roman"/>
+              </a:rPr>
+              <a:t>ControllerBuilder</a:t>
+            </a:r>
+            <a:r>
+              <a:rPr lang="en-US" sz="1600" dirty="0" err="1">
+                <a:solidFill>
+                  <a:srgbClr val="000000"/>
+                </a:solidFill>
+                <a:highlight>
+                  <a:srgbClr val="FFFFFF"/>
+                </a:highlight>
+                <a:latin typeface="Consolas"/>
+                <a:ea typeface="Calibri"/>
+                <a:cs typeface="Times New Roman"/>
+              </a:rPr>
+              <a:t>.Current.SetControllerFactory</a:t>
+            </a:r>
+            <a:r>
+              <a:rPr lang="en-US" sz="1600" dirty="0">
+                <a:solidFill>
+                  <a:srgbClr val="000000"/>
+                </a:solidFill>
+                <a:highlight>
+                  <a:srgbClr val="FFFFFF"/>
+                </a:highlight>
+                <a:latin typeface="Consolas"/>
+                <a:ea typeface="Calibri"/>
+                <a:cs typeface="Times New Roman"/>
+              </a:rPr>
+              <a:t>(factory);</a:t>
+            </a:r>
+            <a:endParaRPr lang="en-US" sz="2000" dirty="0">
+              <a:ea typeface="Calibri"/>
+              <a:cs typeface="Times New Roman"/>
+            </a:endParaRPr>
+          </a:p>
+          <a:p>
+            <a:pPr>
+              <a:lnSpc>
+                <a:spcPct val="115000"/>
+              </a:lnSpc>
+              <a:spcAft>
+                <a:spcPts val="1000"/>
+              </a:spcAft>
+            </a:pPr>
+            <a:r>
+              <a:rPr lang="en-US" sz="2000" dirty="0">
+                <a:ea typeface="Calibri"/>
+                <a:cs typeface="Times New Roman"/>
+              </a:rPr>
+              <a:t> </a:t>
+            </a:r>
+            <a:endParaRPr lang="en-US" sz="2000" dirty="0" smtClean="0">
+              <a:ea typeface="Calibri"/>
+              <a:cs typeface="Times New Roman"/>
+            </a:endParaRPr>
+          </a:p>
+          <a:p>
+            <a:pPr>
+              <a:lnSpc>
+                <a:spcPct val="115000"/>
+              </a:lnSpc>
+              <a:spcAft>
+                <a:spcPts val="1000"/>
+              </a:spcAft>
+            </a:pPr>
+            <a:r>
+              <a:rPr lang="fr-FR" sz="2000" i="1" dirty="0" smtClean="0">
+                <a:ea typeface="Calibri"/>
+                <a:cs typeface="Times New Roman"/>
+              </a:rPr>
+              <a:t>In </a:t>
+            </a:r>
+            <a:r>
+              <a:rPr lang="fr-FR" sz="2000" i="1" dirty="0" err="1" smtClean="0">
+                <a:ea typeface="Calibri"/>
+                <a:cs typeface="Times New Roman"/>
+              </a:rPr>
+              <a:t>Global.asax</a:t>
+            </a:r>
+            <a:endParaRPr lang="en-US" sz="2000" i="1" dirty="0">
+              <a:ea typeface="Calibri"/>
+              <a:cs typeface="Times New Roman"/>
+            </a:endParaRPr>
+          </a:p>
+        </p:txBody>
+      </p:sp>
+      <p:sp>
+        <p:nvSpPr>
+          <p:cNvPr id="9" name="TextBox 8"/>
+          <p:cNvSpPr txBox="1"/>
+          <p:nvPr/>
+        </p:nvSpPr>
+        <p:spPr>
+          <a:xfrm>
+            <a:off x="4427984" y="3892406"/>
+            <a:ext cx="3727221" cy="369332"/>
+          </a:xfrm>
+          <a:prstGeom prst="rect">
+            <a:avLst/>
+          </a:prstGeom>
+          <a:noFill/>
+        </p:spPr>
+        <p:txBody>
+          <a:bodyPr wrap="square" rtlCol="0">
+            <a:spAutoFit/>
+          </a:bodyPr>
+          <a:lstStyle/>
+          <a:p>
+            <a:r>
+              <a:rPr lang="fr-FR" b="1" dirty="0">
+                <a:solidFill>
+                  <a:srgbClr val="FF0000"/>
+                </a:solidFill>
+              </a:rPr>
+              <a:t>t</a:t>
+            </a:r>
+            <a:r>
+              <a:rPr lang="fr-FR" b="1" dirty="0" smtClean="0">
+                <a:solidFill>
+                  <a:srgbClr val="FF0000"/>
+                </a:solidFill>
+              </a:rPr>
+              <a:t>ell MVC to use </a:t>
+            </a:r>
+            <a:r>
+              <a:rPr lang="fr-FR" b="1" dirty="0" err="1" smtClean="0">
+                <a:solidFill>
+                  <a:srgbClr val="FF0000"/>
+                </a:solidFill>
+              </a:rPr>
+              <a:t>our</a:t>
+            </a:r>
+            <a:r>
+              <a:rPr lang="fr-FR" b="1" dirty="0" smtClean="0">
+                <a:solidFill>
+                  <a:srgbClr val="FF0000"/>
+                </a:solidFill>
+              </a:rPr>
+              <a:t> composition </a:t>
+            </a:r>
+            <a:r>
+              <a:rPr lang="fr-FR" b="1" dirty="0" err="1" smtClean="0">
+                <a:solidFill>
+                  <a:srgbClr val="FF0000"/>
+                </a:solidFill>
+              </a:rPr>
+              <a:t>root</a:t>
+            </a:r>
+            <a:endParaRPr lang="en-US" b="1" dirty="0">
+              <a:solidFill>
+                <a:srgbClr val="FF0000"/>
+              </a:solidFill>
+            </a:endParaRPr>
           </a:p>
         </p:txBody>
       </p:sp>
     </p:spTree>
     <p:extLst>
       <p:ext uri="{BB962C8B-B14F-4D97-AF65-F5344CB8AC3E}">
-        <p14:creationId xmlns:p14="http://schemas.microsoft.com/office/powerpoint/2010/main" val="3162647260"/>
+        <p14:creationId xmlns:p14="http://schemas.microsoft.com/office/powerpoint/2010/main" val="1652739496"/>
       </p:ext>
     </p:extLst>
   </p:cSld>
@@ -28946,9 +32710,217 @@
   <p:timing>
     <p:tnLst>
       <p:par>
-        <p:cTn id="1" dur="indefinite" restart="never" nodeType="tmRoot"/>
+        <p:cTn id="1" dur="indefinite" restart="never" nodeType="tmRoot">
+          <p:childTnLst>
+            <p:seq concurrent="1" nextAc="seek">
+              <p:cTn id="2" dur="indefinite" nodeType="mainSeq">
+                <p:childTnLst>
+                  <p:par>
+                    <p:cTn id="3" fill="hold">
+                      <p:stCondLst>
+                        <p:cond delay="indefinite"/>
+                      </p:stCondLst>
+                      <p:childTnLst>
+                        <p:par>
+                          <p:cTn id="4" fill="hold">
+                            <p:stCondLst>
+                              <p:cond delay="0"/>
+                            </p:stCondLst>
+                            <p:childTnLst>
+                              <p:par>
+                                <p:cTn id="5" presetID="1" presetClass="entr" presetSubtype="0" fill="hold" grpId="0" nodeType="clickEffect">
+                                  <p:stCondLst>
+                                    <p:cond delay="0"/>
+                                  </p:stCondLst>
+                                  <p:childTnLst>
+                                    <p:set>
+                                      <p:cBhvr>
+                                        <p:cTn id="6" dur="1" fill="hold">
+                                          <p:stCondLst>
+                                            <p:cond delay="0"/>
+                                          </p:stCondLst>
+                                        </p:cTn>
+                                        <p:tgtEl>
+                                          <p:spTgt spid="4"/>
+                                        </p:tgtEl>
+                                        <p:attrNameLst>
+                                          <p:attrName>style.visibility</p:attrName>
+                                        </p:attrNameLst>
+                                      </p:cBhvr>
+                                      <p:to>
+                                        <p:strVal val="visible"/>
+                                      </p:to>
+                                    </p:set>
+                                  </p:childTnLst>
+                                </p:cTn>
+                              </p:par>
+                            </p:childTnLst>
+                          </p:cTn>
+                        </p:par>
+                      </p:childTnLst>
+                    </p:cTn>
+                  </p:par>
+                  <p:par>
+                    <p:cTn id="7" fill="hold">
+                      <p:stCondLst>
+                        <p:cond delay="indefinite"/>
+                      </p:stCondLst>
+                      <p:childTnLst>
+                        <p:par>
+                          <p:cTn id="8" fill="hold">
+                            <p:stCondLst>
+                              <p:cond delay="0"/>
+                            </p:stCondLst>
+                            <p:childTnLst>
+                              <p:par>
+                                <p:cTn id="9" presetID="1" presetClass="entr" presetSubtype="0" fill="hold" nodeType="clickEffect">
+                                  <p:stCondLst>
+                                    <p:cond delay="0"/>
+                                  </p:stCondLst>
+                                  <p:childTnLst>
+                                    <p:set>
+                                      <p:cBhvr>
+                                        <p:cTn id="10" dur="1" fill="hold">
+                                          <p:stCondLst>
+                                            <p:cond delay="0"/>
+                                          </p:stCondLst>
+                                        </p:cTn>
+                                        <p:tgtEl>
+                                          <p:spTgt spid="7"/>
+                                        </p:tgtEl>
+                                        <p:attrNameLst>
+                                          <p:attrName>style.visibility</p:attrName>
+                                        </p:attrNameLst>
+                                      </p:cBhvr>
+                                      <p:to>
+                                        <p:strVal val="visible"/>
+                                      </p:to>
+                                    </p:set>
+                                  </p:childTnLst>
+                                </p:cTn>
+                              </p:par>
+                            </p:childTnLst>
+                          </p:cTn>
+                        </p:par>
+                      </p:childTnLst>
+                    </p:cTn>
+                  </p:par>
+                  <p:par>
+                    <p:cTn id="11" fill="hold">
+                      <p:stCondLst>
+                        <p:cond delay="indefinite"/>
+                      </p:stCondLst>
+                      <p:childTnLst>
+                        <p:par>
+                          <p:cTn id="12" fill="hold">
+                            <p:stCondLst>
+                              <p:cond delay="0"/>
+                            </p:stCondLst>
+                            <p:childTnLst>
+                              <p:par>
+                                <p:cTn id="13" presetID="1" presetClass="entr" presetSubtype="0" fill="hold" grpId="0" nodeType="clickEffect">
+                                  <p:stCondLst>
+                                    <p:cond delay="0"/>
+                                  </p:stCondLst>
+                                  <p:childTnLst>
+                                    <p:set>
+                                      <p:cBhvr>
+                                        <p:cTn id="14" dur="1" fill="hold">
+                                          <p:stCondLst>
+                                            <p:cond delay="0"/>
+                                          </p:stCondLst>
+                                        </p:cTn>
+                                        <p:tgtEl>
+                                          <p:spTgt spid="8"/>
+                                        </p:tgtEl>
+                                        <p:attrNameLst>
+                                          <p:attrName>style.visibility</p:attrName>
+                                        </p:attrNameLst>
+                                      </p:cBhvr>
+                                      <p:to>
+                                        <p:strVal val="visible"/>
+                                      </p:to>
+                                    </p:set>
+                                  </p:childTnLst>
+                                </p:cTn>
+                              </p:par>
+                            </p:childTnLst>
+                          </p:cTn>
+                        </p:par>
+                      </p:childTnLst>
+                    </p:cTn>
+                  </p:par>
+                  <p:par>
+                    <p:cTn id="15" fill="hold">
+                      <p:stCondLst>
+                        <p:cond delay="indefinite"/>
+                      </p:stCondLst>
+                      <p:childTnLst>
+                        <p:par>
+                          <p:cTn id="16" fill="hold">
+                            <p:stCondLst>
+                              <p:cond delay="0"/>
+                            </p:stCondLst>
+                            <p:childTnLst>
+                              <p:par>
+                                <p:cTn id="17" presetID="1" presetClass="entr" presetSubtype="0" fill="hold" grpId="0" nodeType="clickEffect">
+                                  <p:stCondLst>
+                                    <p:cond delay="0"/>
+                                  </p:stCondLst>
+                                  <p:childTnLst>
+                                    <p:set>
+                                      <p:cBhvr>
+                                        <p:cTn id="18" dur="1" fill="hold">
+                                          <p:stCondLst>
+                                            <p:cond delay="0"/>
+                                          </p:stCondLst>
+                                        </p:cTn>
+                                        <p:tgtEl>
+                                          <p:spTgt spid="9"/>
+                                        </p:tgtEl>
+                                        <p:attrNameLst>
+                                          <p:attrName>style.visibility</p:attrName>
+                                        </p:attrNameLst>
+                                      </p:cBhvr>
+                                      <p:to>
+                                        <p:strVal val="visible"/>
+                                      </p:to>
+                                    </p:set>
+                                  </p:childTnLst>
+                                </p:cTn>
+                              </p:par>
+                            </p:childTnLst>
+                          </p:cTn>
+                        </p:par>
+                      </p:childTnLst>
+                    </p:cTn>
+                  </p:par>
+                </p:childTnLst>
+              </p:cTn>
+              <p:prevCondLst>
+                <p:cond evt="onPrev" delay="0">
+                  <p:tgtEl>
+                    <p:sldTgt/>
+                  </p:tgtEl>
+                </p:cond>
+              </p:prevCondLst>
+              <p:nextCondLst>
+                <p:cond evt="onNext" delay="0">
+                  <p:tgtEl>
+                    <p:sldTgt/>
+                  </p:tgtEl>
+                </p:cond>
+              </p:nextCondLst>
+            </p:seq>
+          </p:childTnLst>
+        </p:cTn>
       </p:par>
     </p:tnLst>
+    <p:bldLst>
+      <p:bldP spid="4" grpId="0" animBg="1"/>
+      <p:bldP spid="8" grpId="0" animBg="1"/>
+      <p:bldP spid="9" grpId="0"/>
+    </p:bldLst>
   </p:timing>
 </p:sld>
 </file>
@@ -29148,7 +33120,7 @@
           <a:p>
             <a:r>
               <a:rPr lang="en-US" dirty="0" smtClean="0"/>
-              <a:t>DI Container</a:t>
+              <a:t>Pure DI aka Poor Man’s DI</a:t>
             </a:r>
             <a:endParaRPr lang="en-US" dirty="0"/>
           </a:p>
@@ -29169,18 +33141,14 @@
           <a:bodyPr/>
           <a:lstStyle/>
           <a:p>
-            <a:r>
-              <a:rPr lang="en-US" dirty="0" smtClean="0"/>
-              <a:t>How it works / what it does</a:t>
-            </a:r>
-            <a:endParaRPr lang="en-US" dirty="0"/>
+            <a:endParaRPr lang="en-US"/>
           </a:p>
         </p:txBody>
       </p:sp>
     </p:spTree>
     <p:extLst>
       <p:ext uri="{BB962C8B-B14F-4D97-AF65-F5344CB8AC3E}">
-        <p14:creationId xmlns:p14="http://schemas.microsoft.com/office/powerpoint/2010/main" val="3753203453"/>
+        <p14:creationId xmlns:p14="http://schemas.microsoft.com/office/powerpoint/2010/main" val="550091921"/>
       </p:ext>
     </p:extLst>
   </p:cSld>
@@ -29226,14 +33194,12 @@
         </p:nvSpPr>
         <p:spPr/>
         <p:txBody>
-          <a:bodyPr>
-            <a:normAutofit fontScale="90000"/>
-          </a:bodyPr>
+          <a:bodyPr/>
           <a:lstStyle/>
           <a:p>
             <a:r>
               <a:rPr lang="en-US" dirty="0" smtClean="0"/>
-              <a:t>Service Locator – DI container misusage</a:t>
+              <a:t>Extensibility with DI</a:t>
             </a:r>
             <a:endParaRPr lang="en-US" dirty="0"/>
           </a:p>
@@ -29254,14 +33220,54 @@
           <a:bodyPr/>
           <a:lstStyle/>
           <a:p>
-            <a:endParaRPr lang="en-US"/>
+            <a:r>
+              <a:rPr lang="en-US" dirty="0" err="1" smtClean="0"/>
+              <a:t>Composability</a:t>
+            </a:r>
+            <a:r>
+              <a:rPr lang="en-US" dirty="0" smtClean="0"/>
+              <a:t> </a:t>
+            </a:r>
+          </a:p>
+          <a:p>
+            <a:r>
+              <a:rPr lang="en-US" dirty="0" smtClean="0"/>
+              <a:t>Testability</a:t>
+            </a:r>
+          </a:p>
+          <a:p>
+            <a:r>
+              <a:rPr lang="en-US" dirty="0" smtClean="0"/>
+              <a:t>Decorator</a:t>
+            </a:r>
+          </a:p>
+          <a:p>
+            <a:endParaRPr lang="en-US" dirty="0"/>
+          </a:p>
+          <a:p>
+            <a:r>
+              <a:rPr lang="en-US" dirty="0" smtClean="0"/>
+              <a:t>Late binding</a:t>
+            </a:r>
+          </a:p>
+          <a:p>
+            <a:endParaRPr lang="en-US" dirty="0"/>
+          </a:p>
+          <a:p>
+            <a:r>
+              <a:rPr lang="en-US" dirty="0" smtClean="0"/>
+              <a:t>Examples ? </a:t>
+            </a:r>
+          </a:p>
+          <a:p>
+            <a:endParaRPr lang="en-US" dirty="0"/>
           </a:p>
         </p:txBody>
       </p:sp>
     </p:spTree>
     <p:extLst>
       <p:ext uri="{BB962C8B-B14F-4D97-AF65-F5344CB8AC3E}">
-        <p14:creationId xmlns:p14="http://schemas.microsoft.com/office/powerpoint/2010/main" val="1148450113"/>
+        <p14:creationId xmlns:p14="http://schemas.microsoft.com/office/powerpoint/2010/main" val="3162647260"/>
       </p:ext>
     </p:extLst>
   </p:cSld>
@@ -29312,7 +33318,7 @@
           <a:p>
             <a:r>
               <a:rPr lang="en-US" dirty="0" smtClean="0"/>
-              <a:t>Composition, but not only</a:t>
+              <a:t>DI Container</a:t>
             </a:r>
             <a:endParaRPr lang="en-US" dirty="0"/>
           </a:p>
@@ -29335,16 +33341,8 @@
           <a:p>
             <a:r>
               <a:rPr lang="en-US" dirty="0" smtClean="0"/>
-              <a:t>Object creation and composition</a:t>
-            </a:r>
-          </a:p>
-          <a:p>
-            <a:r>
-              <a:rPr lang="en-US" dirty="0" smtClean="0"/>
-              <a:t>Other important parts of DI</a:t>
-            </a:r>
-          </a:p>
-          <a:p>
+              <a:t>How it works / what it does</a:t>
+            </a:r>
             <a:endParaRPr lang="en-US" dirty="0"/>
           </a:p>
         </p:txBody>
@@ -29352,7 +33350,7 @@
     </p:spTree>
     <p:extLst>
       <p:ext uri="{BB962C8B-B14F-4D97-AF65-F5344CB8AC3E}">
-        <p14:creationId xmlns:p14="http://schemas.microsoft.com/office/powerpoint/2010/main" val="2294633566"/>
+        <p14:creationId xmlns:p14="http://schemas.microsoft.com/office/powerpoint/2010/main" val="3753203453"/>
       </p:ext>
     </p:extLst>
   </p:cSld>
@@ -29398,16 +33396,14 @@
         </p:nvSpPr>
         <p:spPr/>
         <p:txBody>
-          <a:bodyPr/>
+          <a:bodyPr>
+            <a:normAutofit fontScale="90000"/>
+          </a:bodyPr>
           <a:lstStyle/>
           <a:p>
             <a:r>
-              <a:rPr lang="en-US" dirty="0" err="1" smtClean="0"/>
-              <a:t>LifeTime</a:t>
-            </a:r>
-            <a:r>
               <a:rPr lang="en-US" dirty="0" smtClean="0"/>
-              <a:t> Management</a:t>
+              <a:t>Service Locator – DI container misusage</a:t>
             </a:r>
             <a:endParaRPr lang="en-US" dirty="0"/>
           </a:p>
@@ -29428,14 +33424,14 @@
           <a:bodyPr/>
           <a:lstStyle/>
           <a:p>
-            <a:endParaRPr lang="en-US" dirty="0"/>
+            <a:endParaRPr lang="en-US"/>
           </a:p>
         </p:txBody>
       </p:sp>
     </p:spTree>
     <p:extLst>
       <p:ext uri="{BB962C8B-B14F-4D97-AF65-F5344CB8AC3E}">
-        <p14:creationId xmlns:p14="http://schemas.microsoft.com/office/powerpoint/2010/main" val="3458786066"/>
+        <p14:creationId xmlns:p14="http://schemas.microsoft.com/office/powerpoint/2010/main" val="1148450113"/>
       </p:ext>
     </p:extLst>
   </p:cSld>
@@ -29486,7 +33482,7 @@
           <a:p>
             <a:r>
               <a:rPr lang="en-US" dirty="0" smtClean="0"/>
-              <a:t>Interception</a:t>
+              <a:t>Composition, but not only</a:t>
             </a:r>
             <a:endParaRPr lang="en-US" dirty="0"/>
           </a:p>
@@ -29507,6 +33503,18 @@
           <a:bodyPr/>
           <a:lstStyle/>
           <a:p>
+            <a:r>
+              <a:rPr lang="en-US" dirty="0" smtClean="0"/>
+              <a:t>Object creation and composition</a:t>
+            </a:r>
+          </a:p>
+          <a:p>
+            <a:r>
+              <a:rPr lang="en-US" dirty="0" smtClean="0"/>
+              <a:t>Other important parts of DI</a:t>
+            </a:r>
+          </a:p>
+          <a:p>
             <a:endParaRPr lang="en-US" dirty="0"/>
           </a:p>
         </p:txBody>
@@ -29514,7 +33522,7 @@
     </p:spTree>
     <p:extLst>
       <p:ext uri="{BB962C8B-B14F-4D97-AF65-F5344CB8AC3E}">
-        <p14:creationId xmlns:p14="http://schemas.microsoft.com/office/powerpoint/2010/main" val="4036849652"/>
+        <p14:creationId xmlns:p14="http://schemas.microsoft.com/office/powerpoint/2010/main" val="2294633566"/>
       </p:ext>
     </p:extLst>
   </p:cSld>
@@ -29560,14 +33568,16 @@
         </p:nvSpPr>
         <p:spPr/>
         <p:txBody>
-          <a:bodyPr>
-            <a:normAutofit/>
-          </a:bodyPr>
+          <a:bodyPr/>
           <a:lstStyle/>
           <a:p>
             <a:r>
+              <a:rPr lang="en-US" dirty="0" err="1" smtClean="0"/>
+              <a:t>LifeTime</a:t>
+            </a:r>
+            <a:r>
               <a:rPr lang="en-US" dirty="0" smtClean="0"/>
-              <a:t>Conclusion</a:t>
+              <a:t> Management</a:t>
             </a:r>
             <a:endParaRPr lang="en-US" dirty="0"/>
           </a:p>
@@ -29588,14 +33598,14 @@
           <a:bodyPr/>
           <a:lstStyle/>
           <a:p>
-            <a:endParaRPr lang="en-US"/>
+            <a:endParaRPr lang="en-US" dirty="0"/>
           </a:p>
         </p:txBody>
       </p:sp>
     </p:spTree>
     <p:extLst>
       <p:ext uri="{BB962C8B-B14F-4D97-AF65-F5344CB8AC3E}">
-        <p14:creationId xmlns:p14="http://schemas.microsoft.com/office/powerpoint/2010/main" val="308607750"/>
+        <p14:creationId xmlns:p14="http://schemas.microsoft.com/office/powerpoint/2010/main" val="3458786066"/>
       </p:ext>
     </p:extLst>
   </p:cSld>
@@ -29646,7 +33656,7 @@
           <a:p>
             <a:r>
               <a:rPr lang="en-US" dirty="0" smtClean="0"/>
-              <a:t>Remember</a:t>
+              <a:t>Interception</a:t>
             </a:r>
             <a:endParaRPr lang="en-US" dirty="0"/>
           </a:p>
@@ -29667,14 +33677,14 @@
           <a:bodyPr/>
           <a:lstStyle/>
           <a:p>
-            <a:endParaRPr lang="en-US"/>
+            <a:endParaRPr lang="en-US" dirty="0"/>
           </a:p>
         </p:txBody>
       </p:sp>
     </p:spTree>
     <p:extLst>
       <p:ext uri="{BB962C8B-B14F-4D97-AF65-F5344CB8AC3E}">
-        <p14:creationId xmlns:p14="http://schemas.microsoft.com/office/powerpoint/2010/main" val="1019461660"/>
+        <p14:creationId xmlns:p14="http://schemas.microsoft.com/office/powerpoint/2010/main" val="4036849652"/>
       </p:ext>
     </p:extLst>
   </p:cSld>
@@ -29720,12 +33730,14 @@
         </p:nvSpPr>
         <p:spPr/>
         <p:txBody>
-          <a:bodyPr/>
+          <a:bodyPr>
+            <a:normAutofit/>
+          </a:bodyPr>
           <a:lstStyle/>
           <a:p>
             <a:r>
               <a:rPr lang="en-US" dirty="0" smtClean="0"/>
-              <a:t>Going further …</a:t>
+              <a:t>Conclusion</a:t>
             </a:r>
             <a:endParaRPr lang="en-US" dirty="0"/>
           </a:p>
@@ -29746,6 +33758,164 @@
           <a:bodyPr/>
           <a:lstStyle/>
           <a:p>
+            <a:endParaRPr lang="en-US"/>
+          </a:p>
+        </p:txBody>
+      </p:sp>
+    </p:spTree>
+    <p:extLst>
+      <p:ext uri="{BB962C8B-B14F-4D97-AF65-F5344CB8AC3E}">
+        <p14:creationId xmlns:p14="http://schemas.microsoft.com/office/powerpoint/2010/main" val="308607750"/>
+      </p:ext>
+    </p:extLst>
+  </p:cSld>
+  <p:clrMapOvr>
+    <a:masterClrMapping/>
+  </p:clrMapOvr>
+  <p:timing>
+    <p:tnLst>
+      <p:par>
+        <p:cTn id="1" dur="indefinite" restart="never" nodeType="tmRoot"/>
+      </p:par>
+    </p:tnLst>
+  </p:timing>
+</p:sld>
+</file>
+
+<file path=ppt/slides/slide38.xml><?xml version="1.0" encoding="utf-8"?>
+<p:sld xmlns:a="http://schemas.openxmlformats.org/drawingml/2006/main" xmlns:r="http://schemas.openxmlformats.org/officeDocument/2006/relationships" xmlns:p="http://schemas.openxmlformats.org/presentationml/2006/main">
+  <p:cSld>
+    <p:spTree>
+      <p:nvGrpSpPr>
+        <p:cNvPr id="1" name=""/>
+        <p:cNvGrpSpPr/>
+        <p:nvPr/>
+      </p:nvGrpSpPr>
+      <p:grpSpPr>
+        <a:xfrm>
+          <a:off x="0" y="0"/>
+          <a:ext cx="0" cy="0"/>
+          <a:chOff x="0" y="0"/>
+          <a:chExt cx="0" cy="0"/>
+        </a:xfrm>
+      </p:grpSpPr>
+      <p:sp>
+        <p:nvSpPr>
+          <p:cNvPr id="2" name="Title 1"/>
+          <p:cNvSpPr>
+            <a:spLocks noGrp="1"/>
+          </p:cNvSpPr>
+          <p:nvPr>
+            <p:ph type="title"/>
+          </p:nvPr>
+        </p:nvSpPr>
+        <p:spPr/>
+        <p:txBody>
+          <a:bodyPr/>
+          <a:lstStyle/>
+          <a:p>
+            <a:r>
+              <a:rPr lang="en-US" dirty="0" smtClean="0"/>
+              <a:t>Remember</a:t>
+            </a:r>
+            <a:endParaRPr lang="en-US" dirty="0"/>
+          </a:p>
+        </p:txBody>
+      </p:sp>
+      <p:sp>
+        <p:nvSpPr>
+          <p:cNvPr id="3" name="Content Placeholder 2"/>
+          <p:cNvSpPr>
+            <a:spLocks noGrp="1"/>
+          </p:cNvSpPr>
+          <p:nvPr>
+            <p:ph idx="1"/>
+          </p:nvPr>
+        </p:nvSpPr>
+        <p:spPr/>
+        <p:txBody>
+          <a:bodyPr/>
+          <a:lstStyle/>
+          <a:p>
+            <a:endParaRPr lang="en-US"/>
+          </a:p>
+        </p:txBody>
+      </p:sp>
+    </p:spTree>
+    <p:extLst>
+      <p:ext uri="{BB962C8B-B14F-4D97-AF65-F5344CB8AC3E}">
+        <p14:creationId xmlns:p14="http://schemas.microsoft.com/office/powerpoint/2010/main" val="1019461660"/>
+      </p:ext>
+    </p:extLst>
+  </p:cSld>
+  <p:clrMapOvr>
+    <a:masterClrMapping/>
+  </p:clrMapOvr>
+  <p:timing>
+    <p:tnLst>
+      <p:par>
+        <p:cTn id="1" dur="indefinite" restart="never" nodeType="tmRoot"/>
+      </p:par>
+    </p:tnLst>
+  </p:timing>
+</p:sld>
+</file>
+
+<file path=ppt/slides/slide39.xml><?xml version="1.0" encoding="utf-8"?>
+<p:sld xmlns:a="http://schemas.openxmlformats.org/drawingml/2006/main" xmlns:r="http://schemas.openxmlformats.org/officeDocument/2006/relationships" xmlns:p="http://schemas.openxmlformats.org/presentationml/2006/main">
+  <p:cSld>
+    <p:spTree>
+      <p:nvGrpSpPr>
+        <p:cNvPr id="1" name=""/>
+        <p:cNvGrpSpPr/>
+        <p:nvPr/>
+      </p:nvGrpSpPr>
+      <p:grpSpPr>
+        <a:xfrm>
+          <a:off x="0" y="0"/>
+          <a:ext cx="0" cy="0"/>
+          <a:chOff x="0" y="0"/>
+          <a:chExt cx="0" cy="0"/>
+        </a:xfrm>
+      </p:grpSpPr>
+      <p:sp>
+        <p:nvSpPr>
+          <p:cNvPr id="2" name="Title 1"/>
+          <p:cNvSpPr>
+            <a:spLocks noGrp="1"/>
+          </p:cNvSpPr>
+          <p:nvPr>
+            <p:ph type="title"/>
+          </p:nvPr>
+        </p:nvSpPr>
+        <p:spPr/>
+        <p:txBody>
+          <a:bodyPr/>
+          <a:lstStyle/>
+          <a:p>
+            <a:r>
+              <a:rPr lang="en-US" dirty="0" smtClean="0"/>
+              <a:t>Going further …</a:t>
+            </a:r>
+            <a:endParaRPr lang="en-US" dirty="0"/>
+          </a:p>
+        </p:txBody>
+      </p:sp>
+      <p:sp>
+        <p:nvSpPr>
+          <p:cNvPr id="3" name="Content Placeholder 2"/>
+          <p:cNvSpPr>
+            <a:spLocks noGrp="1"/>
+          </p:cNvSpPr>
+          <p:nvPr>
+            <p:ph idx="1"/>
+          </p:nvPr>
+        </p:nvSpPr>
+        <p:spPr/>
+        <p:txBody>
+          <a:bodyPr/>
+          <a:lstStyle/>
+          <a:p>
             <a:r>
               <a:rPr lang="en-US" dirty="0" smtClean="0"/>
               <a:t>Mark </a:t>
@@ -29797,6 +33967,13 @@
   <p:clrMapOvr>
     <a:masterClrMapping/>
   </p:clrMapOvr>
+  <p:timing>
+    <p:tnLst>
+      <p:par>
+        <p:cTn id="1" dur="indefinite" restart="never" nodeType="tmRoot"/>
+      </p:par>
+    </p:tnLst>
+  </p:timing>
 </p:sld>
 </file>
 

</xml_diff>

<commit_message>
Introduced DI containers in the slides
</commit_message>
<xml_diff>
--- a/Dependency Injection - the right way.pptx
+++ b/Dependency Injection - the right way.pptx
@@ -39045,7 +39045,7 @@
               <a:t> </a:t>
             </a:r>
             <a:r>
-              <a:rPr lang="fr-FR" sz="2400" dirty="0" err="1" smtClean="0">
+              <a:rPr lang="fr-FR" sz="2400" b="1" dirty="0" err="1" smtClean="0">
                 <a:latin typeface="Consolas" panose="020B0609020204030204" pitchFamily="49" charset="0"/>
                 <a:cs typeface="Consolas" panose="020B0609020204030204" pitchFamily="49" charset="0"/>
               </a:rPr>
@@ -39083,7 +39083,7 @@
               <a:t>Method </a:t>
             </a:r>
             <a:r>
-              <a:rPr lang="fr-FR" sz="2800" dirty="0" err="1" smtClean="0">
+              <a:rPr lang="fr-FR" sz="2800" b="1" dirty="0" err="1" smtClean="0">
                 <a:latin typeface="Consolas" panose="020B0609020204030204" pitchFamily="49" charset="0"/>
                 <a:cs typeface="Consolas" panose="020B0609020204030204" pitchFamily="49" charset="0"/>
               </a:rPr>
@@ -39242,7 +39242,3483 @@
           <a:bodyPr/>
           <a:lstStyle/>
           <a:p>
-            <a:endParaRPr lang="en-US"/>
+            <a:endParaRPr lang="en-US" dirty="0"/>
+          </a:p>
+        </p:txBody>
+      </p:sp>
+      <p:sp>
+        <p:nvSpPr>
+          <p:cNvPr id="4" name="TextBox 3"/>
+          <p:cNvSpPr txBox="1"/>
+          <p:nvPr/>
+        </p:nvSpPr>
+        <p:spPr>
+          <a:xfrm>
+            <a:off x="0" y="188640"/>
+            <a:ext cx="9784704" cy="3168753"/>
+          </a:xfrm>
+          <a:prstGeom prst="rect">
+            <a:avLst/>
+          </a:prstGeom>
+          <a:solidFill>
+            <a:schemeClr val="bg1"/>
+          </a:solidFill>
+          <a:ln>
+            <a:solidFill>
+              <a:schemeClr val="accent1"/>
+            </a:solidFill>
+          </a:ln>
+        </p:spPr>
+        <p:txBody>
+          <a:bodyPr wrap="square" rtlCol="0">
+            <a:spAutoFit/>
+          </a:bodyPr>
+          <a:lstStyle/>
+          <a:p>
+            <a:pPr>
+              <a:lnSpc>
+                <a:spcPct val="115000"/>
+              </a:lnSpc>
+              <a:spcAft>
+                <a:spcPts val="0"/>
+              </a:spcAft>
+            </a:pPr>
+            <a:r>
+              <a:rPr lang="en-US" dirty="0">
+                <a:solidFill>
+                  <a:srgbClr val="0000FF"/>
+                </a:solidFill>
+                <a:highlight>
+                  <a:srgbClr val="FFFFFF"/>
+                </a:highlight>
+                <a:latin typeface="Consolas"/>
+                <a:ea typeface="Calibri"/>
+                <a:cs typeface="Times New Roman"/>
+              </a:rPr>
+              <a:t>public</a:t>
+            </a:r>
+            <a:r>
+              <a:rPr lang="en-US" dirty="0">
+                <a:solidFill>
+                  <a:srgbClr val="000000"/>
+                </a:solidFill>
+                <a:highlight>
+                  <a:srgbClr val="FFFFFF"/>
+                </a:highlight>
+                <a:latin typeface="Consolas"/>
+                <a:ea typeface="Calibri"/>
+                <a:cs typeface="Times New Roman"/>
+              </a:rPr>
+              <a:t> </a:t>
+            </a:r>
+            <a:r>
+              <a:rPr lang="en-US" dirty="0">
+                <a:solidFill>
+                  <a:srgbClr val="0000FF"/>
+                </a:solidFill>
+                <a:highlight>
+                  <a:srgbClr val="FFFFFF"/>
+                </a:highlight>
+                <a:latin typeface="Consolas"/>
+                <a:ea typeface="Calibri"/>
+                <a:cs typeface="Times New Roman"/>
+              </a:rPr>
+              <a:t>class</a:t>
+            </a:r>
+            <a:r>
+              <a:rPr lang="en-US" dirty="0">
+                <a:solidFill>
+                  <a:srgbClr val="000000"/>
+                </a:solidFill>
+                <a:highlight>
+                  <a:srgbClr val="FFFFFF"/>
+                </a:highlight>
+                <a:latin typeface="Consolas"/>
+                <a:ea typeface="Calibri"/>
+                <a:cs typeface="Times New Roman"/>
+              </a:rPr>
+              <a:t> </a:t>
+            </a:r>
+            <a:r>
+              <a:rPr lang="en-US" dirty="0" err="1">
+                <a:solidFill>
+                  <a:srgbClr val="2B91AF"/>
+                </a:solidFill>
+                <a:highlight>
+                  <a:srgbClr val="FFFFFF"/>
+                </a:highlight>
+                <a:latin typeface="Consolas"/>
+                <a:ea typeface="Calibri"/>
+                <a:cs typeface="Times New Roman"/>
+              </a:rPr>
+              <a:t>MvcApplication</a:t>
+            </a:r>
+            <a:r>
+              <a:rPr lang="en-US" dirty="0">
+                <a:solidFill>
+                  <a:srgbClr val="000000"/>
+                </a:solidFill>
+                <a:highlight>
+                  <a:srgbClr val="FFFFFF"/>
+                </a:highlight>
+                <a:latin typeface="Consolas"/>
+                <a:ea typeface="Calibri"/>
+                <a:cs typeface="Times New Roman"/>
+              </a:rPr>
+              <a:t> : </a:t>
+            </a:r>
+            <a:r>
+              <a:rPr lang="en-US" dirty="0" err="1">
+                <a:solidFill>
+                  <a:srgbClr val="000000"/>
+                </a:solidFill>
+                <a:highlight>
+                  <a:srgbClr val="FFFFFF"/>
+                </a:highlight>
+                <a:latin typeface="Consolas"/>
+                <a:ea typeface="Calibri"/>
+                <a:cs typeface="Times New Roman"/>
+              </a:rPr>
+              <a:t>System.Web.</a:t>
+            </a:r>
+            <a:r>
+              <a:rPr lang="en-US" dirty="0" err="1">
+                <a:solidFill>
+                  <a:srgbClr val="2B91AF"/>
+                </a:solidFill>
+                <a:highlight>
+                  <a:srgbClr val="FFFFFF"/>
+                </a:highlight>
+                <a:latin typeface="Consolas"/>
+                <a:ea typeface="Calibri"/>
+                <a:cs typeface="Times New Roman"/>
+              </a:rPr>
+              <a:t>HttpApplication</a:t>
+            </a:r>
+            <a:endParaRPr lang="en-US" sz="2400" dirty="0">
+              <a:ea typeface="Calibri"/>
+              <a:cs typeface="Times New Roman"/>
+            </a:endParaRPr>
+          </a:p>
+          <a:p>
+            <a:pPr>
+              <a:lnSpc>
+                <a:spcPct val="115000"/>
+              </a:lnSpc>
+              <a:spcAft>
+                <a:spcPts val="0"/>
+              </a:spcAft>
+            </a:pPr>
+            <a:r>
+              <a:rPr lang="en-US" dirty="0">
+                <a:solidFill>
+                  <a:srgbClr val="000000"/>
+                </a:solidFill>
+                <a:highlight>
+                  <a:srgbClr val="FFFFFF"/>
+                </a:highlight>
+                <a:latin typeface="Consolas"/>
+                <a:ea typeface="Calibri"/>
+                <a:cs typeface="Times New Roman"/>
+              </a:rPr>
+              <a:t>    {</a:t>
+            </a:r>
+            <a:endParaRPr lang="en-US" sz="2400" dirty="0">
+              <a:ea typeface="Calibri"/>
+              <a:cs typeface="Times New Roman"/>
+            </a:endParaRPr>
+          </a:p>
+          <a:p>
+            <a:pPr>
+              <a:lnSpc>
+                <a:spcPct val="115000"/>
+              </a:lnSpc>
+              <a:spcAft>
+                <a:spcPts val="0"/>
+              </a:spcAft>
+            </a:pPr>
+            <a:r>
+              <a:rPr lang="en-US" dirty="0">
+                <a:solidFill>
+                  <a:srgbClr val="000000"/>
+                </a:solidFill>
+                <a:highlight>
+                  <a:srgbClr val="FFFFFF"/>
+                </a:highlight>
+                <a:latin typeface="Consolas"/>
+                <a:ea typeface="Calibri"/>
+                <a:cs typeface="Times New Roman"/>
+              </a:rPr>
+              <a:t>        </a:t>
+            </a:r>
+            <a:r>
+              <a:rPr lang="en-US" dirty="0">
+                <a:solidFill>
+                  <a:srgbClr val="0000FF"/>
+                </a:solidFill>
+                <a:highlight>
+                  <a:srgbClr val="FFFFFF"/>
+                </a:highlight>
+                <a:latin typeface="Consolas"/>
+                <a:ea typeface="Calibri"/>
+                <a:cs typeface="Times New Roman"/>
+              </a:rPr>
+              <a:t>protected</a:t>
+            </a:r>
+            <a:r>
+              <a:rPr lang="en-US" dirty="0">
+                <a:solidFill>
+                  <a:srgbClr val="000000"/>
+                </a:solidFill>
+                <a:highlight>
+                  <a:srgbClr val="FFFFFF"/>
+                </a:highlight>
+                <a:latin typeface="Consolas"/>
+                <a:ea typeface="Calibri"/>
+                <a:cs typeface="Times New Roman"/>
+              </a:rPr>
+              <a:t> </a:t>
+            </a:r>
+            <a:r>
+              <a:rPr lang="en-US" dirty="0">
+                <a:solidFill>
+                  <a:srgbClr val="0000FF"/>
+                </a:solidFill>
+                <a:highlight>
+                  <a:srgbClr val="FFFFFF"/>
+                </a:highlight>
+                <a:latin typeface="Consolas"/>
+                <a:ea typeface="Calibri"/>
+                <a:cs typeface="Times New Roman"/>
+              </a:rPr>
+              <a:t>void</a:t>
+            </a:r>
+            <a:r>
+              <a:rPr lang="en-US" dirty="0">
+                <a:solidFill>
+                  <a:srgbClr val="000000"/>
+                </a:solidFill>
+                <a:highlight>
+                  <a:srgbClr val="FFFFFF"/>
+                </a:highlight>
+                <a:latin typeface="Consolas"/>
+                <a:ea typeface="Calibri"/>
+                <a:cs typeface="Times New Roman"/>
+              </a:rPr>
+              <a:t> </a:t>
+            </a:r>
+            <a:r>
+              <a:rPr lang="en-US" dirty="0" err="1">
+                <a:solidFill>
+                  <a:srgbClr val="000000"/>
+                </a:solidFill>
+                <a:highlight>
+                  <a:srgbClr val="FFFFFF"/>
+                </a:highlight>
+                <a:latin typeface="Consolas"/>
+                <a:ea typeface="Calibri"/>
+                <a:cs typeface="Times New Roman"/>
+              </a:rPr>
+              <a:t>Application_Start</a:t>
+            </a:r>
+            <a:r>
+              <a:rPr lang="en-US" dirty="0">
+                <a:solidFill>
+                  <a:srgbClr val="000000"/>
+                </a:solidFill>
+                <a:highlight>
+                  <a:srgbClr val="FFFFFF"/>
+                </a:highlight>
+                <a:latin typeface="Consolas"/>
+                <a:ea typeface="Calibri"/>
+                <a:cs typeface="Times New Roman"/>
+              </a:rPr>
+              <a:t>()</a:t>
+            </a:r>
+            <a:endParaRPr lang="en-US" sz="2400" dirty="0">
+              <a:ea typeface="Calibri"/>
+              <a:cs typeface="Times New Roman"/>
+            </a:endParaRPr>
+          </a:p>
+          <a:p>
+            <a:pPr>
+              <a:lnSpc>
+                <a:spcPct val="115000"/>
+              </a:lnSpc>
+              <a:spcAft>
+                <a:spcPts val="0"/>
+              </a:spcAft>
+            </a:pPr>
+            <a:r>
+              <a:rPr lang="en-US" dirty="0">
+                <a:solidFill>
+                  <a:srgbClr val="000000"/>
+                </a:solidFill>
+                <a:highlight>
+                  <a:srgbClr val="FFFFFF"/>
+                </a:highlight>
+                <a:latin typeface="Consolas"/>
+                <a:ea typeface="Calibri"/>
+                <a:cs typeface="Times New Roman"/>
+              </a:rPr>
+              <a:t>        {</a:t>
+            </a:r>
+            <a:endParaRPr lang="en-US" sz="2400" dirty="0">
+              <a:ea typeface="Calibri"/>
+              <a:cs typeface="Times New Roman"/>
+            </a:endParaRPr>
+          </a:p>
+          <a:p>
+            <a:pPr>
+              <a:lnSpc>
+                <a:spcPct val="115000"/>
+              </a:lnSpc>
+              <a:spcAft>
+                <a:spcPts val="0"/>
+              </a:spcAft>
+            </a:pPr>
+            <a:r>
+              <a:rPr lang="en-US" dirty="0">
+                <a:solidFill>
+                  <a:srgbClr val="000000"/>
+                </a:solidFill>
+                <a:highlight>
+                  <a:srgbClr val="FFFFFF"/>
+                </a:highlight>
+                <a:latin typeface="Consolas"/>
+                <a:ea typeface="Calibri"/>
+                <a:cs typeface="Times New Roman"/>
+              </a:rPr>
+              <a:t>            </a:t>
+            </a:r>
+            <a:r>
+              <a:rPr lang="en-US" dirty="0" err="1">
+                <a:solidFill>
+                  <a:srgbClr val="0000FF"/>
+                </a:solidFill>
+                <a:highlight>
+                  <a:srgbClr val="FFFFFF"/>
+                </a:highlight>
+                <a:latin typeface="Consolas"/>
+                <a:ea typeface="Calibri"/>
+                <a:cs typeface="Times New Roman"/>
+              </a:rPr>
+              <a:t>var</a:t>
+            </a:r>
+            <a:r>
+              <a:rPr lang="en-US" dirty="0">
+                <a:solidFill>
+                  <a:srgbClr val="000000"/>
+                </a:solidFill>
+                <a:highlight>
+                  <a:srgbClr val="FFFFFF"/>
+                </a:highlight>
+                <a:latin typeface="Consolas"/>
+                <a:ea typeface="Calibri"/>
+                <a:cs typeface="Times New Roman"/>
+              </a:rPr>
+              <a:t> container = </a:t>
+            </a:r>
+            <a:r>
+              <a:rPr lang="en-US" dirty="0">
+                <a:solidFill>
+                  <a:srgbClr val="0000FF"/>
+                </a:solidFill>
+                <a:highlight>
+                  <a:srgbClr val="FFFFFF"/>
+                </a:highlight>
+                <a:latin typeface="Consolas"/>
+                <a:ea typeface="Calibri"/>
+                <a:cs typeface="Times New Roman"/>
+              </a:rPr>
+              <a:t>new</a:t>
+            </a:r>
+            <a:r>
+              <a:rPr lang="en-US" dirty="0">
+                <a:solidFill>
+                  <a:srgbClr val="000000"/>
+                </a:solidFill>
+                <a:highlight>
+                  <a:srgbClr val="FFFFFF"/>
+                </a:highlight>
+                <a:latin typeface="Consolas"/>
+                <a:ea typeface="Calibri"/>
+                <a:cs typeface="Times New Roman"/>
+              </a:rPr>
+              <a:t> </a:t>
+            </a:r>
+            <a:r>
+              <a:rPr lang="en-US" dirty="0" err="1">
+                <a:solidFill>
+                  <a:srgbClr val="2B91AF"/>
+                </a:solidFill>
+                <a:highlight>
+                  <a:srgbClr val="FFFFFF"/>
+                </a:highlight>
+                <a:latin typeface="Consolas"/>
+                <a:ea typeface="Calibri"/>
+                <a:cs typeface="Times New Roman"/>
+              </a:rPr>
+              <a:t>UnityContainer</a:t>
+            </a:r>
+            <a:r>
+              <a:rPr lang="en-US" dirty="0">
+                <a:solidFill>
+                  <a:srgbClr val="000000"/>
+                </a:solidFill>
+                <a:highlight>
+                  <a:srgbClr val="FFFFFF"/>
+                </a:highlight>
+                <a:latin typeface="Consolas"/>
+                <a:ea typeface="Calibri"/>
+                <a:cs typeface="Times New Roman"/>
+              </a:rPr>
+              <a:t>();</a:t>
+            </a:r>
+            <a:endParaRPr lang="en-US" sz="2400" dirty="0">
+              <a:ea typeface="Calibri"/>
+              <a:cs typeface="Times New Roman"/>
+            </a:endParaRPr>
+          </a:p>
+          <a:p>
+            <a:pPr>
+              <a:lnSpc>
+                <a:spcPct val="115000"/>
+              </a:lnSpc>
+              <a:spcAft>
+                <a:spcPts val="0"/>
+              </a:spcAft>
+            </a:pPr>
+            <a:r>
+              <a:rPr lang="en-US" dirty="0">
+                <a:solidFill>
+                  <a:srgbClr val="000000"/>
+                </a:solidFill>
+                <a:highlight>
+                  <a:srgbClr val="FFFFFF"/>
+                </a:highlight>
+                <a:latin typeface="Consolas"/>
+                <a:ea typeface="Calibri"/>
+                <a:cs typeface="Times New Roman"/>
+              </a:rPr>
+              <a:t>            </a:t>
+            </a:r>
+            <a:r>
+              <a:rPr lang="en-US" dirty="0" err="1">
+                <a:solidFill>
+                  <a:srgbClr val="2B91AF"/>
+                </a:solidFill>
+                <a:highlight>
+                  <a:srgbClr val="FFFFFF"/>
+                </a:highlight>
+                <a:latin typeface="Consolas"/>
+                <a:ea typeface="Calibri"/>
+                <a:cs typeface="Times New Roman"/>
+              </a:rPr>
+              <a:t>DependencyConfig</a:t>
+            </a:r>
+            <a:r>
+              <a:rPr lang="en-US" dirty="0" err="1">
+                <a:solidFill>
+                  <a:srgbClr val="000000"/>
+                </a:solidFill>
+                <a:highlight>
+                  <a:srgbClr val="FFFFFF"/>
+                </a:highlight>
+                <a:latin typeface="Consolas"/>
+                <a:ea typeface="Calibri"/>
+                <a:cs typeface="Times New Roman"/>
+              </a:rPr>
+              <a:t>.Configure</a:t>
+            </a:r>
+            <a:r>
+              <a:rPr lang="en-US" dirty="0">
+                <a:solidFill>
+                  <a:srgbClr val="000000"/>
+                </a:solidFill>
+                <a:highlight>
+                  <a:srgbClr val="FFFFFF"/>
+                </a:highlight>
+                <a:latin typeface="Consolas"/>
+                <a:ea typeface="Calibri"/>
+                <a:cs typeface="Times New Roman"/>
+              </a:rPr>
+              <a:t>(container);</a:t>
+            </a:r>
+            <a:endParaRPr lang="en-US" sz="2400" dirty="0">
+              <a:ea typeface="Calibri"/>
+              <a:cs typeface="Times New Roman"/>
+            </a:endParaRPr>
+          </a:p>
+          <a:p>
+            <a:pPr>
+              <a:lnSpc>
+                <a:spcPct val="115000"/>
+              </a:lnSpc>
+              <a:spcAft>
+                <a:spcPts val="0"/>
+              </a:spcAft>
+            </a:pPr>
+            <a:r>
+              <a:rPr lang="en-US" dirty="0">
+                <a:solidFill>
+                  <a:srgbClr val="000000"/>
+                </a:solidFill>
+                <a:highlight>
+                  <a:srgbClr val="FFFFFF"/>
+                </a:highlight>
+                <a:latin typeface="Consolas"/>
+                <a:ea typeface="Calibri"/>
+                <a:cs typeface="Times New Roman"/>
+              </a:rPr>
+              <a:t>            </a:t>
+            </a:r>
+            <a:r>
+              <a:rPr lang="en-US" dirty="0" err="1">
+                <a:solidFill>
+                  <a:srgbClr val="0000FF"/>
+                </a:solidFill>
+                <a:highlight>
+                  <a:srgbClr val="FFFFFF"/>
+                </a:highlight>
+                <a:latin typeface="Consolas"/>
+                <a:ea typeface="Calibri"/>
+                <a:cs typeface="Times New Roman"/>
+              </a:rPr>
+              <a:t>var</a:t>
+            </a:r>
+            <a:r>
+              <a:rPr lang="en-US" dirty="0">
+                <a:solidFill>
+                  <a:srgbClr val="000000"/>
+                </a:solidFill>
+                <a:highlight>
+                  <a:srgbClr val="FFFFFF"/>
+                </a:highlight>
+                <a:latin typeface="Consolas"/>
+                <a:ea typeface="Calibri"/>
+                <a:cs typeface="Times New Roman"/>
+              </a:rPr>
+              <a:t> </a:t>
+            </a:r>
+            <a:r>
+              <a:rPr lang="en-US" dirty="0" err="1">
+                <a:solidFill>
+                  <a:srgbClr val="000000"/>
+                </a:solidFill>
+                <a:highlight>
+                  <a:srgbClr val="FFFFFF"/>
+                </a:highlight>
+                <a:latin typeface="Consolas"/>
+                <a:ea typeface="Calibri"/>
+                <a:cs typeface="Times New Roman"/>
+              </a:rPr>
+              <a:t>compositionRoot</a:t>
+            </a:r>
+            <a:r>
+              <a:rPr lang="en-US" dirty="0">
+                <a:solidFill>
+                  <a:srgbClr val="000000"/>
+                </a:solidFill>
+                <a:highlight>
+                  <a:srgbClr val="FFFFFF"/>
+                </a:highlight>
+                <a:latin typeface="Consolas"/>
+                <a:ea typeface="Calibri"/>
+                <a:cs typeface="Times New Roman"/>
+              </a:rPr>
+              <a:t> = </a:t>
+            </a:r>
+            <a:r>
+              <a:rPr lang="en-US" dirty="0">
+                <a:solidFill>
+                  <a:srgbClr val="0000FF"/>
+                </a:solidFill>
+                <a:highlight>
+                  <a:srgbClr val="FFFFFF"/>
+                </a:highlight>
+                <a:latin typeface="Consolas"/>
+                <a:ea typeface="Calibri"/>
+                <a:cs typeface="Times New Roman"/>
+              </a:rPr>
+              <a:t>new</a:t>
+            </a:r>
+            <a:r>
+              <a:rPr lang="en-US" dirty="0">
+                <a:solidFill>
+                  <a:srgbClr val="000000"/>
+                </a:solidFill>
+                <a:highlight>
+                  <a:srgbClr val="FFFFFF"/>
+                </a:highlight>
+                <a:latin typeface="Consolas"/>
+                <a:ea typeface="Calibri"/>
+                <a:cs typeface="Times New Roman"/>
+              </a:rPr>
+              <a:t> </a:t>
+            </a:r>
+            <a:r>
+              <a:rPr lang="en-US" dirty="0" err="1">
+                <a:solidFill>
+                  <a:srgbClr val="2B91AF"/>
+                </a:solidFill>
+                <a:highlight>
+                  <a:srgbClr val="FFFFFF"/>
+                </a:highlight>
+                <a:latin typeface="Consolas"/>
+                <a:ea typeface="Calibri"/>
+                <a:cs typeface="Times New Roman"/>
+              </a:rPr>
+              <a:t>AppCompositionRoot</a:t>
+            </a:r>
+            <a:r>
+              <a:rPr lang="en-US" dirty="0">
+                <a:solidFill>
+                  <a:srgbClr val="000000"/>
+                </a:solidFill>
+                <a:highlight>
+                  <a:srgbClr val="FFFFFF"/>
+                </a:highlight>
+                <a:latin typeface="Consolas"/>
+                <a:ea typeface="Calibri"/>
+                <a:cs typeface="Times New Roman"/>
+              </a:rPr>
+              <a:t>(container);</a:t>
+            </a:r>
+            <a:endParaRPr lang="en-US" sz="2400" dirty="0">
+              <a:ea typeface="Calibri"/>
+              <a:cs typeface="Times New Roman"/>
+            </a:endParaRPr>
+          </a:p>
+          <a:p>
+            <a:pPr>
+              <a:lnSpc>
+                <a:spcPct val="115000"/>
+              </a:lnSpc>
+              <a:spcAft>
+                <a:spcPts val="1000"/>
+              </a:spcAft>
+            </a:pPr>
+            <a:r>
+              <a:rPr lang="en-US" dirty="0">
+                <a:solidFill>
+                  <a:srgbClr val="000000"/>
+                </a:solidFill>
+                <a:highlight>
+                  <a:srgbClr val="FFFFFF"/>
+                </a:highlight>
+                <a:latin typeface="Consolas"/>
+                <a:ea typeface="Calibri"/>
+                <a:cs typeface="Times New Roman"/>
+              </a:rPr>
+              <a:t>            </a:t>
+            </a:r>
+            <a:r>
+              <a:rPr lang="en-US" dirty="0" err="1">
+                <a:solidFill>
+                  <a:srgbClr val="2B91AF"/>
+                </a:solidFill>
+                <a:highlight>
+                  <a:srgbClr val="FFFFFF"/>
+                </a:highlight>
+                <a:latin typeface="Consolas"/>
+                <a:ea typeface="Calibri"/>
+                <a:cs typeface="Times New Roman"/>
+              </a:rPr>
+              <a:t>ControllerBuilder</a:t>
+            </a:r>
+            <a:r>
+              <a:rPr lang="en-US" dirty="0" err="1">
+                <a:solidFill>
+                  <a:srgbClr val="000000"/>
+                </a:solidFill>
+                <a:highlight>
+                  <a:srgbClr val="FFFFFF"/>
+                </a:highlight>
+                <a:latin typeface="Consolas"/>
+                <a:ea typeface="Calibri"/>
+                <a:cs typeface="Times New Roman"/>
+              </a:rPr>
+              <a:t>.Current.SetControllerFactory</a:t>
+            </a:r>
+            <a:r>
+              <a:rPr lang="en-US" dirty="0">
+                <a:solidFill>
+                  <a:srgbClr val="000000"/>
+                </a:solidFill>
+                <a:highlight>
+                  <a:srgbClr val="FFFFFF"/>
+                </a:highlight>
+                <a:latin typeface="Consolas"/>
+                <a:ea typeface="Calibri"/>
+                <a:cs typeface="Times New Roman"/>
+              </a:rPr>
+              <a:t>(</a:t>
+            </a:r>
+            <a:r>
+              <a:rPr lang="en-US" dirty="0" err="1">
+                <a:solidFill>
+                  <a:srgbClr val="000000"/>
+                </a:solidFill>
+                <a:highlight>
+                  <a:srgbClr val="FFFFFF"/>
+                </a:highlight>
+                <a:latin typeface="Consolas"/>
+                <a:ea typeface="Calibri"/>
+                <a:cs typeface="Times New Roman"/>
+              </a:rPr>
+              <a:t>compositionRoot</a:t>
+            </a:r>
+            <a:r>
+              <a:rPr lang="en-US" dirty="0" smtClean="0">
+                <a:solidFill>
+                  <a:srgbClr val="000000"/>
+                </a:solidFill>
+                <a:highlight>
+                  <a:srgbClr val="FFFFFF"/>
+                </a:highlight>
+                <a:latin typeface="Consolas"/>
+                <a:ea typeface="Calibri"/>
+                <a:cs typeface="Times New Roman"/>
+              </a:rPr>
+              <a:t>);</a:t>
+            </a:r>
+          </a:p>
+          <a:p>
+            <a:pPr>
+              <a:lnSpc>
+                <a:spcPct val="115000"/>
+              </a:lnSpc>
+              <a:spcAft>
+                <a:spcPts val="1000"/>
+              </a:spcAft>
+            </a:pPr>
+            <a:r>
+              <a:rPr lang="fr-FR" sz="2000" i="1" dirty="0" smtClean="0">
+                <a:solidFill>
+                  <a:srgbClr val="000000"/>
+                </a:solidFill>
+                <a:highlight>
+                  <a:srgbClr val="FFFFFF"/>
+                </a:highlight>
+                <a:ea typeface="Calibri"/>
+                <a:cs typeface="Times New Roman"/>
+              </a:rPr>
+              <a:t>In </a:t>
+            </a:r>
+            <a:r>
+              <a:rPr lang="fr-FR" sz="2000" i="1" dirty="0" err="1" smtClean="0">
+                <a:solidFill>
+                  <a:srgbClr val="000000"/>
+                </a:solidFill>
+                <a:highlight>
+                  <a:srgbClr val="FFFFFF"/>
+                </a:highlight>
+                <a:ea typeface="Calibri"/>
+                <a:cs typeface="Times New Roman"/>
+              </a:rPr>
+              <a:t>Global.asax</a:t>
+            </a:r>
+            <a:endParaRPr lang="en-US" sz="2400" i="1" dirty="0">
+              <a:ea typeface="Calibri"/>
+              <a:cs typeface="Times New Roman"/>
+            </a:endParaRPr>
+          </a:p>
+        </p:txBody>
+      </p:sp>
+      <p:sp>
+        <p:nvSpPr>
+          <p:cNvPr id="5" name="TextBox 4"/>
+          <p:cNvSpPr txBox="1"/>
+          <p:nvPr/>
+        </p:nvSpPr>
+        <p:spPr>
+          <a:xfrm>
+            <a:off x="-189106" y="-27384"/>
+            <a:ext cx="9784704" cy="3760004"/>
+          </a:xfrm>
+          <a:prstGeom prst="rect">
+            <a:avLst/>
+          </a:prstGeom>
+          <a:solidFill>
+            <a:schemeClr val="bg1"/>
+          </a:solidFill>
+          <a:ln>
+            <a:solidFill>
+              <a:schemeClr val="accent1"/>
+            </a:solidFill>
+          </a:ln>
+        </p:spPr>
+        <p:txBody>
+          <a:bodyPr wrap="square" rtlCol="0">
+            <a:spAutoFit/>
+          </a:bodyPr>
+          <a:lstStyle/>
+          <a:p>
+            <a:pPr>
+              <a:lnSpc>
+                <a:spcPct val="115000"/>
+              </a:lnSpc>
+              <a:spcAft>
+                <a:spcPts val="0"/>
+              </a:spcAft>
+            </a:pPr>
+            <a:r>
+              <a:rPr lang="en-US" sz="1400" dirty="0">
+                <a:solidFill>
+                  <a:srgbClr val="000000"/>
+                </a:solidFill>
+                <a:highlight>
+                  <a:srgbClr val="FFFFFF"/>
+                </a:highlight>
+                <a:latin typeface="Consolas"/>
+                <a:ea typeface="Calibri"/>
+                <a:cs typeface="Times New Roman"/>
+              </a:rPr>
+              <a:t> </a:t>
+            </a:r>
+            <a:r>
+              <a:rPr lang="en-US" sz="1400" dirty="0">
+                <a:solidFill>
+                  <a:srgbClr val="0000FF"/>
+                </a:solidFill>
+                <a:highlight>
+                  <a:srgbClr val="FFFFFF"/>
+                </a:highlight>
+                <a:latin typeface="Consolas"/>
+                <a:ea typeface="Calibri"/>
+                <a:cs typeface="Times New Roman"/>
+              </a:rPr>
+              <a:t>public</a:t>
+            </a:r>
+            <a:r>
+              <a:rPr lang="en-US" sz="1400" dirty="0">
+                <a:solidFill>
+                  <a:srgbClr val="000000"/>
+                </a:solidFill>
+                <a:highlight>
+                  <a:srgbClr val="FFFFFF"/>
+                </a:highlight>
+                <a:latin typeface="Consolas"/>
+                <a:ea typeface="Calibri"/>
+                <a:cs typeface="Times New Roman"/>
+              </a:rPr>
+              <a:t> </a:t>
+            </a:r>
+            <a:r>
+              <a:rPr lang="en-US" sz="1400" dirty="0">
+                <a:solidFill>
+                  <a:srgbClr val="0000FF"/>
+                </a:solidFill>
+                <a:highlight>
+                  <a:srgbClr val="FFFFFF"/>
+                </a:highlight>
+                <a:latin typeface="Consolas"/>
+                <a:ea typeface="Calibri"/>
+                <a:cs typeface="Times New Roman"/>
+              </a:rPr>
+              <a:t>class</a:t>
+            </a:r>
+            <a:r>
+              <a:rPr lang="en-US" sz="1400" dirty="0">
+                <a:solidFill>
+                  <a:srgbClr val="000000"/>
+                </a:solidFill>
+                <a:highlight>
+                  <a:srgbClr val="FFFFFF"/>
+                </a:highlight>
+                <a:latin typeface="Consolas"/>
+                <a:ea typeface="Calibri"/>
+                <a:cs typeface="Times New Roman"/>
+              </a:rPr>
+              <a:t> </a:t>
+            </a:r>
+            <a:r>
+              <a:rPr lang="en-US" sz="1400" dirty="0" err="1">
+                <a:solidFill>
+                  <a:srgbClr val="2B91AF"/>
+                </a:solidFill>
+                <a:highlight>
+                  <a:srgbClr val="FFFFFF"/>
+                </a:highlight>
+                <a:latin typeface="Consolas"/>
+                <a:ea typeface="Calibri"/>
+                <a:cs typeface="Times New Roman"/>
+              </a:rPr>
+              <a:t>DependencyConfig</a:t>
+            </a:r>
+            <a:endParaRPr lang="en-US" dirty="0">
+              <a:ea typeface="Calibri"/>
+              <a:cs typeface="Times New Roman"/>
+            </a:endParaRPr>
+          </a:p>
+          <a:p>
+            <a:pPr>
+              <a:lnSpc>
+                <a:spcPct val="115000"/>
+              </a:lnSpc>
+              <a:spcAft>
+                <a:spcPts val="0"/>
+              </a:spcAft>
+            </a:pPr>
+            <a:r>
+              <a:rPr lang="en-US" sz="1400" dirty="0">
+                <a:solidFill>
+                  <a:srgbClr val="000000"/>
+                </a:solidFill>
+                <a:highlight>
+                  <a:srgbClr val="FFFFFF"/>
+                </a:highlight>
+                <a:latin typeface="Consolas"/>
+                <a:ea typeface="Calibri"/>
+                <a:cs typeface="Times New Roman"/>
+              </a:rPr>
+              <a:t>    {</a:t>
+            </a:r>
+            <a:endParaRPr lang="en-US" dirty="0">
+              <a:ea typeface="Calibri"/>
+              <a:cs typeface="Times New Roman"/>
+            </a:endParaRPr>
+          </a:p>
+          <a:p>
+            <a:pPr>
+              <a:lnSpc>
+                <a:spcPct val="115000"/>
+              </a:lnSpc>
+              <a:spcAft>
+                <a:spcPts val="0"/>
+              </a:spcAft>
+            </a:pPr>
+            <a:r>
+              <a:rPr lang="en-US" sz="1400" dirty="0">
+                <a:solidFill>
+                  <a:srgbClr val="000000"/>
+                </a:solidFill>
+                <a:highlight>
+                  <a:srgbClr val="FFFFFF"/>
+                </a:highlight>
+                <a:latin typeface="Consolas"/>
+                <a:ea typeface="Calibri"/>
+                <a:cs typeface="Times New Roman"/>
+              </a:rPr>
+              <a:t> </a:t>
+            </a:r>
+            <a:endParaRPr lang="en-US" dirty="0">
+              <a:ea typeface="Calibri"/>
+              <a:cs typeface="Times New Roman"/>
+            </a:endParaRPr>
+          </a:p>
+          <a:p>
+            <a:pPr>
+              <a:lnSpc>
+                <a:spcPct val="115000"/>
+              </a:lnSpc>
+              <a:spcAft>
+                <a:spcPts val="0"/>
+              </a:spcAft>
+            </a:pPr>
+            <a:r>
+              <a:rPr lang="en-US" sz="1400" dirty="0">
+                <a:solidFill>
+                  <a:srgbClr val="000000"/>
+                </a:solidFill>
+                <a:highlight>
+                  <a:srgbClr val="FFFFFF"/>
+                </a:highlight>
+                <a:latin typeface="Consolas"/>
+                <a:ea typeface="Calibri"/>
+                <a:cs typeface="Times New Roman"/>
+              </a:rPr>
+              <a:t>        </a:t>
+            </a:r>
+            <a:r>
+              <a:rPr lang="en-US" sz="1400" dirty="0">
+                <a:solidFill>
+                  <a:srgbClr val="0000FF"/>
+                </a:solidFill>
+                <a:highlight>
+                  <a:srgbClr val="FFFFFF"/>
+                </a:highlight>
+                <a:latin typeface="Consolas"/>
+                <a:ea typeface="Calibri"/>
+                <a:cs typeface="Times New Roman"/>
+              </a:rPr>
+              <a:t>public</a:t>
+            </a:r>
+            <a:r>
+              <a:rPr lang="en-US" sz="1400" dirty="0">
+                <a:solidFill>
+                  <a:srgbClr val="000000"/>
+                </a:solidFill>
+                <a:highlight>
+                  <a:srgbClr val="FFFFFF"/>
+                </a:highlight>
+                <a:latin typeface="Consolas"/>
+                <a:ea typeface="Calibri"/>
+                <a:cs typeface="Times New Roman"/>
+              </a:rPr>
+              <a:t> </a:t>
+            </a:r>
+            <a:r>
+              <a:rPr lang="en-US" sz="1400" dirty="0">
+                <a:solidFill>
+                  <a:srgbClr val="0000FF"/>
+                </a:solidFill>
+                <a:highlight>
+                  <a:srgbClr val="FFFFFF"/>
+                </a:highlight>
+                <a:latin typeface="Consolas"/>
+                <a:ea typeface="Calibri"/>
+                <a:cs typeface="Times New Roman"/>
+              </a:rPr>
+              <a:t>static</a:t>
+            </a:r>
+            <a:r>
+              <a:rPr lang="en-US" sz="1400" dirty="0">
+                <a:solidFill>
+                  <a:srgbClr val="000000"/>
+                </a:solidFill>
+                <a:highlight>
+                  <a:srgbClr val="FFFFFF"/>
+                </a:highlight>
+                <a:latin typeface="Consolas"/>
+                <a:ea typeface="Calibri"/>
+                <a:cs typeface="Times New Roman"/>
+              </a:rPr>
+              <a:t> </a:t>
+            </a:r>
+            <a:r>
+              <a:rPr lang="en-US" sz="1400" dirty="0">
+                <a:solidFill>
+                  <a:srgbClr val="0000FF"/>
+                </a:solidFill>
+                <a:highlight>
+                  <a:srgbClr val="FFFFFF"/>
+                </a:highlight>
+                <a:latin typeface="Consolas"/>
+                <a:ea typeface="Calibri"/>
+                <a:cs typeface="Times New Roman"/>
+              </a:rPr>
+              <a:t>void</a:t>
+            </a:r>
+            <a:r>
+              <a:rPr lang="en-US" sz="1400" dirty="0">
+                <a:solidFill>
+                  <a:srgbClr val="000000"/>
+                </a:solidFill>
+                <a:highlight>
+                  <a:srgbClr val="FFFFFF"/>
+                </a:highlight>
+                <a:latin typeface="Consolas"/>
+                <a:ea typeface="Calibri"/>
+                <a:cs typeface="Times New Roman"/>
+              </a:rPr>
+              <a:t> Configure(</a:t>
+            </a:r>
+            <a:r>
+              <a:rPr lang="en-US" sz="1400" dirty="0" err="1">
+                <a:solidFill>
+                  <a:srgbClr val="2B91AF"/>
+                </a:solidFill>
+                <a:highlight>
+                  <a:srgbClr val="FFFFFF"/>
+                </a:highlight>
+                <a:latin typeface="Consolas"/>
+                <a:ea typeface="Calibri"/>
+                <a:cs typeface="Times New Roman"/>
+              </a:rPr>
+              <a:t>IUnityContainer</a:t>
+            </a:r>
+            <a:r>
+              <a:rPr lang="en-US" sz="1400" dirty="0">
+                <a:solidFill>
+                  <a:srgbClr val="000000"/>
+                </a:solidFill>
+                <a:highlight>
+                  <a:srgbClr val="FFFFFF"/>
+                </a:highlight>
+                <a:latin typeface="Consolas"/>
+                <a:ea typeface="Calibri"/>
+                <a:cs typeface="Times New Roman"/>
+              </a:rPr>
+              <a:t> container)</a:t>
+            </a:r>
+            <a:endParaRPr lang="en-US" dirty="0">
+              <a:ea typeface="Calibri"/>
+              <a:cs typeface="Times New Roman"/>
+            </a:endParaRPr>
+          </a:p>
+          <a:p>
+            <a:pPr>
+              <a:lnSpc>
+                <a:spcPct val="115000"/>
+              </a:lnSpc>
+              <a:spcAft>
+                <a:spcPts val="0"/>
+              </a:spcAft>
+            </a:pPr>
+            <a:r>
+              <a:rPr lang="en-US" sz="1400" dirty="0">
+                <a:solidFill>
+                  <a:srgbClr val="000000"/>
+                </a:solidFill>
+                <a:highlight>
+                  <a:srgbClr val="FFFFFF"/>
+                </a:highlight>
+                <a:latin typeface="Consolas"/>
+                <a:ea typeface="Calibri"/>
+                <a:cs typeface="Times New Roman"/>
+              </a:rPr>
+              <a:t>        {</a:t>
+            </a:r>
+            <a:endParaRPr lang="en-US" dirty="0">
+              <a:ea typeface="Calibri"/>
+              <a:cs typeface="Times New Roman"/>
+            </a:endParaRPr>
+          </a:p>
+          <a:p>
+            <a:pPr>
+              <a:lnSpc>
+                <a:spcPct val="115000"/>
+              </a:lnSpc>
+              <a:spcAft>
+                <a:spcPts val="0"/>
+              </a:spcAft>
+            </a:pPr>
+            <a:r>
+              <a:rPr lang="en-US" sz="1400" dirty="0">
+                <a:solidFill>
+                  <a:srgbClr val="000000"/>
+                </a:solidFill>
+                <a:highlight>
+                  <a:srgbClr val="FFFFFF"/>
+                </a:highlight>
+                <a:latin typeface="Consolas"/>
+                <a:ea typeface="Calibri"/>
+                <a:cs typeface="Times New Roman"/>
+              </a:rPr>
+              <a:t>            </a:t>
+            </a:r>
+            <a:r>
+              <a:rPr lang="en-US" sz="1400" dirty="0" err="1">
+                <a:solidFill>
+                  <a:srgbClr val="0000FF"/>
+                </a:solidFill>
+                <a:highlight>
+                  <a:srgbClr val="FFFFFF"/>
+                </a:highlight>
+                <a:latin typeface="Consolas"/>
+                <a:ea typeface="Calibri"/>
+                <a:cs typeface="Times New Roman"/>
+              </a:rPr>
+              <a:t>var</a:t>
+            </a:r>
+            <a:r>
+              <a:rPr lang="en-US" sz="1400" dirty="0">
+                <a:solidFill>
+                  <a:srgbClr val="000000"/>
+                </a:solidFill>
+                <a:highlight>
+                  <a:srgbClr val="FFFFFF"/>
+                </a:highlight>
+                <a:latin typeface="Consolas"/>
+                <a:ea typeface="Calibri"/>
+                <a:cs typeface="Times New Roman"/>
+              </a:rPr>
+              <a:t> </a:t>
+            </a:r>
+            <a:r>
+              <a:rPr lang="en-US" sz="1400" dirty="0" err="1">
+                <a:solidFill>
+                  <a:srgbClr val="000000"/>
+                </a:solidFill>
+                <a:highlight>
+                  <a:srgbClr val="FFFFFF"/>
+                </a:highlight>
+                <a:latin typeface="Consolas"/>
+                <a:ea typeface="Calibri"/>
+                <a:cs typeface="Times New Roman"/>
+              </a:rPr>
+              <a:t>connectionString</a:t>
+            </a:r>
+            <a:r>
+              <a:rPr lang="en-US" sz="1400" dirty="0">
+                <a:solidFill>
+                  <a:srgbClr val="000000"/>
+                </a:solidFill>
+                <a:highlight>
+                  <a:srgbClr val="FFFFFF"/>
+                </a:highlight>
+                <a:latin typeface="Consolas"/>
+                <a:ea typeface="Calibri"/>
+                <a:cs typeface="Times New Roman"/>
+              </a:rPr>
+              <a:t> = </a:t>
+            </a:r>
+            <a:r>
+              <a:rPr lang="en-US" sz="1400" dirty="0" err="1">
+                <a:solidFill>
+                  <a:srgbClr val="2B91AF"/>
+                </a:solidFill>
+                <a:highlight>
+                  <a:srgbClr val="FFFFFF"/>
+                </a:highlight>
+                <a:latin typeface="Consolas"/>
+                <a:ea typeface="Calibri"/>
+                <a:cs typeface="Times New Roman"/>
+              </a:rPr>
+              <a:t>ConfigurationManager</a:t>
+            </a:r>
+            <a:r>
+              <a:rPr lang="en-US" sz="1400" dirty="0" err="1">
+                <a:solidFill>
+                  <a:srgbClr val="000000"/>
+                </a:solidFill>
+                <a:highlight>
+                  <a:srgbClr val="FFFFFF"/>
+                </a:highlight>
+                <a:latin typeface="Consolas"/>
+                <a:ea typeface="Calibri"/>
+                <a:cs typeface="Times New Roman"/>
+              </a:rPr>
+              <a:t>.ConnectionStrings</a:t>
+            </a:r>
+            <a:r>
+              <a:rPr lang="en-US" sz="1400" dirty="0">
+                <a:solidFill>
+                  <a:srgbClr val="000000"/>
+                </a:solidFill>
+                <a:highlight>
+                  <a:srgbClr val="FFFFFF"/>
+                </a:highlight>
+                <a:latin typeface="Consolas"/>
+                <a:ea typeface="Calibri"/>
+                <a:cs typeface="Times New Roman"/>
+              </a:rPr>
+              <a:t>[</a:t>
+            </a:r>
+            <a:r>
+              <a:rPr lang="en-US" sz="1400" dirty="0">
+                <a:solidFill>
+                  <a:srgbClr val="A31515"/>
+                </a:solidFill>
+                <a:highlight>
+                  <a:srgbClr val="FFFFFF"/>
+                </a:highlight>
+                <a:latin typeface="Consolas"/>
+                <a:ea typeface="Calibri"/>
+                <a:cs typeface="Times New Roman"/>
+              </a:rPr>
+              <a:t>"</a:t>
+            </a:r>
+            <a:r>
+              <a:rPr lang="en-US" sz="1400" dirty="0" err="1">
+                <a:solidFill>
+                  <a:srgbClr val="A31515"/>
+                </a:solidFill>
+                <a:highlight>
+                  <a:srgbClr val="FFFFFF"/>
+                </a:highlight>
+                <a:latin typeface="Consolas"/>
+                <a:ea typeface="Calibri"/>
+                <a:cs typeface="Times New Roman"/>
+              </a:rPr>
+              <a:t>BankingDbContext</a:t>
+            </a:r>
+            <a:r>
+              <a:rPr lang="en-US" sz="1400" dirty="0">
+                <a:solidFill>
+                  <a:srgbClr val="A31515"/>
+                </a:solidFill>
+                <a:highlight>
+                  <a:srgbClr val="FFFFFF"/>
+                </a:highlight>
+                <a:latin typeface="Consolas"/>
+                <a:ea typeface="Calibri"/>
+                <a:cs typeface="Times New Roman"/>
+              </a:rPr>
+              <a:t>"</a:t>
+            </a:r>
+            <a:r>
+              <a:rPr lang="en-US" sz="1400" dirty="0">
+                <a:solidFill>
+                  <a:srgbClr val="000000"/>
+                </a:solidFill>
+                <a:highlight>
+                  <a:srgbClr val="FFFFFF"/>
+                </a:highlight>
+                <a:latin typeface="Consolas"/>
+                <a:ea typeface="Calibri"/>
+                <a:cs typeface="Times New Roman"/>
+              </a:rPr>
+              <a:t>]</a:t>
+            </a:r>
+            <a:endParaRPr lang="en-US" dirty="0">
+              <a:ea typeface="Calibri"/>
+              <a:cs typeface="Times New Roman"/>
+            </a:endParaRPr>
+          </a:p>
+          <a:p>
+            <a:pPr>
+              <a:lnSpc>
+                <a:spcPct val="115000"/>
+              </a:lnSpc>
+              <a:spcAft>
+                <a:spcPts val="0"/>
+              </a:spcAft>
+            </a:pPr>
+            <a:r>
+              <a:rPr lang="en-US" sz="1400" dirty="0">
+                <a:solidFill>
+                  <a:srgbClr val="000000"/>
+                </a:solidFill>
+                <a:highlight>
+                  <a:srgbClr val="FFFFFF"/>
+                </a:highlight>
+                <a:latin typeface="Consolas"/>
+                <a:ea typeface="Calibri"/>
+                <a:cs typeface="Times New Roman"/>
+              </a:rPr>
+              <a:t>                    .</a:t>
+            </a:r>
+            <a:r>
+              <a:rPr lang="en-US" sz="1400" dirty="0" err="1">
+                <a:solidFill>
+                  <a:srgbClr val="000000"/>
+                </a:solidFill>
+                <a:highlight>
+                  <a:srgbClr val="FFFFFF"/>
+                </a:highlight>
+                <a:latin typeface="Consolas"/>
+                <a:ea typeface="Calibri"/>
+                <a:cs typeface="Times New Roman"/>
+              </a:rPr>
+              <a:t>ConnectionString</a:t>
+            </a:r>
+            <a:r>
+              <a:rPr lang="en-US" sz="1400" dirty="0">
+                <a:solidFill>
+                  <a:srgbClr val="000000"/>
+                </a:solidFill>
+                <a:highlight>
+                  <a:srgbClr val="FFFFFF"/>
+                </a:highlight>
+                <a:latin typeface="Consolas"/>
+                <a:ea typeface="Calibri"/>
+                <a:cs typeface="Times New Roman"/>
+              </a:rPr>
+              <a:t>;</a:t>
+            </a:r>
+            <a:endParaRPr lang="en-US" dirty="0">
+              <a:ea typeface="Calibri"/>
+              <a:cs typeface="Times New Roman"/>
+            </a:endParaRPr>
+          </a:p>
+          <a:p>
+            <a:pPr>
+              <a:lnSpc>
+                <a:spcPct val="115000"/>
+              </a:lnSpc>
+              <a:spcAft>
+                <a:spcPts val="0"/>
+              </a:spcAft>
+            </a:pPr>
+            <a:r>
+              <a:rPr lang="en-US" sz="1400" dirty="0">
+                <a:solidFill>
+                  <a:srgbClr val="000000"/>
+                </a:solidFill>
+                <a:highlight>
+                  <a:srgbClr val="FFFFFF"/>
+                </a:highlight>
+                <a:latin typeface="Consolas"/>
+                <a:ea typeface="Calibri"/>
+                <a:cs typeface="Times New Roman"/>
+              </a:rPr>
+              <a:t>            </a:t>
+            </a:r>
+            <a:r>
+              <a:rPr lang="en-US" sz="1400" dirty="0" err="1">
+                <a:solidFill>
+                  <a:srgbClr val="000000"/>
+                </a:solidFill>
+                <a:highlight>
+                  <a:srgbClr val="FFFFFF"/>
+                </a:highlight>
+                <a:latin typeface="Consolas"/>
+                <a:ea typeface="Calibri"/>
+                <a:cs typeface="Times New Roman"/>
+              </a:rPr>
+              <a:t>container.RegisterType</a:t>
+            </a:r>
+            <a:r>
+              <a:rPr lang="en-US" sz="1400" dirty="0">
+                <a:solidFill>
+                  <a:srgbClr val="000000"/>
+                </a:solidFill>
+                <a:highlight>
+                  <a:srgbClr val="FFFFFF"/>
+                </a:highlight>
+                <a:latin typeface="Consolas"/>
+                <a:ea typeface="Calibri"/>
+                <a:cs typeface="Times New Roman"/>
+              </a:rPr>
+              <a:t>&lt;</a:t>
+            </a:r>
+            <a:r>
+              <a:rPr lang="en-US" sz="1400" dirty="0" err="1">
+                <a:solidFill>
+                  <a:srgbClr val="2B91AF"/>
+                </a:solidFill>
+                <a:highlight>
+                  <a:srgbClr val="FFFFFF"/>
+                </a:highlight>
+                <a:latin typeface="Consolas"/>
+                <a:ea typeface="Calibri"/>
+                <a:cs typeface="Times New Roman"/>
+              </a:rPr>
+              <a:t>IAccountRepository</a:t>
+            </a:r>
+            <a:r>
+              <a:rPr lang="en-US" sz="1400" dirty="0">
+                <a:solidFill>
+                  <a:srgbClr val="000000"/>
+                </a:solidFill>
+                <a:highlight>
+                  <a:srgbClr val="FFFFFF"/>
+                </a:highlight>
+                <a:latin typeface="Consolas"/>
+                <a:ea typeface="Calibri"/>
+                <a:cs typeface="Times New Roman"/>
+              </a:rPr>
+              <a:t>, </a:t>
+            </a:r>
+            <a:r>
+              <a:rPr lang="en-US" sz="1400" dirty="0" err="1">
+                <a:solidFill>
+                  <a:srgbClr val="2B91AF"/>
+                </a:solidFill>
+                <a:highlight>
+                  <a:srgbClr val="FFFFFF"/>
+                </a:highlight>
+                <a:latin typeface="Consolas"/>
+                <a:ea typeface="Calibri"/>
+                <a:cs typeface="Times New Roman"/>
+              </a:rPr>
+              <a:t>AccountRepository</a:t>
+            </a:r>
+            <a:r>
+              <a:rPr lang="en-US" sz="1400" dirty="0">
+                <a:solidFill>
+                  <a:srgbClr val="000000"/>
+                </a:solidFill>
+                <a:highlight>
+                  <a:srgbClr val="FFFFFF"/>
+                </a:highlight>
+                <a:latin typeface="Consolas"/>
+                <a:ea typeface="Calibri"/>
+                <a:cs typeface="Times New Roman"/>
+              </a:rPr>
+              <a:t>&gt;(</a:t>
+            </a:r>
+            <a:endParaRPr lang="en-US" dirty="0">
+              <a:ea typeface="Calibri"/>
+              <a:cs typeface="Times New Roman"/>
+            </a:endParaRPr>
+          </a:p>
+          <a:p>
+            <a:pPr>
+              <a:lnSpc>
+                <a:spcPct val="115000"/>
+              </a:lnSpc>
+              <a:spcAft>
+                <a:spcPts val="0"/>
+              </a:spcAft>
+            </a:pPr>
+            <a:r>
+              <a:rPr lang="en-US" sz="1400" dirty="0">
+                <a:solidFill>
+                  <a:srgbClr val="000000"/>
+                </a:solidFill>
+                <a:highlight>
+                  <a:srgbClr val="FFFFFF"/>
+                </a:highlight>
+                <a:latin typeface="Consolas"/>
+                <a:ea typeface="Calibri"/>
+                <a:cs typeface="Times New Roman"/>
+              </a:rPr>
+              <a:t>                </a:t>
+            </a:r>
+            <a:r>
+              <a:rPr lang="en-US" sz="1400" dirty="0">
+                <a:solidFill>
+                  <a:srgbClr val="0000FF"/>
+                </a:solidFill>
+                <a:highlight>
+                  <a:srgbClr val="FFFFFF"/>
+                </a:highlight>
+                <a:latin typeface="Consolas"/>
+                <a:ea typeface="Calibri"/>
+                <a:cs typeface="Times New Roman"/>
+              </a:rPr>
+              <a:t>new</a:t>
+            </a:r>
+            <a:r>
+              <a:rPr lang="en-US" sz="1400" dirty="0">
+                <a:solidFill>
+                  <a:srgbClr val="000000"/>
+                </a:solidFill>
+                <a:highlight>
+                  <a:srgbClr val="FFFFFF"/>
+                </a:highlight>
+                <a:latin typeface="Consolas"/>
+                <a:ea typeface="Calibri"/>
+                <a:cs typeface="Times New Roman"/>
+              </a:rPr>
+              <a:t> </a:t>
+            </a:r>
+            <a:r>
+              <a:rPr lang="en-US" sz="1400" dirty="0" err="1">
+                <a:solidFill>
+                  <a:srgbClr val="2B91AF"/>
+                </a:solidFill>
+                <a:highlight>
+                  <a:srgbClr val="FFFFFF"/>
+                </a:highlight>
+                <a:latin typeface="Consolas"/>
+                <a:ea typeface="Calibri"/>
+                <a:cs typeface="Times New Roman"/>
+              </a:rPr>
+              <a:t>InjectionConstructor</a:t>
+            </a:r>
+            <a:r>
+              <a:rPr lang="en-US" sz="1400" dirty="0">
+                <a:solidFill>
+                  <a:srgbClr val="000000"/>
+                </a:solidFill>
+                <a:highlight>
+                  <a:srgbClr val="FFFFFF"/>
+                </a:highlight>
+                <a:latin typeface="Consolas"/>
+                <a:ea typeface="Calibri"/>
+                <a:cs typeface="Times New Roman"/>
+              </a:rPr>
+              <a:t>(</a:t>
+            </a:r>
+            <a:r>
+              <a:rPr lang="en-US" sz="1400" dirty="0" err="1">
+                <a:solidFill>
+                  <a:srgbClr val="000000"/>
+                </a:solidFill>
+                <a:highlight>
+                  <a:srgbClr val="FFFFFF"/>
+                </a:highlight>
+                <a:latin typeface="Consolas"/>
+                <a:ea typeface="Calibri"/>
+                <a:cs typeface="Times New Roman"/>
+              </a:rPr>
+              <a:t>connectionString</a:t>
+            </a:r>
+            <a:r>
+              <a:rPr lang="en-US" sz="1400" dirty="0">
+                <a:solidFill>
+                  <a:srgbClr val="000000"/>
+                </a:solidFill>
+                <a:highlight>
+                  <a:srgbClr val="FFFFFF"/>
+                </a:highlight>
+                <a:latin typeface="Consolas"/>
+                <a:ea typeface="Calibri"/>
+                <a:cs typeface="Times New Roman"/>
+              </a:rPr>
+              <a:t>));</a:t>
+            </a:r>
+            <a:endParaRPr lang="en-US" dirty="0">
+              <a:ea typeface="Calibri"/>
+              <a:cs typeface="Times New Roman"/>
+            </a:endParaRPr>
+          </a:p>
+          <a:p>
+            <a:pPr>
+              <a:lnSpc>
+                <a:spcPct val="115000"/>
+              </a:lnSpc>
+              <a:spcAft>
+                <a:spcPts val="0"/>
+              </a:spcAft>
+            </a:pPr>
+            <a:r>
+              <a:rPr lang="en-US" sz="1400" dirty="0">
+                <a:solidFill>
+                  <a:srgbClr val="000000"/>
+                </a:solidFill>
+                <a:highlight>
+                  <a:srgbClr val="FFFFFF"/>
+                </a:highlight>
+                <a:latin typeface="Consolas"/>
+                <a:ea typeface="Calibri"/>
+                <a:cs typeface="Times New Roman"/>
+              </a:rPr>
+              <a:t>            </a:t>
+            </a:r>
+            <a:r>
+              <a:rPr lang="en-US" sz="1400" dirty="0" err="1">
+                <a:solidFill>
+                  <a:srgbClr val="000000"/>
+                </a:solidFill>
+                <a:highlight>
+                  <a:srgbClr val="FFFFFF"/>
+                </a:highlight>
+                <a:latin typeface="Consolas"/>
+                <a:ea typeface="Calibri"/>
+                <a:cs typeface="Times New Roman"/>
+              </a:rPr>
+              <a:t>container.RegisterType</a:t>
+            </a:r>
+            <a:r>
+              <a:rPr lang="en-US" sz="1400" dirty="0">
+                <a:solidFill>
+                  <a:srgbClr val="000000"/>
+                </a:solidFill>
+                <a:highlight>
+                  <a:srgbClr val="FFFFFF"/>
+                </a:highlight>
+                <a:latin typeface="Consolas"/>
+                <a:ea typeface="Calibri"/>
+                <a:cs typeface="Times New Roman"/>
+              </a:rPr>
+              <a:t>&lt;</a:t>
+            </a:r>
+            <a:r>
+              <a:rPr lang="en-US" sz="1400" dirty="0" err="1">
+                <a:solidFill>
+                  <a:srgbClr val="2B91AF"/>
+                </a:solidFill>
+                <a:highlight>
+                  <a:srgbClr val="FFFFFF"/>
+                </a:highlight>
+                <a:latin typeface="Consolas"/>
+                <a:ea typeface="Calibri"/>
+                <a:cs typeface="Times New Roman"/>
+              </a:rPr>
+              <a:t>IUserAccountService</a:t>
+            </a:r>
+            <a:r>
+              <a:rPr lang="en-US" sz="1400" dirty="0">
+                <a:solidFill>
+                  <a:srgbClr val="000000"/>
+                </a:solidFill>
+                <a:highlight>
+                  <a:srgbClr val="FFFFFF"/>
+                </a:highlight>
+                <a:latin typeface="Consolas"/>
+                <a:ea typeface="Calibri"/>
+                <a:cs typeface="Times New Roman"/>
+              </a:rPr>
+              <a:t>, </a:t>
+            </a:r>
+            <a:r>
+              <a:rPr lang="en-US" sz="1400" dirty="0" err="1">
+                <a:solidFill>
+                  <a:srgbClr val="2B91AF"/>
+                </a:solidFill>
+                <a:highlight>
+                  <a:srgbClr val="FFFFFF"/>
+                </a:highlight>
+                <a:latin typeface="Consolas"/>
+                <a:ea typeface="Calibri"/>
+                <a:cs typeface="Times New Roman"/>
+              </a:rPr>
+              <a:t>UserAccountService</a:t>
+            </a:r>
+            <a:r>
+              <a:rPr lang="en-US" sz="1400" dirty="0">
+                <a:solidFill>
+                  <a:srgbClr val="000000"/>
+                </a:solidFill>
+                <a:highlight>
+                  <a:srgbClr val="FFFFFF"/>
+                </a:highlight>
+                <a:latin typeface="Consolas"/>
+                <a:ea typeface="Calibri"/>
+                <a:cs typeface="Times New Roman"/>
+              </a:rPr>
+              <a:t>&gt;();</a:t>
+            </a:r>
+            <a:endParaRPr lang="en-US" dirty="0">
+              <a:ea typeface="Calibri"/>
+              <a:cs typeface="Times New Roman"/>
+            </a:endParaRPr>
+          </a:p>
+          <a:p>
+            <a:pPr>
+              <a:lnSpc>
+                <a:spcPct val="115000"/>
+              </a:lnSpc>
+              <a:spcAft>
+                <a:spcPts val="0"/>
+              </a:spcAft>
+            </a:pPr>
+            <a:r>
+              <a:rPr lang="en-US" sz="1400" dirty="0">
+                <a:solidFill>
+                  <a:srgbClr val="000000"/>
+                </a:solidFill>
+                <a:highlight>
+                  <a:srgbClr val="FFFFFF"/>
+                </a:highlight>
+                <a:latin typeface="Consolas"/>
+                <a:ea typeface="Calibri"/>
+                <a:cs typeface="Times New Roman"/>
+              </a:rPr>
+              <a:t>        }</a:t>
+            </a:r>
+            <a:endParaRPr lang="en-US" dirty="0">
+              <a:ea typeface="Calibri"/>
+              <a:cs typeface="Times New Roman"/>
+            </a:endParaRPr>
+          </a:p>
+          <a:p>
+            <a:pPr>
+              <a:lnSpc>
+                <a:spcPct val="115000"/>
+              </a:lnSpc>
+              <a:spcAft>
+                <a:spcPts val="0"/>
+              </a:spcAft>
+            </a:pPr>
+            <a:r>
+              <a:rPr lang="en-US" sz="1400" dirty="0">
+                <a:solidFill>
+                  <a:srgbClr val="000000"/>
+                </a:solidFill>
+                <a:highlight>
+                  <a:srgbClr val="FFFFFF"/>
+                </a:highlight>
+                <a:latin typeface="Consolas"/>
+                <a:ea typeface="Calibri"/>
+                <a:cs typeface="Times New Roman"/>
+              </a:rPr>
+              <a:t> </a:t>
+            </a:r>
+            <a:endParaRPr lang="en-US" dirty="0">
+              <a:ea typeface="Calibri"/>
+              <a:cs typeface="Times New Roman"/>
+            </a:endParaRPr>
+          </a:p>
+          <a:p>
+            <a:pPr>
+              <a:lnSpc>
+                <a:spcPct val="115000"/>
+              </a:lnSpc>
+              <a:spcAft>
+                <a:spcPts val="1000"/>
+              </a:spcAft>
+            </a:pPr>
+            <a:r>
+              <a:rPr lang="en-US" sz="1400" dirty="0">
+                <a:solidFill>
+                  <a:srgbClr val="000000"/>
+                </a:solidFill>
+                <a:highlight>
+                  <a:srgbClr val="FFFFFF"/>
+                </a:highlight>
+                <a:latin typeface="Consolas"/>
+                <a:ea typeface="Calibri"/>
+                <a:cs typeface="Times New Roman"/>
+              </a:rPr>
+              <a:t>    </a:t>
+            </a:r>
+            <a:r>
+              <a:rPr lang="en-US" sz="1400" dirty="0" smtClean="0">
+                <a:solidFill>
+                  <a:srgbClr val="000000"/>
+                </a:solidFill>
+                <a:highlight>
+                  <a:srgbClr val="FFFFFF"/>
+                </a:highlight>
+                <a:latin typeface="Consolas"/>
+                <a:ea typeface="Calibri"/>
+                <a:cs typeface="Times New Roman"/>
+              </a:rPr>
+              <a:t>}</a:t>
+            </a:r>
+          </a:p>
+          <a:p>
+            <a:pPr>
+              <a:lnSpc>
+                <a:spcPct val="115000"/>
+              </a:lnSpc>
+              <a:spcAft>
+                <a:spcPts val="1000"/>
+              </a:spcAft>
+            </a:pPr>
+            <a:r>
+              <a:rPr lang="fr-FR" sz="1400" i="1" dirty="0" smtClean="0">
+                <a:solidFill>
+                  <a:srgbClr val="000000"/>
+                </a:solidFill>
+                <a:highlight>
+                  <a:srgbClr val="FFFFFF"/>
+                </a:highlight>
+                <a:latin typeface="Consolas"/>
+                <a:ea typeface="Calibri"/>
+                <a:cs typeface="Times New Roman"/>
+              </a:rPr>
+              <a:t>In </a:t>
+            </a:r>
+            <a:r>
+              <a:rPr lang="fr-FR" sz="1400" i="1" dirty="0" err="1" smtClean="0">
+                <a:solidFill>
+                  <a:srgbClr val="000000"/>
+                </a:solidFill>
+                <a:highlight>
+                  <a:srgbClr val="FFFFFF"/>
+                </a:highlight>
+                <a:latin typeface="Consolas"/>
+                <a:ea typeface="Calibri"/>
+                <a:cs typeface="Times New Roman"/>
+              </a:rPr>
+              <a:t>DependencyConfig</a:t>
+            </a:r>
+            <a:endParaRPr lang="en-US" i="1" dirty="0">
+              <a:ea typeface="Calibri"/>
+              <a:cs typeface="Times New Roman"/>
+            </a:endParaRPr>
+          </a:p>
+        </p:txBody>
+      </p:sp>
+      <p:sp>
+        <p:nvSpPr>
+          <p:cNvPr id="6" name="TextBox 5"/>
+          <p:cNvSpPr txBox="1"/>
+          <p:nvPr/>
+        </p:nvSpPr>
+        <p:spPr>
+          <a:xfrm>
+            <a:off x="827584" y="2492896"/>
+            <a:ext cx="9784704" cy="4484561"/>
+          </a:xfrm>
+          <a:prstGeom prst="rect">
+            <a:avLst/>
+          </a:prstGeom>
+          <a:solidFill>
+            <a:schemeClr val="bg1"/>
+          </a:solidFill>
+          <a:ln>
+            <a:solidFill>
+              <a:schemeClr val="accent1"/>
+            </a:solidFill>
+          </a:ln>
+        </p:spPr>
+        <p:txBody>
+          <a:bodyPr wrap="square" rtlCol="0">
+            <a:spAutoFit/>
+          </a:bodyPr>
+          <a:lstStyle/>
+          <a:p>
+            <a:pPr>
+              <a:lnSpc>
+                <a:spcPct val="115000"/>
+              </a:lnSpc>
+              <a:spcAft>
+                <a:spcPts val="0"/>
+              </a:spcAft>
+            </a:pPr>
+            <a:r>
+              <a:rPr lang="en-US" sz="1400" dirty="0">
+                <a:solidFill>
+                  <a:srgbClr val="000000"/>
+                </a:solidFill>
+                <a:highlight>
+                  <a:srgbClr val="FFFFFF"/>
+                </a:highlight>
+                <a:latin typeface="Consolas"/>
+                <a:ea typeface="Calibri"/>
+                <a:cs typeface="Times New Roman"/>
+              </a:rPr>
+              <a:t> </a:t>
+            </a:r>
+            <a:r>
+              <a:rPr lang="en-US" sz="1400" dirty="0">
+                <a:solidFill>
+                  <a:srgbClr val="0000FF"/>
+                </a:solidFill>
+                <a:highlight>
+                  <a:srgbClr val="FFFFFF"/>
+                </a:highlight>
+                <a:latin typeface="Consolas"/>
+                <a:ea typeface="Calibri"/>
+                <a:cs typeface="Times New Roman"/>
+              </a:rPr>
+              <a:t>public</a:t>
+            </a:r>
+            <a:r>
+              <a:rPr lang="en-US" sz="1400" dirty="0">
+                <a:solidFill>
+                  <a:srgbClr val="000000"/>
+                </a:solidFill>
+                <a:highlight>
+                  <a:srgbClr val="FFFFFF"/>
+                </a:highlight>
+                <a:latin typeface="Consolas"/>
+                <a:ea typeface="Calibri"/>
+                <a:cs typeface="Times New Roman"/>
+              </a:rPr>
+              <a:t> </a:t>
+            </a:r>
+            <a:r>
+              <a:rPr lang="en-US" sz="1400" dirty="0">
+                <a:solidFill>
+                  <a:srgbClr val="0000FF"/>
+                </a:solidFill>
+                <a:highlight>
+                  <a:srgbClr val="FFFFFF"/>
+                </a:highlight>
+                <a:latin typeface="Consolas"/>
+                <a:ea typeface="Calibri"/>
+                <a:cs typeface="Times New Roman"/>
+              </a:rPr>
+              <a:t>class</a:t>
+            </a:r>
+            <a:r>
+              <a:rPr lang="en-US" sz="1400" dirty="0">
+                <a:solidFill>
+                  <a:srgbClr val="000000"/>
+                </a:solidFill>
+                <a:highlight>
+                  <a:srgbClr val="FFFFFF"/>
+                </a:highlight>
+                <a:latin typeface="Consolas"/>
+                <a:ea typeface="Calibri"/>
+                <a:cs typeface="Times New Roman"/>
+              </a:rPr>
+              <a:t> </a:t>
+            </a:r>
+            <a:r>
+              <a:rPr lang="en-US" sz="1400" dirty="0" err="1">
+                <a:solidFill>
+                  <a:srgbClr val="2B91AF"/>
+                </a:solidFill>
+                <a:highlight>
+                  <a:srgbClr val="FFFFFF"/>
+                </a:highlight>
+                <a:latin typeface="Consolas"/>
+                <a:ea typeface="Calibri"/>
+                <a:cs typeface="Times New Roman"/>
+              </a:rPr>
+              <a:t>AppCompositionRoot</a:t>
+            </a:r>
+            <a:r>
+              <a:rPr lang="en-US" sz="1400" dirty="0">
+                <a:solidFill>
+                  <a:srgbClr val="000000"/>
+                </a:solidFill>
+                <a:highlight>
+                  <a:srgbClr val="FFFFFF"/>
+                </a:highlight>
+                <a:latin typeface="Consolas"/>
+                <a:ea typeface="Calibri"/>
+                <a:cs typeface="Times New Roman"/>
+              </a:rPr>
+              <a:t> : </a:t>
+            </a:r>
+            <a:r>
+              <a:rPr lang="en-US" sz="1400" dirty="0" err="1">
+                <a:solidFill>
+                  <a:srgbClr val="2B91AF"/>
+                </a:solidFill>
+                <a:highlight>
+                  <a:srgbClr val="FFFFFF"/>
+                </a:highlight>
+                <a:latin typeface="Consolas"/>
+                <a:ea typeface="Calibri"/>
+                <a:cs typeface="Times New Roman"/>
+              </a:rPr>
+              <a:t>DefaultControllerFactory</a:t>
+            </a:r>
+            <a:endParaRPr lang="en-US" sz="1400" dirty="0">
+              <a:ea typeface="Calibri"/>
+              <a:cs typeface="Times New Roman"/>
+            </a:endParaRPr>
+          </a:p>
+          <a:p>
+            <a:pPr>
+              <a:lnSpc>
+                <a:spcPct val="115000"/>
+              </a:lnSpc>
+              <a:spcAft>
+                <a:spcPts val="0"/>
+              </a:spcAft>
+            </a:pPr>
+            <a:r>
+              <a:rPr lang="en-US" sz="1400" dirty="0">
+                <a:solidFill>
+                  <a:srgbClr val="000000"/>
+                </a:solidFill>
+                <a:highlight>
+                  <a:srgbClr val="FFFFFF"/>
+                </a:highlight>
+                <a:latin typeface="Consolas"/>
+                <a:ea typeface="Calibri"/>
+                <a:cs typeface="Times New Roman"/>
+              </a:rPr>
+              <a:t>    {</a:t>
+            </a:r>
+            <a:endParaRPr lang="en-US" sz="1400" dirty="0">
+              <a:ea typeface="Calibri"/>
+              <a:cs typeface="Times New Roman"/>
+            </a:endParaRPr>
+          </a:p>
+          <a:p>
+            <a:pPr>
+              <a:lnSpc>
+                <a:spcPct val="115000"/>
+              </a:lnSpc>
+              <a:spcAft>
+                <a:spcPts val="0"/>
+              </a:spcAft>
+            </a:pPr>
+            <a:r>
+              <a:rPr lang="en-US" sz="1400" dirty="0">
+                <a:solidFill>
+                  <a:srgbClr val="000000"/>
+                </a:solidFill>
+                <a:highlight>
+                  <a:srgbClr val="FFFFFF"/>
+                </a:highlight>
+                <a:latin typeface="Consolas"/>
+                <a:ea typeface="Calibri"/>
+                <a:cs typeface="Times New Roman"/>
+              </a:rPr>
+              <a:t>        </a:t>
+            </a:r>
+            <a:r>
+              <a:rPr lang="en-US" sz="1400" dirty="0">
+                <a:solidFill>
+                  <a:srgbClr val="0000FF"/>
+                </a:solidFill>
+                <a:highlight>
+                  <a:srgbClr val="FFFFFF"/>
+                </a:highlight>
+                <a:latin typeface="Consolas"/>
+                <a:ea typeface="Calibri"/>
+                <a:cs typeface="Times New Roman"/>
+              </a:rPr>
+              <a:t>private</a:t>
+            </a:r>
+            <a:r>
+              <a:rPr lang="en-US" sz="1400" dirty="0">
+                <a:solidFill>
+                  <a:srgbClr val="000000"/>
+                </a:solidFill>
+                <a:highlight>
+                  <a:srgbClr val="FFFFFF"/>
+                </a:highlight>
+                <a:latin typeface="Consolas"/>
+                <a:ea typeface="Calibri"/>
+                <a:cs typeface="Times New Roman"/>
+              </a:rPr>
+              <a:t> </a:t>
+            </a:r>
+            <a:r>
+              <a:rPr lang="en-US" sz="1400" dirty="0" err="1">
+                <a:solidFill>
+                  <a:srgbClr val="0000FF"/>
+                </a:solidFill>
+                <a:highlight>
+                  <a:srgbClr val="FFFFFF"/>
+                </a:highlight>
+                <a:latin typeface="Consolas"/>
+                <a:ea typeface="Calibri"/>
+                <a:cs typeface="Times New Roman"/>
+              </a:rPr>
+              <a:t>readonly</a:t>
+            </a:r>
+            <a:r>
+              <a:rPr lang="en-US" sz="1400" dirty="0">
+                <a:solidFill>
+                  <a:srgbClr val="000000"/>
+                </a:solidFill>
+                <a:highlight>
+                  <a:srgbClr val="FFFFFF"/>
+                </a:highlight>
+                <a:latin typeface="Consolas"/>
+                <a:ea typeface="Calibri"/>
+                <a:cs typeface="Times New Roman"/>
+              </a:rPr>
+              <a:t> </a:t>
+            </a:r>
+            <a:r>
+              <a:rPr lang="en-US" sz="1400" dirty="0" err="1">
+                <a:solidFill>
+                  <a:srgbClr val="2B91AF"/>
+                </a:solidFill>
+                <a:highlight>
+                  <a:srgbClr val="FFFFFF"/>
+                </a:highlight>
+                <a:latin typeface="Consolas"/>
+                <a:ea typeface="Calibri"/>
+                <a:cs typeface="Times New Roman"/>
+              </a:rPr>
+              <a:t>IUnityContainer</a:t>
+            </a:r>
+            <a:r>
+              <a:rPr lang="en-US" sz="1400" dirty="0">
+                <a:solidFill>
+                  <a:srgbClr val="000000"/>
+                </a:solidFill>
+                <a:highlight>
+                  <a:srgbClr val="FFFFFF"/>
+                </a:highlight>
+                <a:latin typeface="Consolas"/>
+                <a:ea typeface="Calibri"/>
+                <a:cs typeface="Times New Roman"/>
+              </a:rPr>
+              <a:t> _</a:t>
+            </a:r>
+            <a:r>
+              <a:rPr lang="en-US" sz="1400" dirty="0" err="1">
+                <a:solidFill>
+                  <a:srgbClr val="000000"/>
+                </a:solidFill>
+                <a:highlight>
+                  <a:srgbClr val="FFFFFF"/>
+                </a:highlight>
+                <a:latin typeface="Consolas"/>
+                <a:ea typeface="Calibri"/>
+                <a:cs typeface="Times New Roman"/>
+              </a:rPr>
+              <a:t>unityContainer</a:t>
+            </a:r>
+            <a:r>
+              <a:rPr lang="en-US" sz="1400" dirty="0">
+                <a:solidFill>
+                  <a:srgbClr val="000000"/>
+                </a:solidFill>
+                <a:highlight>
+                  <a:srgbClr val="FFFFFF"/>
+                </a:highlight>
+                <a:latin typeface="Consolas"/>
+                <a:ea typeface="Calibri"/>
+                <a:cs typeface="Times New Roman"/>
+              </a:rPr>
+              <a:t>;</a:t>
+            </a:r>
+            <a:endParaRPr lang="en-US" sz="1400" dirty="0">
+              <a:ea typeface="Calibri"/>
+              <a:cs typeface="Times New Roman"/>
+            </a:endParaRPr>
+          </a:p>
+          <a:p>
+            <a:pPr>
+              <a:lnSpc>
+                <a:spcPct val="115000"/>
+              </a:lnSpc>
+              <a:spcAft>
+                <a:spcPts val="0"/>
+              </a:spcAft>
+            </a:pPr>
+            <a:r>
+              <a:rPr lang="en-US" sz="1400" dirty="0">
+                <a:solidFill>
+                  <a:srgbClr val="000000"/>
+                </a:solidFill>
+                <a:highlight>
+                  <a:srgbClr val="FFFFFF"/>
+                </a:highlight>
+                <a:latin typeface="Consolas"/>
+                <a:ea typeface="Calibri"/>
+                <a:cs typeface="Times New Roman"/>
+              </a:rPr>
+              <a:t> </a:t>
+            </a:r>
+            <a:endParaRPr lang="en-US" sz="1400" dirty="0">
+              <a:ea typeface="Calibri"/>
+              <a:cs typeface="Times New Roman"/>
+            </a:endParaRPr>
+          </a:p>
+          <a:p>
+            <a:pPr>
+              <a:lnSpc>
+                <a:spcPct val="115000"/>
+              </a:lnSpc>
+              <a:spcAft>
+                <a:spcPts val="0"/>
+              </a:spcAft>
+            </a:pPr>
+            <a:r>
+              <a:rPr lang="en-US" sz="1400" dirty="0">
+                <a:solidFill>
+                  <a:srgbClr val="000000"/>
+                </a:solidFill>
+                <a:highlight>
+                  <a:srgbClr val="FFFFFF"/>
+                </a:highlight>
+                <a:latin typeface="Consolas"/>
+                <a:ea typeface="Calibri"/>
+                <a:cs typeface="Times New Roman"/>
+              </a:rPr>
+              <a:t>        </a:t>
+            </a:r>
+            <a:r>
+              <a:rPr lang="en-US" sz="1400" dirty="0">
+                <a:solidFill>
+                  <a:srgbClr val="0000FF"/>
+                </a:solidFill>
+                <a:highlight>
+                  <a:srgbClr val="FFFFFF"/>
+                </a:highlight>
+                <a:latin typeface="Consolas"/>
+                <a:ea typeface="Calibri"/>
+                <a:cs typeface="Times New Roman"/>
+              </a:rPr>
+              <a:t>public</a:t>
+            </a:r>
+            <a:r>
+              <a:rPr lang="en-US" sz="1400" dirty="0">
+                <a:solidFill>
+                  <a:srgbClr val="000000"/>
+                </a:solidFill>
+                <a:highlight>
+                  <a:srgbClr val="FFFFFF"/>
+                </a:highlight>
+                <a:latin typeface="Consolas"/>
+                <a:ea typeface="Calibri"/>
+                <a:cs typeface="Times New Roman"/>
+              </a:rPr>
+              <a:t> </a:t>
+            </a:r>
+            <a:r>
+              <a:rPr lang="en-US" sz="1400" dirty="0" err="1">
+                <a:solidFill>
+                  <a:srgbClr val="000000"/>
+                </a:solidFill>
+                <a:highlight>
+                  <a:srgbClr val="FFFFFF"/>
+                </a:highlight>
+                <a:latin typeface="Consolas"/>
+                <a:ea typeface="Calibri"/>
+                <a:cs typeface="Times New Roman"/>
+              </a:rPr>
+              <a:t>AppCompositionRoot</a:t>
+            </a:r>
+            <a:r>
+              <a:rPr lang="en-US" sz="1400" dirty="0">
+                <a:solidFill>
+                  <a:srgbClr val="000000"/>
+                </a:solidFill>
+                <a:highlight>
+                  <a:srgbClr val="FFFFFF"/>
+                </a:highlight>
+                <a:latin typeface="Consolas"/>
+                <a:ea typeface="Calibri"/>
+                <a:cs typeface="Times New Roman"/>
+              </a:rPr>
+              <a:t>(</a:t>
+            </a:r>
+            <a:r>
+              <a:rPr lang="en-US" sz="1400" dirty="0" err="1">
+                <a:solidFill>
+                  <a:srgbClr val="2B91AF"/>
+                </a:solidFill>
+                <a:highlight>
+                  <a:srgbClr val="FFFFFF"/>
+                </a:highlight>
+                <a:latin typeface="Consolas"/>
+                <a:ea typeface="Calibri"/>
+                <a:cs typeface="Times New Roman"/>
+              </a:rPr>
+              <a:t>IUnityContainer</a:t>
+            </a:r>
+            <a:r>
+              <a:rPr lang="en-US" sz="1400" dirty="0">
+                <a:solidFill>
+                  <a:srgbClr val="000000"/>
+                </a:solidFill>
+                <a:highlight>
+                  <a:srgbClr val="FFFFFF"/>
+                </a:highlight>
+                <a:latin typeface="Consolas"/>
+                <a:ea typeface="Calibri"/>
+                <a:cs typeface="Times New Roman"/>
+              </a:rPr>
+              <a:t> </a:t>
+            </a:r>
+            <a:r>
+              <a:rPr lang="en-US" sz="1400" dirty="0" err="1">
+                <a:solidFill>
+                  <a:srgbClr val="000000"/>
+                </a:solidFill>
+                <a:highlight>
+                  <a:srgbClr val="FFFFFF"/>
+                </a:highlight>
+                <a:latin typeface="Consolas"/>
+                <a:ea typeface="Calibri"/>
+                <a:cs typeface="Times New Roman"/>
+              </a:rPr>
+              <a:t>unityContainer</a:t>
+            </a:r>
+            <a:r>
+              <a:rPr lang="en-US" sz="1400" dirty="0">
+                <a:solidFill>
+                  <a:srgbClr val="000000"/>
+                </a:solidFill>
+                <a:highlight>
+                  <a:srgbClr val="FFFFFF"/>
+                </a:highlight>
+                <a:latin typeface="Consolas"/>
+                <a:ea typeface="Calibri"/>
+                <a:cs typeface="Times New Roman"/>
+              </a:rPr>
+              <a:t>)</a:t>
+            </a:r>
+            <a:endParaRPr lang="en-US" sz="1400" dirty="0">
+              <a:ea typeface="Calibri"/>
+              <a:cs typeface="Times New Roman"/>
+            </a:endParaRPr>
+          </a:p>
+          <a:p>
+            <a:pPr>
+              <a:lnSpc>
+                <a:spcPct val="115000"/>
+              </a:lnSpc>
+              <a:spcAft>
+                <a:spcPts val="0"/>
+              </a:spcAft>
+            </a:pPr>
+            <a:r>
+              <a:rPr lang="en-US" sz="1400" dirty="0">
+                <a:solidFill>
+                  <a:srgbClr val="000000"/>
+                </a:solidFill>
+                <a:highlight>
+                  <a:srgbClr val="FFFFFF"/>
+                </a:highlight>
+                <a:latin typeface="Consolas"/>
+                <a:ea typeface="Calibri"/>
+                <a:cs typeface="Times New Roman"/>
+              </a:rPr>
+              <a:t>        {</a:t>
+            </a:r>
+            <a:endParaRPr lang="en-US" sz="1400" dirty="0">
+              <a:ea typeface="Calibri"/>
+              <a:cs typeface="Times New Roman"/>
+            </a:endParaRPr>
+          </a:p>
+          <a:p>
+            <a:pPr>
+              <a:lnSpc>
+                <a:spcPct val="115000"/>
+              </a:lnSpc>
+              <a:spcAft>
+                <a:spcPts val="0"/>
+              </a:spcAft>
+            </a:pPr>
+            <a:r>
+              <a:rPr lang="en-US" sz="1400" dirty="0">
+                <a:solidFill>
+                  <a:srgbClr val="000000"/>
+                </a:solidFill>
+                <a:highlight>
+                  <a:srgbClr val="FFFFFF"/>
+                </a:highlight>
+                <a:latin typeface="Consolas"/>
+                <a:ea typeface="Calibri"/>
+                <a:cs typeface="Times New Roman"/>
+              </a:rPr>
+              <a:t>            </a:t>
+            </a:r>
+            <a:r>
+              <a:rPr lang="en-US" sz="1400" dirty="0">
+                <a:solidFill>
+                  <a:srgbClr val="0000FF"/>
+                </a:solidFill>
+                <a:highlight>
+                  <a:srgbClr val="FFFFFF"/>
+                </a:highlight>
+                <a:latin typeface="Consolas"/>
+                <a:ea typeface="Calibri"/>
+                <a:cs typeface="Times New Roman"/>
+              </a:rPr>
+              <a:t>if</a:t>
+            </a:r>
+            <a:r>
+              <a:rPr lang="en-US" sz="1400" dirty="0">
+                <a:solidFill>
+                  <a:srgbClr val="000000"/>
+                </a:solidFill>
+                <a:highlight>
+                  <a:srgbClr val="FFFFFF"/>
+                </a:highlight>
+                <a:latin typeface="Consolas"/>
+                <a:ea typeface="Calibri"/>
+                <a:cs typeface="Times New Roman"/>
+              </a:rPr>
+              <a:t> (</a:t>
+            </a:r>
+            <a:r>
+              <a:rPr lang="en-US" sz="1400" dirty="0" err="1">
+                <a:solidFill>
+                  <a:srgbClr val="000000"/>
+                </a:solidFill>
+                <a:highlight>
+                  <a:srgbClr val="FFFFFF"/>
+                </a:highlight>
+                <a:latin typeface="Consolas"/>
+                <a:ea typeface="Calibri"/>
+                <a:cs typeface="Times New Roman"/>
+              </a:rPr>
+              <a:t>unityContainer</a:t>
+            </a:r>
+            <a:r>
+              <a:rPr lang="en-US" sz="1400" dirty="0">
+                <a:solidFill>
+                  <a:srgbClr val="000000"/>
+                </a:solidFill>
+                <a:highlight>
+                  <a:srgbClr val="FFFFFF"/>
+                </a:highlight>
+                <a:latin typeface="Consolas"/>
+                <a:ea typeface="Calibri"/>
+                <a:cs typeface="Times New Roman"/>
+              </a:rPr>
+              <a:t> == </a:t>
+            </a:r>
+            <a:r>
+              <a:rPr lang="en-US" sz="1400" dirty="0">
+                <a:solidFill>
+                  <a:srgbClr val="0000FF"/>
+                </a:solidFill>
+                <a:highlight>
+                  <a:srgbClr val="FFFFFF"/>
+                </a:highlight>
+                <a:latin typeface="Consolas"/>
+                <a:ea typeface="Calibri"/>
+                <a:cs typeface="Times New Roman"/>
+              </a:rPr>
+              <a:t>null</a:t>
+            </a:r>
+            <a:r>
+              <a:rPr lang="en-US" sz="1400" dirty="0">
+                <a:solidFill>
+                  <a:srgbClr val="000000"/>
+                </a:solidFill>
+                <a:highlight>
+                  <a:srgbClr val="FFFFFF"/>
+                </a:highlight>
+                <a:latin typeface="Consolas"/>
+                <a:ea typeface="Calibri"/>
+                <a:cs typeface="Times New Roman"/>
+              </a:rPr>
+              <a:t>) </a:t>
+            </a:r>
+            <a:r>
+              <a:rPr lang="en-US" sz="1400" dirty="0">
+                <a:solidFill>
+                  <a:srgbClr val="0000FF"/>
+                </a:solidFill>
+                <a:highlight>
+                  <a:srgbClr val="FFFFFF"/>
+                </a:highlight>
+                <a:latin typeface="Consolas"/>
+                <a:ea typeface="Calibri"/>
+                <a:cs typeface="Times New Roman"/>
+              </a:rPr>
+              <a:t>throw</a:t>
+            </a:r>
+            <a:r>
+              <a:rPr lang="en-US" sz="1400" dirty="0">
+                <a:solidFill>
+                  <a:srgbClr val="000000"/>
+                </a:solidFill>
+                <a:highlight>
+                  <a:srgbClr val="FFFFFF"/>
+                </a:highlight>
+                <a:latin typeface="Consolas"/>
+                <a:ea typeface="Calibri"/>
+                <a:cs typeface="Times New Roman"/>
+              </a:rPr>
+              <a:t> </a:t>
+            </a:r>
+            <a:r>
+              <a:rPr lang="en-US" sz="1400" dirty="0">
+                <a:solidFill>
+                  <a:srgbClr val="0000FF"/>
+                </a:solidFill>
+                <a:highlight>
+                  <a:srgbClr val="FFFFFF"/>
+                </a:highlight>
+                <a:latin typeface="Consolas"/>
+                <a:ea typeface="Calibri"/>
+                <a:cs typeface="Times New Roman"/>
+              </a:rPr>
+              <a:t>new</a:t>
+            </a:r>
+            <a:r>
+              <a:rPr lang="en-US" sz="1400" dirty="0">
+                <a:solidFill>
+                  <a:srgbClr val="000000"/>
+                </a:solidFill>
+                <a:highlight>
+                  <a:srgbClr val="FFFFFF"/>
+                </a:highlight>
+                <a:latin typeface="Consolas"/>
+                <a:ea typeface="Calibri"/>
+                <a:cs typeface="Times New Roman"/>
+              </a:rPr>
+              <a:t> </a:t>
+            </a:r>
+            <a:r>
+              <a:rPr lang="en-US" sz="1400" dirty="0" err="1">
+                <a:solidFill>
+                  <a:srgbClr val="2B91AF"/>
+                </a:solidFill>
+                <a:highlight>
+                  <a:srgbClr val="FFFFFF"/>
+                </a:highlight>
+                <a:latin typeface="Consolas"/>
+                <a:ea typeface="Calibri"/>
+                <a:cs typeface="Times New Roman"/>
+              </a:rPr>
+              <a:t>ArgumentNullException</a:t>
+            </a:r>
+            <a:r>
+              <a:rPr lang="en-US" sz="1400" dirty="0">
+                <a:solidFill>
+                  <a:srgbClr val="000000"/>
+                </a:solidFill>
+                <a:highlight>
+                  <a:srgbClr val="FFFFFF"/>
+                </a:highlight>
+                <a:latin typeface="Consolas"/>
+                <a:ea typeface="Calibri"/>
+                <a:cs typeface="Times New Roman"/>
+              </a:rPr>
+              <a:t>(</a:t>
+            </a:r>
+            <a:r>
+              <a:rPr lang="en-US" sz="1400" dirty="0">
+                <a:solidFill>
+                  <a:srgbClr val="A31515"/>
+                </a:solidFill>
+                <a:highlight>
+                  <a:srgbClr val="FFFFFF"/>
+                </a:highlight>
+                <a:latin typeface="Consolas"/>
+                <a:ea typeface="Calibri"/>
+                <a:cs typeface="Times New Roman"/>
+              </a:rPr>
+              <a:t>"</a:t>
+            </a:r>
+            <a:r>
+              <a:rPr lang="en-US" sz="1400" dirty="0" err="1">
+                <a:solidFill>
+                  <a:srgbClr val="A31515"/>
+                </a:solidFill>
+                <a:highlight>
+                  <a:srgbClr val="FFFFFF"/>
+                </a:highlight>
+                <a:latin typeface="Consolas"/>
+                <a:ea typeface="Calibri"/>
+                <a:cs typeface="Times New Roman"/>
+              </a:rPr>
+              <a:t>unityContainer</a:t>
+            </a:r>
+            <a:r>
+              <a:rPr lang="en-US" sz="1400" dirty="0">
+                <a:solidFill>
+                  <a:srgbClr val="A31515"/>
+                </a:solidFill>
+                <a:highlight>
+                  <a:srgbClr val="FFFFFF"/>
+                </a:highlight>
+                <a:latin typeface="Consolas"/>
+                <a:ea typeface="Calibri"/>
+                <a:cs typeface="Times New Roman"/>
+              </a:rPr>
+              <a:t>"</a:t>
+            </a:r>
+            <a:r>
+              <a:rPr lang="en-US" sz="1400" dirty="0">
+                <a:solidFill>
+                  <a:srgbClr val="000000"/>
+                </a:solidFill>
+                <a:highlight>
+                  <a:srgbClr val="FFFFFF"/>
+                </a:highlight>
+                <a:latin typeface="Consolas"/>
+                <a:ea typeface="Calibri"/>
+                <a:cs typeface="Times New Roman"/>
+              </a:rPr>
+              <a:t>);</a:t>
+            </a:r>
+            <a:endParaRPr lang="en-US" sz="1400" dirty="0">
+              <a:ea typeface="Calibri"/>
+              <a:cs typeface="Times New Roman"/>
+            </a:endParaRPr>
+          </a:p>
+          <a:p>
+            <a:pPr>
+              <a:lnSpc>
+                <a:spcPct val="115000"/>
+              </a:lnSpc>
+              <a:spcAft>
+                <a:spcPts val="0"/>
+              </a:spcAft>
+            </a:pPr>
+            <a:r>
+              <a:rPr lang="en-US" sz="1400" dirty="0">
+                <a:solidFill>
+                  <a:srgbClr val="000000"/>
+                </a:solidFill>
+                <a:highlight>
+                  <a:srgbClr val="FFFFFF"/>
+                </a:highlight>
+                <a:latin typeface="Consolas"/>
+                <a:ea typeface="Calibri"/>
+                <a:cs typeface="Times New Roman"/>
+              </a:rPr>
+              <a:t>            _</a:t>
+            </a:r>
+            <a:r>
+              <a:rPr lang="en-US" sz="1400" dirty="0" err="1">
+                <a:solidFill>
+                  <a:srgbClr val="000000"/>
+                </a:solidFill>
+                <a:highlight>
+                  <a:srgbClr val="FFFFFF"/>
+                </a:highlight>
+                <a:latin typeface="Consolas"/>
+                <a:ea typeface="Calibri"/>
+                <a:cs typeface="Times New Roman"/>
+              </a:rPr>
+              <a:t>unityContainer</a:t>
+            </a:r>
+            <a:r>
+              <a:rPr lang="en-US" sz="1400" dirty="0">
+                <a:solidFill>
+                  <a:srgbClr val="000000"/>
+                </a:solidFill>
+                <a:highlight>
+                  <a:srgbClr val="FFFFFF"/>
+                </a:highlight>
+                <a:latin typeface="Consolas"/>
+                <a:ea typeface="Calibri"/>
+                <a:cs typeface="Times New Roman"/>
+              </a:rPr>
+              <a:t> = </a:t>
+            </a:r>
+            <a:r>
+              <a:rPr lang="en-US" sz="1400" dirty="0" err="1">
+                <a:solidFill>
+                  <a:srgbClr val="000000"/>
+                </a:solidFill>
+                <a:highlight>
+                  <a:srgbClr val="FFFFFF"/>
+                </a:highlight>
+                <a:latin typeface="Consolas"/>
+                <a:ea typeface="Calibri"/>
+                <a:cs typeface="Times New Roman"/>
+              </a:rPr>
+              <a:t>unityContainer</a:t>
+            </a:r>
+            <a:r>
+              <a:rPr lang="en-US" sz="1400" dirty="0">
+                <a:solidFill>
+                  <a:srgbClr val="000000"/>
+                </a:solidFill>
+                <a:highlight>
+                  <a:srgbClr val="FFFFFF"/>
+                </a:highlight>
+                <a:latin typeface="Consolas"/>
+                <a:ea typeface="Calibri"/>
+                <a:cs typeface="Times New Roman"/>
+              </a:rPr>
+              <a:t>;</a:t>
+            </a:r>
+            <a:endParaRPr lang="en-US" sz="1400" dirty="0">
+              <a:ea typeface="Calibri"/>
+              <a:cs typeface="Times New Roman"/>
+            </a:endParaRPr>
+          </a:p>
+          <a:p>
+            <a:pPr>
+              <a:lnSpc>
+                <a:spcPct val="115000"/>
+              </a:lnSpc>
+              <a:spcAft>
+                <a:spcPts val="0"/>
+              </a:spcAft>
+            </a:pPr>
+            <a:r>
+              <a:rPr lang="en-US" sz="1400" dirty="0">
+                <a:solidFill>
+                  <a:srgbClr val="000000"/>
+                </a:solidFill>
+                <a:highlight>
+                  <a:srgbClr val="FFFFFF"/>
+                </a:highlight>
+                <a:latin typeface="Consolas"/>
+                <a:ea typeface="Calibri"/>
+                <a:cs typeface="Times New Roman"/>
+              </a:rPr>
+              <a:t>        }</a:t>
+            </a:r>
+            <a:endParaRPr lang="en-US" sz="1400" dirty="0">
+              <a:ea typeface="Calibri"/>
+              <a:cs typeface="Times New Roman"/>
+            </a:endParaRPr>
+          </a:p>
+          <a:p>
+            <a:pPr>
+              <a:lnSpc>
+                <a:spcPct val="115000"/>
+              </a:lnSpc>
+              <a:spcAft>
+                <a:spcPts val="0"/>
+              </a:spcAft>
+            </a:pPr>
+            <a:r>
+              <a:rPr lang="en-US" sz="1400" dirty="0">
+                <a:solidFill>
+                  <a:srgbClr val="000000"/>
+                </a:solidFill>
+                <a:highlight>
+                  <a:srgbClr val="FFFFFF"/>
+                </a:highlight>
+                <a:latin typeface="Consolas"/>
+                <a:ea typeface="Calibri"/>
+                <a:cs typeface="Times New Roman"/>
+              </a:rPr>
+              <a:t> </a:t>
+            </a:r>
+            <a:endParaRPr lang="en-US" sz="1400" dirty="0">
+              <a:ea typeface="Calibri"/>
+              <a:cs typeface="Times New Roman"/>
+            </a:endParaRPr>
+          </a:p>
+          <a:p>
+            <a:pPr>
+              <a:lnSpc>
+                <a:spcPct val="115000"/>
+              </a:lnSpc>
+              <a:spcAft>
+                <a:spcPts val="0"/>
+              </a:spcAft>
+            </a:pPr>
+            <a:r>
+              <a:rPr lang="en-US" sz="1400" dirty="0">
+                <a:solidFill>
+                  <a:srgbClr val="000000"/>
+                </a:solidFill>
+                <a:highlight>
+                  <a:srgbClr val="FFFFFF"/>
+                </a:highlight>
+                <a:latin typeface="Consolas"/>
+                <a:ea typeface="Calibri"/>
+                <a:cs typeface="Times New Roman"/>
+              </a:rPr>
+              <a:t>        </a:t>
+            </a:r>
+            <a:r>
+              <a:rPr lang="en-US" sz="1400" dirty="0">
+                <a:solidFill>
+                  <a:srgbClr val="0000FF"/>
+                </a:solidFill>
+                <a:highlight>
+                  <a:srgbClr val="FFFFFF"/>
+                </a:highlight>
+                <a:latin typeface="Consolas"/>
+                <a:ea typeface="Calibri"/>
+                <a:cs typeface="Times New Roman"/>
+              </a:rPr>
+              <a:t>protected</a:t>
+            </a:r>
+            <a:r>
+              <a:rPr lang="en-US" sz="1400" dirty="0">
+                <a:solidFill>
+                  <a:srgbClr val="000000"/>
+                </a:solidFill>
+                <a:highlight>
+                  <a:srgbClr val="FFFFFF"/>
+                </a:highlight>
+                <a:latin typeface="Consolas"/>
+                <a:ea typeface="Calibri"/>
+                <a:cs typeface="Times New Roman"/>
+              </a:rPr>
+              <a:t> </a:t>
+            </a:r>
+            <a:r>
+              <a:rPr lang="en-US" sz="1400" dirty="0">
+                <a:solidFill>
+                  <a:srgbClr val="0000FF"/>
+                </a:solidFill>
+                <a:highlight>
+                  <a:srgbClr val="FFFFFF"/>
+                </a:highlight>
+                <a:latin typeface="Consolas"/>
+                <a:ea typeface="Calibri"/>
+                <a:cs typeface="Times New Roman"/>
+              </a:rPr>
+              <a:t>override</a:t>
+            </a:r>
+            <a:r>
+              <a:rPr lang="en-US" sz="1400" dirty="0">
+                <a:solidFill>
+                  <a:srgbClr val="000000"/>
+                </a:solidFill>
+                <a:highlight>
+                  <a:srgbClr val="FFFFFF"/>
+                </a:highlight>
+                <a:latin typeface="Consolas"/>
+                <a:ea typeface="Calibri"/>
+                <a:cs typeface="Times New Roman"/>
+              </a:rPr>
+              <a:t> </a:t>
+            </a:r>
+            <a:r>
+              <a:rPr lang="en-US" sz="1400" dirty="0" err="1">
+                <a:solidFill>
+                  <a:srgbClr val="2B91AF"/>
+                </a:solidFill>
+                <a:highlight>
+                  <a:srgbClr val="FFFFFF"/>
+                </a:highlight>
+                <a:latin typeface="Consolas"/>
+                <a:ea typeface="Calibri"/>
+                <a:cs typeface="Times New Roman"/>
+              </a:rPr>
+              <a:t>IController</a:t>
+            </a:r>
+            <a:r>
+              <a:rPr lang="en-US" sz="1400" dirty="0">
+                <a:solidFill>
+                  <a:srgbClr val="000000"/>
+                </a:solidFill>
+                <a:highlight>
+                  <a:srgbClr val="FFFFFF"/>
+                </a:highlight>
+                <a:latin typeface="Consolas"/>
+                <a:ea typeface="Calibri"/>
+                <a:cs typeface="Times New Roman"/>
+              </a:rPr>
+              <a:t> </a:t>
+            </a:r>
+            <a:r>
+              <a:rPr lang="en-US" sz="1400" dirty="0" err="1">
+                <a:solidFill>
+                  <a:srgbClr val="000000"/>
+                </a:solidFill>
+                <a:highlight>
+                  <a:srgbClr val="FFFFFF"/>
+                </a:highlight>
+                <a:latin typeface="Consolas"/>
+                <a:ea typeface="Calibri"/>
+                <a:cs typeface="Times New Roman"/>
+              </a:rPr>
+              <a:t>GetControllerInstance</a:t>
+            </a:r>
+            <a:r>
+              <a:rPr lang="en-US" sz="1400" dirty="0">
+                <a:solidFill>
+                  <a:srgbClr val="000000"/>
+                </a:solidFill>
+                <a:highlight>
+                  <a:srgbClr val="FFFFFF"/>
+                </a:highlight>
+                <a:latin typeface="Consolas"/>
+                <a:ea typeface="Calibri"/>
+                <a:cs typeface="Times New Roman"/>
+              </a:rPr>
+              <a:t>(</a:t>
+            </a:r>
+            <a:r>
+              <a:rPr lang="en-US" sz="1400" dirty="0" err="1">
+                <a:solidFill>
+                  <a:srgbClr val="2B91AF"/>
+                </a:solidFill>
+                <a:highlight>
+                  <a:srgbClr val="FFFFFF"/>
+                </a:highlight>
+                <a:latin typeface="Consolas"/>
+                <a:ea typeface="Calibri"/>
+                <a:cs typeface="Times New Roman"/>
+              </a:rPr>
+              <a:t>RequestContext</a:t>
+            </a:r>
+            <a:r>
+              <a:rPr lang="en-US" sz="1400" dirty="0">
+                <a:solidFill>
+                  <a:srgbClr val="000000"/>
+                </a:solidFill>
+                <a:highlight>
+                  <a:srgbClr val="FFFFFF"/>
+                </a:highlight>
+                <a:latin typeface="Consolas"/>
+                <a:ea typeface="Calibri"/>
+                <a:cs typeface="Times New Roman"/>
+              </a:rPr>
+              <a:t> </a:t>
+            </a:r>
+            <a:r>
+              <a:rPr lang="en-US" sz="1400" dirty="0" err="1">
+                <a:solidFill>
+                  <a:srgbClr val="000000"/>
+                </a:solidFill>
+                <a:highlight>
+                  <a:srgbClr val="FFFFFF"/>
+                </a:highlight>
+                <a:latin typeface="Consolas"/>
+                <a:ea typeface="Calibri"/>
+                <a:cs typeface="Times New Roman"/>
+              </a:rPr>
+              <a:t>requestContext</a:t>
+            </a:r>
+            <a:r>
+              <a:rPr lang="en-US" sz="1400" dirty="0">
+                <a:solidFill>
+                  <a:srgbClr val="000000"/>
+                </a:solidFill>
+                <a:highlight>
+                  <a:srgbClr val="FFFFFF"/>
+                </a:highlight>
+                <a:latin typeface="Consolas"/>
+                <a:ea typeface="Calibri"/>
+                <a:cs typeface="Times New Roman"/>
+              </a:rPr>
+              <a:t>, </a:t>
+            </a:r>
+            <a:r>
+              <a:rPr lang="en-US" sz="1400" dirty="0">
+                <a:solidFill>
+                  <a:srgbClr val="2B91AF"/>
+                </a:solidFill>
+                <a:highlight>
+                  <a:srgbClr val="FFFFFF"/>
+                </a:highlight>
+                <a:latin typeface="Consolas"/>
+                <a:ea typeface="Calibri"/>
+                <a:cs typeface="Times New Roman"/>
+              </a:rPr>
+              <a:t>Type</a:t>
+            </a:r>
+            <a:r>
+              <a:rPr lang="en-US" sz="1400" dirty="0">
+                <a:solidFill>
+                  <a:srgbClr val="000000"/>
+                </a:solidFill>
+                <a:highlight>
+                  <a:srgbClr val="FFFFFF"/>
+                </a:highlight>
+                <a:latin typeface="Consolas"/>
+                <a:ea typeface="Calibri"/>
+                <a:cs typeface="Times New Roman"/>
+              </a:rPr>
+              <a:t> </a:t>
+            </a:r>
+            <a:r>
+              <a:rPr lang="en-US" sz="1400" dirty="0" err="1">
+                <a:solidFill>
+                  <a:srgbClr val="000000"/>
+                </a:solidFill>
+                <a:highlight>
+                  <a:srgbClr val="FFFFFF"/>
+                </a:highlight>
+                <a:latin typeface="Consolas"/>
+                <a:ea typeface="Calibri"/>
+                <a:cs typeface="Times New Roman"/>
+              </a:rPr>
+              <a:t>controllerType</a:t>
+            </a:r>
+            <a:r>
+              <a:rPr lang="en-US" sz="1400" dirty="0">
+                <a:solidFill>
+                  <a:srgbClr val="000000"/>
+                </a:solidFill>
+                <a:highlight>
+                  <a:srgbClr val="FFFFFF"/>
+                </a:highlight>
+                <a:latin typeface="Consolas"/>
+                <a:ea typeface="Calibri"/>
+                <a:cs typeface="Times New Roman"/>
+              </a:rPr>
+              <a:t>)</a:t>
+            </a:r>
+            <a:endParaRPr lang="en-US" sz="1400" dirty="0">
+              <a:ea typeface="Calibri"/>
+              <a:cs typeface="Times New Roman"/>
+            </a:endParaRPr>
+          </a:p>
+          <a:p>
+            <a:pPr>
+              <a:lnSpc>
+                <a:spcPct val="115000"/>
+              </a:lnSpc>
+              <a:spcAft>
+                <a:spcPts val="0"/>
+              </a:spcAft>
+            </a:pPr>
+            <a:r>
+              <a:rPr lang="en-US" sz="1400" dirty="0">
+                <a:solidFill>
+                  <a:srgbClr val="000000"/>
+                </a:solidFill>
+                <a:highlight>
+                  <a:srgbClr val="FFFFFF"/>
+                </a:highlight>
+                <a:latin typeface="Consolas"/>
+                <a:ea typeface="Calibri"/>
+                <a:cs typeface="Times New Roman"/>
+              </a:rPr>
+              <a:t>        {</a:t>
+            </a:r>
+            <a:endParaRPr lang="en-US" sz="1400" dirty="0">
+              <a:ea typeface="Calibri"/>
+              <a:cs typeface="Times New Roman"/>
+            </a:endParaRPr>
+          </a:p>
+          <a:p>
+            <a:pPr>
+              <a:lnSpc>
+                <a:spcPct val="115000"/>
+              </a:lnSpc>
+              <a:spcAft>
+                <a:spcPts val="0"/>
+              </a:spcAft>
+            </a:pPr>
+            <a:r>
+              <a:rPr lang="en-US" sz="1400" dirty="0">
+                <a:solidFill>
+                  <a:srgbClr val="000000"/>
+                </a:solidFill>
+                <a:highlight>
+                  <a:srgbClr val="FFFFFF"/>
+                </a:highlight>
+                <a:latin typeface="Consolas"/>
+                <a:ea typeface="Calibri"/>
+                <a:cs typeface="Times New Roman"/>
+              </a:rPr>
+              <a:t>            </a:t>
+            </a:r>
+            <a:r>
+              <a:rPr lang="en-US" sz="1400" dirty="0">
+                <a:solidFill>
+                  <a:srgbClr val="0000FF"/>
+                </a:solidFill>
+                <a:highlight>
+                  <a:srgbClr val="FFFFFF"/>
+                </a:highlight>
+                <a:latin typeface="Consolas"/>
+                <a:ea typeface="Calibri"/>
+                <a:cs typeface="Times New Roman"/>
+              </a:rPr>
+              <a:t>return</a:t>
+            </a:r>
+            <a:r>
+              <a:rPr lang="en-US" sz="1400" dirty="0">
+                <a:solidFill>
+                  <a:srgbClr val="000000"/>
+                </a:solidFill>
+                <a:highlight>
+                  <a:srgbClr val="FFFFFF"/>
+                </a:highlight>
+                <a:latin typeface="Consolas"/>
+                <a:ea typeface="Calibri"/>
+                <a:cs typeface="Times New Roman"/>
+              </a:rPr>
+              <a:t> (</a:t>
+            </a:r>
+            <a:r>
+              <a:rPr lang="en-US" sz="1400" dirty="0" err="1">
+                <a:solidFill>
+                  <a:srgbClr val="2B91AF"/>
+                </a:solidFill>
+                <a:highlight>
+                  <a:srgbClr val="FFFFFF"/>
+                </a:highlight>
+                <a:latin typeface="Consolas"/>
+                <a:ea typeface="Calibri"/>
+                <a:cs typeface="Times New Roman"/>
+              </a:rPr>
+              <a:t>IController</a:t>
+            </a:r>
+            <a:r>
+              <a:rPr lang="en-US" sz="1400" dirty="0">
+                <a:solidFill>
+                  <a:srgbClr val="000000"/>
+                </a:solidFill>
+                <a:highlight>
+                  <a:srgbClr val="FFFFFF"/>
+                </a:highlight>
+                <a:latin typeface="Consolas"/>
+                <a:ea typeface="Calibri"/>
+                <a:cs typeface="Times New Roman"/>
+              </a:rPr>
+              <a:t>) _</a:t>
+            </a:r>
+            <a:r>
+              <a:rPr lang="en-US" sz="1400" dirty="0" err="1">
+                <a:solidFill>
+                  <a:srgbClr val="000000"/>
+                </a:solidFill>
+                <a:highlight>
+                  <a:srgbClr val="FFFFFF"/>
+                </a:highlight>
+                <a:latin typeface="Consolas"/>
+                <a:ea typeface="Calibri"/>
+                <a:cs typeface="Times New Roman"/>
+              </a:rPr>
+              <a:t>unityContainer.Resolve</a:t>
+            </a:r>
+            <a:r>
+              <a:rPr lang="en-US" sz="1400" dirty="0">
+                <a:solidFill>
+                  <a:srgbClr val="000000"/>
+                </a:solidFill>
+                <a:highlight>
+                  <a:srgbClr val="FFFFFF"/>
+                </a:highlight>
+                <a:latin typeface="Consolas"/>
+                <a:ea typeface="Calibri"/>
+                <a:cs typeface="Times New Roman"/>
+              </a:rPr>
+              <a:t>(</a:t>
+            </a:r>
+            <a:r>
+              <a:rPr lang="en-US" sz="1400" dirty="0" err="1">
+                <a:solidFill>
+                  <a:srgbClr val="000000"/>
+                </a:solidFill>
+                <a:highlight>
+                  <a:srgbClr val="FFFFFF"/>
+                </a:highlight>
+                <a:latin typeface="Consolas"/>
+                <a:ea typeface="Calibri"/>
+                <a:cs typeface="Times New Roman"/>
+              </a:rPr>
+              <a:t>controllerType</a:t>
+            </a:r>
+            <a:r>
+              <a:rPr lang="en-US" sz="1400" dirty="0">
+                <a:solidFill>
+                  <a:srgbClr val="000000"/>
+                </a:solidFill>
+                <a:highlight>
+                  <a:srgbClr val="FFFFFF"/>
+                </a:highlight>
+                <a:latin typeface="Consolas"/>
+                <a:ea typeface="Calibri"/>
+                <a:cs typeface="Times New Roman"/>
+              </a:rPr>
+              <a:t>);</a:t>
+            </a:r>
+            <a:endParaRPr lang="en-US" sz="1400" dirty="0">
+              <a:ea typeface="Calibri"/>
+              <a:cs typeface="Times New Roman"/>
+            </a:endParaRPr>
+          </a:p>
+          <a:p>
+            <a:pPr>
+              <a:lnSpc>
+                <a:spcPct val="115000"/>
+              </a:lnSpc>
+              <a:spcAft>
+                <a:spcPts val="0"/>
+              </a:spcAft>
+            </a:pPr>
+            <a:r>
+              <a:rPr lang="en-US" sz="1400" dirty="0">
+                <a:solidFill>
+                  <a:srgbClr val="000000"/>
+                </a:solidFill>
+                <a:highlight>
+                  <a:srgbClr val="FFFFFF"/>
+                </a:highlight>
+                <a:latin typeface="Consolas"/>
+                <a:ea typeface="Calibri"/>
+                <a:cs typeface="Times New Roman"/>
+              </a:rPr>
+              <a:t>        }</a:t>
+            </a:r>
+            <a:endParaRPr lang="en-US" sz="1400" dirty="0">
+              <a:ea typeface="Calibri"/>
+              <a:cs typeface="Times New Roman"/>
+            </a:endParaRPr>
+          </a:p>
+          <a:p>
+            <a:pPr>
+              <a:lnSpc>
+                <a:spcPct val="115000"/>
+              </a:lnSpc>
+              <a:spcAft>
+                <a:spcPts val="1000"/>
+              </a:spcAft>
+            </a:pPr>
+            <a:r>
+              <a:rPr lang="en-US" sz="1400" dirty="0">
+                <a:solidFill>
+                  <a:srgbClr val="000000"/>
+                </a:solidFill>
+                <a:highlight>
+                  <a:srgbClr val="FFFFFF"/>
+                </a:highlight>
+                <a:latin typeface="Consolas"/>
+                <a:ea typeface="Calibri"/>
+                <a:cs typeface="Times New Roman"/>
+              </a:rPr>
+              <a:t>    </a:t>
+            </a:r>
+            <a:r>
+              <a:rPr lang="en-US" sz="1400" dirty="0" smtClean="0">
+                <a:solidFill>
+                  <a:srgbClr val="000000"/>
+                </a:solidFill>
+                <a:highlight>
+                  <a:srgbClr val="FFFFFF"/>
+                </a:highlight>
+                <a:latin typeface="Consolas"/>
+                <a:ea typeface="Calibri"/>
+                <a:cs typeface="Times New Roman"/>
+              </a:rPr>
+              <a:t>}</a:t>
+            </a:r>
+          </a:p>
+          <a:p>
+            <a:pPr>
+              <a:lnSpc>
+                <a:spcPct val="115000"/>
+              </a:lnSpc>
+              <a:spcAft>
+                <a:spcPts val="1000"/>
+              </a:spcAft>
+            </a:pPr>
+            <a:r>
+              <a:rPr lang="fr-FR" sz="1400" i="1" dirty="0" smtClean="0">
+                <a:solidFill>
+                  <a:srgbClr val="000000"/>
+                </a:solidFill>
+                <a:highlight>
+                  <a:srgbClr val="FFFFFF"/>
+                </a:highlight>
+                <a:latin typeface="Consolas"/>
+                <a:ea typeface="Calibri"/>
+                <a:cs typeface="Times New Roman"/>
+              </a:rPr>
+              <a:t>In </a:t>
+            </a:r>
+            <a:r>
+              <a:rPr lang="fr-FR" sz="1400" i="1" dirty="0" err="1" smtClean="0">
+                <a:solidFill>
+                  <a:srgbClr val="000000"/>
+                </a:solidFill>
+                <a:highlight>
+                  <a:srgbClr val="FFFFFF"/>
+                </a:highlight>
+                <a:latin typeface="Consolas"/>
+                <a:ea typeface="Calibri"/>
+                <a:cs typeface="Times New Roman"/>
+              </a:rPr>
+              <a:t>CompositionRoot</a:t>
+            </a:r>
+            <a:endParaRPr lang="en-US" i="1" dirty="0">
+              <a:ea typeface="Calibri"/>
+              <a:cs typeface="Times New Roman"/>
+            </a:endParaRPr>
+          </a:p>
+        </p:txBody>
+      </p:sp>
+      <p:sp>
+        <p:nvSpPr>
+          <p:cNvPr id="7" name="TextBox 6"/>
+          <p:cNvSpPr txBox="1"/>
+          <p:nvPr/>
+        </p:nvSpPr>
+        <p:spPr>
+          <a:xfrm>
+            <a:off x="2843808" y="6133862"/>
+            <a:ext cx="5067156" cy="584775"/>
+          </a:xfrm>
+          <a:prstGeom prst="rect">
+            <a:avLst/>
+          </a:prstGeom>
+          <a:noFill/>
+        </p:spPr>
+        <p:txBody>
+          <a:bodyPr wrap="none" rtlCol="0">
+            <a:spAutoFit/>
+          </a:bodyPr>
+          <a:lstStyle/>
+          <a:p>
+            <a:r>
+              <a:rPr lang="fr-FR" sz="3200" b="1" dirty="0" err="1" smtClean="0">
+                <a:solidFill>
+                  <a:srgbClr val="C00000"/>
+                </a:solidFill>
+              </a:rPr>
+              <a:t>R</a:t>
+            </a:r>
+            <a:r>
+              <a:rPr lang="fr-FR" sz="3200" dirty="0" err="1" smtClean="0">
+                <a:solidFill>
+                  <a:srgbClr val="C00000"/>
+                </a:solidFill>
+              </a:rPr>
+              <a:t>egister</a:t>
+            </a:r>
+            <a:r>
+              <a:rPr lang="fr-FR" sz="3200" dirty="0" smtClean="0">
+                <a:solidFill>
+                  <a:srgbClr val="C00000"/>
+                </a:solidFill>
+              </a:rPr>
+              <a:t> / </a:t>
+            </a:r>
+            <a:r>
+              <a:rPr lang="fr-FR" sz="3200" b="1" dirty="0" err="1" smtClean="0">
+                <a:solidFill>
+                  <a:srgbClr val="C00000"/>
+                </a:solidFill>
+              </a:rPr>
+              <a:t>R</a:t>
+            </a:r>
+            <a:r>
+              <a:rPr lang="fr-FR" sz="3200" dirty="0" err="1" smtClean="0">
+                <a:solidFill>
+                  <a:srgbClr val="C00000"/>
+                </a:solidFill>
+              </a:rPr>
+              <a:t>esolve</a:t>
+            </a:r>
+            <a:r>
+              <a:rPr lang="fr-FR" sz="3200" dirty="0" smtClean="0">
+                <a:solidFill>
+                  <a:srgbClr val="C00000"/>
+                </a:solidFill>
+              </a:rPr>
+              <a:t> (/ </a:t>
+            </a:r>
+            <a:r>
+              <a:rPr lang="fr-FR" sz="3200" b="1" dirty="0" smtClean="0">
+                <a:solidFill>
+                  <a:srgbClr val="C00000"/>
+                </a:solidFill>
+              </a:rPr>
+              <a:t>R</a:t>
+            </a:r>
+            <a:r>
+              <a:rPr lang="fr-FR" sz="3200" dirty="0" smtClean="0">
+                <a:solidFill>
+                  <a:srgbClr val="C00000"/>
+                </a:solidFill>
+              </a:rPr>
+              <a:t>elease)</a:t>
+            </a:r>
+            <a:endParaRPr lang="en-US" sz="3200" dirty="0">
+              <a:solidFill>
+                <a:srgbClr val="C00000"/>
+              </a:solidFill>
+            </a:endParaRPr>
+          </a:p>
+        </p:txBody>
+      </p:sp>
+      <p:sp>
+        <p:nvSpPr>
+          <p:cNvPr id="9" name="Rounded Rectangle 8"/>
+          <p:cNvSpPr/>
+          <p:nvPr/>
+        </p:nvSpPr>
+        <p:spPr>
+          <a:xfrm>
+            <a:off x="1835696" y="1645595"/>
+            <a:ext cx="5400600" cy="414046"/>
+          </a:xfrm>
+          <a:prstGeom prst="roundRect">
+            <a:avLst/>
+          </a:prstGeom>
+          <a:noFill/>
+          <a:ln>
+            <a:solidFill>
+              <a:srgbClr val="FF0000"/>
+            </a:solidFill>
+          </a:ln>
+        </p:spPr>
+        <p:style>
+          <a:lnRef idx="2">
+            <a:schemeClr val="accent1">
+              <a:shade val="50000"/>
+            </a:schemeClr>
+          </a:lnRef>
+          <a:fillRef idx="1">
+            <a:schemeClr val="accent1"/>
+          </a:fillRef>
+          <a:effectRef idx="0">
+            <a:schemeClr val="accent1"/>
+          </a:effectRef>
+          <a:fontRef idx="minor">
+            <a:schemeClr val="lt1"/>
+          </a:fontRef>
+        </p:style>
+        <p:txBody>
+          <a:bodyPr rtlCol="0" anchor="ctr"/>
+          <a:lstStyle/>
+          <a:p>
+            <a:pPr algn="ctr"/>
+            <a:endParaRPr lang="en-US">
+              <a:solidFill>
+                <a:srgbClr val="C00000"/>
+              </a:solidFill>
+            </a:endParaRPr>
+          </a:p>
+        </p:txBody>
+      </p:sp>
+      <p:sp>
+        <p:nvSpPr>
+          <p:cNvPr id="10" name="Rounded Rectangle 9"/>
+          <p:cNvSpPr/>
+          <p:nvPr/>
+        </p:nvSpPr>
+        <p:spPr>
+          <a:xfrm>
+            <a:off x="4211960" y="5589240"/>
+            <a:ext cx="4032448" cy="544622"/>
+          </a:xfrm>
+          <a:prstGeom prst="roundRect">
+            <a:avLst/>
+          </a:prstGeom>
+          <a:noFill/>
+          <a:ln>
+            <a:solidFill>
+              <a:srgbClr val="FF0000"/>
+            </a:solidFill>
+          </a:ln>
+        </p:spPr>
+        <p:style>
+          <a:lnRef idx="2">
+            <a:schemeClr val="accent1">
+              <a:shade val="50000"/>
+            </a:schemeClr>
+          </a:lnRef>
+          <a:fillRef idx="1">
+            <a:schemeClr val="accent1"/>
+          </a:fillRef>
+          <a:effectRef idx="0">
+            <a:schemeClr val="accent1"/>
+          </a:effectRef>
+          <a:fontRef idx="minor">
+            <a:schemeClr val="lt1"/>
+          </a:fontRef>
+        </p:style>
+        <p:txBody>
+          <a:bodyPr rtlCol="0" anchor="ctr"/>
+          <a:lstStyle/>
+          <a:p>
+            <a:pPr algn="ctr"/>
+            <a:endParaRPr lang="en-US">
+              <a:solidFill>
+                <a:srgbClr val="C00000"/>
+              </a:solidFill>
+            </a:endParaRPr>
           </a:p>
         </p:txBody>
       </p:sp>
@@ -39259,9 +42735,172 @@
   <p:timing>
     <p:tnLst>
       <p:par>
-        <p:cTn id="1" dur="indefinite" restart="never" nodeType="tmRoot"/>
+        <p:cTn id="1" dur="indefinite" restart="never" nodeType="tmRoot">
+          <p:childTnLst>
+            <p:seq concurrent="1" nextAc="seek">
+              <p:cTn id="2" dur="indefinite" nodeType="mainSeq">
+                <p:childTnLst>
+                  <p:par>
+                    <p:cTn id="3" fill="hold">
+                      <p:stCondLst>
+                        <p:cond delay="indefinite"/>
+                      </p:stCondLst>
+                      <p:childTnLst>
+                        <p:par>
+                          <p:cTn id="4" fill="hold">
+                            <p:stCondLst>
+                              <p:cond delay="0"/>
+                            </p:stCondLst>
+                            <p:childTnLst>
+                              <p:par>
+                                <p:cTn id="5" presetID="1" presetClass="entr" presetSubtype="0" fill="hold" grpId="0" nodeType="clickEffect">
+                                  <p:stCondLst>
+                                    <p:cond delay="0"/>
+                                  </p:stCondLst>
+                                  <p:childTnLst>
+                                    <p:set>
+                                      <p:cBhvr>
+                                        <p:cTn id="6" dur="1" fill="hold">
+                                          <p:stCondLst>
+                                            <p:cond delay="0"/>
+                                          </p:stCondLst>
+                                        </p:cTn>
+                                        <p:tgtEl>
+                                          <p:spTgt spid="4"/>
+                                        </p:tgtEl>
+                                        <p:attrNameLst>
+                                          <p:attrName>style.visibility</p:attrName>
+                                        </p:attrNameLst>
+                                      </p:cBhvr>
+                                      <p:to>
+                                        <p:strVal val="visible"/>
+                                      </p:to>
+                                    </p:set>
+                                  </p:childTnLst>
+                                </p:cTn>
+                              </p:par>
+                            </p:childTnLst>
+                          </p:cTn>
+                        </p:par>
+                      </p:childTnLst>
+                    </p:cTn>
+                  </p:par>
+                  <p:par>
+                    <p:cTn id="7" fill="hold">
+                      <p:stCondLst>
+                        <p:cond delay="indefinite"/>
+                      </p:stCondLst>
+                      <p:childTnLst>
+                        <p:par>
+                          <p:cTn id="8" fill="hold">
+                            <p:stCondLst>
+                              <p:cond delay="0"/>
+                            </p:stCondLst>
+                            <p:childTnLst>
+                              <p:par>
+                                <p:cTn id="9" presetID="1" presetClass="entr" presetSubtype="0" fill="hold" grpId="0" nodeType="clickEffect">
+                                  <p:stCondLst>
+                                    <p:cond delay="0"/>
+                                  </p:stCondLst>
+                                  <p:childTnLst>
+                                    <p:set>
+                                      <p:cBhvr>
+                                        <p:cTn id="10" dur="1" fill="hold">
+                                          <p:stCondLst>
+                                            <p:cond delay="0"/>
+                                          </p:stCondLst>
+                                        </p:cTn>
+                                        <p:tgtEl>
+                                          <p:spTgt spid="5"/>
+                                        </p:tgtEl>
+                                        <p:attrNameLst>
+                                          <p:attrName>style.visibility</p:attrName>
+                                        </p:attrNameLst>
+                                      </p:cBhvr>
+                                      <p:to>
+                                        <p:strVal val="visible"/>
+                                      </p:to>
+                                    </p:set>
+                                  </p:childTnLst>
+                                </p:cTn>
+                              </p:par>
+                            </p:childTnLst>
+                          </p:cTn>
+                        </p:par>
+                      </p:childTnLst>
+                    </p:cTn>
+                  </p:par>
+                  <p:par>
+                    <p:cTn id="11" fill="hold">
+                      <p:stCondLst>
+                        <p:cond delay="indefinite"/>
+                      </p:stCondLst>
+                      <p:childTnLst>
+                        <p:par>
+                          <p:cTn id="12" fill="hold">
+                            <p:stCondLst>
+                              <p:cond delay="0"/>
+                            </p:stCondLst>
+                            <p:childTnLst>
+                              <p:par>
+                                <p:cTn id="13" presetID="1" presetClass="entr" presetSubtype="0" fill="hold" grpId="0" nodeType="clickEffect">
+                                  <p:stCondLst>
+                                    <p:cond delay="0"/>
+                                  </p:stCondLst>
+                                  <p:childTnLst>
+                                    <p:set>
+                                      <p:cBhvr>
+                                        <p:cTn id="14" dur="1" fill="hold">
+                                          <p:stCondLst>
+                                            <p:cond delay="0"/>
+                                          </p:stCondLst>
+                                        </p:cTn>
+                                        <p:tgtEl>
+                                          <p:spTgt spid="6"/>
+                                        </p:tgtEl>
+                                        <p:attrNameLst>
+                                          <p:attrName>style.visibility</p:attrName>
+                                        </p:attrNameLst>
+                                      </p:cBhvr>
+                                      <p:to>
+                                        <p:strVal val="visible"/>
+                                      </p:to>
+                                    </p:set>
+                                  </p:childTnLst>
+                                </p:cTn>
+                              </p:par>
+                            </p:childTnLst>
+                          </p:cTn>
+                        </p:par>
+                      </p:childTnLst>
+                    </p:cTn>
+                  </p:par>
+                </p:childTnLst>
+              </p:cTn>
+              <p:prevCondLst>
+                <p:cond evt="onPrev" delay="0">
+                  <p:tgtEl>
+                    <p:sldTgt/>
+                  </p:tgtEl>
+                </p:cond>
+              </p:prevCondLst>
+              <p:nextCondLst>
+                <p:cond evt="onNext" delay="0">
+                  <p:tgtEl>
+                    <p:sldTgt/>
+                  </p:tgtEl>
+                </p:cond>
+              </p:nextCondLst>
+            </p:seq>
+          </p:childTnLst>
+        </p:cTn>
       </p:par>
     </p:tnLst>
+    <p:bldLst>
+      <p:bldP spid="4" grpId="0" animBg="1"/>
+      <p:bldP spid="5" grpId="0" animBg="1"/>
+      <p:bldP spid="6" grpId="0" animBg="1"/>
+    </p:bldLst>
   </p:timing>
 </p:sld>
 </file>
@@ -39300,7 +42939,7 @@
           <a:p>
             <a:r>
               <a:rPr lang="en-US" dirty="0" smtClean="0"/>
-              <a:t>Composition, but not only</a:t>
+              <a:t>Aspects of DI</a:t>
             </a:r>
             <a:endParaRPr lang="en-US" dirty="0"/>
           </a:p>
@@ -39322,17 +42961,25 @@
           <a:lstStyle/>
           <a:p>
             <a:r>
-              <a:rPr lang="en-US" dirty="0" smtClean="0"/>
-              <a:t>Object creation and composition</a:t>
-            </a:r>
-          </a:p>
-          <a:p>
-            <a:r>
-              <a:rPr lang="en-US" dirty="0" smtClean="0"/>
-              <a:t>Other important parts of DI</a:t>
-            </a:r>
-          </a:p>
-          <a:p>
+              <a:rPr lang="fr-FR" dirty="0" smtClean="0"/>
+              <a:t>Composition</a:t>
+            </a:r>
+          </a:p>
+          <a:p>
+            <a:r>
+              <a:rPr lang="fr-FR" dirty="0" err="1" smtClean="0"/>
+              <a:t>Lifetime</a:t>
+            </a:r>
+            <a:r>
+              <a:rPr lang="fr-FR" dirty="0" smtClean="0"/>
+              <a:t> Management</a:t>
+            </a:r>
+          </a:p>
+          <a:p>
+            <a:r>
+              <a:rPr lang="fr-FR" dirty="0" smtClean="0"/>
+              <a:t>Interception</a:t>
+            </a:r>
             <a:endParaRPr lang="en-US" dirty="0"/>
           </a:p>
         </p:txBody>
@@ -39436,7 +43083,7 @@
 </file>
 
 <file path=ppt/slides/slide40.xml><?xml version="1.0" encoding="utf-8"?>
-<p:sld xmlns:a="http://schemas.openxmlformats.org/drawingml/2006/main" xmlns:r="http://schemas.openxmlformats.org/officeDocument/2006/relationships" xmlns:p="http://schemas.openxmlformats.org/presentationml/2006/main">
+<p:sld xmlns:a="http://schemas.openxmlformats.org/drawingml/2006/main" xmlns:r="http://schemas.openxmlformats.org/officeDocument/2006/relationships" xmlns:p="http://schemas.openxmlformats.org/presentationml/2006/main" show="0">
   <p:cSld>
     <p:spTree>
       <p:nvGrpSpPr>
@@ -39508,6 +43155,14 @@
   <p:clrMapOvr>
     <a:masterClrMapping/>
   </p:clrMapOvr>
+  <mc:AlternateContent xmlns:mc="http://schemas.openxmlformats.org/markup-compatibility/2006">
+    <mc:Choice xmlns:p14="http://schemas.microsoft.com/office/powerpoint/2010/main" Requires="p14">
+      <p:transition spd="slow" p14:dur="2000"/>
+    </mc:Choice>
+    <mc:Fallback>
+      <p:transition spd="slow"/>
+    </mc:Fallback>
+  </mc:AlternateContent>
   <p:timing>
     <p:tnLst>
       <p:par>
@@ -39573,6 +43228,69 @@
           <a:bodyPr/>
           <a:lstStyle/>
           <a:p>
+            <a:r>
+              <a:rPr lang="fr-FR" dirty="0" smtClean="0"/>
+              <a:t>~ </a:t>
+            </a:r>
+            <a:r>
+              <a:rPr lang="fr-FR" dirty="0" err="1" smtClean="0"/>
+              <a:t>Dynamic</a:t>
+            </a:r>
+            <a:r>
+              <a:rPr lang="fr-FR" dirty="0" smtClean="0"/>
+              <a:t> </a:t>
+            </a:r>
+            <a:r>
+              <a:rPr lang="fr-FR" dirty="0" err="1" smtClean="0"/>
+              <a:t>Decorators</a:t>
+            </a:r>
+            <a:endParaRPr lang="fr-FR" dirty="0" smtClean="0"/>
+          </a:p>
+          <a:p>
+            <a:r>
+              <a:rPr lang="fr-FR" dirty="0" smtClean="0"/>
+              <a:t>Cross-</a:t>
+            </a:r>
+            <a:r>
+              <a:rPr lang="fr-FR" dirty="0" err="1" smtClean="0"/>
+              <a:t>cutting</a:t>
+            </a:r>
+            <a:r>
+              <a:rPr lang="fr-FR" dirty="0" smtClean="0"/>
+              <a:t> </a:t>
+            </a:r>
+            <a:r>
+              <a:rPr lang="fr-FR" dirty="0" err="1" smtClean="0"/>
+              <a:t>concerns</a:t>
+            </a:r>
+            <a:endParaRPr lang="fr-FR" dirty="0" smtClean="0"/>
+          </a:p>
+          <a:p>
+            <a:pPr lvl="1"/>
+            <a:r>
+              <a:rPr lang="fr-FR" dirty="0" err="1" smtClean="0"/>
+              <a:t>Logging</a:t>
+            </a:r>
+            <a:endParaRPr lang="fr-FR" dirty="0" smtClean="0"/>
+          </a:p>
+          <a:p>
+            <a:pPr lvl="1"/>
+            <a:r>
+              <a:rPr lang="fr-FR" dirty="0" err="1" smtClean="0"/>
+              <a:t>Auditing</a:t>
+            </a:r>
+            <a:endParaRPr lang="fr-FR" dirty="0" smtClean="0"/>
+          </a:p>
+          <a:p>
+            <a:pPr lvl="1"/>
+            <a:r>
+              <a:rPr lang="fr-FR" dirty="0" err="1" smtClean="0"/>
+              <a:t>Profiling</a:t>
+            </a:r>
+            <a:r>
+              <a:rPr lang="fr-FR" dirty="0" smtClean="0"/>
+              <a:t> …</a:t>
+            </a:r>
             <a:endParaRPr lang="en-US" dirty="0"/>
           </a:p>
         </p:txBody>

</xml_diff>

<commit_message>
slides more or less done .... enough for today !
</commit_message>
<xml_diff>
--- a/Dependency Injection - the right way.pptx
+++ b/Dependency Injection - the right way.pptx
@@ -5,7 +5,7 @@
     <p:sldMasterId id="2147483648" r:id="rId1"/>
   </p:sldMasterIdLst>
   <p:notesMasterIdLst>
-    <p:notesMasterId r:id="rId48"/>
+    <p:notesMasterId r:id="rId51"/>
   </p:notesMasterIdLst>
   <p:sldIdLst>
     <p:sldId id="258" r:id="rId2"/>
@@ -49,11 +49,14 @@
     <p:sldId id="275" r:id="rId40"/>
     <p:sldId id="276" r:id="rId41"/>
     <p:sldId id="277" r:id="rId42"/>
-    <p:sldId id="278" r:id="rId43"/>
-    <p:sldId id="279" r:id="rId44"/>
-    <p:sldId id="259" r:id="rId45"/>
-    <p:sldId id="303" r:id="rId46"/>
-    <p:sldId id="274" r:id="rId47"/>
+    <p:sldId id="305" r:id="rId43"/>
+    <p:sldId id="278" r:id="rId44"/>
+    <p:sldId id="279" r:id="rId45"/>
+    <p:sldId id="259" r:id="rId46"/>
+    <p:sldId id="306" r:id="rId47"/>
+    <p:sldId id="307" r:id="rId48"/>
+    <p:sldId id="303" r:id="rId49"/>
+    <p:sldId id="274" r:id="rId50"/>
   </p:sldIdLst>
   <p:sldSz cx="9144000" cy="6858000" type="screen4x3"/>
   <p:notesSz cx="6858000" cy="9144000"/>
@@ -202,6 +205,7 @@
             <p14:sldId id="275"/>
             <p14:sldId id="276"/>
             <p14:sldId id="277"/>
+            <p14:sldId id="305"/>
           </p14:sldIdLst>
         </p14:section>
         <p14:section name="Ending" id="{ABFE2192-66D0-45D8-95C8-D54249131523}">
@@ -209,6 +213,8 @@
             <p14:sldId id="278"/>
             <p14:sldId id="279"/>
             <p14:sldId id="259"/>
+            <p14:sldId id="306"/>
+            <p14:sldId id="307"/>
             <p14:sldId id="303"/>
             <p14:sldId id="274"/>
           </p14:sldIdLst>
@@ -37762,98 +37768,113 @@
           </p:txBody>
         </p:sp>
       </p:grpSp>
-      <p:sp>
-        <p:nvSpPr>
-          <p:cNvPr id="10" name="Rounded Rectangle 9"/>
-          <p:cNvSpPr/>
+      <p:grpSp>
+        <p:nvGrpSpPr>
+          <p:cNvPr id="13" name="Group 12"/>
+          <p:cNvGrpSpPr/>
           <p:nvPr/>
-        </p:nvSpPr>
-        <p:spPr>
+        </p:nvGrpSpPr>
+        <p:grpSpPr>
           <a:xfrm>
             <a:off x="3707904" y="5229200"/>
-            <a:ext cx="3456384" cy="504056"/>
+            <a:ext cx="3556815" cy="919257"/>
+            <a:chOff x="3707904" y="5229200"/>
+            <a:chExt cx="3556815" cy="919257"/>
           </a:xfrm>
-          <a:prstGeom prst="roundRect">
-            <a:avLst/>
-          </a:prstGeom>
-          <a:noFill/>
-          <a:ln>
-            <a:solidFill>
-              <a:srgbClr val="FF0000"/>
-            </a:solidFill>
-          </a:ln>
-        </p:spPr>
-        <p:style>
-          <a:lnRef idx="2">
-            <a:schemeClr val="accent1">
-              <a:shade val="50000"/>
-            </a:schemeClr>
-          </a:lnRef>
-          <a:fillRef idx="1">
-            <a:schemeClr val="accent1"/>
-          </a:fillRef>
-          <a:effectRef idx="0">
-            <a:schemeClr val="accent1"/>
-          </a:effectRef>
-          <a:fontRef idx="minor">
-            <a:schemeClr val="lt1"/>
-          </a:fontRef>
-        </p:style>
-        <p:txBody>
-          <a:bodyPr rtlCol="0" anchor="ctr"/>
-          <a:lstStyle/>
-          <a:p>
-            <a:pPr algn="ctr"/>
-            <a:endParaRPr lang="en-US"/>
-          </a:p>
-        </p:txBody>
-      </p:sp>
-      <p:sp>
-        <p:nvSpPr>
-          <p:cNvPr id="11" name="TextBox 10"/>
-          <p:cNvSpPr txBox="1"/>
-          <p:nvPr/>
-        </p:nvSpPr>
-        <p:spPr>
-          <a:xfrm>
-            <a:off x="3747153" y="5748347"/>
-            <a:ext cx="3517566" cy="400110"/>
-          </a:xfrm>
-          <a:prstGeom prst="rect">
-            <a:avLst/>
-          </a:prstGeom>
-          <a:noFill/>
-        </p:spPr>
-        <p:txBody>
-          <a:bodyPr wrap="none" rtlCol="0">
-            <a:spAutoFit/>
-          </a:bodyPr>
-          <a:lstStyle/>
-          <a:p>
-            <a:r>
-              <a:rPr lang="en-US" sz="2000" b="1" dirty="0">
-                <a:solidFill>
-                  <a:srgbClr val="FF0000"/>
-                </a:solidFill>
-              </a:rPr>
-              <a:t>d</a:t>
-            </a:r>
-            <a:r>
-              <a:rPr lang="en-US" sz="2000" b="1" dirty="0" smtClean="0">
-                <a:solidFill>
-                  <a:srgbClr val="FF0000"/>
-                </a:solidFill>
-              </a:rPr>
-              <a:t>elegate to decorated instance </a:t>
-            </a:r>
-            <a:endParaRPr lang="en-US" sz="2000" b="1" dirty="0">
+        </p:grpSpPr>
+        <p:sp>
+          <p:nvSpPr>
+            <p:cNvPr id="10" name="Rounded Rectangle 9"/>
+            <p:cNvSpPr/>
+            <p:nvPr/>
+          </p:nvSpPr>
+          <p:spPr>
+            <a:xfrm>
+              <a:off x="3707904" y="5229200"/>
+              <a:ext cx="3456384" cy="504056"/>
+            </a:xfrm>
+            <a:prstGeom prst="roundRect">
+              <a:avLst/>
+            </a:prstGeom>
+            <a:noFill/>
+            <a:ln>
               <a:solidFill>
                 <a:srgbClr val="FF0000"/>
               </a:solidFill>
-            </a:endParaRPr>
-          </a:p>
-        </p:txBody>
-      </p:sp>
+            </a:ln>
+          </p:spPr>
+          <p:style>
+            <a:lnRef idx="2">
+              <a:schemeClr val="accent1">
+                <a:shade val="50000"/>
+              </a:schemeClr>
+            </a:lnRef>
+            <a:fillRef idx="1">
+              <a:schemeClr val="accent1"/>
+            </a:fillRef>
+            <a:effectRef idx="0">
+              <a:schemeClr val="accent1"/>
+            </a:effectRef>
+            <a:fontRef idx="minor">
+              <a:schemeClr val="lt1"/>
+            </a:fontRef>
+          </p:style>
+          <p:txBody>
+            <a:bodyPr rtlCol="0" anchor="ctr"/>
+            <a:lstStyle/>
+            <a:p>
+              <a:pPr algn="ctr"/>
+              <a:endParaRPr lang="en-US"/>
+            </a:p>
+          </p:txBody>
+        </p:sp>
+        <p:sp>
+          <p:nvSpPr>
+            <p:cNvPr id="11" name="TextBox 10"/>
+            <p:cNvSpPr txBox="1"/>
+            <p:nvPr/>
+          </p:nvSpPr>
+          <p:spPr>
+            <a:xfrm>
+              <a:off x="3747153" y="5748347"/>
+              <a:ext cx="3517566" cy="400110"/>
+            </a:xfrm>
+            <a:prstGeom prst="rect">
+              <a:avLst/>
+            </a:prstGeom>
+            <a:noFill/>
+          </p:spPr>
+          <p:txBody>
+            <a:bodyPr wrap="none" rtlCol="0">
+              <a:spAutoFit/>
+            </a:bodyPr>
+            <a:lstStyle/>
+            <a:p>
+              <a:r>
+                <a:rPr lang="en-US" sz="2000" b="1" dirty="0">
+                  <a:solidFill>
+                    <a:srgbClr val="FF0000"/>
+                  </a:solidFill>
+                </a:rPr>
+                <a:t>d</a:t>
+              </a:r>
+              <a:r>
+                <a:rPr lang="en-US" sz="2000" b="1" dirty="0" smtClean="0">
+                  <a:solidFill>
+                    <a:srgbClr val="FF0000"/>
+                  </a:solidFill>
+                </a:rPr>
+                <a:t>elegate to decorated instance </a:t>
+              </a:r>
+              <a:endParaRPr lang="en-US" sz="2000" b="1" dirty="0">
+                <a:solidFill>
+                  <a:srgbClr val="FF0000"/>
+                </a:solidFill>
+              </a:endParaRPr>
+            </a:p>
+          </p:txBody>
+        </p:sp>
+      </p:grpSp>
       <p:sp>
         <p:nvSpPr>
           <p:cNvPr id="12" name="TextBox 11"/>
@@ -43291,6 +43312,20 @@
               <a:rPr lang="fr-FR" dirty="0" smtClean="0"/>
               <a:t> …</a:t>
             </a:r>
+          </a:p>
+          <a:p>
+            <a:r>
+              <a:rPr lang="fr-FR" dirty="0" smtClean="0"/>
+              <a:t>AOP-</a:t>
+            </a:r>
+            <a:r>
+              <a:rPr lang="fr-FR" dirty="0" err="1" smtClean="0"/>
+              <a:t>like</a:t>
+            </a:r>
+            <a:r>
+              <a:rPr lang="fr-FR" dirty="0" smtClean="0"/>
+              <a:t> !</a:t>
+            </a:r>
             <a:endParaRPr lang="en-US" dirty="0"/>
           </a:p>
         </p:txBody>
@@ -43344,14 +43379,28 @@
         </p:nvSpPr>
         <p:spPr/>
         <p:txBody>
-          <a:bodyPr>
-            <a:normAutofit/>
-          </a:bodyPr>
+          <a:bodyPr/>
           <a:lstStyle/>
           <a:p>
             <a:r>
-              <a:rPr lang="en-US" dirty="0" smtClean="0"/>
-              <a:t>Conclusion</a:t>
+              <a:rPr lang="fr-FR" dirty="0" err="1" smtClean="0"/>
+              <a:t>Example</a:t>
+            </a:r>
+            <a:r>
+              <a:rPr lang="fr-FR" dirty="0" smtClean="0"/>
+              <a:t> </a:t>
+            </a:r>
+            <a:r>
+              <a:rPr lang="fr-FR" dirty="0" err="1" smtClean="0"/>
+              <a:t>with</a:t>
+            </a:r>
+            <a:r>
+              <a:rPr lang="fr-FR" dirty="0" smtClean="0"/>
+              <a:t> </a:t>
+            </a:r>
+            <a:r>
+              <a:rPr lang="fr-FR" dirty="0" err="1" smtClean="0"/>
+              <a:t>Unity</a:t>
             </a:r>
             <a:endParaRPr lang="en-US" dirty="0"/>
           </a:p>
@@ -43376,10 +43425,3795 @@
           </a:p>
         </p:txBody>
       </p:sp>
+      <p:sp>
+        <p:nvSpPr>
+          <p:cNvPr id="4" name="TextBox 3"/>
+          <p:cNvSpPr txBox="1"/>
+          <p:nvPr/>
+        </p:nvSpPr>
+        <p:spPr>
+          <a:xfrm>
+            <a:off x="-252536" y="44624"/>
+            <a:ext cx="10873208" cy="7772897"/>
+          </a:xfrm>
+          <a:prstGeom prst="rect">
+            <a:avLst/>
+          </a:prstGeom>
+          <a:solidFill>
+            <a:schemeClr val="bg1"/>
+          </a:solidFill>
+          <a:ln>
+            <a:solidFill>
+              <a:schemeClr val="accent1"/>
+            </a:solidFill>
+          </a:ln>
+        </p:spPr>
+        <p:txBody>
+          <a:bodyPr wrap="square" rtlCol="0">
+            <a:spAutoFit/>
+          </a:bodyPr>
+          <a:lstStyle/>
+          <a:p>
+            <a:pPr>
+              <a:lnSpc>
+                <a:spcPct val="115000"/>
+              </a:lnSpc>
+              <a:spcAft>
+                <a:spcPts val="0"/>
+              </a:spcAft>
+            </a:pPr>
+            <a:r>
+              <a:rPr lang="en-US" sz="1400" dirty="0">
+                <a:solidFill>
+                  <a:srgbClr val="0000FF"/>
+                </a:solidFill>
+                <a:highlight>
+                  <a:srgbClr val="FFFFFF"/>
+                </a:highlight>
+                <a:latin typeface="Consolas"/>
+                <a:ea typeface="Calibri"/>
+                <a:cs typeface="Times New Roman"/>
+              </a:rPr>
+              <a:t>public</a:t>
+            </a:r>
+            <a:r>
+              <a:rPr lang="en-US" sz="1400" dirty="0">
+                <a:solidFill>
+                  <a:srgbClr val="000000"/>
+                </a:solidFill>
+                <a:highlight>
+                  <a:srgbClr val="FFFFFF"/>
+                </a:highlight>
+                <a:latin typeface="Consolas"/>
+                <a:ea typeface="Calibri"/>
+                <a:cs typeface="Times New Roman"/>
+              </a:rPr>
+              <a:t> </a:t>
+            </a:r>
+            <a:r>
+              <a:rPr lang="en-US" sz="1400" dirty="0">
+                <a:solidFill>
+                  <a:srgbClr val="0000FF"/>
+                </a:solidFill>
+                <a:highlight>
+                  <a:srgbClr val="FFFFFF"/>
+                </a:highlight>
+                <a:latin typeface="Consolas"/>
+                <a:ea typeface="Calibri"/>
+                <a:cs typeface="Times New Roman"/>
+              </a:rPr>
+              <a:t>class</a:t>
+            </a:r>
+            <a:r>
+              <a:rPr lang="en-US" sz="1400" dirty="0">
+                <a:solidFill>
+                  <a:srgbClr val="000000"/>
+                </a:solidFill>
+                <a:highlight>
+                  <a:srgbClr val="FFFFFF"/>
+                </a:highlight>
+                <a:latin typeface="Consolas"/>
+                <a:ea typeface="Calibri"/>
+                <a:cs typeface="Times New Roman"/>
+              </a:rPr>
+              <a:t> </a:t>
+            </a:r>
+            <a:r>
+              <a:rPr lang="en-US" sz="1400" dirty="0" err="1">
+                <a:solidFill>
+                  <a:srgbClr val="2B91AF"/>
+                </a:solidFill>
+                <a:highlight>
+                  <a:srgbClr val="FFFFFF"/>
+                </a:highlight>
+                <a:latin typeface="Consolas"/>
+                <a:ea typeface="Calibri"/>
+                <a:cs typeface="Times New Roman"/>
+              </a:rPr>
+              <a:t>TimingBehavior</a:t>
+            </a:r>
+            <a:r>
+              <a:rPr lang="en-US" sz="1400" dirty="0">
+                <a:solidFill>
+                  <a:srgbClr val="000000"/>
+                </a:solidFill>
+                <a:highlight>
+                  <a:srgbClr val="FFFFFF"/>
+                </a:highlight>
+                <a:latin typeface="Consolas"/>
+                <a:ea typeface="Calibri"/>
+                <a:cs typeface="Times New Roman"/>
+              </a:rPr>
+              <a:t> : </a:t>
+            </a:r>
+            <a:r>
+              <a:rPr lang="en-US" sz="1400" dirty="0" err="1">
+                <a:solidFill>
+                  <a:srgbClr val="2B91AF"/>
+                </a:solidFill>
+                <a:highlight>
+                  <a:srgbClr val="FFFFFF"/>
+                </a:highlight>
+                <a:latin typeface="Consolas"/>
+                <a:ea typeface="Calibri"/>
+                <a:cs typeface="Times New Roman"/>
+              </a:rPr>
+              <a:t>IInterceptionBehavior</a:t>
+            </a:r>
+            <a:endParaRPr lang="en-US" sz="1400" dirty="0">
+              <a:ea typeface="Calibri"/>
+              <a:cs typeface="Times New Roman"/>
+            </a:endParaRPr>
+          </a:p>
+          <a:p>
+            <a:pPr>
+              <a:lnSpc>
+                <a:spcPct val="115000"/>
+              </a:lnSpc>
+              <a:spcAft>
+                <a:spcPts val="0"/>
+              </a:spcAft>
+            </a:pPr>
+            <a:r>
+              <a:rPr lang="en-US" sz="1400" dirty="0">
+                <a:solidFill>
+                  <a:srgbClr val="000000"/>
+                </a:solidFill>
+                <a:highlight>
+                  <a:srgbClr val="FFFFFF"/>
+                </a:highlight>
+                <a:latin typeface="Consolas"/>
+                <a:ea typeface="Calibri"/>
+                <a:cs typeface="Times New Roman"/>
+              </a:rPr>
+              <a:t>    {</a:t>
+            </a:r>
+            <a:endParaRPr lang="en-US" sz="1400" dirty="0">
+              <a:ea typeface="Calibri"/>
+              <a:cs typeface="Times New Roman"/>
+            </a:endParaRPr>
+          </a:p>
+          <a:p>
+            <a:pPr>
+              <a:lnSpc>
+                <a:spcPct val="115000"/>
+              </a:lnSpc>
+              <a:spcAft>
+                <a:spcPts val="0"/>
+              </a:spcAft>
+            </a:pPr>
+            <a:r>
+              <a:rPr lang="en-US" sz="1400" dirty="0">
+                <a:solidFill>
+                  <a:srgbClr val="000000"/>
+                </a:solidFill>
+                <a:highlight>
+                  <a:srgbClr val="FFFFFF"/>
+                </a:highlight>
+                <a:latin typeface="Consolas"/>
+                <a:ea typeface="Calibri"/>
+                <a:cs typeface="Times New Roman"/>
+              </a:rPr>
+              <a:t>        </a:t>
+            </a:r>
+            <a:r>
+              <a:rPr lang="en-US" sz="1400" dirty="0">
+                <a:solidFill>
+                  <a:srgbClr val="0000FF"/>
+                </a:solidFill>
+                <a:highlight>
+                  <a:srgbClr val="FFFFFF"/>
+                </a:highlight>
+                <a:latin typeface="Consolas"/>
+                <a:ea typeface="Calibri"/>
+                <a:cs typeface="Times New Roman"/>
+              </a:rPr>
+              <a:t>public</a:t>
+            </a:r>
+            <a:r>
+              <a:rPr lang="en-US" sz="1400" dirty="0">
+                <a:solidFill>
+                  <a:srgbClr val="000000"/>
+                </a:solidFill>
+                <a:highlight>
+                  <a:srgbClr val="FFFFFF"/>
+                </a:highlight>
+                <a:latin typeface="Consolas"/>
+                <a:ea typeface="Calibri"/>
+                <a:cs typeface="Times New Roman"/>
+              </a:rPr>
+              <a:t> </a:t>
+            </a:r>
+            <a:r>
+              <a:rPr lang="en-US" sz="1400" dirty="0" err="1">
+                <a:solidFill>
+                  <a:srgbClr val="2B91AF"/>
+                </a:solidFill>
+                <a:highlight>
+                  <a:srgbClr val="FFFFFF"/>
+                </a:highlight>
+                <a:latin typeface="Consolas"/>
+                <a:ea typeface="Calibri"/>
+                <a:cs typeface="Times New Roman"/>
+              </a:rPr>
+              <a:t>IMethodReturn</a:t>
+            </a:r>
+            <a:r>
+              <a:rPr lang="en-US" sz="1400" dirty="0">
+                <a:solidFill>
+                  <a:srgbClr val="000000"/>
+                </a:solidFill>
+                <a:highlight>
+                  <a:srgbClr val="FFFFFF"/>
+                </a:highlight>
+                <a:latin typeface="Consolas"/>
+                <a:ea typeface="Calibri"/>
+                <a:cs typeface="Times New Roman"/>
+              </a:rPr>
+              <a:t> Invoke(</a:t>
+            </a:r>
+            <a:r>
+              <a:rPr lang="en-US" sz="1400" dirty="0" err="1">
+                <a:solidFill>
+                  <a:srgbClr val="2B91AF"/>
+                </a:solidFill>
+                <a:highlight>
+                  <a:srgbClr val="FFFFFF"/>
+                </a:highlight>
+                <a:latin typeface="Consolas"/>
+                <a:ea typeface="Calibri"/>
+                <a:cs typeface="Times New Roman"/>
+              </a:rPr>
+              <a:t>IMethodInvocation</a:t>
+            </a:r>
+            <a:r>
+              <a:rPr lang="en-US" sz="1400" dirty="0">
+                <a:solidFill>
+                  <a:srgbClr val="000000"/>
+                </a:solidFill>
+                <a:highlight>
+                  <a:srgbClr val="FFFFFF"/>
+                </a:highlight>
+                <a:latin typeface="Consolas"/>
+                <a:ea typeface="Calibri"/>
+                <a:cs typeface="Times New Roman"/>
+              </a:rPr>
+              <a:t> input, </a:t>
+            </a:r>
+            <a:r>
+              <a:rPr lang="en-US" sz="1400" dirty="0" err="1">
+                <a:solidFill>
+                  <a:srgbClr val="2B91AF"/>
+                </a:solidFill>
+                <a:highlight>
+                  <a:srgbClr val="FFFFFF"/>
+                </a:highlight>
+                <a:latin typeface="Consolas"/>
+                <a:ea typeface="Calibri"/>
+                <a:cs typeface="Times New Roman"/>
+              </a:rPr>
+              <a:t>GetNextInterceptionBehaviorDelegate</a:t>
+            </a:r>
+            <a:r>
+              <a:rPr lang="en-US" sz="1400" dirty="0">
+                <a:solidFill>
+                  <a:srgbClr val="000000"/>
+                </a:solidFill>
+                <a:highlight>
+                  <a:srgbClr val="FFFFFF"/>
+                </a:highlight>
+                <a:latin typeface="Consolas"/>
+                <a:ea typeface="Calibri"/>
+                <a:cs typeface="Times New Roman"/>
+              </a:rPr>
+              <a:t> </a:t>
+            </a:r>
+            <a:r>
+              <a:rPr lang="en-US" sz="1400" dirty="0" err="1">
+                <a:solidFill>
+                  <a:srgbClr val="000000"/>
+                </a:solidFill>
+                <a:highlight>
+                  <a:srgbClr val="FFFFFF"/>
+                </a:highlight>
+                <a:latin typeface="Consolas"/>
+                <a:ea typeface="Calibri"/>
+                <a:cs typeface="Times New Roman"/>
+              </a:rPr>
+              <a:t>getNext</a:t>
+            </a:r>
+            <a:r>
+              <a:rPr lang="en-US" sz="1400" dirty="0">
+                <a:solidFill>
+                  <a:srgbClr val="000000"/>
+                </a:solidFill>
+                <a:highlight>
+                  <a:srgbClr val="FFFFFF"/>
+                </a:highlight>
+                <a:latin typeface="Consolas"/>
+                <a:ea typeface="Calibri"/>
+                <a:cs typeface="Times New Roman"/>
+              </a:rPr>
+              <a:t>)</a:t>
+            </a:r>
+            <a:endParaRPr lang="en-US" sz="1400" dirty="0">
+              <a:ea typeface="Calibri"/>
+              <a:cs typeface="Times New Roman"/>
+            </a:endParaRPr>
+          </a:p>
+          <a:p>
+            <a:pPr>
+              <a:lnSpc>
+                <a:spcPct val="115000"/>
+              </a:lnSpc>
+              <a:spcAft>
+                <a:spcPts val="0"/>
+              </a:spcAft>
+            </a:pPr>
+            <a:r>
+              <a:rPr lang="en-US" sz="1400" dirty="0">
+                <a:solidFill>
+                  <a:srgbClr val="000000"/>
+                </a:solidFill>
+                <a:highlight>
+                  <a:srgbClr val="FFFFFF"/>
+                </a:highlight>
+                <a:latin typeface="Consolas"/>
+                <a:ea typeface="Calibri"/>
+                <a:cs typeface="Times New Roman"/>
+              </a:rPr>
+              <a:t>        {</a:t>
+            </a:r>
+            <a:endParaRPr lang="en-US" sz="1400" dirty="0">
+              <a:ea typeface="Calibri"/>
+              <a:cs typeface="Times New Roman"/>
+            </a:endParaRPr>
+          </a:p>
+          <a:p>
+            <a:pPr>
+              <a:lnSpc>
+                <a:spcPct val="115000"/>
+              </a:lnSpc>
+              <a:spcAft>
+                <a:spcPts val="0"/>
+              </a:spcAft>
+            </a:pPr>
+            <a:r>
+              <a:rPr lang="en-US" sz="1400" dirty="0">
+                <a:solidFill>
+                  <a:srgbClr val="000000"/>
+                </a:solidFill>
+                <a:highlight>
+                  <a:srgbClr val="FFFFFF"/>
+                </a:highlight>
+                <a:latin typeface="Consolas"/>
+                <a:ea typeface="Calibri"/>
+                <a:cs typeface="Times New Roman"/>
+              </a:rPr>
+              <a:t>            </a:t>
+            </a:r>
+            <a:r>
+              <a:rPr lang="en-US" sz="1400" dirty="0" err="1">
+                <a:solidFill>
+                  <a:srgbClr val="0000FF"/>
+                </a:solidFill>
+                <a:highlight>
+                  <a:srgbClr val="FFFFFF"/>
+                </a:highlight>
+                <a:latin typeface="Consolas"/>
+                <a:ea typeface="Calibri"/>
+                <a:cs typeface="Times New Roman"/>
+              </a:rPr>
+              <a:t>var</a:t>
+            </a:r>
+            <a:r>
+              <a:rPr lang="en-US" sz="1400" dirty="0">
+                <a:solidFill>
+                  <a:srgbClr val="000000"/>
+                </a:solidFill>
+                <a:highlight>
+                  <a:srgbClr val="FFFFFF"/>
+                </a:highlight>
+                <a:latin typeface="Consolas"/>
+                <a:ea typeface="Calibri"/>
+                <a:cs typeface="Times New Roman"/>
+              </a:rPr>
+              <a:t> stopwatch = </a:t>
+            </a:r>
+            <a:r>
+              <a:rPr lang="en-US" sz="1400" dirty="0">
+                <a:solidFill>
+                  <a:srgbClr val="0000FF"/>
+                </a:solidFill>
+                <a:highlight>
+                  <a:srgbClr val="FFFFFF"/>
+                </a:highlight>
+                <a:latin typeface="Consolas"/>
+                <a:ea typeface="Calibri"/>
+                <a:cs typeface="Times New Roman"/>
+              </a:rPr>
+              <a:t>new</a:t>
+            </a:r>
+            <a:r>
+              <a:rPr lang="en-US" sz="1400" dirty="0">
+                <a:solidFill>
+                  <a:srgbClr val="000000"/>
+                </a:solidFill>
+                <a:highlight>
+                  <a:srgbClr val="FFFFFF"/>
+                </a:highlight>
+                <a:latin typeface="Consolas"/>
+                <a:ea typeface="Calibri"/>
+                <a:cs typeface="Times New Roman"/>
+              </a:rPr>
+              <a:t> </a:t>
+            </a:r>
+            <a:r>
+              <a:rPr lang="en-US" sz="1400" dirty="0">
+                <a:solidFill>
+                  <a:srgbClr val="2B91AF"/>
+                </a:solidFill>
+                <a:highlight>
+                  <a:srgbClr val="FFFFFF"/>
+                </a:highlight>
+                <a:latin typeface="Consolas"/>
+                <a:ea typeface="Calibri"/>
+                <a:cs typeface="Times New Roman"/>
+              </a:rPr>
+              <a:t>Stopwatch</a:t>
+            </a:r>
+            <a:r>
+              <a:rPr lang="en-US" sz="1400" dirty="0">
+                <a:solidFill>
+                  <a:srgbClr val="000000"/>
+                </a:solidFill>
+                <a:highlight>
+                  <a:srgbClr val="FFFFFF"/>
+                </a:highlight>
+                <a:latin typeface="Consolas"/>
+                <a:ea typeface="Calibri"/>
+                <a:cs typeface="Times New Roman"/>
+              </a:rPr>
+              <a:t>();</a:t>
+            </a:r>
+            <a:endParaRPr lang="en-US" sz="1400" dirty="0">
+              <a:ea typeface="Calibri"/>
+              <a:cs typeface="Times New Roman"/>
+            </a:endParaRPr>
+          </a:p>
+          <a:p>
+            <a:pPr>
+              <a:lnSpc>
+                <a:spcPct val="115000"/>
+              </a:lnSpc>
+              <a:spcAft>
+                <a:spcPts val="0"/>
+              </a:spcAft>
+            </a:pPr>
+            <a:r>
+              <a:rPr lang="en-US" sz="1400" dirty="0">
+                <a:solidFill>
+                  <a:srgbClr val="000000"/>
+                </a:solidFill>
+                <a:highlight>
+                  <a:srgbClr val="FFFFFF"/>
+                </a:highlight>
+                <a:latin typeface="Consolas"/>
+                <a:ea typeface="Calibri"/>
+                <a:cs typeface="Times New Roman"/>
+              </a:rPr>
+              <a:t>            </a:t>
+            </a:r>
+            <a:r>
+              <a:rPr lang="en-US" sz="1400" dirty="0">
+                <a:solidFill>
+                  <a:srgbClr val="008000"/>
+                </a:solidFill>
+                <a:highlight>
+                  <a:srgbClr val="FFFFFF"/>
+                </a:highlight>
+                <a:latin typeface="Consolas"/>
+                <a:ea typeface="Calibri"/>
+                <a:cs typeface="Times New Roman"/>
+              </a:rPr>
+              <a:t>// Before invoking the method on the original target.</a:t>
+            </a:r>
+            <a:endParaRPr lang="en-US" sz="1400" dirty="0">
+              <a:ea typeface="Calibri"/>
+              <a:cs typeface="Times New Roman"/>
+            </a:endParaRPr>
+          </a:p>
+          <a:p>
+            <a:pPr>
+              <a:lnSpc>
+                <a:spcPct val="115000"/>
+              </a:lnSpc>
+              <a:spcAft>
+                <a:spcPts val="0"/>
+              </a:spcAft>
+            </a:pPr>
+            <a:r>
+              <a:rPr lang="en-US" sz="1400" dirty="0">
+                <a:solidFill>
+                  <a:srgbClr val="000000"/>
+                </a:solidFill>
+                <a:highlight>
+                  <a:srgbClr val="FFFFFF"/>
+                </a:highlight>
+                <a:latin typeface="Consolas"/>
+                <a:ea typeface="Calibri"/>
+                <a:cs typeface="Times New Roman"/>
+              </a:rPr>
+              <a:t>            </a:t>
+            </a:r>
+            <a:r>
+              <a:rPr lang="en-US" sz="1400" dirty="0" err="1">
+                <a:solidFill>
+                  <a:srgbClr val="2B91AF"/>
+                </a:solidFill>
+                <a:highlight>
+                  <a:srgbClr val="FFFFFF"/>
+                </a:highlight>
+                <a:latin typeface="Consolas"/>
+                <a:ea typeface="Calibri"/>
+                <a:cs typeface="Times New Roman"/>
+              </a:rPr>
+              <a:t>Debug</a:t>
+            </a:r>
+            <a:r>
+              <a:rPr lang="en-US" sz="1400" dirty="0" err="1">
+                <a:solidFill>
+                  <a:srgbClr val="000000"/>
+                </a:solidFill>
+                <a:highlight>
+                  <a:srgbClr val="FFFFFF"/>
+                </a:highlight>
+                <a:latin typeface="Consolas"/>
+                <a:ea typeface="Calibri"/>
+                <a:cs typeface="Times New Roman"/>
+              </a:rPr>
+              <a:t>.WriteLine</a:t>
+            </a:r>
+            <a:r>
+              <a:rPr lang="en-US" sz="1400" dirty="0">
+                <a:solidFill>
+                  <a:srgbClr val="000000"/>
+                </a:solidFill>
+                <a:highlight>
+                  <a:srgbClr val="FFFFFF"/>
+                </a:highlight>
+                <a:latin typeface="Consolas"/>
+                <a:ea typeface="Calibri"/>
+                <a:cs typeface="Times New Roman"/>
+              </a:rPr>
+              <a:t>(</a:t>
+            </a:r>
+            <a:r>
+              <a:rPr lang="en-US" sz="1400" dirty="0">
+                <a:solidFill>
+                  <a:srgbClr val="A31515"/>
+                </a:solidFill>
+                <a:highlight>
+                  <a:srgbClr val="FFFFFF"/>
+                </a:highlight>
+                <a:latin typeface="Consolas"/>
+                <a:ea typeface="Calibri"/>
+                <a:cs typeface="Times New Roman"/>
+              </a:rPr>
+              <a:t>"&gt; </a:t>
+            </a:r>
+            <a:r>
+              <a:rPr lang="en-US" sz="1400" dirty="0">
+                <a:solidFill>
+                  <a:srgbClr val="3CB371"/>
+                </a:solidFill>
+                <a:highlight>
+                  <a:srgbClr val="FFFFFF"/>
+                </a:highlight>
+                <a:latin typeface="Consolas"/>
+                <a:ea typeface="Calibri"/>
+                <a:cs typeface="Times New Roman"/>
+              </a:rPr>
+              <a:t>{0}</a:t>
+            </a:r>
+            <a:r>
+              <a:rPr lang="en-US" sz="1400" dirty="0">
+                <a:solidFill>
+                  <a:srgbClr val="A31515"/>
+                </a:solidFill>
+                <a:highlight>
+                  <a:srgbClr val="FFFFFF"/>
+                </a:highlight>
+                <a:latin typeface="Consolas"/>
+                <a:ea typeface="Calibri"/>
+                <a:cs typeface="Times New Roman"/>
+              </a:rPr>
+              <a:t>.</a:t>
+            </a:r>
+            <a:r>
+              <a:rPr lang="en-US" sz="1400" dirty="0">
+                <a:solidFill>
+                  <a:srgbClr val="3CB371"/>
+                </a:solidFill>
+                <a:highlight>
+                  <a:srgbClr val="FFFFFF"/>
+                </a:highlight>
+                <a:latin typeface="Consolas"/>
+                <a:ea typeface="Calibri"/>
+                <a:cs typeface="Times New Roman"/>
+              </a:rPr>
+              <a:t>{1}</a:t>
+            </a:r>
+            <a:r>
+              <a:rPr lang="en-US" sz="1400" dirty="0">
+                <a:solidFill>
+                  <a:srgbClr val="A31515"/>
+                </a:solidFill>
+                <a:highlight>
+                  <a:srgbClr val="FFFFFF"/>
+                </a:highlight>
+                <a:latin typeface="Consolas"/>
+                <a:ea typeface="Calibri"/>
+                <a:cs typeface="Times New Roman"/>
+              </a:rPr>
+              <a:t>"</a:t>
+            </a:r>
+            <a:r>
+              <a:rPr lang="en-US" sz="1400" dirty="0">
+                <a:solidFill>
+                  <a:srgbClr val="000000"/>
+                </a:solidFill>
+                <a:highlight>
+                  <a:srgbClr val="FFFFFF"/>
+                </a:highlight>
+                <a:latin typeface="Consolas"/>
+                <a:ea typeface="Calibri"/>
+                <a:cs typeface="Times New Roman"/>
+              </a:rPr>
+              <a:t>, </a:t>
+            </a:r>
+            <a:r>
+              <a:rPr lang="en-US" sz="1400" dirty="0" err="1">
+                <a:solidFill>
+                  <a:srgbClr val="000000"/>
+                </a:solidFill>
+                <a:highlight>
+                  <a:srgbClr val="FFFFFF"/>
+                </a:highlight>
+                <a:latin typeface="Consolas"/>
+                <a:ea typeface="Calibri"/>
+                <a:cs typeface="Times New Roman"/>
+              </a:rPr>
+              <a:t>input.MethodBase.DeclaringType</a:t>
+            </a:r>
+            <a:r>
+              <a:rPr lang="en-US" sz="1400" dirty="0">
+                <a:solidFill>
+                  <a:srgbClr val="000000"/>
+                </a:solidFill>
+                <a:highlight>
+                  <a:srgbClr val="FFFFFF"/>
+                </a:highlight>
+                <a:latin typeface="Consolas"/>
+                <a:ea typeface="Calibri"/>
+                <a:cs typeface="Times New Roman"/>
+              </a:rPr>
+              <a:t>, </a:t>
+            </a:r>
+            <a:r>
+              <a:rPr lang="en-US" sz="1400" dirty="0" err="1">
+                <a:solidFill>
+                  <a:srgbClr val="000000"/>
+                </a:solidFill>
+                <a:highlight>
+                  <a:srgbClr val="FFFFFF"/>
+                </a:highlight>
+                <a:latin typeface="Consolas"/>
+                <a:ea typeface="Calibri"/>
+                <a:cs typeface="Times New Roman"/>
+              </a:rPr>
+              <a:t>input.MethodBase.Name</a:t>
+            </a:r>
+            <a:r>
+              <a:rPr lang="en-US" sz="1400" dirty="0">
+                <a:solidFill>
+                  <a:srgbClr val="000000"/>
+                </a:solidFill>
+                <a:highlight>
+                  <a:srgbClr val="FFFFFF"/>
+                </a:highlight>
+                <a:latin typeface="Consolas"/>
+                <a:ea typeface="Calibri"/>
+                <a:cs typeface="Times New Roman"/>
+              </a:rPr>
+              <a:t>);</a:t>
+            </a:r>
+            <a:endParaRPr lang="en-US" sz="1400" dirty="0">
+              <a:ea typeface="Calibri"/>
+              <a:cs typeface="Times New Roman"/>
+            </a:endParaRPr>
+          </a:p>
+          <a:p>
+            <a:pPr>
+              <a:lnSpc>
+                <a:spcPct val="115000"/>
+              </a:lnSpc>
+              <a:spcAft>
+                <a:spcPts val="0"/>
+              </a:spcAft>
+            </a:pPr>
+            <a:r>
+              <a:rPr lang="en-US" sz="1400" dirty="0">
+                <a:solidFill>
+                  <a:srgbClr val="000000"/>
+                </a:solidFill>
+                <a:highlight>
+                  <a:srgbClr val="FFFFFF"/>
+                </a:highlight>
+                <a:latin typeface="Consolas"/>
+                <a:ea typeface="Calibri"/>
+                <a:cs typeface="Times New Roman"/>
+              </a:rPr>
+              <a:t> </a:t>
+            </a:r>
+            <a:endParaRPr lang="en-US" sz="1400" dirty="0">
+              <a:ea typeface="Calibri"/>
+              <a:cs typeface="Times New Roman"/>
+            </a:endParaRPr>
+          </a:p>
+          <a:p>
+            <a:pPr>
+              <a:lnSpc>
+                <a:spcPct val="115000"/>
+              </a:lnSpc>
+              <a:spcAft>
+                <a:spcPts val="0"/>
+              </a:spcAft>
+            </a:pPr>
+            <a:r>
+              <a:rPr lang="en-US" sz="1400" dirty="0">
+                <a:solidFill>
+                  <a:srgbClr val="000000"/>
+                </a:solidFill>
+                <a:highlight>
+                  <a:srgbClr val="FFFFFF"/>
+                </a:highlight>
+                <a:latin typeface="Consolas"/>
+                <a:ea typeface="Calibri"/>
+                <a:cs typeface="Times New Roman"/>
+              </a:rPr>
+              <a:t>            </a:t>
+            </a:r>
+            <a:r>
+              <a:rPr lang="en-US" sz="1400" dirty="0" err="1">
+                <a:solidFill>
+                  <a:srgbClr val="000000"/>
+                </a:solidFill>
+                <a:highlight>
+                  <a:srgbClr val="FFFFFF"/>
+                </a:highlight>
+                <a:latin typeface="Consolas"/>
+                <a:ea typeface="Calibri"/>
+                <a:cs typeface="Times New Roman"/>
+              </a:rPr>
+              <a:t>stopwatch.Start</a:t>
+            </a:r>
+            <a:r>
+              <a:rPr lang="en-US" sz="1400" dirty="0">
+                <a:solidFill>
+                  <a:srgbClr val="000000"/>
+                </a:solidFill>
+                <a:highlight>
+                  <a:srgbClr val="FFFFFF"/>
+                </a:highlight>
+                <a:latin typeface="Consolas"/>
+                <a:ea typeface="Calibri"/>
+                <a:cs typeface="Times New Roman"/>
+              </a:rPr>
+              <a:t>();</a:t>
+            </a:r>
+            <a:endParaRPr lang="en-US" sz="1400" dirty="0">
+              <a:ea typeface="Calibri"/>
+              <a:cs typeface="Times New Roman"/>
+            </a:endParaRPr>
+          </a:p>
+          <a:p>
+            <a:pPr>
+              <a:lnSpc>
+                <a:spcPct val="115000"/>
+              </a:lnSpc>
+              <a:spcAft>
+                <a:spcPts val="0"/>
+              </a:spcAft>
+            </a:pPr>
+            <a:r>
+              <a:rPr lang="en-US" sz="1400" dirty="0">
+                <a:solidFill>
+                  <a:srgbClr val="000000"/>
+                </a:solidFill>
+                <a:highlight>
+                  <a:srgbClr val="FFFFFF"/>
+                </a:highlight>
+                <a:latin typeface="Consolas"/>
+                <a:ea typeface="Calibri"/>
+                <a:cs typeface="Times New Roman"/>
+              </a:rPr>
+              <a:t>            </a:t>
+            </a:r>
+            <a:r>
+              <a:rPr lang="en-US" sz="1400" dirty="0">
+                <a:solidFill>
+                  <a:srgbClr val="008000"/>
+                </a:solidFill>
+                <a:highlight>
+                  <a:srgbClr val="FFFFFF"/>
+                </a:highlight>
+                <a:latin typeface="Consolas"/>
+                <a:ea typeface="Calibri"/>
+                <a:cs typeface="Times New Roman"/>
+              </a:rPr>
+              <a:t>// Invoke the next behavior in the chain.</a:t>
+            </a:r>
+            <a:endParaRPr lang="en-US" sz="1400" dirty="0">
+              <a:ea typeface="Calibri"/>
+              <a:cs typeface="Times New Roman"/>
+            </a:endParaRPr>
+          </a:p>
+          <a:p>
+            <a:pPr>
+              <a:lnSpc>
+                <a:spcPct val="115000"/>
+              </a:lnSpc>
+              <a:spcAft>
+                <a:spcPts val="0"/>
+              </a:spcAft>
+            </a:pPr>
+            <a:r>
+              <a:rPr lang="en-US" sz="1400" dirty="0">
+                <a:solidFill>
+                  <a:srgbClr val="000000"/>
+                </a:solidFill>
+                <a:highlight>
+                  <a:srgbClr val="FFFFFF"/>
+                </a:highlight>
+                <a:latin typeface="Consolas"/>
+                <a:ea typeface="Calibri"/>
+                <a:cs typeface="Times New Roman"/>
+              </a:rPr>
+              <a:t>            </a:t>
+            </a:r>
+            <a:r>
+              <a:rPr lang="en-US" sz="1400" dirty="0" err="1">
+                <a:solidFill>
+                  <a:srgbClr val="0000FF"/>
+                </a:solidFill>
+                <a:highlight>
+                  <a:srgbClr val="FFFFFF"/>
+                </a:highlight>
+                <a:latin typeface="Consolas"/>
+                <a:ea typeface="Calibri"/>
+                <a:cs typeface="Times New Roman"/>
+              </a:rPr>
+              <a:t>var</a:t>
+            </a:r>
+            <a:r>
+              <a:rPr lang="en-US" sz="1400" dirty="0">
+                <a:solidFill>
+                  <a:srgbClr val="000000"/>
+                </a:solidFill>
+                <a:highlight>
+                  <a:srgbClr val="FFFFFF"/>
+                </a:highlight>
+                <a:latin typeface="Consolas"/>
+                <a:ea typeface="Calibri"/>
+                <a:cs typeface="Times New Roman"/>
+              </a:rPr>
+              <a:t> result = </a:t>
+            </a:r>
+            <a:r>
+              <a:rPr lang="en-US" sz="1400" dirty="0" err="1">
+                <a:solidFill>
+                  <a:srgbClr val="000000"/>
+                </a:solidFill>
+                <a:highlight>
+                  <a:srgbClr val="FFFFFF"/>
+                </a:highlight>
+                <a:latin typeface="Consolas"/>
+                <a:ea typeface="Calibri"/>
+                <a:cs typeface="Times New Roman"/>
+              </a:rPr>
+              <a:t>getNext</a:t>
+            </a:r>
+            <a:r>
+              <a:rPr lang="en-US" sz="1400" dirty="0">
+                <a:solidFill>
+                  <a:srgbClr val="000000"/>
+                </a:solidFill>
+                <a:highlight>
+                  <a:srgbClr val="FFFFFF"/>
+                </a:highlight>
+                <a:latin typeface="Consolas"/>
+                <a:ea typeface="Calibri"/>
+                <a:cs typeface="Times New Roman"/>
+              </a:rPr>
+              <a:t>()(input, </a:t>
+            </a:r>
+            <a:r>
+              <a:rPr lang="en-US" sz="1400" dirty="0" err="1">
+                <a:solidFill>
+                  <a:srgbClr val="000000"/>
+                </a:solidFill>
+                <a:highlight>
+                  <a:srgbClr val="FFFFFF"/>
+                </a:highlight>
+                <a:latin typeface="Consolas"/>
+                <a:ea typeface="Calibri"/>
+                <a:cs typeface="Times New Roman"/>
+              </a:rPr>
+              <a:t>getNext</a:t>
+            </a:r>
+            <a:r>
+              <a:rPr lang="en-US" sz="1400" dirty="0">
+                <a:solidFill>
+                  <a:srgbClr val="000000"/>
+                </a:solidFill>
+                <a:highlight>
+                  <a:srgbClr val="FFFFFF"/>
+                </a:highlight>
+                <a:latin typeface="Consolas"/>
+                <a:ea typeface="Calibri"/>
+                <a:cs typeface="Times New Roman"/>
+              </a:rPr>
+              <a:t>);</a:t>
+            </a:r>
+            <a:endParaRPr lang="en-US" sz="1400" dirty="0">
+              <a:ea typeface="Calibri"/>
+              <a:cs typeface="Times New Roman"/>
+            </a:endParaRPr>
+          </a:p>
+          <a:p>
+            <a:pPr>
+              <a:lnSpc>
+                <a:spcPct val="115000"/>
+              </a:lnSpc>
+              <a:spcAft>
+                <a:spcPts val="0"/>
+              </a:spcAft>
+            </a:pPr>
+            <a:r>
+              <a:rPr lang="en-US" sz="1400" dirty="0">
+                <a:solidFill>
+                  <a:srgbClr val="000000"/>
+                </a:solidFill>
+                <a:highlight>
+                  <a:srgbClr val="FFFFFF"/>
+                </a:highlight>
+                <a:latin typeface="Consolas"/>
+                <a:ea typeface="Calibri"/>
+                <a:cs typeface="Times New Roman"/>
+              </a:rPr>
+              <a:t> </a:t>
+            </a:r>
+            <a:endParaRPr lang="en-US" sz="1400" dirty="0">
+              <a:ea typeface="Calibri"/>
+              <a:cs typeface="Times New Roman"/>
+            </a:endParaRPr>
+          </a:p>
+          <a:p>
+            <a:pPr>
+              <a:lnSpc>
+                <a:spcPct val="115000"/>
+              </a:lnSpc>
+              <a:spcAft>
+                <a:spcPts val="0"/>
+              </a:spcAft>
+            </a:pPr>
+            <a:r>
+              <a:rPr lang="en-US" sz="1400" dirty="0">
+                <a:solidFill>
+                  <a:srgbClr val="000000"/>
+                </a:solidFill>
+                <a:highlight>
+                  <a:srgbClr val="FFFFFF"/>
+                </a:highlight>
+                <a:latin typeface="Consolas"/>
+                <a:ea typeface="Calibri"/>
+                <a:cs typeface="Times New Roman"/>
+              </a:rPr>
+              <a:t>            </a:t>
+            </a:r>
+            <a:r>
+              <a:rPr lang="en-US" sz="1400" dirty="0" err="1">
+                <a:solidFill>
+                  <a:srgbClr val="000000"/>
+                </a:solidFill>
+                <a:highlight>
+                  <a:srgbClr val="FFFFFF"/>
+                </a:highlight>
+                <a:latin typeface="Consolas"/>
+                <a:ea typeface="Calibri"/>
+                <a:cs typeface="Times New Roman"/>
+              </a:rPr>
+              <a:t>stopwatch.Stop</a:t>
+            </a:r>
+            <a:r>
+              <a:rPr lang="en-US" sz="1400" dirty="0">
+                <a:solidFill>
+                  <a:srgbClr val="000000"/>
+                </a:solidFill>
+                <a:highlight>
+                  <a:srgbClr val="FFFFFF"/>
+                </a:highlight>
+                <a:latin typeface="Consolas"/>
+                <a:ea typeface="Calibri"/>
+                <a:cs typeface="Times New Roman"/>
+              </a:rPr>
+              <a:t>();</a:t>
+            </a:r>
+            <a:endParaRPr lang="en-US" sz="1400" dirty="0">
+              <a:ea typeface="Calibri"/>
+              <a:cs typeface="Times New Roman"/>
+            </a:endParaRPr>
+          </a:p>
+          <a:p>
+            <a:pPr>
+              <a:lnSpc>
+                <a:spcPct val="115000"/>
+              </a:lnSpc>
+              <a:spcAft>
+                <a:spcPts val="0"/>
+              </a:spcAft>
+            </a:pPr>
+            <a:r>
+              <a:rPr lang="en-US" sz="1400" dirty="0">
+                <a:solidFill>
+                  <a:srgbClr val="000000"/>
+                </a:solidFill>
+                <a:highlight>
+                  <a:srgbClr val="FFFFFF"/>
+                </a:highlight>
+                <a:latin typeface="Consolas"/>
+                <a:ea typeface="Calibri"/>
+                <a:cs typeface="Times New Roman"/>
+              </a:rPr>
+              <a:t>            </a:t>
+            </a:r>
+            <a:r>
+              <a:rPr lang="en-US" sz="1400" dirty="0">
+                <a:solidFill>
+                  <a:srgbClr val="008000"/>
+                </a:solidFill>
+                <a:highlight>
+                  <a:srgbClr val="FFFFFF"/>
+                </a:highlight>
+                <a:latin typeface="Consolas"/>
+                <a:ea typeface="Calibri"/>
+                <a:cs typeface="Times New Roman"/>
+              </a:rPr>
+              <a:t>// After invoking the method on the original target.</a:t>
+            </a:r>
+            <a:endParaRPr lang="en-US" sz="1400" dirty="0">
+              <a:ea typeface="Calibri"/>
+              <a:cs typeface="Times New Roman"/>
+            </a:endParaRPr>
+          </a:p>
+          <a:p>
+            <a:pPr>
+              <a:lnSpc>
+                <a:spcPct val="115000"/>
+              </a:lnSpc>
+              <a:spcAft>
+                <a:spcPts val="0"/>
+              </a:spcAft>
+            </a:pPr>
+            <a:r>
+              <a:rPr lang="en-US" sz="1400" dirty="0">
+                <a:solidFill>
+                  <a:srgbClr val="000000"/>
+                </a:solidFill>
+                <a:highlight>
+                  <a:srgbClr val="FFFFFF"/>
+                </a:highlight>
+                <a:latin typeface="Consolas"/>
+                <a:ea typeface="Calibri"/>
+                <a:cs typeface="Times New Roman"/>
+              </a:rPr>
+              <a:t>            </a:t>
+            </a:r>
+            <a:r>
+              <a:rPr lang="en-US" sz="1400" dirty="0">
+                <a:solidFill>
+                  <a:srgbClr val="0000FF"/>
+                </a:solidFill>
+                <a:highlight>
+                  <a:srgbClr val="FFFFFF"/>
+                </a:highlight>
+                <a:latin typeface="Consolas"/>
+                <a:ea typeface="Calibri"/>
+                <a:cs typeface="Times New Roman"/>
+              </a:rPr>
+              <a:t>if</a:t>
+            </a:r>
+            <a:r>
+              <a:rPr lang="en-US" sz="1400" dirty="0">
+                <a:solidFill>
+                  <a:srgbClr val="000000"/>
+                </a:solidFill>
+                <a:highlight>
+                  <a:srgbClr val="FFFFFF"/>
+                </a:highlight>
+                <a:latin typeface="Consolas"/>
+                <a:ea typeface="Calibri"/>
+                <a:cs typeface="Times New Roman"/>
+              </a:rPr>
+              <a:t> (</a:t>
+            </a:r>
+            <a:r>
+              <a:rPr lang="en-US" sz="1400" dirty="0" err="1">
+                <a:solidFill>
+                  <a:srgbClr val="000000"/>
+                </a:solidFill>
+                <a:highlight>
+                  <a:srgbClr val="FFFFFF"/>
+                </a:highlight>
+                <a:latin typeface="Consolas"/>
+                <a:ea typeface="Calibri"/>
+                <a:cs typeface="Times New Roman"/>
+              </a:rPr>
+              <a:t>result.Exception</a:t>
+            </a:r>
+            <a:r>
+              <a:rPr lang="en-US" sz="1400" dirty="0">
+                <a:solidFill>
+                  <a:srgbClr val="000000"/>
+                </a:solidFill>
+                <a:highlight>
+                  <a:srgbClr val="FFFFFF"/>
+                </a:highlight>
+                <a:latin typeface="Consolas"/>
+                <a:ea typeface="Calibri"/>
+                <a:cs typeface="Times New Roman"/>
+              </a:rPr>
+              <a:t> != </a:t>
+            </a:r>
+            <a:r>
+              <a:rPr lang="en-US" sz="1400" dirty="0">
+                <a:solidFill>
+                  <a:srgbClr val="0000FF"/>
+                </a:solidFill>
+                <a:highlight>
+                  <a:srgbClr val="FFFFFF"/>
+                </a:highlight>
+                <a:latin typeface="Consolas"/>
+                <a:ea typeface="Calibri"/>
+                <a:cs typeface="Times New Roman"/>
+              </a:rPr>
+              <a:t>null</a:t>
+            </a:r>
+            <a:r>
+              <a:rPr lang="en-US" sz="1400" dirty="0">
+                <a:solidFill>
+                  <a:srgbClr val="000000"/>
+                </a:solidFill>
+                <a:highlight>
+                  <a:srgbClr val="FFFFFF"/>
+                </a:highlight>
+                <a:latin typeface="Consolas"/>
+                <a:ea typeface="Calibri"/>
+                <a:cs typeface="Times New Roman"/>
+              </a:rPr>
+              <a:t>)</a:t>
+            </a:r>
+            <a:endParaRPr lang="en-US" sz="1400" dirty="0">
+              <a:ea typeface="Calibri"/>
+              <a:cs typeface="Times New Roman"/>
+            </a:endParaRPr>
+          </a:p>
+          <a:p>
+            <a:pPr>
+              <a:lnSpc>
+                <a:spcPct val="115000"/>
+              </a:lnSpc>
+              <a:spcAft>
+                <a:spcPts val="0"/>
+              </a:spcAft>
+            </a:pPr>
+            <a:r>
+              <a:rPr lang="en-US" sz="1400" dirty="0">
+                <a:solidFill>
+                  <a:srgbClr val="000000"/>
+                </a:solidFill>
+                <a:highlight>
+                  <a:srgbClr val="FFFFFF"/>
+                </a:highlight>
+                <a:latin typeface="Consolas"/>
+                <a:ea typeface="Calibri"/>
+                <a:cs typeface="Times New Roman"/>
+              </a:rPr>
+              <a:t>            {</a:t>
+            </a:r>
+            <a:endParaRPr lang="en-US" sz="1400" dirty="0">
+              <a:ea typeface="Calibri"/>
+              <a:cs typeface="Times New Roman"/>
+            </a:endParaRPr>
+          </a:p>
+          <a:p>
+            <a:pPr>
+              <a:lnSpc>
+                <a:spcPct val="115000"/>
+              </a:lnSpc>
+              <a:spcAft>
+                <a:spcPts val="0"/>
+              </a:spcAft>
+            </a:pPr>
+            <a:r>
+              <a:rPr lang="en-US" sz="1400" dirty="0">
+                <a:solidFill>
+                  <a:srgbClr val="000000"/>
+                </a:solidFill>
+                <a:highlight>
+                  <a:srgbClr val="FFFFFF"/>
+                </a:highlight>
+                <a:latin typeface="Consolas"/>
+                <a:ea typeface="Calibri"/>
+                <a:cs typeface="Times New Roman"/>
+              </a:rPr>
+              <a:t>                </a:t>
+            </a:r>
+            <a:r>
+              <a:rPr lang="en-US" sz="1400" dirty="0" err="1">
+                <a:solidFill>
+                  <a:srgbClr val="2B91AF"/>
+                </a:solidFill>
+                <a:highlight>
+                  <a:srgbClr val="FFFFFF"/>
+                </a:highlight>
+                <a:latin typeface="Consolas"/>
+                <a:ea typeface="Calibri"/>
+                <a:cs typeface="Times New Roman"/>
+              </a:rPr>
+              <a:t>Debug</a:t>
+            </a:r>
+            <a:r>
+              <a:rPr lang="en-US" sz="1400" dirty="0" err="1">
+                <a:solidFill>
+                  <a:srgbClr val="000000"/>
+                </a:solidFill>
+                <a:highlight>
+                  <a:srgbClr val="FFFFFF"/>
+                </a:highlight>
+                <a:latin typeface="Consolas"/>
+                <a:ea typeface="Calibri"/>
+                <a:cs typeface="Times New Roman"/>
+              </a:rPr>
+              <a:t>.WriteLine</a:t>
+            </a:r>
+            <a:r>
+              <a:rPr lang="en-US" sz="1400" dirty="0">
+                <a:solidFill>
+                  <a:srgbClr val="000000"/>
+                </a:solidFill>
+                <a:highlight>
+                  <a:srgbClr val="FFFFFF"/>
+                </a:highlight>
+                <a:latin typeface="Consolas"/>
+                <a:ea typeface="Calibri"/>
+                <a:cs typeface="Times New Roman"/>
+              </a:rPr>
+              <a:t>(</a:t>
+            </a:r>
+            <a:endParaRPr lang="en-US" sz="1400" dirty="0">
+              <a:ea typeface="Calibri"/>
+              <a:cs typeface="Times New Roman"/>
+            </a:endParaRPr>
+          </a:p>
+          <a:p>
+            <a:pPr>
+              <a:lnSpc>
+                <a:spcPct val="115000"/>
+              </a:lnSpc>
+              <a:spcAft>
+                <a:spcPts val="0"/>
+              </a:spcAft>
+            </a:pPr>
+            <a:r>
+              <a:rPr lang="en-US" sz="1400" dirty="0">
+                <a:solidFill>
+                  <a:srgbClr val="000000"/>
+                </a:solidFill>
+                <a:highlight>
+                  <a:srgbClr val="FFFFFF"/>
+                </a:highlight>
+                <a:latin typeface="Consolas"/>
+                <a:ea typeface="Calibri"/>
+                <a:cs typeface="Times New Roman"/>
+              </a:rPr>
+              <a:t>                  </a:t>
+            </a:r>
+            <a:r>
+              <a:rPr lang="en-US" sz="1400" dirty="0">
+                <a:solidFill>
+                  <a:srgbClr val="A31515"/>
+                </a:solidFill>
+                <a:highlight>
+                  <a:srgbClr val="FFFFFF"/>
+                </a:highlight>
+                <a:latin typeface="Consolas"/>
+                <a:ea typeface="Calibri"/>
+                <a:cs typeface="Times New Roman"/>
+              </a:rPr>
+              <a:t>"&lt; </a:t>
+            </a:r>
+            <a:r>
+              <a:rPr lang="en-US" sz="1400" dirty="0">
+                <a:solidFill>
+                  <a:srgbClr val="3CB371"/>
+                </a:solidFill>
+                <a:highlight>
+                  <a:srgbClr val="FFFFFF"/>
+                </a:highlight>
+                <a:latin typeface="Consolas"/>
+                <a:ea typeface="Calibri"/>
+                <a:cs typeface="Times New Roman"/>
+              </a:rPr>
+              <a:t>{0}</a:t>
+            </a:r>
+            <a:r>
+              <a:rPr lang="en-US" sz="1400" dirty="0">
+                <a:solidFill>
+                  <a:srgbClr val="A31515"/>
+                </a:solidFill>
+                <a:highlight>
+                  <a:srgbClr val="FFFFFF"/>
+                </a:highlight>
+                <a:latin typeface="Consolas"/>
+                <a:ea typeface="Calibri"/>
+                <a:cs typeface="Times New Roman"/>
+              </a:rPr>
+              <a:t>.</a:t>
+            </a:r>
+            <a:r>
+              <a:rPr lang="en-US" sz="1400" dirty="0">
+                <a:solidFill>
+                  <a:srgbClr val="3CB371"/>
+                </a:solidFill>
+                <a:highlight>
+                  <a:srgbClr val="FFFFFF"/>
+                </a:highlight>
+                <a:latin typeface="Consolas"/>
+                <a:ea typeface="Calibri"/>
+                <a:cs typeface="Times New Roman"/>
+              </a:rPr>
+              <a:t>{1}</a:t>
+            </a:r>
+            <a:r>
+              <a:rPr lang="en-US" sz="1400" dirty="0">
+                <a:solidFill>
+                  <a:srgbClr val="A31515"/>
+                </a:solidFill>
+                <a:highlight>
+                  <a:srgbClr val="FFFFFF"/>
+                </a:highlight>
+                <a:latin typeface="Consolas"/>
+                <a:ea typeface="Calibri"/>
+                <a:cs typeface="Times New Roman"/>
+              </a:rPr>
+              <a:t> failed - after </a:t>
+            </a:r>
+            <a:r>
+              <a:rPr lang="en-US" sz="1400" dirty="0">
+                <a:solidFill>
+                  <a:srgbClr val="3CB371"/>
+                </a:solidFill>
+                <a:highlight>
+                  <a:srgbClr val="FFFFFF"/>
+                </a:highlight>
+                <a:latin typeface="Consolas"/>
+                <a:ea typeface="Calibri"/>
+                <a:cs typeface="Times New Roman"/>
+              </a:rPr>
+              <a:t>{3}</a:t>
+            </a:r>
+            <a:r>
+              <a:rPr lang="en-US" sz="1400" dirty="0">
+                <a:solidFill>
+                  <a:srgbClr val="A31515"/>
+                </a:solidFill>
+                <a:highlight>
+                  <a:srgbClr val="FFFFFF"/>
+                </a:highlight>
+                <a:latin typeface="Consolas"/>
+                <a:ea typeface="Calibri"/>
+                <a:cs typeface="Times New Roman"/>
+              </a:rPr>
+              <a:t> </a:t>
+            </a:r>
+            <a:r>
+              <a:rPr lang="en-US" sz="1400" dirty="0" err="1">
+                <a:solidFill>
+                  <a:srgbClr val="A31515"/>
+                </a:solidFill>
+                <a:highlight>
+                  <a:srgbClr val="FFFFFF"/>
+                </a:highlight>
+                <a:latin typeface="Consolas"/>
+                <a:ea typeface="Calibri"/>
+                <a:cs typeface="Times New Roman"/>
+              </a:rPr>
+              <a:t>ms</a:t>
+            </a:r>
+            <a:r>
+              <a:rPr lang="en-US" sz="1400" dirty="0">
+                <a:solidFill>
+                  <a:srgbClr val="A31515"/>
+                </a:solidFill>
+                <a:highlight>
+                  <a:srgbClr val="FFFFFF"/>
+                </a:highlight>
+                <a:latin typeface="Consolas"/>
+                <a:ea typeface="Calibri"/>
+                <a:cs typeface="Times New Roman"/>
+              </a:rPr>
+              <a:t>"</a:t>
+            </a:r>
+            <a:r>
+              <a:rPr lang="en-US" sz="1400" dirty="0">
+                <a:solidFill>
+                  <a:srgbClr val="000000"/>
+                </a:solidFill>
+                <a:highlight>
+                  <a:srgbClr val="FFFFFF"/>
+                </a:highlight>
+                <a:latin typeface="Consolas"/>
+                <a:ea typeface="Calibri"/>
+                <a:cs typeface="Times New Roman"/>
+              </a:rPr>
+              <a:t>,</a:t>
+            </a:r>
+            <a:endParaRPr lang="en-US" sz="1400" dirty="0">
+              <a:ea typeface="Calibri"/>
+              <a:cs typeface="Times New Roman"/>
+            </a:endParaRPr>
+          </a:p>
+          <a:p>
+            <a:pPr>
+              <a:lnSpc>
+                <a:spcPct val="115000"/>
+              </a:lnSpc>
+              <a:spcAft>
+                <a:spcPts val="0"/>
+              </a:spcAft>
+            </a:pPr>
+            <a:r>
+              <a:rPr lang="en-US" sz="1400" dirty="0">
+                <a:solidFill>
+                  <a:srgbClr val="000000"/>
+                </a:solidFill>
+                <a:highlight>
+                  <a:srgbClr val="FFFFFF"/>
+                </a:highlight>
+                <a:latin typeface="Consolas"/>
+                <a:ea typeface="Calibri"/>
+                <a:cs typeface="Times New Roman"/>
+              </a:rPr>
+              <a:t>                  </a:t>
+            </a:r>
+            <a:r>
+              <a:rPr lang="en-US" sz="1400" dirty="0" err="1">
+                <a:solidFill>
+                  <a:srgbClr val="000000"/>
+                </a:solidFill>
+                <a:highlight>
+                  <a:srgbClr val="FFFFFF"/>
+                </a:highlight>
+                <a:latin typeface="Consolas"/>
+                <a:ea typeface="Calibri"/>
+                <a:cs typeface="Times New Roman"/>
+              </a:rPr>
+              <a:t>input.MethodBase.DeclaringType</a:t>
+            </a:r>
+            <a:r>
+              <a:rPr lang="en-US" sz="1400" dirty="0">
+                <a:solidFill>
+                  <a:srgbClr val="000000"/>
+                </a:solidFill>
+                <a:highlight>
+                  <a:srgbClr val="FFFFFF"/>
+                </a:highlight>
+                <a:latin typeface="Consolas"/>
+                <a:ea typeface="Calibri"/>
+                <a:cs typeface="Times New Roman"/>
+              </a:rPr>
+              <a:t>, </a:t>
+            </a:r>
+            <a:r>
+              <a:rPr lang="en-US" sz="1400" dirty="0" err="1">
+                <a:solidFill>
+                  <a:srgbClr val="000000"/>
+                </a:solidFill>
+                <a:highlight>
+                  <a:srgbClr val="FFFFFF"/>
+                </a:highlight>
+                <a:latin typeface="Consolas"/>
+                <a:ea typeface="Calibri"/>
+                <a:cs typeface="Times New Roman"/>
+              </a:rPr>
+              <a:t>input.MethodBase.Name</a:t>
+            </a:r>
+            <a:r>
+              <a:rPr lang="en-US" sz="1400" dirty="0">
+                <a:solidFill>
+                  <a:srgbClr val="000000"/>
+                </a:solidFill>
+                <a:highlight>
+                  <a:srgbClr val="FFFFFF"/>
+                </a:highlight>
+                <a:latin typeface="Consolas"/>
+                <a:ea typeface="Calibri"/>
+                <a:cs typeface="Times New Roman"/>
+              </a:rPr>
+              <a:t>, </a:t>
+            </a:r>
+            <a:r>
+              <a:rPr lang="en-US" sz="1400" dirty="0" err="1">
+                <a:solidFill>
+                  <a:srgbClr val="000000"/>
+                </a:solidFill>
+                <a:highlight>
+                  <a:srgbClr val="FFFFFF"/>
+                </a:highlight>
+                <a:latin typeface="Consolas"/>
+                <a:ea typeface="Calibri"/>
+                <a:cs typeface="Times New Roman"/>
+              </a:rPr>
+              <a:t>result.Exception.GetType</a:t>
+            </a:r>
+            <a:r>
+              <a:rPr lang="en-US" sz="1400" dirty="0">
+                <a:solidFill>
+                  <a:srgbClr val="000000"/>
+                </a:solidFill>
+                <a:highlight>
+                  <a:srgbClr val="FFFFFF"/>
+                </a:highlight>
+                <a:latin typeface="Consolas"/>
+                <a:ea typeface="Calibri"/>
+                <a:cs typeface="Times New Roman"/>
+              </a:rPr>
+              <a:t>(), </a:t>
+            </a:r>
+            <a:r>
+              <a:rPr lang="en-US" sz="1400" dirty="0" err="1">
+                <a:solidFill>
+                  <a:srgbClr val="000000"/>
+                </a:solidFill>
+                <a:highlight>
+                  <a:srgbClr val="FFFFFF"/>
+                </a:highlight>
+                <a:latin typeface="Consolas"/>
+                <a:ea typeface="Calibri"/>
+                <a:cs typeface="Times New Roman"/>
+              </a:rPr>
+              <a:t>stopwatch.ElapsedMilliseconds</a:t>
+            </a:r>
+            <a:r>
+              <a:rPr lang="en-US" sz="1400" dirty="0">
+                <a:solidFill>
+                  <a:srgbClr val="000000"/>
+                </a:solidFill>
+                <a:highlight>
+                  <a:srgbClr val="FFFFFF"/>
+                </a:highlight>
+                <a:latin typeface="Consolas"/>
+                <a:ea typeface="Calibri"/>
+                <a:cs typeface="Times New Roman"/>
+              </a:rPr>
+              <a:t>);</a:t>
+            </a:r>
+            <a:endParaRPr lang="en-US" sz="1400" dirty="0">
+              <a:ea typeface="Calibri"/>
+              <a:cs typeface="Times New Roman"/>
+            </a:endParaRPr>
+          </a:p>
+          <a:p>
+            <a:pPr>
+              <a:lnSpc>
+                <a:spcPct val="115000"/>
+              </a:lnSpc>
+              <a:spcAft>
+                <a:spcPts val="0"/>
+              </a:spcAft>
+            </a:pPr>
+            <a:r>
+              <a:rPr lang="en-US" sz="1400" dirty="0">
+                <a:solidFill>
+                  <a:srgbClr val="000000"/>
+                </a:solidFill>
+                <a:highlight>
+                  <a:srgbClr val="FFFFFF"/>
+                </a:highlight>
+                <a:latin typeface="Consolas"/>
+                <a:ea typeface="Calibri"/>
+                <a:cs typeface="Times New Roman"/>
+              </a:rPr>
+              <a:t>            }</a:t>
+            </a:r>
+            <a:endParaRPr lang="en-US" sz="1400" dirty="0">
+              <a:ea typeface="Calibri"/>
+              <a:cs typeface="Times New Roman"/>
+            </a:endParaRPr>
+          </a:p>
+          <a:p>
+            <a:pPr>
+              <a:lnSpc>
+                <a:spcPct val="115000"/>
+              </a:lnSpc>
+              <a:spcAft>
+                <a:spcPts val="0"/>
+              </a:spcAft>
+            </a:pPr>
+            <a:r>
+              <a:rPr lang="en-US" sz="1400" dirty="0">
+                <a:solidFill>
+                  <a:srgbClr val="000000"/>
+                </a:solidFill>
+                <a:highlight>
+                  <a:srgbClr val="FFFFFF"/>
+                </a:highlight>
+                <a:latin typeface="Consolas"/>
+                <a:ea typeface="Calibri"/>
+                <a:cs typeface="Times New Roman"/>
+              </a:rPr>
+              <a:t>            </a:t>
+            </a:r>
+            <a:r>
+              <a:rPr lang="en-US" sz="1400" dirty="0">
+                <a:solidFill>
+                  <a:srgbClr val="0000FF"/>
+                </a:solidFill>
+                <a:highlight>
+                  <a:srgbClr val="FFFFFF"/>
+                </a:highlight>
+                <a:latin typeface="Consolas"/>
+                <a:ea typeface="Calibri"/>
+                <a:cs typeface="Times New Roman"/>
+              </a:rPr>
+              <a:t>else</a:t>
+            </a:r>
+            <a:endParaRPr lang="en-US" sz="1400" dirty="0">
+              <a:ea typeface="Calibri"/>
+              <a:cs typeface="Times New Roman"/>
+            </a:endParaRPr>
+          </a:p>
+          <a:p>
+            <a:pPr>
+              <a:lnSpc>
+                <a:spcPct val="115000"/>
+              </a:lnSpc>
+              <a:spcAft>
+                <a:spcPts val="0"/>
+              </a:spcAft>
+            </a:pPr>
+            <a:r>
+              <a:rPr lang="en-US" sz="1400" dirty="0">
+                <a:solidFill>
+                  <a:srgbClr val="000000"/>
+                </a:solidFill>
+                <a:highlight>
+                  <a:srgbClr val="FFFFFF"/>
+                </a:highlight>
+                <a:latin typeface="Consolas"/>
+                <a:ea typeface="Calibri"/>
+                <a:cs typeface="Times New Roman"/>
+              </a:rPr>
+              <a:t>            {</a:t>
+            </a:r>
+            <a:endParaRPr lang="en-US" sz="1400" dirty="0">
+              <a:ea typeface="Calibri"/>
+              <a:cs typeface="Times New Roman"/>
+            </a:endParaRPr>
+          </a:p>
+          <a:p>
+            <a:pPr>
+              <a:lnSpc>
+                <a:spcPct val="115000"/>
+              </a:lnSpc>
+              <a:spcAft>
+                <a:spcPts val="0"/>
+              </a:spcAft>
+            </a:pPr>
+            <a:r>
+              <a:rPr lang="en-US" sz="1400" dirty="0">
+                <a:solidFill>
+                  <a:srgbClr val="000000"/>
+                </a:solidFill>
+                <a:highlight>
+                  <a:srgbClr val="FFFFFF"/>
+                </a:highlight>
+                <a:latin typeface="Consolas"/>
+                <a:ea typeface="Calibri"/>
+                <a:cs typeface="Times New Roman"/>
+              </a:rPr>
+              <a:t>                </a:t>
+            </a:r>
+            <a:r>
+              <a:rPr lang="en-US" sz="1400" dirty="0" err="1">
+                <a:solidFill>
+                  <a:srgbClr val="2B91AF"/>
+                </a:solidFill>
+                <a:highlight>
+                  <a:srgbClr val="FFFFFF"/>
+                </a:highlight>
+                <a:latin typeface="Consolas"/>
+                <a:ea typeface="Calibri"/>
+                <a:cs typeface="Times New Roman"/>
+              </a:rPr>
+              <a:t>Debug</a:t>
+            </a:r>
+            <a:r>
+              <a:rPr lang="en-US" sz="1400" dirty="0" err="1">
+                <a:solidFill>
+                  <a:srgbClr val="000000"/>
+                </a:solidFill>
+                <a:highlight>
+                  <a:srgbClr val="FFFFFF"/>
+                </a:highlight>
+                <a:latin typeface="Consolas"/>
+                <a:ea typeface="Calibri"/>
+                <a:cs typeface="Times New Roman"/>
+              </a:rPr>
+              <a:t>.WriteLine</a:t>
+            </a:r>
+            <a:r>
+              <a:rPr lang="en-US" sz="1400" dirty="0">
+                <a:solidFill>
+                  <a:srgbClr val="000000"/>
+                </a:solidFill>
+                <a:highlight>
+                  <a:srgbClr val="FFFFFF"/>
+                </a:highlight>
+                <a:latin typeface="Consolas"/>
+                <a:ea typeface="Calibri"/>
+                <a:cs typeface="Times New Roman"/>
+              </a:rPr>
+              <a:t>(</a:t>
+            </a:r>
+            <a:r>
+              <a:rPr lang="en-US" sz="1400" dirty="0">
+                <a:solidFill>
+                  <a:srgbClr val="A31515"/>
+                </a:solidFill>
+                <a:highlight>
+                  <a:srgbClr val="FFFFFF"/>
+                </a:highlight>
+                <a:latin typeface="Consolas"/>
+                <a:ea typeface="Calibri"/>
+                <a:cs typeface="Times New Roman"/>
+              </a:rPr>
+              <a:t>"&lt; </a:t>
+            </a:r>
+            <a:r>
+              <a:rPr lang="en-US" sz="1400" dirty="0">
+                <a:solidFill>
+                  <a:srgbClr val="3CB371"/>
+                </a:solidFill>
+                <a:highlight>
+                  <a:srgbClr val="FFFFFF"/>
+                </a:highlight>
+                <a:latin typeface="Consolas"/>
+                <a:ea typeface="Calibri"/>
+                <a:cs typeface="Times New Roman"/>
+              </a:rPr>
+              <a:t>{0}</a:t>
+            </a:r>
+            <a:r>
+              <a:rPr lang="en-US" sz="1400" dirty="0">
+                <a:solidFill>
+                  <a:srgbClr val="A31515"/>
+                </a:solidFill>
+                <a:highlight>
+                  <a:srgbClr val="FFFFFF"/>
+                </a:highlight>
+                <a:latin typeface="Consolas"/>
+                <a:ea typeface="Calibri"/>
+                <a:cs typeface="Times New Roman"/>
+              </a:rPr>
+              <a:t>.</a:t>
+            </a:r>
+            <a:r>
+              <a:rPr lang="en-US" sz="1400" dirty="0">
+                <a:solidFill>
+                  <a:srgbClr val="3CB371"/>
+                </a:solidFill>
+                <a:highlight>
+                  <a:srgbClr val="FFFFFF"/>
+                </a:highlight>
+                <a:latin typeface="Consolas"/>
+                <a:ea typeface="Calibri"/>
+                <a:cs typeface="Times New Roman"/>
+              </a:rPr>
+              <a:t>{1}</a:t>
+            </a:r>
+            <a:r>
+              <a:rPr lang="en-US" sz="1400" dirty="0">
+                <a:solidFill>
+                  <a:srgbClr val="A31515"/>
+                </a:solidFill>
+                <a:highlight>
+                  <a:srgbClr val="FFFFFF"/>
+                </a:highlight>
+                <a:latin typeface="Consolas"/>
+                <a:ea typeface="Calibri"/>
+                <a:cs typeface="Times New Roman"/>
+              </a:rPr>
+              <a:t> - after </a:t>
+            </a:r>
+            <a:r>
+              <a:rPr lang="en-US" sz="1400" dirty="0">
+                <a:solidFill>
+                  <a:srgbClr val="3CB371"/>
+                </a:solidFill>
+                <a:highlight>
+                  <a:srgbClr val="FFFFFF"/>
+                </a:highlight>
+                <a:latin typeface="Consolas"/>
+                <a:ea typeface="Calibri"/>
+                <a:cs typeface="Times New Roman"/>
+              </a:rPr>
+              <a:t>{2}</a:t>
+            </a:r>
+            <a:r>
+              <a:rPr lang="en-US" sz="1400" dirty="0">
+                <a:solidFill>
+                  <a:srgbClr val="A31515"/>
+                </a:solidFill>
+                <a:highlight>
+                  <a:srgbClr val="FFFFFF"/>
+                </a:highlight>
+                <a:latin typeface="Consolas"/>
+                <a:ea typeface="Calibri"/>
+                <a:cs typeface="Times New Roman"/>
+              </a:rPr>
+              <a:t> </a:t>
+            </a:r>
+            <a:r>
+              <a:rPr lang="en-US" sz="1400" dirty="0" err="1">
+                <a:solidFill>
+                  <a:srgbClr val="A31515"/>
+                </a:solidFill>
+                <a:highlight>
+                  <a:srgbClr val="FFFFFF"/>
+                </a:highlight>
+                <a:latin typeface="Consolas"/>
+                <a:ea typeface="Calibri"/>
+                <a:cs typeface="Times New Roman"/>
+              </a:rPr>
+              <a:t>ms</a:t>
+            </a:r>
+            <a:r>
+              <a:rPr lang="en-US" sz="1400" dirty="0">
+                <a:solidFill>
+                  <a:srgbClr val="A31515"/>
+                </a:solidFill>
+                <a:highlight>
+                  <a:srgbClr val="FFFFFF"/>
+                </a:highlight>
+                <a:latin typeface="Consolas"/>
+                <a:ea typeface="Calibri"/>
+                <a:cs typeface="Times New Roman"/>
+              </a:rPr>
+              <a:t>"</a:t>
+            </a:r>
+            <a:r>
+              <a:rPr lang="en-US" sz="1400" dirty="0">
+                <a:solidFill>
+                  <a:srgbClr val="000000"/>
+                </a:solidFill>
+                <a:highlight>
+                  <a:srgbClr val="FFFFFF"/>
+                </a:highlight>
+                <a:latin typeface="Consolas"/>
+                <a:ea typeface="Calibri"/>
+                <a:cs typeface="Times New Roman"/>
+              </a:rPr>
+              <a:t>,</a:t>
+            </a:r>
+            <a:endParaRPr lang="en-US" sz="1400" dirty="0">
+              <a:ea typeface="Calibri"/>
+              <a:cs typeface="Times New Roman"/>
+            </a:endParaRPr>
+          </a:p>
+          <a:p>
+            <a:pPr>
+              <a:lnSpc>
+                <a:spcPct val="115000"/>
+              </a:lnSpc>
+              <a:spcAft>
+                <a:spcPts val="0"/>
+              </a:spcAft>
+            </a:pPr>
+            <a:r>
+              <a:rPr lang="en-US" sz="1400" dirty="0">
+                <a:solidFill>
+                  <a:srgbClr val="000000"/>
+                </a:solidFill>
+                <a:highlight>
+                  <a:srgbClr val="FFFFFF"/>
+                </a:highlight>
+                <a:latin typeface="Consolas"/>
+                <a:ea typeface="Calibri"/>
+                <a:cs typeface="Times New Roman"/>
+              </a:rPr>
+              <a:t>                  </a:t>
+            </a:r>
+            <a:r>
+              <a:rPr lang="en-US" sz="1400" dirty="0" err="1">
+                <a:solidFill>
+                  <a:srgbClr val="000000"/>
+                </a:solidFill>
+                <a:highlight>
+                  <a:srgbClr val="FFFFFF"/>
+                </a:highlight>
+                <a:latin typeface="Consolas"/>
+                <a:ea typeface="Calibri"/>
+                <a:cs typeface="Times New Roman"/>
+              </a:rPr>
+              <a:t>input.MethodBase.DeclaringType</a:t>
+            </a:r>
+            <a:r>
+              <a:rPr lang="en-US" sz="1400" dirty="0">
+                <a:solidFill>
+                  <a:srgbClr val="000000"/>
+                </a:solidFill>
+                <a:highlight>
+                  <a:srgbClr val="FFFFFF"/>
+                </a:highlight>
+                <a:latin typeface="Consolas"/>
+                <a:ea typeface="Calibri"/>
+                <a:cs typeface="Times New Roman"/>
+              </a:rPr>
+              <a:t>, </a:t>
+            </a:r>
+            <a:r>
+              <a:rPr lang="en-US" sz="1400" dirty="0" err="1">
+                <a:solidFill>
+                  <a:srgbClr val="000000"/>
+                </a:solidFill>
+                <a:highlight>
+                  <a:srgbClr val="FFFFFF"/>
+                </a:highlight>
+                <a:latin typeface="Consolas"/>
+                <a:ea typeface="Calibri"/>
+                <a:cs typeface="Times New Roman"/>
+              </a:rPr>
+              <a:t>input.MethodBase.Name</a:t>
+            </a:r>
+            <a:r>
+              <a:rPr lang="en-US" sz="1400" dirty="0">
+                <a:solidFill>
+                  <a:srgbClr val="000000"/>
+                </a:solidFill>
+                <a:highlight>
+                  <a:srgbClr val="FFFFFF"/>
+                </a:highlight>
+                <a:latin typeface="Consolas"/>
+                <a:ea typeface="Calibri"/>
+                <a:cs typeface="Times New Roman"/>
+              </a:rPr>
+              <a:t>,</a:t>
+            </a:r>
+            <a:endParaRPr lang="en-US" sz="1400" dirty="0">
+              <a:ea typeface="Calibri"/>
+              <a:cs typeface="Times New Roman"/>
+            </a:endParaRPr>
+          </a:p>
+          <a:p>
+            <a:pPr>
+              <a:lnSpc>
+                <a:spcPct val="115000"/>
+              </a:lnSpc>
+              <a:spcAft>
+                <a:spcPts val="0"/>
+              </a:spcAft>
+            </a:pPr>
+            <a:r>
+              <a:rPr lang="en-US" sz="1400" dirty="0">
+                <a:solidFill>
+                  <a:srgbClr val="000000"/>
+                </a:solidFill>
+                <a:highlight>
+                  <a:srgbClr val="FFFFFF"/>
+                </a:highlight>
+                <a:latin typeface="Consolas"/>
+                <a:ea typeface="Calibri"/>
+                <a:cs typeface="Times New Roman"/>
+              </a:rPr>
+              <a:t>                  </a:t>
+            </a:r>
+            <a:r>
+              <a:rPr lang="en-US" sz="1400" dirty="0" err="1">
+                <a:solidFill>
+                  <a:srgbClr val="000000"/>
+                </a:solidFill>
+                <a:highlight>
+                  <a:srgbClr val="FFFFFF"/>
+                </a:highlight>
+                <a:latin typeface="Consolas"/>
+                <a:ea typeface="Calibri"/>
+                <a:cs typeface="Times New Roman"/>
+              </a:rPr>
+              <a:t>stopwatch.ElapsedMilliseconds</a:t>
+            </a:r>
+            <a:r>
+              <a:rPr lang="en-US" sz="1400" dirty="0">
+                <a:solidFill>
+                  <a:srgbClr val="000000"/>
+                </a:solidFill>
+                <a:highlight>
+                  <a:srgbClr val="FFFFFF"/>
+                </a:highlight>
+                <a:latin typeface="Consolas"/>
+                <a:ea typeface="Calibri"/>
+                <a:cs typeface="Times New Roman"/>
+              </a:rPr>
+              <a:t>);</a:t>
+            </a:r>
+            <a:endParaRPr lang="en-US" sz="1400" dirty="0">
+              <a:ea typeface="Calibri"/>
+              <a:cs typeface="Times New Roman"/>
+            </a:endParaRPr>
+          </a:p>
+          <a:p>
+            <a:pPr>
+              <a:lnSpc>
+                <a:spcPct val="115000"/>
+              </a:lnSpc>
+              <a:spcAft>
+                <a:spcPts val="0"/>
+              </a:spcAft>
+            </a:pPr>
+            <a:r>
+              <a:rPr lang="en-US" sz="1400" dirty="0">
+                <a:solidFill>
+                  <a:srgbClr val="000000"/>
+                </a:solidFill>
+                <a:highlight>
+                  <a:srgbClr val="FFFFFF"/>
+                </a:highlight>
+                <a:latin typeface="Consolas"/>
+                <a:ea typeface="Calibri"/>
+                <a:cs typeface="Times New Roman"/>
+              </a:rPr>
+              <a:t>            }</a:t>
+            </a:r>
+            <a:endParaRPr lang="en-US" sz="1400" dirty="0">
+              <a:ea typeface="Calibri"/>
+              <a:cs typeface="Times New Roman"/>
+            </a:endParaRPr>
+          </a:p>
+          <a:p>
+            <a:pPr>
+              <a:lnSpc>
+                <a:spcPct val="115000"/>
+              </a:lnSpc>
+              <a:spcAft>
+                <a:spcPts val="0"/>
+              </a:spcAft>
+            </a:pPr>
+            <a:r>
+              <a:rPr lang="en-US" sz="1400" dirty="0">
+                <a:solidFill>
+                  <a:srgbClr val="000000"/>
+                </a:solidFill>
+                <a:highlight>
+                  <a:srgbClr val="FFFFFF"/>
+                </a:highlight>
+                <a:latin typeface="Consolas"/>
+                <a:ea typeface="Calibri"/>
+                <a:cs typeface="Times New Roman"/>
+              </a:rPr>
+              <a:t> </a:t>
+            </a:r>
+            <a:endParaRPr lang="en-US" sz="1400" dirty="0">
+              <a:ea typeface="Calibri"/>
+              <a:cs typeface="Times New Roman"/>
+            </a:endParaRPr>
+          </a:p>
+          <a:p>
+            <a:pPr>
+              <a:lnSpc>
+                <a:spcPct val="115000"/>
+              </a:lnSpc>
+              <a:spcAft>
+                <a:spcPts val="0"/>
+              </a:spcAft>
+            </a:pPr>
+            <a:r>
+              <a:rPr lang="en-US" sz="1400" dirty="0">
+                <a:solidFill>
+                  <a:srgbClr val="000000"/>
+                </a:solidFill>
+                <a:highlight>
+                  <a:srgbClr val="FFFFFF"/>
+                </a:highlight>
+                <a:latin typeface="Consolas"/>
+                <a:ea typeface="Calibri"/>
+                <a:cs typeface="Times New Roman"/>
+              </a:rPr>
+              <a:t>            </a:t>
+            </a:r>
+            <a:r>
+              <a:rPr lang="en-US" sz="1400" dirty="0">
+                <a:solidFill>
+                  <a:srgbClr val="0000FF"/>
+                </a:solidFill>
+                <a:highlight>
+                  <a:srgbClr val="FFFFFF"/>
+                </a:highlight>
+                <a:latin typeface="Consolas"/>
+                <a:ea typeface="Calibri"/>
+                <a:cs typeface="Times New Roman"/>
+              </a:rPr>
+              <a:t>return</a:t>
+            </a:r>
+            <a:r>
+              <a:rPr lang="en-US" sz="1400" dirty="0">
+                <a:solidFill>
+                  <a:srgbClr val="000000"/>
+                </a:solidFill>
+                <a:highlight>
+                  <a:srgbClr val="FFFFFF"/>
+                </a:highlight>
+                <a:latin typeface="Consolas"/>
+                <a:ea typeface="Calibri"/>
+                <a:cs typeface="Times New Roman"/>
+              </a:rPr>
+              <a:t> result;</a:t>
+            </a:r>
+            <a:endParaRPr lang="en-US" sz="1400" dirty="0">
+              <a:ea typeface="Calibri"/>
+              <a:cs typeface="Times New Roman"/>
+            </a:endParaRPr>
+          </a:p>
+          <a:p>
+            <a:pPr>
+              <a:lnSpc>
+                <a:spcPct val="115000"/>
+              </a:lnSpc>
+              <a:spcAft>
+                <a:spcPts val="1000"/>
+              </a:spcAft>
+            </a:pPr>
+            <a:r>
+              <a:rPr lang="en-US" sz="1400" dirty="0">
+                <a:solidFill>
+                  <a:srgbClr val="000000"/>
+                </a:solidFill>
+                <a:highlight>
+                  <a:srgbClr val="FFFFFF"/>
+                </a:highlight>
+                <a:latin typeface="Consolas"/>
+                <a:ea typeface="Calibri"/>
+                <a:cs typeface="Times New Roman"/>
+              </a:rPr>
+              <a:t>        }</a:t>
+            </a:r>
+            <a:endParaRPr lang="en-US" sz="1400" dirty="0">
+              <a:ea typeface="Calibri"/>
+              <a:cs typeface="Times New Roman"/>
+            </a:endParaRPr>
+          </a:p>
+        </p:txBody>
+      </p:sp>
+      <p:grpSp>
+        <p:nvGrpSpPr>
+          <p:cNvPr id="5" name="Group 4"/>
+          <p:cNvGrpSpPr/>
+          <p:nvPr/>
+        </p:nvGrpSpPr>
+        <p:grpSpPr>
+          <a:xfrm>
+            <a:off x="2123728" y="2420888"/>
+            <a:ext cx="6515938" cy="504056"/>
+            <a:chOff x="3707904" y="5157192"/>
+            <a:chExt cx="6515938" cy="504056"/>
+          </a:xfrm>
+        </p:grpSpPr>
+        <p:sp>
+          <p:nvSpPr>
+            <p:cNvPr id="6" name="Rounded Rectangle 5"/>
+            <p:cNvSpPr/>
+            <p:nvPr/>
+          </p:nvSpPr>
+          <p:spPr>
+            <a:xfrm>
+              <a:off x="3707904" y="5157192"/>
+              <a:ext cx="3456384" cy="504056"/>
+            </a:xfrm>
+            <a:prstGeom prst="roundRect">
+              <a:avLst/>
+            </a:prstGeom>
+            <a:noFill/>
+            <a:ln>
+              <a:solidFill>
+                <a:srgbClr val="FF0000"/>
+              </a:solidFill>
+            </a:ln>
+          </p:spPr>
+          <p:style>
+            <a:lnRef idx="2">
+              <a:schemeClr val="accent1">
+                <a:shade val="50000"/>
+              </a:schemeClr>
+            </a:lnRef>
+            <a:fillRef idx="1">
+              <a:schemeClr val="accent1"/>
+            </a:fillRef>
+            <a:effectRef idx="0">
+              <a:schemeClr val="accent1"/>
+            </a:effectRef>
+            <a:fontRef idx="minor">
+              <a:schemeClr val="lt1"/>
+            </a:fontRef>
+          </p:style>
+          <p:txBody>
+            <a:bodyPr rtlCol="0" anchor="ctr"/>
+            <a:lstStyle/>
+            <a:p>
+              <a:pPr algn="ctr"/>
+              <a:endParaRPr lang="en-US"/>
+            </a:p>
+          </p:txBody>
+        </p:sp>
+        <p:sp>
+          <p:nvSpPr>
+            <p:cNvPr id="7" name="TextBox 6"/>
+            <p:cNvSpPr txBox="1"/>
+            <p:nvPr/>
+          </p:nvSpPr>
+          <p:spPr>
+            <a:xfrm>
+              <a:off x="7292719" y="5229200"/>
+              <a:ext cx="2931123" cy="400110"/>
+            </a:xfrm>
+            <a:prstGeom prst="rect">
+              <a:avLst/>
+            </a:prstGeom>
+            <a:noFill/>
+          </p:spPr>
+          <p:txBody>
+            <a:bodyPr wrap="none" rtlCol="0">
+              <a:spAutoFit/>
+            </a:bodyPr>
+            <a:lstStyle/>
+            <a:p>
+              <a:r>
+                <a:rPr lang="en-US" sz="2000" b="1" dirty="0" smtClean="0">
+                  <a:solidFill>
+                    <a:srgbClr val="FF0000"/>
+                  </a:solidFill>
+                </a:rPr>
+                <a:t>Call to decorated instance</a:t>
+              </a:r>
+              <a:endParaRPr lang="en-US" sz="2000" b="1" dirty="0">
+                <a:solidFill>
+                  <a:srgbClr val="FF0000"/>
+                </a:solidFill>
+              </a:endParaRPr>
+            </a:p>
+          </p:txBody>
+        </p:sp>
+      </p:grpSp>
+      <p:sp>
+        <p:nvSpPr>
+          <p:cNvPr id="8" name="TextBox 7"/>
+          <p:cNvSpPr txBox="1"/>
+          <p:nvPr/>
+        </p:nvSpPr>
+        <p:spPr>
+          <a:xfrm>
+            <a:off x="359532" y="2132856"/>
+            <a:ext cx="9649071" cy="4056495"/>
+          </a:xfrm>
+          <a:prstGeom prst="rect">
+            <a:avLst/>
+          </a:prstGeom>
+          <a:solidFill>
+            <a:schemeClr val="bg1"/>
+          </a:solidFill>
+          <a:ln>
+            <a:solidFill>
+              <a:schemeClr val="accent1"/>
+            </a:solidFill>
+          </a:ln>
+        </p:spPr>
+        <p:txBody>
+          <a:bodyPr wrap="square" rtlCol="0">
+            <a:spAutoFit/>
+          </a:bodyPr>
+          <a:lstStyle/>
+          <a:p>
+            <a:pPr>
+              <a:lnSpc>
+                <a:spcPct val="115000"/>
+              </a:lnSpc>
+              <a:spcAft>
+                <a:spcPts val="0"/>
+              </a:spcAft>
+            </a:pPr>
+            <a:r>
+              <a:rPr lang="en-US" sz="1400" dirty="0">
+                <a:solidFill>
+                  <a:srgbClr val="000000"/>
+                </a:solidFill>
+                <a:highlight>
+                  <a:srgbClr val="FFFFFF"/>
+                </a:highlight>
+                <a:latin typeface="Consolas"/>
+                <a:ea typeface="Calibri"/>
+                <a:cs typeface="Times New Roman"/>
+              </a:rPr>
+              <a:t> </a:t>
+            </a:r>
+            <a:r>
+              <a:rPr lang="en-US" sz="1400" dirty="0">
+                <a:solidFill>
+                  <a:srgbClr val="0000FF"/>
+                </a:solidFill>
+                <a:highlight>
+                  <a:srgbClr val="FFFFFF"/>
+                </a:highlight>
+                <a:latin typeface="Consolas"/>
+                <a:ea typeface="Calibri"/>
+                <a:cs typeface="Times New Roman"/>
+              </a:rPr>
+              <a:t>public</a:t>
+            </a:r>
+            <a:r>
+              <a:rPr lang="en-US" sz="1400" dirty="0">
+                <a:solidFill>
+                  <a:srgbClr val="000000"/>
+                </a:solidFill>
+                <a:highlight>
+                  <a:srgbClr val="FFFFFF"/>
+                </a:highlight>
+                <a:latin typeface="Consolas"/>
+                <a:ea typeface="Calibri"/>
+                <a:cs typeface="Times New Roman"/>
+              </a:rPr>
+              <a:t> </a:t>
+            </a:r>
+            <a:r>
+              <a:rPr lang="en-US" sz="1400" dirty="0">
+                <a:solidFill>
+                  <a:srgbClr val="0000FF"/>
+                </a:solidFill>
+                <a:highlight>
+                  <a:srgbClr val="FFFFFF"/>
+                </a:highlight>
+                <a:latin typeface="Consolas"/>
+                <a:ea typeface="Calibri"/>
+                <a:cs typeface="Times New Roman"/>
+              </a:rPr>
+              <a:t>class</a:t>
+            </a:r>
+            <a:r>
+              <a:rPr lang="en-US" sz="1400" dirty="0">
+                <a:solidFill>
+                  <a:srgbClr val="000000"/>
+                </a:solidFill>
+                <a:highlight>
+                  <a:srgbClr val="FFFFFF"/>
+                </a:highlight>
+                <a:latin typeface="Consolas"/>
+                <a:ea typeface="Calibri"/>
+                <a:cs typeface="Times New Roman"/>
+              </a:rPr>
+              <a:t> </a:t>
+            </a:r>
+            <a:r>
+              <a:rPr lang="en-US" sz="1400" dirty="0" err="1">
+                <a:solidFill>
+                  <a:srgbClr val="2B91AF"/>
+                </a:solidFill>
+                <a:highlight>
+                  <a:srgbClr val="FFFFFF"/>
+                </a:highlight>
+                <a:latin typeface="Consolas"/>
+                <a:ea typeface="Calibri"/>
+                <a:cs typeface="Times New Roman"/>
+              </a:rPr>
+              <a:t>DependencyConfig</a:t>
+            </a:r>
+            <a:endParaRPr lang="en-US" sz="1400" dirty="0">
+              <a:ea typeface="Calibri"/>
+              <a:cs typeface="Times New Roman"/>
+            </a:endParaRPr>
+          </a:p>
+          <a:p>
+            <a:pPr>
+              <a:lnSpc>
+                <a:spcPct val="115000"/>
+              </a:lnSpc>
+              <a:spcAft>
+                <a:spcPts val="0"/>
+              </a:spcAft>
+            </a:pPr>
+            <a:r>
+              <a:rPr lang="en-US" sz="1400" dirty="0">
+                <a:solidFill>
+                  <a:srgbClr val="000000"/>
+                </a:solidFill>
+                <a:highlight>
+                  <a:srgbClr val="FFFFFF"/>
+                </a:highlight>
+                <a:latin typeface="Consolas"/>
+                <a:ea typeface="Calibri"/>
+                <a:cs typeface="Times New Roman"/>
+              </a:rPr>
+              <a:t>    {</a:t>
+            </a:r>
+            <a:endParaRPr lang="en-US" sz="1400" dirty="0">
+              <a:ea typeface="Calibri"/>
+              <a:cs typeface="Times New Roman"/>
+            </a:endParaRPr>
+          </a:p>
+          <a:p>
+            <a:pPr>
+              <a:lnSpc>
+                <a:spcPct val="115000"/>
+              </a:lnSpc>
+              <a:spcAft>
+                <a:spcPts val="0"/>
+              </a:spcAft>
+            </a:pPr>
+            <a:r>
+              <a:rPr lang="en-US" sz="1400" dirty="0">
+                <a:solidFill>
+                  <a:srgbClr val="000000"/>
+                </a:solidFill>
+                <a:highlight>
+                  <a:srgbClr val="FFFFFF"/>
+                </a:highlight>
+                <a:latin typeface="Consolas"/>
+                <a:ea typeface="Calibri"/>
+                <a:cs typeface="Times New Roman"/>
+              </a:rPr>
+              <a:t>        </a:t>
+            </a:r>
+            <a:r>
+              <a:rPr lang="en-US" sz="1400" dirty="0">
+                <a:solidFill>
+                  <a:srgbClr val="0000FF"/>
+                </a:solidFill>
+                <a:highlight>
+                  <a:srgbClr val="FFFFFF"/>
+                </a:highlight>
+                <a:latin typeface="Consolas"/>
+                <a:ea typeface="Calibri"/>
+                <a:cs typeface="Times New Roman"/>
+              </a:rPr>
+              <a:t>public</a:t>
+            </a:r>
+            <a:r>
+              <a:rPr lang="en-US" sz="1400" dirty="0">
+                <a:solidFill>
+                  <a:srgbClr val="000000"/>
+                </a:solidFill>
+                <a:highlight>
+                  <a:srgbClr val="FFFFFF"/>
+                </a:highlight>
+                <a:latin typeface="Consolas"/>
+                <a:ea typeface="Calibri"/>
+                <a:cs typeface="Times New Roman"/>
+              </a:rPr>
+              <a:t> </a:t>
+            </a:r>
+            <a:r>
+              <a:rPr lang="en-US" sz="1400" dirty="0">
+                <a:solidFill>
+                  <a:srgbClr val="0000FF"/>
+                </a:solidFill>
+                <a:highlight>
+                  <a:srgbClr val="FFFFFF"/>
+                </a:highlight>
+                <a:latin typeface="Consolas"/>
+                <a:ea typeface="Calibri"/>
+                <a:cs typeface="Times New Roman"/>
+              </a:rPr>
+              <a:t>static</a:t>
+            </a:r>
+            <a:r>
+              <a:rPr lang="en-US" sz="1400" dirty="0">
+                <a:solidFill>
+                  <a:srgbClr val="000000"/>
+                </a:solidFill>
+                <a:highlight>
+                  <a:srgbClr val="FFFFFF"/>
+                </a:highlight>
+                <a:latin typeface="Consolas"/>
+                <a:ea typeface="Calibri"/>
+                <a:cs typeface="Times New Roman"/>
+              </a:rPr>
+              <a:t> </a:t>
+            </a:r>
+            <a:r>
+              <a:rPr lang="en-US" sz="1400" dirty="0">
+                <a:solidFill>
+                  <a:srgbClr val="0000FF"/>
+                </a:solidFill>
+                <a:highlight>
+                  <a:srgbClr val="FFFFFF"/>
+                </a:highlight>
+                <a:latin typeface="Consolas"/>
+                <a:ea typeface="Calibri"/>
+                <a:cs typeface="Times New Roman"/>
+              </a:rPr>
+              <a:t>void</a:t>
+            </a:r>
+            <a:r>
+              <a:rPr lang="en-US" sz="1400" dirty="0">
+                <a:solidFill>
+                  <a:srgbClr val="000000"/>
+                </a:solidFill>
+                <a:highlight>
+                  <a:srgbClr val="FFFFFF"/>
+                </a:highlight>
+                <a:latin typeface="Consolas"/>
+                <a:ea typeface="Calibri"/>
+                <a:cs typeface="Times New Roman"/>
+              </a:rPr>
+              <a:t> Configure(</a:t>
+            </a:r>
+            <a:r>
+              <a:rPr lang="en-US" sz="1400" dirty="0" err="1">
+                <a:solidFill>
+                  <a:srgbClr val="2B91AF"/>
+                </a:solidFill>
+                <a:highlight>
+                  <a:srgbClr val="FFFFFF"/>
+                </a:highlight>
+                <a:latin typeface="Consolas"/>
+                <a:ea typeface="Calibri"/>
+                <a:cs typeface="Times New Roman"/>
+              </a:rPr>
+              <a:t>IUnityContainer</a:t>
+            </a:r>
+            <a:r>
+              <a:rPr lang="en-US" sz="1400" dirty="0">
+                <a:solidFill>
+                  <a:srgbClr val="000000"/>
+                </a:solidFill>
+                <a:highlight>
+                  <a:srgbClr val="FFFFFF"/>
+                </a:highlight>
+                <a:latin typeface="Consolas"/>
+                <a:ea typeface="Calibri"/>
+                <a:cs typeface="Times New Roman"/>
+              </a:rPr>
+              <a:t> container)</a:t>
+            </a:r>
+            <a:endParaRPr lang="en-US" sz="1400" dirty="0">
+              <a:ea typeface="Calibri"/>
+              <a:cs typeface="Times New Roman"/>
+            </a:endParaRPr>
+          </a:p>
+          <a:p>
+            <a:pPr>
+              <a:lnSpc>
+                <a:spcPct val="115000"/>
+              </a:lnSpc>
+              <a:spcAft>
+                <a:spcPts val="0"/>
+              </a:spcAft>
+            </a:pPr>
+            <a:r>
+              <a:rPr lang="en-US" sz="1400" dirty="0">
+                <a:solidFill>
+                  <a:srgbClr val="000000"/>
+                </a:solidFill>
+                <a:highlight>
+                  <a:srgbClr val="FFFFFF"/>
+                </a:highlight>
+                <a:latin typeface="Consolas"/>
+                <a:ea typeface="Calibri"/>
+                <a:cs typeface="Times New Roman"/>
+              </a:rPr>
+              <a:t>        {</a:t>
+            </a:r>
+            <a:endParaRPr lang="en-US" sz="1400" dirty="0">
+              <a:ea typeface="Calibri"/>
+              <a:cs typeface="Times New Roman"/>
+            </a:endParaRPr>
+          </a:p>
+          <a:p>
+            <a:pPr>
+              <a:lnSpc>
+                <a:spcPct val="115000"/>
+              </a:lnSpc>
+              <a:spcAft>
+                <a:spcPts val="0"/>
+              </a:spcAft>
+            </a:pPr>
+            <a:r>
+              <a:rPr lang="en-US" sz="1400" dirty="0">
+                <a:solidFill>
+                  <a:srgbClr val="000000"/>
+                </a:solidFill>
+                <a:highlight>
+                  <a:srgbClr val="FFFFFF"/>
+                </a:highlight>
+                <a:latin typeface="Consolas"/>
+                <a:ea typeface="Calibri"/>
+                <a:cs typeface="Times New Roman"/>
+              </a:rPr>
+              <a:t>            </a:t>
+            </a:r>
+            <a:r>
+              <a:rPr lang="en-US" sz="1400" dirty="0" err="1">
+                <a:solidFill>
+                  <a:srgbClr val="000000"/>
+                </a:solidFill>
+                <a:highlight>
+                  <a:srgbClr val="FFFFFF"/>
+                </a:highlight>
+                <a:latin typeface="Consolas"/>
+                <a:ea typeface="Calibri"/>
+                <a:cs typeface="Times New Roman"/>
+              </a:rPr>
+              <a:t>container.AddNewExtension</a:t>
+            </a:r>
+            <a:r>
+              <a:rPr lang="en-US" sz="1400" dirty="0">
+                <a:solidFill>
+                  <a:srgbClr val="000000"/>
+                </a:solidFill>
+                <a:highlight>
+                  <a:srgbClr val="FFFFFF"/>
+                </a:highlight>
+                <a:latin typeface="Consolas"/>
+                <a:ea typeface="Calibri"/>
+                <a:cs typeface="Times New Roman"/>
+              </a:rPr>
+              <a:t>&lt;</a:t>
+            </a:r>
+            <a:r>
+              <a:rPr lang="en-US" sz="1400" dirty="0">
+                <a:solidFill>
+                  <a:srgbClr val="2B91AF"/>
+                </a:solidFill>
+                <a:highlight>
+                  <a:srgbClr val="FFFFFF"/>
+                </a:highlight>
+                <a:latin typeface="Consolas"/>
+                <a:ea typeface="Calibri"/>
+                <a:cs typeface="Times New Roman"/>
+              </a:rPr>
+              <a:t>Interception</a:t>
+            </a:r>
+            <a:r>
+              <a:rPr lang="en-US" sz="1400" dirty="0">
+                <a:solidFill>
+                  <a:srgbClr val="000000"/>
+                </a:solidFill>
+                <a:highlight>
+                  <a:srgbClr val="FFFFFF"/>
+                </a:highlight>
+                <a:latin typeface="Consolas"/>
+                <a:ea typeface="Calibri"/>
+                <a:cs typeface="Times New Roman"/>
+              </a:rPr>
+              <a:t>&gt;();</a:t>
+            </a:r>
+            <a:endParaRPr lang="en-US" sz="1400" dirty="0">
+              <a:ea typeface="Calibri"/>
+              <a:cs typeface="Times New Roman"/>
+            </a:endParaRPr>
+          </a:p>
+          <a:p>
+            <a:pPr>
+              <a:lnSpc>
+                <a:spcPct val="115000"/>
+              </a:lnSpc>
+              <a:spcAft>
+                <a:spcPts val="0"/>
+              </a:spcAft>
+            </a:pPr>
+            <a:r>
+              <a:rPr lang="en-US" sz="1400" dirty="0">
+                <a:solidFill>
+                  <a:srgbClr val="000000"/>
+                </a:solidFill>
+                <a:highlight>
+                  <a:srgbClr val="FFFFFF"/>
+                </a:highlight>
+                <a:latin typeface="Consolas"/>
+                <a:ea typeface="Calibri"/>
+                <a:cs typeface="Times New Roman"/>
+              </a:rPr>
+              <a:t>            </a:t>
+            </a:r>
+            <a:r>
+              <a:rPr lang="en-US" sz="1400" dirty="0" err="1">
+                <a:solidFill>
+                  <a:srgbClr val="0000FF"/>
+                </a:solidFill>
+                <a:highlight>
+                  <a:srgbClr val="FFFFFF"/>
+                </a:highlight>
+                <a:latin typeface="Consolas"/>
+                <a:ea typeface="Calibri"/>
+                <a:cs typeface="Times New Roman"/>
+              </a:rPr>
+              <a:t>var</a:t>
+            </a:r>
+            <a:r>
+              <a:rPr lang="en-US" sz="1400" dirty="0">
+                <a:solidFill>
+                  <a:srgbClr val="000000"/>
+                </a:solidFill>
+                <a:highlight>
+                  <a:srgbClr val="FFFFFF"/>
+                </a:highlight>
+                <a:latin typeface="Consolas"/>
+                <a:ea typeface="Calibri"/>
+                <a:cs typeface="Times New Roman"/>
+              </a:rPr>
+              <a:t> </a:t>
+            </a:r>
+            <a:r>
+              <a:rPr lang="en-US" sz="1400" dirty="0" err="1">
+                <a:solidFill>
+                  <a:srgbClr val="000000"/>
+                </a:solidFill>
+                <a:highlight>
+                  <a:srgbClr val="FFFFFF"/>
+                </a:highlight>
+                <a:latin typeface="Consolas"/>
+                <a:ea typeface="Calibri"/>
+                <a:cs typeface="Times New Roman"/>
+              </a:rPr>
+              <a:t>connectionString</a:t>
+            </a:r>
+            <a:r>
+              <a:rPr lang="en-US" sz="1400" dirty="0">
+                <a:solidFill>
+                  <a:srgbClr val="000000"/>
+                </a:solidFill>
+                <a:highlight>
+                  <a:srgbClr val="FFFFFF"/>
+                </a:highlight>
+                <a:latin typeface="Consolas"/>
+                <a:ea typeface="Calibri"/>
+                <a:cs typeface="Times New Roman"/>
+              </a:rPr>
+              <a:t> = </a:t>
+            </a:r>
+            <a:r>
+              <a:rPr lang="en-US" sz="1400" dirty="0" err="1">
+                <a:solidFill>
+                  <a:srgbClr val="2B91AF"/>
+                </a:solidFill>
+                <a:highlight>
+                  <a:srgbClr val="FFFFFF"/>
+                </a:highlight>
+                <a:latin typeface="Consolas"/>
+                <a:ea typeface="Calibri"/>
+                <a:cs typeface="Times New Roman"/>
+              </a:rPr>
+              <a:t>ConfigurationManager</a:t>
+            </a:r>
+            <a:r>
+              <a:rPr lang="en-US" sz="1400" dirty="0" err="1">
+                <a:solidFill>
+                  <a:srgbClr val="000000"/>
+                </a:solidFill>
+                <a:highlight>
+                  <a:srgbClr val="FFFFFF"/>
+                </a:highlight>
+                <a:latin typeface="Consolas"/>
+                <a:ea typeface="Calibri"/>
+                <a:cs typeface="Times New Roman"/>
+              </a:rPr>
+              <a:t>.ConnectionStrings</a:t>
+            </a:r>
+            <a:r>
+              <a:rPr lang="en-US" sz="1400" dirty="0">
+                <a:solidFill>
+                  <a:srgbClr val="000000"/>
+                </a:solidFill>
+                <a:highlight>
+                  <a:srgbClr val="FFFFFF"/>
+                </a:highlight>
+                <a:latin typeface="Consolas"/>
+                <a:ea typeface="Calibri"/>
+                <a:cs typeface="Times New Roman"/>
+              </a:rPr>
+              <a:t>[</a:t>
+            </a:r>
+            <a:r>
+              <a:rPr lang="en-US" sz="1400" dirty="0">
+                <a:solidFill>
+                  <a:srgbClr val="A31515"/>
+                </a:solidFill>
+                <a:highlight>
+                  <a:srgbClr val="FFFFFF"/>
+                </a:highlight>
+                <a:latin typeface="Consolas"/>
+                <a:ea typeface="Calibri"/>
+                <a:cs typeface="Times New Roman"/>
+              </a:rPr>
+              <a:t>"</a:t>
+            </a:r>
+            <a:r>
+              <a:rPr lang="en-US" sz="1400" dirty="0" err="1">
+                <a:solidFill>
+                  <a:srgbClr val="A31515"/>
+                </a:solidFill>
+                <a:highlight>
+                  <a:srgbClr val="FFFFFF"/>
+                </a:highlight>
+                <a:latin typeface="Consolas"/>
+                <a:ea typeface="Calibri"/>
+                <a:cs typeface="Times New Roman"/>
+              </a:rPr>
+              <a:t>BankingDbContext</a:t>
+            </a:r>
+            <a:r>
+              <a:rPr lang="en-US" sz="1400" dirty="0">
+                <a:solidFill>
+                  <a:srgbClr val="A31515"/>
+                </a:solidFill>
+                <a:highlight>
+                  <a:srgbClr val="FFFFFF"/>
+                </a:highlight>
+                <a:latin typeface="Consolas"/>
+                <a:ea typeface="Calibri"/>
+                <a:cs typeface="Times New Roman"/>
+              </a:rPr>
+              <a:t>"</a:t>
+            </a:r>
+            <a:r>
+              <a:rPr lang="en-US" sz="1400" dirty="0">
+                <a:solidFill>
+                  <a:srgbClr val="000000"/>
+                </a:solidFill>
+                <a:highlight>
+                  <a:srgbClr val="FFFFFF"/>
+                </a:highlight>
+                <a:latin typeface="Consolas"/>
+                <a:ea typeface="Calibri"/>
+                <a:cs typeface="Times New Roman"/>
+              </a:rPr>
+              <a:t>]</a:t>
+            </a:r>
+            <a:endParaRPr lang="en-US" sz="1400" dirty="0">
+              <a:ea typeface="Calibri"/>
+              <a:cs typeface="Times New Roman"/>
+            </a:endParaRPr>
+          </a:p>
+          <a:p>
+            <a:pPr>
+              <a:lnSpc>
+                <a:spcPct val="115000"/>
+              </a:lnSpc>
+              <a:spcAft>
+                <a:spcPts val="0"/>
+              </a:spcAft>
+            </a:pPr>
+            <a:r>
+              <a:rPr lang="en-US" sz="1400" dirty="0">
+                <a:solidFill>
+                  <a:srgbClr val="000000"/>
+                </a:solidFill>
+                <a:highlight>
+                  <a:srgbClr val="FFFFFF"/>
+                </a:highlight>
+                <a:latin typeface="Consolas"/>
+                <a:ea typeface="Calibri"/>
+                <a:cs typeface="Times New Roman"/>
+              </a:rPr>
+              <a:t>                    .</a:t>
+            </a:r>
+            <a:r>
+              <a:rPr lang="en-US" sz="1400" dirty="0" err="1">
+                <a:solidFill>
+                  <a:srgbClr val="000000"/>
+                </a:solidFill>
+                <a:highlight>
+                  <a:srgbClr val="FFFFFF"/>
+                </a:highlight>
+                <a:latin typeface="Consolas"/>
+                <a:ea typeface="Calibri"/>
+                <a:cs typeface="Times New Roman"/>
+              </a:rPr>
+              <a:t>ConnectionString</a:t>
+            </a:r>
+            <a:r>
+              <a:rPr lang="en-US" sz="1400" dirty="0">
+                <a:solidFill>
+                  <a:srgbClr val="000000"/>
+                </a:solidFill>
+                <a:highlight>
+                  <a:srgbClr val="FFFFFF"/>
+                </a:highlight>
+                <a:latin typeface="Consolas"/>
+                <a:ea typeface="Calibri"/>
+                <a:cs typeface="Times New Roman"/>
+              </a:rPr>
+              <a:t>;</a:t>
+            </a:r>
+            <a:endParaRPr lang="en-US" sz="1400" dirty="0">
+              <a:ea typeface="Calibri"/>
+              <a:cs typeface="Times New Roman"/>
+            </a:endParaRPr>
+          </a:p>
+          <a:p>
+            <a:pPr>
+              <a:lnSpc>
+                <a:spcPct val="115000"/>
+              </a:lnSpc>
+              <a:spcAft>
+                <a:spcPts val="0"/>
+              </a:spcAft>
+            </a:pPr>
+            <a:r>
+              <a:rPr lang="en-US" sz="1400" dirty="0">
+                <a:solidFill>
+                  <a:srgbClr val="000000"/>
+                </a:solidFill>
+                <a:highlight>
+                  <a:srgbClr val="FFFFFF"/>
+                </a:highlight>
+                <a:latin typeface="Consolas"/>
+                <a:ea typeface="Calibri"/>
+                <a:cs typeface="Times New Roman"/>
+              </a:rPr>
+              <a:t>            </a:t>
+            </a:r>
+            <a:r>
+              <a:rPr lang="en-US" sz="1400" dirty="0" err="1">
+                <a:solidFill>
+                  <a:srgbClr val="000000"/>
+                </a:solidFill>
+                <a:highlight>
+                  <a:srgbClr val="FFFFFF"/>
+                </a:highlight>
+                <a:latin typeface="Consolas"/>
+                <a:ea typeface="Calibri"/>
+                <a:cs typeface="Times New Roman"/>
+              </a:rPr>
+              <a:t>container.RegisterType</a:t>
+            </a:r>
+            <a:r>
+              <a:rPr lang="en-US" sz="1400" dirty="0">
+                <a:solidFill>
+                  <a:srgbClr val="000000"/>
+                </a:solidFill>
+                <a:highlight>
+                  <a:srgbClr val="FFFFFF"/>
+                </a:highlight>
+                <a:latin typeface="Consolas"/>
+                <a:ea typeface="Calibri"/>
+                <a:cs typeface="Times New Roman"/>
+              </a:rPr>
+              <a:t>&lt;</a:t>
+            </a:r>
+            <a:r>
+              <a:rPr lang="en-US" sz="1400" dirty="0" err="1">
+                <a:solidFill>
+                  <a:srgbClr val="2B91AF"/>
+                </a:solidFill>
+                <a:highlight>
+                  <a:srgbClr val="FFFFFF"/>
+                </a:highlight>
+                <a:latin typeface="Consolas"/>
+                <a:ea typeface="Calibri"/>
+                <a:cs typeface="Times New Roman"/>
+              </a:rPr>
+              <a:t>IAccountRepository</a:t>
+            </a:r>
+            <a:r>
+              <a:rPr lang="en-US" sz="1400" dirty="0">
+                <a:solidFill>
+                  <a:srgbClr val="000000"/>
+                </a:solidFill>
+                <a:highlight>
+                  <a:srgbClr val="FFFFFF"/>
+                </a:highlight>
+                <a:latin typeface="Consolas"/>
+                <a:ea typeface="Calibri"/>
+                <a:cs typeface="Times New Roman"/>
+              </a:rPr>
+              <a:t>, </a:t>
+            </a:r>
+            <a:r>
+              <a:rPr lang="en-US" sz="1400" dirty="0" err="1">
+                <a:solidFill>
+                  <a:srgbClr val="2B91AF"/>
+                </a:solidFill>
+                <a:highlight>
+                  <a:srgbClr val="FFFFFF"/>
+                </a:highlight>
+                <a:latin typeface="Consolas"/>
+                <a:ea typeface="Calibri"/>
+                <a:cs typeface="Times New Roman"/>
+              </a:rPr>
+              <a:t>AccountRepository</a:t>
+            </a:r>
+            <a:r>
+              <a:rPr lang="en-US" sz="1400" dirty="0">
+                <a:solidFill>
+                  <a:srgbClr val="000000"/>
+                </a:solidFill>
+                <a:highlight>
+                  <a:srgbClr val="FFFFFF"/>
+                </a:highlight>
+                <a:latin typeface="Consolas"/>
+                <a:ea typeface="Calibri"/>
+                <a:cs typeface="Times New Roman"/>
+              </a:rPr>
+              <a:t>&gt;(</a:t>
+            </a:r>
+            <a:endParaRPr lang="en-US" sz="1400" dirty="0">
+              <a:ea typeface="Calibri"/>
+              <a:cs typeface="Times New Roman"/>
+            </a:endParaRPr>
+          </a:p>
+          <a:p>
+            <a:pPr>
+              <a:lnSpc>
+                <a:spcPct val="115000"/>
+              </a:lnSpc>
+              <a:spcAft>
+                <a:spcPts val="0"/>
+              </a:spcAft>
+            </a:pPr>
+            <a:r>
+              <a:rPr lang="en-US" sz="1400" dirty="0">
+                <a:solidFill>
+                  <a:srgbClr val="000000"/>
+                </a:solidFill>
+                <a:highlight>
+                  <a:srgbClr val="FFFFFF"/>
+                </a:highlight>
+                <a:latin typeface="Consolas"/>
+                <a:ea typeface="Calibri"/>
+                <a:cs typeface="Times New Roman"/>
+              </a:rPr>
+              <a:t>                </a:t>
+            </a:r>
+            <a:r>
+              <a:rPr lang="en-US" sz="1400" dirty="0">
+                <a:solidFill>
+                  <a:srgbClr val="0000FF"/>
+                </a:solidFill>
+                <a:highlight>
+                  <a:srgbClr val="FFFFFF"/>
+                </a:highlight>
+                <a:latin typeface="Consolas"/>
+                <a:ea typeface="Calibri"/>
+                <a:cs typeface="Times New Roman"/>
+              </a:rPr>
+              <a:t>new</a:t>
+            </a:r>
+            <a:r>
+              <a:rPr lang="en-US" sz="1400" dirty="0">
+                <a:solidFill>
+                  <a:srgbClr val="000000"/>
+                </a:solidFill>
+                <a:highlight>
+                  <a:srgbClr val="FFFFFF"/>
+                </a:highlight>
+                <a:latin typeface="Consolas"/>
+                <a:ea typeface="Calibri"/>
+                <a:cs typeface="Times New Roman"/>
+              </a:rPr>
+              <a:t> </a:t>
+            </a:r>
+            <a:r>
+              <a:rPr lang="en-US" sz="1400" dirty="0" err="1">
+                <a:solidFill>
+                  <a:srgbClr val="2B91AF"/>
+                </a:solidFill>
+                <a:highlight>
+                  <a:srgbClr val="FFFFFF"/>
+                </a:highlight>
+                <a:latin typeface="Consolas"/>
+                <a:ea typeface="Calibri"/>
+                <a:cs typeface="Times New Roman"/>
+              </a:rPr>
+              <a:t>InjectionConstructor</a:t>
+            </a:r>
+            <a:r>
+              <a:rPr lang="en-US" sz="1400" dirty="0">
+                <a:solidFill>
+                  <a:srgbClr val="000000"/>
+                </a:solidFill>
+                <a:highlight>
+                  <a:srgbClr val="FFFFFF"/>
+                </a:highlight>
+                <a:latin typeface="Consolas"/>
+                <a:ea typeface="Calibri"/>
+                <a:cs typeface="Times New Roman"/>
+              </a:rPr>
+              <a:t>(</a:t>
+            </a:r>
+            <a:r>
+              <a:rPr lang="en-US" sz="1400" dirty="0" err="1">
+                <a:solidFill>
+                  <a:srgbClr val="000000"/>
+                </a:solidFill>
+                <a:highlight>
+                  <a:srgbClr val="FFFFFF"/>
+                </a:highlight>
+                <a:latin typeface="Consolas"/>
+                <a:ea typeface="Calibri"/>
+                <a:cs typeface="Times New Roman"/>
+              </a:rPr>
+              <a:t>connectionString</a:t>
+            </a:r>
+            <a:r>
+              <a:rPr lang="en-US" sz="1400" dirty="0">
+                <a:solidFill>
+                  <a:srgbClr val="000000"/>
+                </a:solidFill>
+                <a:highlight>
+                  <a:srgbClr val="FFFFFF"/>
+                </a:highlight>
+                <a:latin typeface="Consolas"/>
+                <a:ea typeface="Calibri"/>
+                <a:cs typeface="Times New Roman"/>
+              </a:rPr>
+              <a:t>),</a:t>
+            </a:r>
+            <a:endParaRPr lang="en-US" sz="1400" dirty="0">
+              <a:ea typeface="Calibri"/>
+              <a:cs typeface="Times New Roman"/>
+            </a:endParaRPr>
+          </a:p>
+          <a:p>
+            <a:pPr>
+              <a:lnSpc>
+                <a:spcPct val="115000"/>
+              </a:lnSpc>
+              <a:spcAft>
+                <a:spcPts val="0"/>
+              </a:spcAft>
+            </a:pPr>
+            <a:r>
+              <a:rPr lang="en-US" sz="1400" dirty="0">
+                <a:solidFill>
+                  <a:srgbClr val="000000"/>
+                </a:solidFill>
+                <a:highlight>
+                  <a:srgbClr val="FFFFFF"/>
+                </a:highlight>
+                <a:latin typeface="Consolas"/>
+                <a:ea typeface="Calibri"/>
+                <a:cs typeface="Times New Roman"/>
+              </a:rPr>
+              <a:t>                </a:t>
+            </a:r>
+            <a:r>
+              <a:rPr lang="en-US" sz="1400" dirty="0">
+                <a:solidFill>
+                  <a:srgbClr val="0000FF"/>
+                </a:solidFill>
+                <a:highlight>
+                  <a:srgbClr val="FFFFFF"/>
+                </a:highlight>
+                <a:latin typeface="Consolas"/>
+                <a:ea typeface="Calibri"/>
+                <a:cs typeface="Times New Roman"/>
+              </a:rPr>
+              <a:t>new</a:t>
+            </a:r>
+            <a:r>
+              <a:rPr lang="en-US" sz="1400" dirty="0">
+                <a:solidFill>
+                  <a:srgbClr val="000000"/>
+                </a:solidFill>
+                <a:highlight>
+                  <a:srgbClr val="FFFFFF"/>
+                </a:highlight>
+                <a:latin typeface="Consolas"/>
+                <a:ea typeface="Calibri"/>
+                <a:cs typeface="Times New Roman"/>
+              </a:rPr>
+              <a:t> </a:t>
+            </a:r>
+            <a:r>
+              <a:rPr lang="en-US" sz="1400" dirty="0">
+                <a:solidFill>
+                  <a:srgbClr val="2B91AF"/>
+                </a:solidFill>
+                <a:highlight>
+                  <a:srgbClr val="FFFFFF"/>
+                </a:highlight>
+                <a:latin typeface="Consolas"/>
+                <a:ea typeface="Calibri"/>
+                <a:cs typeface="Times New Roman"/>
+              </a:rPr>
+              <a:t>Interceptor</a:t>
+            </a:r>
+            <a:r>
+              <a:rPr lang="en-US" sz="1400" dirty="0">
+                <a:solidFill>
+                  <a:srgbClr val="000000"/>
+                </a:solidFill>
+                <a:highlight>
+                  <a:srgbClr val="FFFFFF"/>
+                </a:highlight>
+                <a:latin typeface="Consolas"/>
+                <a:ea typeface="Calibri"/>
+                <a:cs typeface="Times New Roman"/>
+              </a:rPr>
+              <a:t>&lt;</a:t>
+            </a:r>
+            <a:r>
+              <a:rPr lang="en-US" sz="1400" dirty="0" err="1">
+                <a:solidFill>
+                  <a:srgbClr val="2B91AF"/>
+                </a:solidFill>
+                <a:highlight>
+                  <a:srgbClr val="FFFFFF"/>
+                </a:highlight>
+                <a:latin typeface="Consolas"/>
+                <a:ea typeface="Calibri"/>
+                <a:cs typeface="Times New Roman"/>
+              </a:rPr>
+              <a:t>InterfaceInterceptor</a:t>
+            </a:r>
+            <a:r>
+              <a:rPr lang="en-US" sz="1400" dirty="0">
+                <a:solidFill>
+                  <a:srgbClr val="000000"/>
+                </a:solidFill>
+                <a:highlight>
+                  <a:srgbClr val="FFFFFF"/>
+                </a:highlight>
+                <a:latin typeface="Consolas"/>
+                <a:ea typeface="Calibri"/>
+                <a:cs typeface="Times New Roman"/>
+              </a:rPr>
+              <a:t>&gt;(),</a:t>
+            </a:r>
+            <a:endParaRPr lang="en-US" sz="1400" dirty="0">
+              <a:ea typeface="Calibri"/>
+              <a:cs typeface="Times New Roman"/>
+            </a:endParaRPr>
+          </a:p>
+          <a:p>
+            <a:pPr>
+              <a:lnSpc>
+                <a:spcPct val="115000"/>
+              </a:lnSpc>
+              <a:spcAft>
+                <a:spcPts val="0"/>
+              </a:spcAft>
+            </a:pPr>
+            <a:r>
+              <a:rPr lang="en-US" sz="1400" dirty="0">
+                <a:solidFill>
+                  <a:srgbClr val="000000"/>
+                </a:solidFill>
+                <a:highlight>
+                  <a:srgbClr val="FFFFFF"/>
+                </a:highlight>
+                <a:latin typeface="Consolas"/>
+                <a:ea typeface="Calibri"/>
+                <a:cs typeface="Times New Roman"/>
+              </a:rPr>
+              <a:t>                </a:t>
+            </a:r>
+            <a:r>
+              <a:rPr lang="en-US" sz="1400" dirty="0">
+                <a:solidFill>
+                  <a:srgbClr val="0000FF"/>
+                </a:solidFill>
+                <a:highlight>
+                  <a:srgbClr val="FFFFFF"/>
+                </a:highlight>
+                <a:latin typeface="Consolas"/>
+                <a:ea typeface="Calibri"/>
+                <a:cs typeface="Times New Roman"/>
+              </a:rPr>
+              <a:t>new</a:t>
+            </a:r>
+            <a:r>
+              <a:rPr lang="en-US" sz="1400" dirty="0">
+                <a:solidFill>
+                  <a:srgbClr val="000000"/>
+                </a:solidFill>
+                <a:highlight>
+                  <a:srgbClr val="FFFFFF"/>
+                </a:highlight>
+                <a:latin typeface="Consolas"/>
+                <a:ea typeface="Calibri"/>
+                <a:cs typeface="Times New Roman"/>
+              </a:rPr>
+              <a:t> </a:t>
+            </a:r>
+            <a:r>
+              <a:rPr lang="en-US" sz="1400" dirty="0" err="1">
+                <a:solidFill>
+                  <a:srgbClr val="2B91AF"/>
+                </a:solidFill>
+                <a:highlight>
+                  <a:srgbClr val="FFFFFF"/>
+                </a:highlight>
+                <a:latin typeface="Consolas"/>
+                <a:ea typeface="Calibri"/>
+                <a:cs typeface="Times New Roman"/>
+              </a:rPr>
+              <a:t>InterceptionBehavior</a:t>
+            </a:r>
+            <a:r>
+              <a:rPr lang="en-US" sz="1400" dirty="0">
+                <a:solidFill>
+                  <a:srgbClr val="000000"/>
+                </a:solidFill>
+                <a:highlight>
+                  <a:srgbClr val="FFFFFF"/>
+                </a:highlight>
+                <a:latin typeface="Consolas"/>
+                <a:ea typeface="Calibri"/>
+                <a:cs typeface="Times New Roman"/>
+              </a:rPr>
+              <a:t>&lt;</a:t>
+            </a:r>
+            <a:r>
+              <a:rPr lang="en-US" sz="1400" dirty="0" err="1">
+                <a:solidFill>
+                  <a:srgbClr val="2B91AF"/>
+                </a:solidFill>
+                <a:highlight>
+                  <a:srgbClr val="FFFFFF"/>
+                </a:highlight>
+                <a:latin typeface="Consolas"/>
+                <a:ea typeface="Calibri"/>
+                <a:cs typeface="Times New Roman"/>
+              </a:rPr>
+              <a:t>TimingBehavior</a:t>
+            </a:r>
+            <a:r>
+              <a:rPr lang="en-US" sz="1400" dirty="0">
+                <a:solidFill>
+                  <a:srgbClr val="000000"/>
+                </a:solidFill>
+                <a:highlight>
+                  <a:srgbClr val="FFFFFF"/>
+                </a:highlight>
+                <a:latin typeface="Consolas"/>
+                <a:ea typeface="Calibri"/>
+                <a:cs typeface="Times New Roman"/>
+              </a:rPr>
+              <a:t>&gt;());</a:t>
+            </a:r>
+            <a:endParaRPr lang="en-US" sz="1400" dirty="0">
+              <a:ea typeface="Calibri"/>
+              <a:cs typeface="Times New Roman"/>
+            </a:endParaRPr>
+          </a:p>
+          <a:p>
+            <a:pPr>
+              <a:lnSpc>
+                <a:spcPct val="115000"/>
+              </a:lnSpc>
+              <a:spcAft>
+                <a:spcPts val="0"/>
+              </a:spcAft>
+            </a:pPr>
+            <a:r>
+              <a:rPr lang="en-US" sz="1400" dirty="0">
+                <a:solidFill>
+                  <a:srgbClr val="000000"/>
+                </a:solidFill>
+                <a:highlight>
+                  <a:srgbClr val="FFFFFF"/>
+                </a:highlight>
+                <a:latin typeface="Consolas"/>
+                <a:ea typeface="Calibri"/>
+                <a:cs typeface="Times New Roman"/>
+              </a:rPr>
+              <a:t>            </a:t>
+            </a:r>
+            <a:r>
+              <a:rPr lang="en-US" sz="1400" dirty="0" err="1">
+                <a:solidFill>
+                  <a:srgbClr val="000000"/>
+                </a:solidFill>
+                <a:highlight>
+                  <a:srgbClr val="FFFFFF"/>
+                </a:highlight>
+                <a:latin typeface="Consolas"/>
+                <a:ea typeface="Calibri"/>
+                <a:cs typeface="Times New Roman"/>
+              </a:rPr>
+              <a:t>container.RegisterType</a:t>
+            </a:r>
+            <a:r>
+              <a:rPr lang="en-US" sz="1400" dirty="0">
+                <a:solidFill>
+                  <a:srgbClr val="000000"/>
+                </a:solidFill>
+                <a:highlight>
+                  <a:srgbClr val="FFFFFF"/>
+                </a:highlight>
+                <a:latin typeface="Consolas"/>
+                <a:ea typeface="Calibri"/>
+                <a:cs typeface="Times New Roman"/>
+              </a:rPr>
+              <a:t>&lt;</a:t>
+            </a:r>
+            <a:r>
+              <a:rPr lang="en-US" sz="1400" dirty="0" err="1">
+                <a:solidFill>
+                  <a:srgbClr val="2B91AF"/>
+                </a:solidFill>
+                <a:highlight>
+                  <a:srgbClr val="FFFFFF"/>
+                </a:highlight>
+                <a:latin typeface="Consolas"/>
+                <a:ea typeface="Calibri"/>
+                <a:cs typeface="Times New Roman"/>
+              </a:rPr>
+              <a:t>IUserAccountService</a:t>
+            </a:r>
+            <a:r>
+              <a:rPr lang="en-US" sz="1400" dirty="0">
+                <a:solidFill>
+                  <a:srgbClr val="000000"/>
+                </a:solidFill>
+                <a:highlight>
+                  <a:srgbClr val="FFFFFF"/>
+                </a:highlight>
+                <a:latin typeface="Consolas"/>
+                <a:ea typeface="Calibri"/>
+                <a:cs typeface="Times New Roman"/>
+              </a:rPr>
+              <a:t>, </a:t>
+            </a:r>
+            <a:r>
+              <a:rPr lang="en-US" sz="1400" dirty="0" err="1">
+                <a:solidFill>
+                  <a:srgbClr val="2B91AF"/>
+                </a:solidFill>
+                <a:highlight>
+                  <a:srgbClr val="FFFFFF"/>
+                </a:highlight>
+                <a:latin typeface="Consolas"/>
+                <a:ea typeface="Calibri"/>
+                <a:cs typeface="Times New Roman"/>
+              </a:rPr>
+              <a:t>UserAccountService</a:t>
+            </a:r>
+            <a:r>
+              <a:rPr lang="en-US" sz="1400" dirty="0">
+                <a:solidFill>
+                  <a:srgbClr val="000000"/>
+                </a:solidFill>
+                <a:highlight>
+                  <a:srgbClr val="FFFFFF"/>
+                </a:highlight>
+                <a:latin typeface="Consolas"/>
+                <a:ea typeface="Calibri"/>
+                <a:cs typeface="Times New Roman"/>
+              </a:rPr>
+              <a:t>&gt;(</a:t>
+            </a:r>
+            <a:endParaRPr lang="en-US" sz="1400" dirty="0">
+              <a:ea typeface="Calibri"/>
+              <a:cs typeface="Times New Roman"/>
+            </a:endParaRPr>
+          </a:p>
+          <a:p>
+            <a:pPr>
+              <a:lnSpc>
+                <a:spcPct val="115000"/>
+              </a:lnSpc>
+              <a:spcAft>
+                <a:spcPts val="0"/>
+              </a:spcAft>
+            </a:pPr>
+            <a:r>
+              <a:rPr lang="en-US" sz="1400" dirty="0">
+                <a:solidFill>
+                  <a:srgbClr val="000000"/>
+                </a:solidFill>
+                <a:highlight>
+                  <a:srgbClr val="FFFFFF"/>
+                </a:highlight>
+                <a:latin typeface="Consolas"/>
+                <a:ea typeface="Calibri"/>
+                <a:cs typeface="Times New Roman"/>
+              </a:rPr>
+              <a:t>                </a:t>
+            </a:r>
+            <a:r>
+              <a:rPr lang="en-US" sz="1400" dirty="0">
+                <a:solidFill>
+                  <a:srgbClr val="0000FF"/>
+                </a:solidFill>
+                <a:highlight>
+                  <a:srgbClr val="FFFFFF"/>
+                </a:highlight>
+                <a:latin typeface="Consolas"/>
+                <a:ea typeface="Calibri"/>
+                <a:cs typeface="Times New Roman"/>
+              </a:rPr>
+              <a:t>new</a:t>
+            </a:r>
+            <a:r>
+              <a:rPr lang="en-US" sz="1400" dirty="0">
+                <a:solidFill>
+                  <a:srgbClr val="000000"/>
+                </a:solidFill>
+                <a:highlight>
+                  <a:srgbClr val="FFFFFF"/>
+                </a:highlight>
+                <a:latin typeface="Consolas"/>
+                <a:ea typeface="Calibri"/>
+                <a:cs typeface="Times New Roman"/>
+              </a:rPr>
+              <a:t> </a:t>
+            </a:r>
+            <a:r>
+              <a:rPr lang="en-US" sz="1400" dirty="0">
+                <a:solidFill>
+                  <a:srgbClr val="2B91AF"/>
+                </a:solidFill>
+                <a:highlight>
+                  <a:srgbClr val="FFFFFF"/>
+                </a:highlight>
+                <a:latin typeface="Consolas"/>
+                <a:ea typeface="Calibri"/>
+                <a:cs typeface="Times New Roman"/>
+              </a:rPr>
+              <a:t>Interceptor</a:t>
+            </a:r>
+            <a:r>
+              <a:rPr lang="en-US" sz="1400" dirty="0">
+                <a:solidFill>
+                  <a:srgbClr val="000000"/>
+                </a:solidFill>
+                <a:highlight>
+                  <a:srgbClr val="FFFFFF"/>
+                </a:highlight>
+                <a:latin typeface="Consolas"/>
+                <a:ea typeface="Calibri"/>
+                <a:cs typeface="Times New Roman"/>
+              </a:rPr>
+              <a:t>&lt;</a:t>
+            </a:r>
+            <a:r>
+              <a:rPr lang="en-US" sz="1400" dirty="0" err="1">
+                <a:solidFill>
+                  <a:srgbClr val="2B91AF"/>
+                </a:solidFill>
+                <a:highlight>
+                  <a:srgbClr val="FFFFFF"/>
+                </a:highlight>
+                <a:latin typeface="Consolas"/>
+                <a:ea typeface="Calibri"/>
+                <a:cs typeface="Times New Roman"/>
+              </a:rPr>
+              <a:t>InterfaceInterceptor</a:t>
+            </a:r>
+            <a:r>
+              <a:rPr lang="en-US" sz="1400" dirty="0">
+                <a:solidFill>
+                  <a:srgbClr val="000000"/>
+                </a:solidFill>
+                <a:highlight>
+                  <a:srgbClr val="FFFFFF"/>
+                </a:highlight>
+                <a:latin typeface="Consolas"/>
+                <a:ea typeface="Calibri"/>
+                <a:cs typeface="Times New Roman"/>
+              </a:rPr>
+              <a:t>&gt;(),</a:t>
+            </a:r>
+            <a:endParaRPr lang="en-US" sz="1400" dirty="0">
+              <a:ea typeface="Calibri"/>
+              <a:cs typeface="Times New Roman"/>
+            </a:endParaRPr>
+          </a:p>
+          <a:p>
+            <a:pPr>
+              <a:lnSpc>
+                <a:spcPct val="115000"/>
+              </a:lnSpc>
+              <a:spcAft>
+                <a:spcPts val="0"/>
+              </a:spcAft>
+            </a:pPr>
+            <a:r>
+              <a:rPr lang="en-US" sz="1400" dirty="0">
+                <a:solidFill>
+                  <a:srgbClr val="000000"/>
+                </a:solidFill>
+                <a:highlight>
+                  <a:srgbClr val="FFFFFF"/>
+                </a:highlight>
+                <a:latin typeface="Consolas"/>
+                <a:ea typeface="Calibri"/>
+                <a:cs typeface="Times New Roman"/>
+              </a:rPr>
+              <a:t>                </a:t>
+            </a:r>
+            <a:r>
+              <a:rPr lang="en-US" sz="1400" dirty="0">
+                <a:solidFill>
+                  <a:srgbClr val="0000FF"/>
+                </a:solidFill>
+                <a:highlight>
+                  <a:srgbClr val="FFFFFF"/>
+                </a:highlight>
+                <a:latin typeface="Consolas"/>
+                <a:ea typeface="Calibri"/>
+                <a:cs typeface="Times New Roman"/>
+              </a:rPr>
+              <a:t>new</a:t>
+            </a:r>
+            <a:r>
+              <a:rPr lang="en-US" sz="1400" dirty="0">
+                <a:solidFill>
+                  <a:srgbClr val="000000"/>
+                </a:solidFill>
+                <a:highlight>
+                  <a:srgbClr val="FFFFFF"/>
+                </a:highlight>
+                <a:latin typeface="Consolas"/>
+                <a:ea typeface="Calibri"/>
+                <a:cs typeface="Times New Roman"/>
+              </a:rPr>
+              <a:t> </a:t>
+            </a:r>
+            <a:r>
+              <a:rPr lang="en-US" sz="1400" dirty="0" err="1">
+                <a:solidFill>
+                  <a:srgbClr val="2B91AF"/>
+                </a:solidFill>
+                <a:highlight>
+                  <a:srgbClr val="FFFFFF"/>
+                </a:highlight>
+                <a:latin typeface="Consolas"/>
+                <a:ea typeface="Calibri"/>
+                <a:cs typeface="Times New Roman"/>
+              </a:rPr>
+              <a:t>InterceptionBehavior</a:t>
+            </a:r>
+            <a:r>
+              <a:rPr lang="en-US" sz="1400" dirty="0">
+                <a:solidFill>
+                  <a:srgbClr val="000000"/>
+                </a:solidFill>
+                <a:highlight>
+                  <a:srgbClr val="FFFFFF"/>
+                </a:highlight>
+                <a:latin typeface="Consolas"/>
+                <a:ea typeface="Calibri"/>
+                <a:cs typeface="Times New Roman"/>
+              </a:rPr>
+              <a:t>&lt;</a:t>
+            </a:r>
+            <a:r>
+              <a:rPr lang="en-US" sz="1400" dirty="0" err="1">
+                <a:solidFill>
+                  <a:srgbClr val="2B91AF"/>
+                </a:solidFill>
+                <a:highlight>
+                  <a:srgbClr val="FFFFFF"/>
+                </a:highlight>
+                <a:latin typeface="Consolas"/>
+                <a:ea typeface="Calibri"/>
+                <a:cs typeface="Times New Roman"/>
+              </a:rPr>
+              <a:t>TimingBehavior</a:t>
+            </a:r>
+            <a:r>
+              <a:rPr lang="en-US" sz="1400" dirty="0">
+                <a:solidFill>
+                  <a:srgbClr val="000000"/>
+                </a:solidFill>
+                <a:highlight>
+                  <a:srgbClr val="FFFFFF"/>
+                </a:highlight>
+                <a:latin typeface="Consolas"/>
+                <a:ea typeface="Calibri"/>
+                <a:cs typeface="Times New Roman"/>
+              </a:rPr>
+              <a:t>&gt;());</a:t>
+            </a:r>
+            <a:endParaRPr lang="en-US" sz="1400" dirty="0">
+              <a:ea typeface="Calibri"/>
+              <a:cs typeface="Times New Roman"/>
+            </a:endParaRPr>
+          </a:p>
+          <a:p>
+            <a:pPr>
+              <a:lnSpc>
+                <a:spcPct val="115000"/>
+              </a:lnSpc>
+              <a:spcAft>
+                <a:spcPts val="0"/>
+              </a:spcAft>
+            </a:pPr>
+            <a:r>
+              <a:rPr lang="en-US" sz="1400" dirty="0">
+                <a:solidFill>
+                  <a:srgbClr val="000000"/>
+                </a:solidFill>
+                <a:highlight>
+                  <a:srgbClr val="FFFFFF"/>
+                </a:highlight>
+                <a:latin typeface="Consolas"/>
+                <a:ea typeface="Calibri"/>
+                <a:cs typeface="Times New Roman"/>
+              </a:rPr>
+              <a:t>        }</a:t>
+            </a:r>
+            <a:endParaRPr lang="en-US" sz="1400" dirty="0">
+              <a:ea typeface="Calibri"/>
+              <a:cs typeface="Times New Roman"/>
+            </a:endParaRPr>
+          </a:p>
+          <a:p>
+            <a:pPr>
+              <a:lnSpc>
+                <a:spcPct val="115000"/>
+              </a:lnSpc>
+              <a:spcAft>
+                <a:spcPts val="1000"/>
+              </a:spcAft>
+            </a:pPr>
+            <a:r>
+              <a:rPr lang="en-US" sz="1400" dirty="0">
+                <a:solidFill>
+                  <a:srgbClr val="000000"/>
+                </a:solidFill>
+                <a:highlight>
+                  <a:srgbClr val="FFFFFF"/>
+                </a:highlight>
+                <a:latin typeface="Consolas"/>
+                <a:ea typeface="Calibri"/>
+                <a:cs typeface="Times New Roman"/>
+              </a:rPr>
+              <a:t>    }</a:t>
+            </a:r>
+            <a:endParaRPr lang="en-US" sz="1400" dirty="0">
+              <a:ea typeface="Calibri"/>
+              <a:cs typeface="Times New Roman"/>
+            </a:endParaRPr>
+          </a:p>
+        </p:txBody>
+      </p:sp>
     </p:spTree>
     <p:extLst>
       <p:ext uri="{BB962C8B-B14F-4D97-AF65-F5344CB8AC3E}">
-        <p14:creationId xmlns:p14="http://schemas.microsoft.com/office/powerpoint/2010/main" val="308607750"/>
+        <p14:creationId xmlns:p14="http://schemas.microsoft.com/office/powerpoint/2010/main" val="3509099350"/>
       </p:ext>
     </p:extLst>
   </p:cSld>
@@ -43389,9 +47223,126 @@
   <p:timing>
     <p:tnLst>
       <p:par>
-        <p:cTn id="1" dur="indefinite" restart="never" nodeType="tmRoot"/>
+        <p:cTn id="1" dur="indefinite" restart="never" nodeType="tmRoot">
+          <p:childTnLst>
+            <p:seq concurrent="1" nextAc="seek">
+              <p:cTn id="2" dur="indefinite" nodeType="mainSeq">
+                <p:childTnLst>
+                  <p:par>
+                    <p:cTn id="3" fill="hold">
+                      <p:stCondLst>
+                        <p:cond delay="indefinite"/>
+                      </p:stCondLst>
+                      <p:childTnLst>
+                        <p:par>
+                          <p:cTn id="4" fill="hold">
+                            <p:stCondLst>
+                              <p:cond delay="0"/>
+                            </p:stCondLst>
+                            <p:childTnLst>
+                              <p:par>
+                                <p:cTn id="5" presetID="1" presetClass="entr" presetSubtype="0" fill="hold" grpId="0" nodeType="clickEffect">
+                                  <p:stCondLst>
+                                    <p:cond delay="0"/>
+                                  </p:stCondLst>
+                                  <p:childTnLst>
+                                    <p:set>
+                                      <p:cBhvr>
+                                        <p:cTn id="6" dur="1" fill="hold">
+                                          <p:stCondLst>
+                                            <p:cond delay="0"/>
+                                          </p:stCondLst>
+                                        </p:cTn>
+                                        <p:tgtEl>
+                                          <p:spTgt spid="4"/>
+                                        </p:tgtEl>
+                                        <p:attrNameLst>
+                                          <p:attrName>style.visibility</p:attrName>
+                                        </p:attrNameLst>
+                                      </p:cBhvr>
+                                      <p:to>
+                                        <p:strVal val="visible"/>
+                                      </p:to>
+                                    </p:set>
+                                  </p:childTnLst>
+                                </p:cTn>
+                              </p:par>
+                            </p:childTnLst>
+                          </p:cTn>
+                        </p:par>
+                      </p:childTnLst>
+                    </p:cTn>
+                  </p:par>
+                  <p:par>
+                    <p:cTn id="7" fill="hold">
+                      <p:stCondLst>
+                        <p:cond delay="indefinite"/>
+                      </p:stCondLst>
+                      <p:childTnLst>
+                        <p:par>
+                          <p:cTn id="8" fill="hold">
+                            <p:stCondLst>
+                              <p:cond delay="0"/>
+                            </p:stCondLst>
+                            <p:childTnLst>
+                              <p:par>
+                                <p:cTn id="9" presetID="1" presetClass="entr" presetSubtype="0" fill="hold" grpId="0" nodeType="clickEffect">
+                                  <p:stCondLst>
+                                    <p:cond delay="0"/>
+                                  </p:stCondLst>
+                                  <p:childTnLst>
+                                    <p:set>
+                                      <p:cBhvr>
+                                        <p:cTn id="10" dur="1" fill="hold">
+                                          <p:stCondLst>
+                                            <p:cond delay="0"/>
+                                          </p:stCondLst>
+                                        </p:cTn>
+                                        <p:tgtEl>
+                                          <p:spTgt spid="8"/>
+                                        </p:tgtEl>
+                                        <p:attrNameLst>
+                                          <p:attrName>style.visibility</p:attrName>
+                                        </p:attrNameLst>
+                                      </p:cBhvr>
+                                      <p:to>
+                                        <p:strVal val="visible"/>
+                                      </p:to>
+                                    </p:set>
+                                  </p:childTnLst>
+                                </p:cTn>
+                              </p:par>
+                            </p:childTnLst>
+                          </p:cTn>
+                        </p:par>
+                      </p:childTnLst>
+                    </p:cTn>
+                  </p:par>
+                </p:childTnLst>
+              </p:cTn>
+              <p:prevCondLst>
+                <p:cond evt="onPrev" delay="0">
+                  <p:tgtEl>
+                    <p:sldTgt/>
+                  </p:tgtEl>
+                </p:cond>
+              </p:prevCondLst>
+              <p:nextCondLst>
+                <p:cond evt="onNext" delay="0">
+                  <p:tgtEl>
+                    <p:sldTgt/>
+                  </p:tgtEl>
+                </p:cond>
+              </p:nextCondLst>
+            </p:seq>
+          </p:childTnLst>
+        </p:cTn>
       </p:par>
     </p:tnLst>
+    <p:bldLst>
+      <p:bldP spid="4" grpId="0" animBg="1"/>
+      <p:bldP spid="8" grpId="0" animBg="1"/>
+    </p:bldLst>
   </p:timing>
 </p:sld>
 </file>
@@ -43425,12 +47376,14 @@
         </p:nvSpPr>
         <p:spPr/>
         <p:txBody>
-          <a:bodyPr/>
+          <a:bodyPr>
+            <a:normAutofit/>
+          </a:bodyPr>
           <a:lstStyle/>
           <a:p>
             <a:r>
               <a:rPr lang="en-US" dirty="0" smtClean="0"/>
-              <a:t>Remember</a:t>
+              <a:t>Conclusion</a:t>
             </a:r>
             <a:endParaRPr lang="en-US" dirty="0"/>
           </a:p>
@@ -43451,14 +47404,24 @@
           <a:bodyPr/>
           <a:lstStyle/>
           <a:p>
-            <a:endParaRPr lang="en-US"/>
+            <a:r>
+              <a:rPr lang="fr-FR" dirty="0" smtClean="0"/>
+              <a:t>TODO </a:t>
+            </a:r>
+            <a:r>
+              <a:rPr lang="fr-FR" dirty="0" smtClean="0">
+                <a:sym typeface="Wingdings" panose="05000000000000000000" pitchFamily="2" charset="2"/>
+              </a:rPr>
+              <a:t></a:t>
+            </a:r>
+            <a:endParaRPr lang="en-US" dirty="0"/>
           </a:p>
         </p:txBody>
       </p:sp>
     </p:spTree>
     <p:extLst>
       <p:ext uri="{BB962C8B-B14F-4D97-AF65-F5344CB8AC3E}">
-        <p14:creationId xmlns:p14="http://schemas.microsoft.com/office/powerpoint/2010/main" val="1019461660"/>
+        <p14:creationId xmlns:p14="http://schemas.microsoft.com/office/powerpoint/2010/main" val="308607750"/>
       </p:ext>
     </p:extLst>
   </p:cSld>
@@ -43509,7 +47472,7 @@
           <a:p>
             <a:r>
               <a:rPr lang="en-US" dirty="0" smtClean="0"/>
-              <a:t>Going further …</a:t>
+              <a:t>Remember</a:t>
             </a:r>
             <a:endParaRPr lang="en-US" dirty="0"/>
           </a:p>
@@ -43531,41 +47494,86 @@
           <a:lstStyle/>
           <a:p>
             <a:r>
-              <a:rPr lang="en-US" dirty="0" smtClean="0"/>
-              <a:t>Mark </a:t>
-            </a:r>
-            <a:r>
-              <a:rPr lang="en-US" dirty="0" err="1" smtClean="0"/>
-              <a:t>Seemann’s</a:t>
-            </a:r>
-            <a:r>
-              <a:rPr lang="en-US" dirty="0" smtClean="0"/>
-              <a:t> book and blog posts</a:t>
-            </a:r>
-          </a:p>
-          <a:p>
-            <a:r>
-              <a:rPr lang="en-US" dirty="0" smtClean="0"/>
-              <a:t>Conversation about DI in </a:t>
-            </a:r>
-            <a:r>
-              <a:rPr lang="en-US" dirty="0" err="1" smtClean="0"/>
-              <a:t>aspnet</a:t>
-            </a:r>
-            <a:r>
-              <a:rPr lang="en-US" dirty="0" smtClean="0"/>
+              <a:rPr lang="fr-FR" dirty="0" err="1" smtClean="0"/>
+              <a:t>Constructor</a:t>
+            </a:r>
+            <a:r>
+              <a:rPr lang="fr-FR" dirty="0" smtClean="0"/>
+              <a:t> Injection </a:t>
+            </a:r>
+            <a:r>
+              <a:rPr lang="fr-FR" dirty="0" err="1" smtClean="0"/>
+              <a:t>is</a:t>
+            </a:r>
+            <a:r>
+              <a:rPr lang="fr-FR" dirty="0" smtClean="0"/>
               <a:t> </a:t>
             </a:r>
             <a:r>
-              <a:rPr lang="en-US" dirty="0" err="1" smtClean="0"/>
-              <a:t>vNext</a:t>
-            </a:r>
-            <a:endParaRPr lang="en-US" dirty="0" smtClean="0"/>
-          </a:p>
-          <a:p>
-            <a:r>
-              <a:rPr lang="en-US" dirty="0" smtClean="0"/>
-              <a:t>SOLID</a:t>
+              <a:rPr lang="fr-FR" dirty="0" err="1" smtClean="0"/>
+              <a:t>your</a:t>
+            </a:r>
+            <a:r>
+              <a:rPr lang="fr-FR" dirty="0" smtClean="0"/>
+              <a:t> </a:t>
+            </a:r>
+            <a:r>
+              <a:rPr lang="fr-FR" dirty="0" err="1" smtClean="0"/>
+              <a:t>friend</a:t>
+            </a:r>
+            <a:endParaRPr lang="fr-FR" dirty="0" smtClean="0"/>
+          </a:p>
+          <a:p>
+            <a:r>
+              <a:rPr lang="fr-FR" dirty="0" smtClean="0"/>
+              <a:t>DI-</a:t>
+            </a:r>
+            <a:r>
+              <a:rPr lang="fr-FR" dirty="0" err="1" smtClean="0"/>
+              <a:t>friendly</a:t>
+            </a:r>
+            <a:r>
+              <a:rPr lang="fr-FR" dirty="0" smtClean="0"/>
+              <a:t> </a:t>
+            </a:r>
+            <a:r>
+              <a:rPr lang="fr-FR" dirty="0" err="1" smtClean="0"/>
+              <a:t>everywhere</a:t>
+            </a:r>
+            <a:endParaRPr lang="fr-FR" dirty="0" smtClean="0"/>
+          </a:p>
+          <a:p>
+            <a:r>
+              <a:rPr lang="fr-FR" dirty="0" smtClean="0"/>
+              <a:t>DI Container </a:t>
+            </a:r>
+            <a:r>
+              <a:rPr lang="fr-FR" dirty="0" err="1" smtClean="0"/>
+              <a:t>should</a:t>
+            </a:r>
+            <a:r>
+              <a:rPr lang="fr-FR" dirty="0" smtClean="0"/>
+              <a:t> </a:t>
+            </a:r>
+            <a:r>
+              <a:rPr lang="fr-FR" dirty="0" err="1" smtClean="0"/>
+              <a:t>be</a:t>
+            </a:r>
+            <a:r>
+              <a:rPr lang="fr-FR" dirty="0" smtClean="0"/>
+              <a:t> visible </a:t>
+            </a:r>
+            <a:r>
+              <a:rPr lang="fr-FR" dirty="0" err="1" smtClean="0"/>
+              <a:t>only</a:t>
+            </a:r>
+            <a:r>
+              <a:rPr lang="fr-FR" dirty="0" smtClean="0"/>
+              <a:t> in Composition </a:t>
+            </a:r>
+            <a:r>
+              <a:rPr lang="fr-FR" dirty="0" err="1" smtClean="0"/>
+              <a:t>Root</a:t>
             </a:r>
             <a:endParaRPr lang="en-US" dirty="0"/>
           </a:p>
@@ -43574,7 +47582,7 @@
     </p:spTree>
     <p:extLst>
       <p:ext uri="{BB962C8B-B14F-4D97-AF65-F5344CB8AC3E}">
-        <p14:creationId xmlns:p14="http://schemas.microsoft.com/office/powerpoint/2010/main" val="3179521032"/>
+        <p14:creationId xmlns:p14="http://schemas.microsoft.com/office/powerpoint/2010/main" val="1019461660"/>
       </p:ext>
     </p:extLst>
   </p:cSld>
@@ -43610,6 +47618,310 @@
       </p:grpSpPr>
       <p:sp>
         <p:nvSpPr>
+          <p:cNvPr id="2" name="Title 1"/>
+          <p:cNvSpPr>
+            <a:spLocks noGrp="1"/>
+          </p:cNvSpPr>
+          <p:nvPr>
+            <p:ph type="title"/>
+          </p:nvPr>
+        </p:nvSpPr>
+        <p:spPr/>
+        <p:txBody>
+          <a:bodyPr/>
+          <a:lstStyle/>
+          <a:p>
+            <a:r>
+              <a:rPr lang="en-US" dirty="0" smtClean="0"/>
+              <a:t>Going further …</a:t>
+            </a:r>
+            <a:endParaRPr lang="en-US" dirty="0"/>
+          </a:p>
+        </p:txBody>
+      </p:sp>
+      <p:sp>
+        <p:nvSpPr>
+          <p:cNvPr id="3" name="Content Placeholder 2"/>
+          <p:cNvSpPr>
+            <a:spLocks noGrp="1"/>
+          </p:cNvSpPr>
+          <p:nvPr>
+            <p:ph idx="1"/>
+          </p:nvPr>
+        </p:nvSpPr>
+        <p:spPr/>
+        <p:txBody>
+          <a:bodyPr/>
+          <a:lstStyle/>
+          <a:p>
+            <a:r>
+              <a:rPr lang="en-US" dirty="0" smtClean="0"/>
+              <a:t>Mark </a:t>
+            </a:r>
+            <a:r>
+              <a:rPr lang="en-US" dirty="0" err="1" smtClean="0"/>
+              <a:t>Seemann’s</a:t>
+            </a:r>
+            <a:r>
+              <a:rPr lang="en-US" dirty="0" smtClean="0"/>
+              <a:t> book and blog posts</a:t>
+            </a:r>
+          </a:p>
+          <a:p>
+            <a:r>
+              <a:rPr lang="en-US" dirty="0" smtClean="0"/>
+              <a:t>Conversation about DI in </a:t>
+            </a:r>
+            <a:r>
+              <a:rPr lang="en-US" dirty="0" err="1" smtClean="0"/>
+              <a:t>aspnet</a:t>
+            </a:r>
+            <a:r>
+              <a:rPr lang="en-US" dirty="0" smtClean="0"/>
+              <a:t> </a:t>
+            </a:r>
+            <a:r>
+              <a:rPr lang="en-US" dirty="0" err="1" smtClean="0"/>
+              <a:t>vNext</a:t>
+            </a:r>
+            <a:endParaRPr lang="en-US" dirty="0" smtClean="0"/>
+          </a:p>
+          <a:p>
+            <a:r>
+              <a:rPr lang="en-US" dirty="0" smtClean="0"/>
+              <a:t>SOLID</a:t>
+            </a:r>
+          </a:p>
+          <a:p>
+            <a:r>
+              <a:rPr lang="fr-FR" dirty="0" smtClean="0"/>
+              <a:t>TODO</a:t>
+            </a:r>
+            <a:endParaRPr lang="en-US" dirty="0"/>
+          </a:p>
+        </p:txBody>
+      </p:sp>
+    </p:spTree>
+    <p:extLst>
+      <p:ext uri="{BB962C8B-B14F-4D97-AF65-F5344CB8AC3E}">
+        <p14:creationId xmlns:p14="http://schemas.microsoft.com/office/powerpoint/2010/main" val="3179521032"/>
+      </p:ext>
+    </p:extLst>
+  </p:cSld>
+  <p:clrMapOvr>
+    <a:masterClrMapping/>
+  </p:clrMapOvr>
+  <p:timing>
+    <p:tnLst>
+      <p:par>
+        <p:cTn id="1" dur="indefinite" restart="never" nodeType="tmRoot"/>
+      </p:par>
+    </p:tnLst>
+  </p:timing>
+</p:sld>
+</file>
+
+<file path=ppt/slides/slide46.xml><?xml version="1.0" encoding="utf-8"?>
+<p:sld xmlns:a="http://schemas.openxmlformats.org/drawingml/2006/main" xmlns:r="http://schemas.openxmlformats.org/officeDocument/2006/relationships" xmlns:p="http://schemas.openxmlformats.org/presentationml/2006/main">
+  <p:cSld>
+    <p:spTree>
+      <p:nvGrpSpPr>
+        <p:cNvPr id="1" name=""/>
+        <p:cNvGrpSpPr/>
+        <p:nvPr/>
+      </p:nvGrpSpPr>
+      <p:grpSpPr>
+        <a:xfrm>
+          <a:off x="0" y="0"/>
+          <a:ext cx="0" cy="0"/>
+          <a:chOff x="0" y="0"/>
+          <a:chExt cx="0" cy="0"/>
+        </a:xfrm>
+      </p:grpSpPr>
+      <p:sp>
+        <p:nvSpPr>
+          <p:cNvPr id="4" name="Title 3"/>
+          <p:cNvSpPr>
+            <a:spLocks noGrp="1"/>
+          </p:cNvSpPr>
+          <p:nvPr>
+            <p:ph type="title"/>
+          </p:nvPr>
+        </p:nvSpPr>
+        <p:spPr/>
+        <p:txBody>
+          <a:bodyPr/>
+          <a:lstStyle/>
+          <a:p>
+            <a:r>
+              <a:rPr lang="fr-FR" dirty="0" err="1" smtClean="0"/>
+              <a:t>Q&amp;a</a:t>
+            </a:r>
+            <a:endParaRPr lang="en-US" dirty="0"/>
+          </a:p>
+        </p:txBody>
+      </p:sp>
+      <p:sp>
+        <p:nvSpPr>
+          <p:cNvPr id="5" name="Text Placeholder 4"/>
+          <p:cNvSpPr>
+            <a:spLocks noGrp="1"/>
+          </p:cNvSpPr>
+          <p:nvPr>
+            <p:ph type="body" idx="1"/>
+          </p:nvPr>
+        </p:nvSpPr>
+        <p:spPr/>
+        <p:txBody>
+          <a:bodyPr/>
+          <a:lstStyle/>
+          <a:p>
+            <a:r>
+              <a:rPr lang="fr-FR" dirty="0" smtClean="0"/>
+              <a:t>Shoot !</a:t>
+            </a:r>
+            <a:endParaRPr lang="en-US" dirty="0"/>
+          </a:p>
+        </p:txBody>
+      </p:sp>
+    </p:spTree>
+    <p:extLst>
+      <p:ext uri="{BB962C8B-B14F-4D97-AF65-F5344CB8AC3E}">
+        <p14:creationId xmlns:p14="http://schemas.microsoft.com/office/powerpoint/2010/main" val="660623375"/>
+      </p:ext>
+    </p:extLst>
+  </p:cSld>
+  <p:clrMapOvr>
+    <a:masterClrMapping/>
+  </p:clrMapOvr>
+  <p:timing>
+    <p:tnLst>
+      <p:par>
+        <p:cTn id="1" dur="indefinite" restart="never" nodeType="tmRoot"/>
+      </p:par>
+    </p:tnLst>
+  </p:timing>
+</p:sld>
+</file>
+
+<file path=ppt/slides/slide47.xml><?xml version="1.0" encoding="utf-8"?>
+<p:sld xmlns:a="http://schemas.openxmlformats.org/drawingml/2006/main" xmlns:r="http://schemas.openxmlformats.org/officeDocument/2006/relationships" xmlns:p="http://schemas.openxmlformats.org/presentationml/2006/main">
+  <p:cSld>
+    <p:spTree>
+      <p:nvGrpSpPr>
+        <p:cNvPr id="1" name=""/>
+        <p:cNvGrpSpPr/>
+        <p:nvPr/>
+      </p:nvGrpSpPr>
+      <p:grpSpPr>
+        <a:xfrm>
+          <a:off x="0" y="0"/>
+          <a:ext cx="0" cy="0"/>
+          <a:chOff x="0" y="0"/>
+          <a:chExt cx="0" cy="0"/>
+        </a:xfrm>
+      </p:grpSpPr>
+      <p:sp>
+        <p:nvSpPr>
+          <p:cNvPr id="2" name="Title 1"/>
+          <p:cNvSpPr>
+            <a:spLocks noGrp="1"/>
+          </p:cNvSpPr>
+          <p:nvPr>
+            <p:ph type="title"/>
+          </p:nvPr>
+        </p:nvSpPr>
+        <p:spPr/>
+        <p:txBody>
+          <a:bodyPr/>
+          <a:lstStyle/>
+          <a:p>
+            <a:r>
+              <a:rPr lang="fr-FR" dirty="0" err="1" smtClean="0"/>
+              <a:t>Thanks</a:t>
+            </a:r>
+            <a:r>
+              <a:rPr lang="fr-FR" dirty="0" smtClean="0"/>
+              <a:t> for </a:t>
+            </a:r>
+            <a:r>
+              <a:rPr lang="fr-FR" dirty="0" err="1" smtClean="0"/>
+              <a:t>attending</a:t>
+            </a:r>
+            <a:r>
+              <a:rPr lang="fr-FR" dirty="0" smtClean="0"/>
+              <a:t> !</a:t>
+            </a:r>
+            <a:endParaRPr lang="en-US" dirty="0"/>
+          </a:p>
+        </p:txBody>
+      </p:sp>
+      <p:sp>
+        <p:nvSpPr>
+          <p:cNvPr id="3" name="Text Placeholder 2"/>
+          <p:cNvSpPr>
+            <a:spLocks noGrp="1"/>
+          </p:cNvSpPr>
+          <p:nvPr>
+            <p:ph type="body" idx="1"/>
+          </p:nvPr>
+        </p:nvSpPr>
+        <p:spPr/>
+        <p:txBody>
+          <a:bodyPr/>
+          <a:lstStyle/>
+          <a:p>
+            <a:r>
+              <a:rPr lang="fr-FR" dirty="0" smtClean="0"/>
+              <a:t>Contact : @</a:t>
+            </a:r>
+            <a:r>
+              <a:rPr lang="fr-FR" dirty="0" err="1" smtClean="0"/>
+              <a:t>tsimbalar</a:t>
+            </a:r>
+            <a:endParaRPr lang="en-US" dirty="0"/>
+          </a:p>
+        </p:txBody>
+      </p:sp>
+    </p:spTree>
+    <p:extLst>
+      <p:ext uri="{BB962C8B-B14F-4D97-AF65-F5344CB8AC3E}">
+        <p14:creationId xmlns:p14="http://schemas.microsoft.com/office/powerpoint/2010/main" val="1114269859"/>
+      </p:ext>
+    </p:extLst>
+  </p:cSld>
+  <p:clrMapOvr>
+    <a:masterClrMapping/>
+  </p:clrMapOvr>
+  <p:timing>
+    <p:tnLst>
+      <p:par>
+        <p:cTn id="1" dur="indefinite" restart="never" nodeType="tmRoot"/>
+      </p:par>
+    </p:tnLst>
+  </p:timing>
+</p:sld>
+</file>
+
+<file path=ppt/slides/slide48.xml><?xml version="1.0" encoding="utf-8"?>
+<p:sld xmlns:a="http://schemas.openxmlformats.org/drawingml/2006/main" xmlns:r="http://schemas.openxmlformats.org/officeDocument/2006/relationships" xmlns:p="http://schemas.openxmlformats.org/presentationml/2006/main">
+  <p:cSld>
+    <p:spTree>
+      <p:nvGrpSpPr>
+        <p:cNvPr id="1" name=""/>
+        <p:cNvGrpSpPr/>
+        <p:nvPr/>
+      </p:nvGrpSpPr>
+      <p:grpSpPr>
+        <a:xfrm>
+          <a:off x="0" y="0"/>
+          <a:ext cx="0" cy="0"/>
+          <a:chOff x="0" y="0"/>
+          <a:chExt cx="0" cy="0"/>
+        </a:xfrm>
+      </p:grpSpPr>
+      <p:sp>
+        <p:nvSpPr>
           <p:cNvPr id="4" name="Title 3"/>
           <p:cNvSpPr>
             <a:spLocks noGrp="1"/>
@@ -43682,7 +47994,7 @@
 </p:sld>
 </file>
 
-<file path=ppt/slides/slide46.xml><?xml version="1.0" encoding="utf-8"?>
+<file path=ppt/slides/slide49.xml><?xml version="1.0" encoding="utf-8"?>
 <p:sld xmlns:a="http://schemas.openxmlformats.org/drawingml/2006/main" xmlns:r="http://schemas.openxmlformats.org/officeDocument/2006/relationships" xmlns:p="http://schemas.openxmlformats.org/presentationml/2006/main">
   <p:cSld>
     <p:spTree>

</xml_diff>